<commit_message>
Fix bug in outer merge. Add head, tail, nsmallest
</commit_message>
<xml_diff>
--- a/doc/cheatsheet/Pandas_Cheat_Sheet.pptx
+++ b/doc/cheatsheet/Pandas_Cheat_Sheet.pptx
@@ -244,7 +244,7 @@
           <a:p>
             <a:fld id="{79278B33-2949-49BE-B3B0-3F16CAF906FE}" type="datetimeFigureOut">
               <a:rPr lang="en-US" smtClean="0"/>
-              <a:t>12/21/2016</a:t>
+              <a:t>12/22/2016</a:t>
             </a:fld>
             <a:endParaRPr lang="en-US"/>
           </a:p>
@@ -414,7 +414,7 @@
           <a:p>
             <a:fld id="{79278B33-2949-49BE-B3B0-3F16CAF906FE}" type="datetimeFigureOut">
               <a:rPr lang="en-US" smtClean="0"/>
-              <a:t>12/21/2016</a:t>
+              <a:t>12/22/2016</a:t>
             </a:fld>
             <a:endParaRPr lang="en-US"/>
           </a:p>
@@ -594,7 +594,7 @@
           <a:p>
             <a:fld id="{79278B33-2949-49BE-B3B0-3F16CAF906FE}" type="datetimeFigureOut">
               <a:rPr lang="en-US" smtClean="0"/>
-              <a:t>12/21/2016</a:t>
+              <a:t>12/22/2016</a:t>
             </a:fld>
             <a:endParaRPr lang="en-US"/>
           </a:p>
@@ -764,7 +764,7 @@
           <a:p>
             <a:fld id="{79278B33-2949-49BE-B3B0-3F16CAF906FE}" type="datetimeFigureOut">
               <a:rPr lang="en-US" smtClean="0"/>
-              <a:t>12/21/2016</a:t>
+              <a:t>12/22/2016</a:t>
             </a:fld>
             <a:endParaRPr lang="en-US"/>
           </a:p>
@@ -1008,7 +1008,7 @@
           <a:p>
             <a:fld id="{79278B33-2949-49BE-B3B0-3F16CAF906FE}" type="datetimeFigureOut">
               <a:rPr lang="en-US" smtClean="0"/>
-              <a:t>12/21/2016</a:t>
+              <a:t>12/22/2016</a:t>
             </a:fld>
             <a:endParaRPr lang="en-US"/>
           </a:p>
@@ -1240,7 +1240,7 @@
           <a:p>
             <a:fld id="{79278B33-2949-49BE-B3B0-3F16CAF906FE}" type="datetimeFigureOut">
               <a:rPr lang="en-US" smtClean="0"/>
-              <a:t>12/21/2016</a:t>
+              <a:t>12/22/2016</a:t>
             </a:fld>
             <a:endParaRPr lang="en-US"/>
           </a:p>
@@ -1607,7 +1607,7 @@
           <a:p>
             <a:fld id="{79278B33-2949-49BE-B3B0-3F16CAF906FE}" type="datetimeFigureOut">
               <a:rPr lang="en-US" smtClean="0"/>
-              <a:t>12/21/2016</a:t>
+              <a:t>12/22/2016</a:t>
             </a:fld>
             <a:endParaRPr lang="en-US"/>
           </a:p>
@@ -1725,7 +1725,7 @@
           <a:p>
             <a:fld id="{79278B33-2949-49BE-B3B0-3F16CAF906FE}" type="datetimeFigureOut">
               <a:rPr lang="en-US" smtClean="0"/>
-              <a:t>12/21/2016</a:t>
+              <a:t>12/22/2016</a:t>
             </a:fld>
             <a:endParaRPr lang="en-US"/>
           </a:p>
@@ -1820,7 +1820,7 @@
           <a:p>
             <a:fld id="{79278B33-2949-49BE-B3B0-3F16CAF906FE}" type="datetimeFigureOut">
               <a:rPr lang="en-US" smtClean="0"/>
-              <a:t>12/21/2016</a:t>
+              <a:t>12/22/2016</a:t>
             </a:fld>
             <a:endParaRPr lang="en-US"/>
           </a:p>
@@ -2097,7 +2097,7 @@
           <a:p>
             <a:fld id="{79278B33-2949-49BE-B3B0-3F16CAF906FE}" type="datetimeFigureOut">
               <a:rPr lang="en-US" smtClean="0"/>
-              <a:t>12/21/2016</a:t>
+              <a:t>12/22/2016</a:t>
             </a:fld>
             <a:endParaRPr lang="en-US"/>
           </a:p>
@@ -2354,7 +2354,7 @@
           <a:p>
             <a:fld id="{79278B33-2949-49BE-B3B0-3F16CAF906FE}" type="datetimeFigureOut">
               <a:rPr lang="en-US" smtClean="0"/>
-              <a:t>12/21/2016</a:t>
+              <a:t>12/22/2016</a:t>
             </a:fld>
             <a:endParaRPr lang="en-US"/>
           </a:p>
@@ -2567,7 +2567,7 @@
           <a:p>
             <a:fld id="{79278B33-2949-49BE-B3B0-3F16CAF906FE}" type="datetimeFigureOut">
               <a:rPr lang="en-US" smtClean="0"/>
-              <a:t>12/21/2016</a:t>
+              <a:t>12/22/2016</a:t>
             </a:fld>
             <a:endParaRPr lang="en-US"/>
           </a:p>
@@ -12515,8 +12515,8 @@
         </p:nvSpPr>
         <p:spPr>
           <a:xfrm>
-            <a:off x="3958595" y="6980115"/>
-            <a:ext cx="4504529" cy="2308324"/>
+            <a:off x="3958595" y="7063240"/>
+            <a:ext cx="2468370" cy="1938992"/>
           </a:xfrm>
           <a:prstGeom prst="rect">
             <a:avLst/>
@@ -12558,160 +12558,108 @@
             </a:endParaRPr>
           </a:p>
           <a:p>
+            <a:pPr marL="174625"/>
+            <a:r>
+              <a:rPr lang="en-US" sz="1200" dirty="0" smtClean="0"/>
+              <a:t>Extract </a:t>
+            </a:r>
+            <a:r>
+              <a:rPr lang="en-US" sz="1200" dirty="0" smtClean="0"/>
+              <a:t>rows that meet logical criteria.</a:t>
+            </a:r>
+          </a:p>
+          <a:p>
+            <a:r>
+              <a:rPr lang="en-US" sz="1200" b="1" dirty="0" err="1">
+                <a:latin typeface="Consolas" panose="020B0609020204030204" pitchFamily="49" charset="0"/>
+              </a:rPr>
+              <a:t>d</a:t>
+            </a:r>
+            <a:r>
+              <a:rPr lang="en-US" sz="1200" b="1" dirty="0" err="1" smtClean="0">
+                <a:latin typeface="Consolas" panose="020B0609020204030204" pitchFamily="49" charset="0"/>
+              </a:rPr>
+              <a:t>f.drop_duplicates</a:t>
+            </a:r>
+            <a:r>
+              <a:rPr lang="en-US" sz="1200" b="1" dirty="0" smtClean="0">
+                <a:latin typeface="Consolas" panose="020B0609020204030204" pitchFamily="49" charset="0"/>
+              </a:rPr>
+              <a:t>()</a:t>
+            </a:r>
+          </a:p>
+          <a:p>
+            <a:pPr marL="174625"/>
+            <a:r>
+              <a:rPr lang="en-US" sz="1200" dirty="0" smtClean="0"/>
+              <a:t>Remove </a:t>
+            </a:r>
             <a:r>
               <a:rPr lang="en-US" sz="1200" dirty="0"/>
-              <a:t> </a:t>
-            </a:r>
-            <a:r>
-              <a:rPr lang="en-US" sz="1200" dirty="0" smtClean="0"/>
-              <a:t>    Extract rows that meet logical criteria.</a:t>
-            </a:r>
-          </a:p>
-          <a:p>
-            <a:r>
-              <a:rPr lang="en-US" sz="1200" b="1" dirty="0" err="1">
-                <a:latin typeface="Consolas" panose="020B0609020204030204" pitchFamily="49" charset="0"/>
-              </a:rPr>
-              <a:t>d</a:t>
-            </a:r>
+              <a:t>duplicate rows (only considers columns).</a:t>
+            </a:r>
+          </a:p>
+          <a:p>
             <a:r>
               <a:rPr lang="en-US" sz="1200" b="1" dirty="0" err="1" smtClean="0">
                 <a:latin typeface="Consolas" panose="020B0609020204030204" pitchFamily="49" charset="0"/>
               </a:rPr>
-              <a:t>f.drop_duplicates</a:t>
+              <a:t>df.head</a:t>
             </a:r>
             <a:r>
               <a:rPr lang="en-US" sz="1200" b="1" dirty="0" smtClean="0">
                 <a:latin typeface="Consolas" panose="020B0609020204030204" pitchFamily="49" charset="0"/>
               </a:rPr>
-              <a:t>()</a:t>
-            </a:r>
-          </a:p>
-          <a:p>
-            <a:r>
-              <a:rPr lang="en-US" sz="1200" dirty="0"/>
-              <a:t> </a:t>
-            </a:r>
-            <a:r>
-              <a:rPr lang="en-US" sz="1200" dirty="0" smtClean="0"/>
-              <a:t>    Remove duplicate rows (only considers columns).</a:t>
-            </a:r>
-          </a:p>
-          <a:p>
-            <a:r>
-              <a:rPr lang="en-US" sz="1200" b="1" dirty="0" err="1" smtClean="0">
-                <a:latin typeface="Consolas" panose="020B0609020204030204" pitchFamily="49" charset="0"/>
-              </a:rPr>
-              <a:t>df.sample</a:t>
-            </a:r>
-            <a:r>
-              <a:rPr lang="en-US" sz="1200" b="1" dirty="0" smtClean="0">
-                <a:latin typeface="Consolas" panose="020B0609020204030204" pitchFamily="49" charset="0"/>
-              </a:rPr>
-              <a:t>(</a:t>
-            </a:r>
-            <a:r>
-              <a:rPr lang="en-US" sz="1200" b="1" dirty="0" err="1" smtClean="0">
-                <a:latin typeface="Consolas" panose="020B0609020204030204" pitchFamily="49" charset="0"/>
-              </a:rPr>
-              <a:t>frac</a:t>
-            </a:r>
-            <a:r>
-              <a:rPr lang="en-US" sz="1200" b="1" dirty="0" smtClean="0">
-                <a:latin typeface="Consolas" panose="020B0609020204030204" pitchFamily="49" charset="0"/>
-              </a:rPr>
-              <a:t>=0.5)</a:t>
-            </a:r>
-          </a:p>
-          <a:p>
-            <a:r>
-              <a:rPr lang="en-US" sz="1200" dirty="0"/>
-              <a:t> </a:t>
-            </a:r>
-            <a:r>
-              <a:rPr lang="en-US" sz="1200" dirty="0" smtClean="0"/>
-              <a:t>    Randomly select fraction of rows.</a:t>
-            </a:r>
-          </a:p>
-          <a:p>
-            <a:r>
-              <a:rPr lang="en-US" sz="1200" b="1" dirty="0" err="1" smtClean="0">
-                <a:latin typeface="Consolas" panose="020B0609020204030204" pitchFamily="49" charset="0"/>
-              </a:rPr>
-              <a:t>df.sample</a:t>
-            </a:r>
-            <a:r>
-              <a:rPr lang="en-US" sz="1200" b="1" dirty="0" smtClean="0">
-                <a:latin typeface="Consolas" panose="020B0609020204030204" pitchFamily="49" charset="0"/>
-              </a:rPr>
-              <a:t>(n=10)</a:t>
+              <a:t>(n)</a:t>
             </a:r>
             <a:endParaRPr lang="en-US" sz="1200" b="1" dirty="0">
               <a:latin typeface="Consolas" panose="020B0609020204030204" pitchFamily="49" charset="0"/>
             </a:endParaRPr>
           </a:p>
           <a:p>
+            <a:pPr marL="174625"/>
             <a:r>
               <a:rPr lang="en-US" sz="1200" dirty="0" smtClean="0"/>
-              <a:t>     Randomly </a:t>
-            </a:r>
+              <a:t>Select first n rows.</a:t>
+            </a:r>
+          </a:p>
+          <a:p>
+            <a:r>
+              <a:rPr lang="en-US" sz="1200" b="1" dirty="0" err="1" smtClean="0">
+                <a:latin typeface="Consolas" panose="020B0609020204030204" pitchFamily="49" charset="0"/>
+              </a:rPr>
+              <a:t>df.tail</a:t>
+            </a:r>
+            <a:r>
+              <a:rPr lang="en-US" sz="1200" b="1" dirty="0" smtClean="0">
+                <a:latin typeface="Consolas" panose="020B0609020204030204" pitchFamily="49" charset="0"/>
+              </a:rPr>
+              <a:t>(n</a:t>
+            </a:r>
+            <a:r>
+              <a:rPr lang="en-US" sz="1200" b="1" dirty="0">
+                <a:latin typeface="Consolas" panose="020B0609020204030204" pitchFamily="49" charset="0"/>
+              </a:rPr>
+              <a:t>)</a:t>
+            </a:r>
+          </a:p>
+          <a:p>
+            <a:pPr marL="174625"/>
             <a:r>
               <a:rPr lang="en-US" sz="1200" dirty="0"/>
-              <a:t>select </a:t>
+              <a:t>Select </a:t>
             </a:r>
             <a:r>
               <a:rPr lang="en-US" sz="1200" dirty="0" smtClean="0"/>
-              <a:t>n rows.</a:t>
-            </a:r>
-            <a:endParaRPr lang="en-US" sz="1200" dirty="0"/>
-          </a:p>
-          <a:p>
-            <a:r>
-              <a:rPr lang="en-US" sz="1200" b="1" dirty="0" err="1" smtClean="0">
-                <a:latin typeface="Consolas" panose="020B0609020204030204" pitchFamily="49" charset="0"/>
-              </a:rPr>
-              <a:t>df.iloc</a:t>
-            </a:r>
-            <a:r>
-              <a:rPr lang="en-US" sz="1200" b="1" dirty="0" smtClean="0">
-                <a:latin typeface="Consolas" panose="020B0609020204030204" pitchFamily="49" charset="0"/>
-              </a:rPr>
-              <a:t>[10:20]</a:t>
-            </a:r>
-          </a:p>
-          <a:p>
+              <a:t>last n </a:t>
+            </a:r>
             <a:r>
               <a:rPr lang="en-US" sz="1200" dirty="0"/>
-              <a:t> </a:t>
+              <a:t>rows</a:t>
             </a:r>
             <a:r>
               <a:rPr lang="en-US" sz="1200" dirty="0" smtClean="0"/>
-              <a:t>    Select rows by position.</a:t>
-            </a:r>
-            <a:endParaRPr lang="en-US" sz="1200" dirty="0"/>
-          </a:p>
-          <a:p>
-            <a:r>
-              <a:rPr lang="en-US" sz="1200" b="1" dirty="0" err="1" smtClean="0">
-                <a:latin typeface="Consolas" panose="020B0609020204030204" pitchFamily="49" charset="0"/>
-              </a:rPr>
-              <a:t>df.nlargest</a:t>
-            </a:r>
-            <a:r>
-              <a:rPr lang="en-US" sz="1200" b="1" dirty="0" smtClean="0">
-                <a:latin typeface="Consolas" panose="020B0609020204030204" pitchFamily="49" charset="0"/>
-              </a:rPr>
-              <a:t>(10, 'value')</a:t>
-            </a:r>
-          </a:p>
-          <a:p>
-            <a:r>
-              <a:rPr lang="en-US" sz="1200" dirty="0"/>
-              <a:t> </a:t>
-            </a:r>
-            <a:r>
-              <a:rPr lang="en-US" sz="1200" dirty="0" smtClean="0"/>
-              <a:t>    Select and order top n entries.</a:t>
+              <a:t>.</a:t>
             </a:r>
             <a:endParaRPr lang="en-US" sz="1200" dirty="0"/>
           </a:p>
@@ -14292,11 +14240,7 @@
             </a:r>
             <a:r>
               <a:rPr lang="en-US" sz="800" dirty="0" smtClean="0"/>
-              <a:t>) </a:t>
-            </a:r>
-            <a:r>
-              <a:rPr lang="en-US" sz="800" dirty="0" smtClean="0"/>
-              <a:t> Written by Irv Lustig, </a:t>
+              <a:t>)  Written by Irv Lustig, </a:t>
             </a:r>
             <a:r>
               <a:rPr lang="en-US" sz="800" dirty="0" smtClean="0">
@@ -16284,6 +16228,208 @@
           </a:graphicData>
         </a:graphic>
       </p:graphicFrame>
+      <p:sp>
+        <p:nvSpPr>
+          <p:cNvPr id="89" name="TextBox 88"/>
+          <p:cNvSpPr txBox="1"/>
+          <p:nvPr/>
+        </p:nvSpPr>
+        <p:spPr>
+          <a:xfrm>
+            <a:off x="6331165" y="7063240"/>
+            <a:ext cx="2492075" cy="1938992"/>
+          </a:xfrm>
+          <a:prstGeom prst="rect">
+            <a:avLst/>
+          </a:prstGeom>
+          <a:noFill/>
+        </p:spPr>
+        <p:txBody>
+          <a:bodyPr wrap="square" rtlCol="0">
+            <a:spAutoFit/>
+          </a:bodyPr>
+          <a:lstStyle/>
+          <a:p>
+            <a:r>
+              <a:rPr lang="en-US" sz="1200" b="1" dirty="0" err="1">
+                <a:latin typeface="Consolas" panose="020B0609020204030204" pitchFamily="49" charset="0"/>
+              </a:rPr>
+              <a:t>df.sample</a:t>
+            </a:r>
+            <a:r>
+              <a:rPr lang="en-US" sz="1200" b="1" dirty="0">
+                <a:latin typeface="Consolas" panose="020B0609020204030204" pitchFamily="49" charset="0"/>
+              </a:rPr>
+              <a:t>(</a:t>
+            </a:r>
+            <a:r>
+              <a:rPr lang="en-US" sz="1200" b="1" dirty="0" err="1">
+                <a:latin typeface="Consolas" panose="020B0609020204030204" pitchFamily="49" charset="0"/>
+              </a:rPr>
+              <a:t>frac</a:t>
+            </a:r>
+            <a:r>
+              <a:rPr lang="en-US" sz="1200" b="1" dirty="0">
+                <a:latin typeface="Consolas" panose="020B0609020204030204" pitchFamily="49" charset="0"/>
+              </a:rPr>
+              <a:t>=0.5)</a:t>
+            </a:r>
+          </a:p>
+          <a:p>
+            <a:pPr marL="174625"/>
+            <a:r>
+              <a:rPr lang="en-US" sz="1200" dirty="0" smtClean="0"/>
+              <a:t>Randomly </a:t>
+            </a:r>
+            <a:r>
+              <a:rPr lang="en-US" sz="1200" dirty="0"/>
+              <a:t>select fraction of rows. </a:t>
+            </a:r>
+            <a:endParaRPr lang="en-US" sz="1200" dirty="0"/>
+          </a:p>
+          <a:p>
+            <a:r>
+              <a:rPr lang="en-US" sz="1200" b="1" dirty="0" err="1" smtClean="0">
+                <a:latin typeface="Consolas" panose="020B0609020204030204" pitchFamily="49" charset="0"/>
+              </a:rPr>
+              <a:t>df.sample</a:t>
+            </a:r>
+            <a:r>
+              <a:rPr lang="en-US" sz="1200" b="1" dirty="0" smtClean="0">
+                <a:latin typeface="Consolas" panose="020B0609020204030204" pitchFamily="49" charset="0"/>
+              </a:rPr>
+              <a:t>(n=10</a:t>
+            </a:r>
+            <a:r>
+              <a:rPr lang="en-US" sz="1200" b="1" dirty="0" smtClean="0">
+                <a:latin typeface="Consolas" panose="020B0609020204030204" pitchFamily="49" charset="0"/>
+              </a:rPr>
+              <a:t>)</a:t>
+            </a:r>
+            <a:endParaRPr lang="en-US" sz="1200" b="1" dirty="0">
+              <a:latin typeface="Consolas" panose="020B0609020204030204" pitchFamily="49" charset="0"/>
+            </a:endParaRPr>
+          </a:p>
+          <a:p>
+            <a:r>
+              <a:rPr lang="en-US" sz="1200" dirty="0" smtClean="0"/>
+              <a:t>     Randomly </a:t>
+            </a:r>
+            <a:r>
+              <a:rPr lang="en-US" sz="1200" dirty="0"/>
+              <a:t>select </a:t>
+            </a:r>
+            <a:r>
+              <a:rPr lang="en-US" sz="1200" dirty="0" smtClean="0"/>
+              <a:t>n rows.</a:t>
+            </a:r>
+            <a:endParaRPr lang="en-US" sz="1200" dirty="0"/>
+          </a:p>
+          <a:p>
+            <a:r>
+              <a:rPr lang="en-US" sz="1200" b="1" dirty="0" err="1" smtClean="0">
+                <a:latin typeface="Consolas" panose="020B0609020204030204" pitchFamily="49" charset="0"/>
+              </a:rPr>
+              <a:t>df.iloc</a:t>
+            </a:r>
+            <a:r>
+              <a:rPr lang="en-US" sz="1200" b="1" dirty="0" smtClean="0">
+                <a:latin typeface="Consolas" panose="020B0609020204030204" pitchFamily="49" charset="0"/>
+              </a:rPr>
+              <a:t>[10:20]</a:t>
+            </a:r>
+          </a:p>
+          <a:p>
+            <a:r>
+              <a:rPr lang="en-US" sz="1200" dirty="0"/>
+              <a:t> </a:t>
+            </a:r>
+            <a:r>
+              <a:rPr lang="en-US" sz="1200" dirty="0" smtClean="0"/>
+              <a:t>    Select rows by position.</a:t>
+            </a:r>
+            <a:endParaRPr lang="en-US" sz="1200" dirty="0"/>
+          </a:p>
+          <a:p>
+            <a:r>
+              <a:rPr lang="en-US" sz="1200" b="1" dirty="0" err="1" smtClean="0">
+                <a:latin typeface="Consolas" panose="020B0609020204030204" pitchFamily="49" charset="0"/>
+              </a:rPr>
+              <a:t>df.nlargest</a:t>
+            </a:r>
+            <a:r>
+              <a:rPr lang="en-US" sz="1200" b="1" dirty="0" smtClean="0">
+                <a:latin typeface="Consolas" panose="020B0609020204030204" pitchFamily="49" charset="0"/>
+              </a:rPr>
+              <a:t>(n, </a:t>
+            </a:r>
+            <a:r>
+              <a:rPr lang="en-US" sz="1200" b="1" dirty="0" smtClean="0">
+                <a:latin typeface="Consolas" panose="020B0609020204030204" pitchFamily="49" charset="0"/>
+              </a:rPr>
+              <a:t>'value')</a:t>
+            </a:r>
+          </a:p>
+          <a:p>
+            <a:r>
+              <a:rPr lang="en-US" sz="1200" dirty="0"/>
+              <a:t> </a:t>
+            </a:r>
+            <a:r>
+              <a:rPr lang="en-US" sz="1200" dirty="0" smtClean="0"/>
+              <a:t>    Select and order top n entries</a:t>
+            </a:r>
+            <a:r>
+              <a:rPr lang="en-US" sz="1200" dirty="0" smtClean="0"/>
+              <a:t>.</a:t>
+            </a:r>
+          </a:p>
+          <a:p>
+            <a:r>
+              <a:rPr lang="en-US" sz="1200" b="1" dirty="0" err="1" smtClean="0">
+                <a:latin typeface="Consolas" panose="020B0609020204030204" pitchFamily="49" charset="0"/>
+              </a:rPr>
+              <a:t>df.nsmallest</a:t>
+            </a:r>
+            <a:r>
+              <a:rPr lang="en-US" sz="1200" b="1" dirty="0" smtClean="0">
+                <a:latin typeface="Consolas" panose="020B0609020204030204" pitchFamily="49" charset="0"/>
+              </a:rPr>
+              <a:t>(n, </a:t>
+            </a:r>
+            <a:r>
+              <a:rPr lang="en-US" sz="1200" b="1" dirty="0">
+                <a:latin typeface="Consolas" panose="020B0609020204030204" pitchFamily="49" charset="0"/>
+              </a:rPr>
+              <a:t>'value')</a:t>
+            </a:r>
+          </a:p>
+          <a:p>
+            <a:pPr marL="174625"/>
+            <a:r>
+              <a:rPr lang="en-US" sz="1200" dirty="0" smtClean="0"/>
+              <a:t>Select </a:t>
+            </a:r>
+            <a:r>
+              <a:rPr lang="en-US" sz="1200" dirty="0"/>
+              <a:t>and order </a:t>
+            </a:r>
+            <a:r>
+              <a:rPr lang="en-US" sz="1200" dirty="0"/>
+              <a:t>bottom n </a:t>
+            </a:r>
+            <a:r>
+              <a:rPr lang="en-US" sz="1200" dirty="0"/>
+              <a:t>entries</a:t>
+            </a:r>
+            <a:r>
+              <a:rPr lang="en-US" sz="1200" dirty="0"/>
+              <a:t>.</a:t>
+            </a:r>
+            <a:endParaRPr lang="en-US" sz="1200" dirty="0"/>
+          </a:p>
+        </p:txBody>
+      </p:sp>
     </p:spTree>
     <p:extLst>
       <p:ext uri="{BB962C8B-B14F-4D97-AF65-F5344CB8AC3E}">
@@ -22336,7 +22482,19 @@
               <a:rPr lang="en-US" sz="1200" b="1" dirty="0">
                 <a:latin typeface="Consolas" panose="020B0609020204030204" pitchFamily="49" charset="0"/>
               </a:rPr>
-              <a:t>         how='inner', on='x1')</a:t>
+              <a:t>         how=</a:t>
+            </a:r>
+            <a:r>
+              <a:rPr lang="en-US" sz="1200" b="1" dirty="0" smtClean="0">
+                <a:latin typeface="Consolas" panose="020B0609020204030204" pitchFamily="49" charset="0"/>
+              </a:rPr>
+              <a:t>'outer</a:t>
+            </a:r>
+            <a:r>
+              <a:rPr lang="en-US" sz="1200" b="1" dirty="0">
+                <a:latin typeface="Consolas" panose="020B0609020204030204" pitchFamily="49" charset="0"/>
+              </a:rPr>
+              <a:t>', on='x1')</a:t>
             </a:r>
           </a:p>
           <a:p>

</xml_diff>

<commit_message>
Rebasing to get latest version of cheatsheet
</commit_message>
<xml_diff>
--- a/doc/cheatsheet/Pandas_Cheat_Sheet.pptx
+++ b/doc/cheatsheet/Pandas_Cheat_Sheet.pptx
@@ -12561,11 +12561,7 @@
             <a:pPr marL="174625"/>
             <a:r>
               <a:rPr lang="en-US" sz="1200" dirty="0" smtClean="0"/>
-              <a:t>Extract </a:t>
-            </a:r>
-            <a:r>
-              <a:rPr lang="en-US" sz="1200" dirty="0" smtClean="0"/>
-              <a:t>rows that meet logical criteria.</a:t>
+              <a:t>Extract rows that meet logical criteria.</a:t>
             </a:r>
           </a:p>
           <a:p>
@@ -12674,14 +12670,14 @@
           <p:nvPr>
             <p:extLst>
               <p:ext uri="{D42A27DB-BD31-4B8C-83A1-F6EECF244321}">
-                <p14:modId xmlns:p14="http://schemas.microsoft.com/office/powerpoint/2010/main" val="2914391951"/>
+                <p14:modId xmlns:p14="http://schemas.microsoft.com/office/powerpoint/2010/main" val="2405697195"/>
               </p:ext>
             </p:extLst>
           </p:nvPr>
         </p:nvGraphicFramePr>
         <p:xfrm>
           <a:off x="3946615" y="9243804"/>
-          <a:ext cx="4706255" cy="1374905"/>
+          <a:ext cx="4814590" cy="1374905"/>
         </p:xfrm>
         <a:graphic>
           <a:graphicData uri="http://schemas.openxmlformats.org/drawingml/2006/table">
@@ -12690,10 +12686,10 @@
                 <a:tableStyleId>{5C22544A-7EE6-4342-B048-85BDC9FD1C3A}</a:tableStyleId>
               </a:tblPr>
               <a:tblGrid>
-                <a:gridCol w="225695"/>
-                <a:gridCol w="1143000"/>
-                <a:gridCol w="1737360"/>
-                <a:gridCol w="1600200"/>
+                <a:gridCol w="230890"/>
+                <a:gridCol w="1175988"/>
+                <a:gridCol w="1770676"/>
+                <a:gridCol w="1637036"/>
               </a:tblGrid>
               <a:tr h="231905">
                 <a:tc gridSpan="4">
@@ -12985,7 +12981,7 @@
                       <a:headEnd type="none" w="med" len="med"/>
                       <a:tailEnd type="none" w="med" len="med"/>
                     </a:lnL>
-                    <a:lnR w="12700" cap="flat" cmpd="sng" algn="ctr">
+                    <a:lnR w="76200" cap="flat" cmpd="sng" algn="ctr">
                       <a:solidFill>
                         <a:schemeClr val="accent5"/>
                       </a:solidFill>
@@ -13036,7 +13032,7 @@
                     </a:p>
                   </a:txBody>
                   <a:tcPr marL="45720" marR="45720">
-                    <a:lnL w="12700" cap="flat" cmpd="sng" algn="ctr">
+                    <a:lnL w="76200" cap="flat" cmpd="sng" algn="ctr">
                       <a:solidFill>
                         <a:schemeClr val="accent5"/>
                       </a:solidFill>
@@ -13219,7 +13215,7 @@
                       <a:headEnd type="none" w="med" len="med"/>
                       <a:tailEnd type="none" w="med" len="med"/>
                     </a:lnL>
-                    <a:lnR w="12700" cap="flat" cmpd="sng" algn="ctr">
+                    <a:lnR w="76200" cap="flat" cmpd="sng" algn="ctr">
                       <a:solidFill>
                         <a:schemeClr val="accent5"/>
                       </a:solidFill>
@@ -13288,7 +13284,7 @@
                     </a:p>
                   </a:txBody>
                   <a:tcPr marL="45720" marR="45720">
-                    <a:lnL w="12700" cap="flat" cmpd="sng" algn="ctr">
+                    <a:lnL w="76200" cap="flat" cmpd="sng" algn="ctr">
                       <a:solidFill>
                         <a:schemeClr val="accent5"/>
                       </a:solidFill>
@@ -13471,7 +13467,7 @@
                       <a:headEnd type="none" w="med" len="med"/>
                       <a:tailEnd type="none" w="med" len="med"/>
                     </a:lnL>
-                    <a:lnR w="12700" cap="flat" cmpd="sng" algn="ctr">
+                    <a:lnR w="76200" cap="flat" cmpd="sng" algn="ctr">
                       <a:solidFill>
                         <a:schemeClr val="accent5"/>
                       </a:solidFill>
@@ -13540,7 +13536,7 @@
                     </a:p>
                   </a:txBody>
                   <a:tcPr marL="45720" marR="45720">
-                    <a:lnL w="12700" cap="flat" cmpd="sng" algn="ctr">
+                    <a:lnL w="76200" cap="flat" cmpd="sng" algn="ctr">
                       <a:solidFill>
                         <a:schemeClr val="accent5"/>
                       </a:solidFill>
@@ -13727,7 +13723,7 @@
                       <a:headEnd type="none" w="med" len="med"/>
                       <a:tailEnd type="none" w="med" len="med"/>
                     </a:lnL>
-                    <a:lnR w="12700" cap="flat" cmpd="sng" algn="ctr">
+                    <a:lnR w="76200" cap="flat" cmpd="sng" algn="ctr">
                       <a:solidFill>
                         <a:schemeClr val="accent5"/>
                       </a:solidFill>
@@ -13796,7 +13792,7 @@
                     </a:p>
                   </a:txBody>
                   <a:tcPr marL="45720" marR="45720">
-                    <a:lnL w="12700" cap="flat" cmpd="sng" algn="ctr">
+                    <a:lnL w="76200" cap="flat" cmpd="sng" algn="ctr">
                       <a:solidFill>
                         <a:schemeClr val="accent5"/>
                       </a:solidFill>
@@ -13983,7 +13979,7 @@
                       <a:headEnd type="none" w="med" len="med"/>
                       <a:tailEnd type="none" w="med" len="med"/>
                     </a:lnL>
-                    <a:lnR w="12700" cap="flat" cmpd="sng" algn="ctr">
+                    <a:lnR w="76200" cap="flat" cmpd="sng" algn="ctr">
                       <a:solidFill>
                         <a:schemeClr val="accent5"/>
                       </a:solidFill>
@@ -14058,7 +14054,7 @@
                     </a:p>
                   </a:txBody>
                   <a:tcPr marL="45720" marR="45720">
-                    <a:lnL w="12700" cap="flat" cmpd="sng" algn="ctr">
+                    <a:lnL w="76200" cap="flat" cmpd="sng" algn="ctr">
                       <a:solidFill>
                         <a:schemeClr val="accent5"/>
                       </a:solidFill>
@@ -16285,7 +16281,6 @@
               <a:rPr lang="en-US" sz="1200" dirty="0"/>
               <a:t>select fraction of rows. </a:t>
             </a:r>
-            <a:endParaRPr lang="en-US" sz="1200" dirty="0"/>
           </a:p>
           <a:p>
             <a:r>
@@ -16298,13 +16293,7 @@
               <a:rPr lang="en-US" sz="1200" b="1" dirty="0" smtClean="0">
                 <a:latin typeface="Consolas" panose="020B0609020204030204" pitchFamily="49" charset="0"/>
               </a:rPr>
-              <a:t>(n=10</a:t>
-            </a:r>
-            <a:r>
-              <a:rPr lang="en-US" sz="1200" b="1" dirty="0" smtClean="0">
-                <a:latin typeface="Consolas" panose="020B0609020204030204" pitchFamily="49" charset="0"/>
-              </a:rPr>
-              <a:t>)</a:t>
+              <a:t>(n=10)</a:t>
             </a:r>
             <a:endParaRPr lang="en-US" sz="1200" b="1" dirty="0">
               <a:latin typeface="Consolas" panose="020B0609020204030204" pitchFamily="49" charset="0"/>
@@ -16361,13 +16350,7 @@
               <a:rPr lang="en-US" sz="1200" b="1" dirty="0" smtClean="0">
                 <a:latin typeface="Consolas" panose="020B0609020204030204" pitchFamily="49" charset="0"/>
               </a:rPr>
-              <a:t>(n, </a:t>
-            </a:r>
-            <a:r>
-              <a:rPr lang="en-US" sz="1200" b="1" dirty="0" smtClean="0">
-                <a:latin typeface="Consolas" panose="020B0609020204030204" pitchFamily="49" charset="0"/>
-              </a:rPr>
-              <a:t>'value')</a:t>
+              <a:t>(n, 'value')</a:t>
             </a:r>
           </a:p>
           <a:p>
@@ -16377,11 +16360,7 @@
             </a:r>
             <a:r>
               <a:rPr lang="en-US" sz="1200" dirty="0" smtClean="0"/>
-              <a:t>    Select and order top n entries</a:t>
-            </a:r>
-            <a:r>
-              <a:rPr lang="en-US" sz="1200" dirty="0" smtClean="0"/>
-              <a:t>.</a:t>
+              <a:t>    Select and order top n entries.</a:t>
             </a:r>
           </a:p>
           <a:p>
@@ -16412,21 +16391,8 @@
             </a:r>
             <a:r>
               <a:rPr lang="en-US" sz="1200" dirty="0"/>
-              <a:t>and order </a:t>
-            </a:r>
-            <a:r>
-              <a:rPr lang="en-US" sz="1200" dirty="0"/>
-              <a:t>bottom n </a:t>
-            </a:r>
-            <a:r>
-              <a:rPr lang="en-US" sz="1200" dirty="0"/>
-              <a:t>entries</a:t>
-            </a:r>
-            <a:r>
-              <a:rPr lang="en-US" sz="1200" dirty="0"/>
-              <a:t>.</a:t>
-            </a:r>
-            <a:endParaRPr lang="en-US" sz="1200" dirty="0"/>
+              <a:t>and order bottom n entries.</a:t>
+            </a:r>
           </a:p>
         </p:txBody>
       </p:sp>

</xml_diff>

<commit_message>
docs cheat sheet pandas Pd to pd
Change pandas syntax from Pd to pd
</commit_message>
<xml_diff>
--- a/doc/cheatsheet/Pandas_Cheat_Sheet.pptx
+++ b/doc/cheatsheet/Pandas_Cheat_Sheet.pptx
@@ -244,7 +244,7 @@
           <a:p>
             <a:fld id="{79278B33-2949-49BE-B3B0-3F16CAF906FE}" type="datetimeFigureOut">
               <a:rPr lang="en-US" smtClean="0"/>
-              <a:t>12/22/2016</a:t>
+              <a:t>12/31/2016</a:t>
             </a:fld>
             <a:endParaRPr lang="en-US"/>
           </a:p>
@@ -414,7 +414,7 @@
           <a:p>
             <a:fld id="{79278B33-2949-49BE-B3B0-3F16CAF906FE}" type="datetimeFigureOut">
               <a:rPr lang="en-US" smtClean="0"/>
-              <a:t>12/22/2016</a:t>
+              <a:t>12/31/2016</a:t>
             </a:fld>
             <a:endParaRPr lang="en-US"/>
           </a:p>
@@ -594,7 +594,7 @@
           <a:p>
             <a:fld id="{79278B33-2949-49BE-B3B0-3F16CAF906FE}" type="datetimeFigureOut">
               <a:rPr lang="en-US" smtClean="0"/>
-              <a:t>12/22/2016</a:t>
+              <a:t>12/31/2016</a:t>
             </a:fld>
             <a:endParaRPr lang="en-US"/>
           </a:p>
@@ -764,7 +764,7 @@
           <a:p>
             <a:fld id="{79278B33-2949-49BE-B3B0-3F16CAF906FE}" type="datetimeFigureOut">
               <a:rPr lang="en-US" smtClean="0"/>
-              <a:t>12/22/2016</a:t>
+              <a:t>12/31/2016</a:t>
             </a:fld>
             <a:endParaRPr lang="en-US"/>
           </a:p>
@@ -1008,7 +1008,7 @@
           <a:p>
             <a:fld id="{79278B33-2949-49BE-B3B0-3F16CAF906FE}" type="datetimeFigureOut">
               <a:rPr lang="en-US" smtClean="0"/>
-              <a:t>12/22/2016</a:t>
+              <a:t>12/31/2016</a:t>
             </a:fld>
             <a:endParaRPr lang="en-US"/>
           </a:p>
@@ -1240,7 +1240,7 @@
           <a:p>
             <a:fld id="{79278B33-2949-49BE-B3B0-3F16CAF906FE}" type="datetimeFigureOut">
               <a:rPr lang="en-US" smtClean="0"/>
-              <a:t>12/22/2016</a:t>
+              <a:t>12/31/2016</a:t>
             </a:fld>
             <a:endParaRPr lang="en-US"/>
           </a:p>
@@ -1607,7 +1607,7 @@
           <a:p>
             <a:fld id="{79278B33-2949-49BE-B3B0-3F16CAF906FE}" type="datetimeFigureOut">
               <a:rPr lang="en-US" smtClean="0"/>
-              <a:t>12/22/2016</a:t>
+              <a:t>12/31/2016</a:t>
             </a:fld>
             <a:endParaRPr lang="en-US"/>
           </a:p>
@@ -1725,7 +1725,7 @@
           <a:p>
             <a:fld id="{79278B33-2949-49BE-B3B0-3F16CAF906FE}" type="datetimeFigureOut">
               <a:rPr lang="en-US" smtClean="0"/>
-              <a:t>12/22/2016</a:t>
+              <a:t>12/31/2016</a:t>
             </a:fld>
             <a:endParaRPr lang="en-US"/>
           </a:p>
@@ -1820,7 +1820,7 @@
           <a:p>
             <a:fld id="{79278B33-2949-49BE-B3B0-3F16CAF906FE}" type="datetimeFigureOut">
               <a:rPr lang="en-US" smtClean="0"/>
-              <a:t>12/22/2016</a:t>
+              <a:t>12/31/2016</a:t>
             </a:fld>
             <a:endParaRPr lang="en-US"/>
           </a:p>
@@ -2097,7 +2097,7 @@
           <a:p>
             <a:fld id="{79278B33-2949-49BE-B3B0-3F16CAF906FE}" type="datetimeFigureOut">
               <a:rPr lang="en-US" smtClean="0"/>
-              <a:t>12/22/2016</a:t>
+              <a:t>12/31/2016</a:t>
             </a:fld>
             <a:endParaRPr lang="en-US"/>
           </a:p>
@@ -2354,7 +2354,7 @@
           <a:p>
             <a:fld id="{79278B33-2949-49BE-B3B0-3F16CAF906FE}" type="datetimeFigureOut">
               <a:rPr lang="en-US" smtClean="0"/>
-              <a:t>12/22/2016</a:t>
+              <a:t>12/31/2016</a:t>
             </a:fld>
             <a:endParaRPr lang="en-US"/>
           </a:p>
@@ -2567,7 +2567,7 @@
           <a:p>
             <a:fld id="{79278B33-2949-49BE-B3B0-3F16CAF906FE}" type="datetimeFigureOut">
               <a:rPr lang="en-US" smtClean="0"/>
-              <a:t>12/22/2016</a:t>
+              <a:t>12/31/2016</a:t>
             </a:fld>
             <a:endParaRPr lang="en-US"/>
           </a:p>
@@ -12670,7 +12670,7 @@
           <p:nvPr>
             <p:extLst>
               <p:ext uri="{D42A27DB-BD31-4B8C-83A1-F6EECF244321}">
-                <p14:modId xmlns:p14="http://schemas.microsoft.com/office/powerpoint/2010/main" val="2405697195"/>
+                <p14:modId xmlns:p14="http://schemas.microsoft.com/office/powerpoint/2010/main" val="4256108172"/>
               </p:ext>
             </p:extLst>
           </p:nvPr>
@@ -13763,10 +13763,10 @@
                     <a:lstStyle/>
                     <a:p>
                       <a:r>
-                        <a:rPr lang="en-US" sz="900" b="1" dirty="0" err="1" smtClean="0">
+                        <a:rPr lang="en-US" sz="900" b="1" smtClean="0">
                           <a:latin typeface="Consolas" panose="020B0609020204030204" pitchFamily="49" charset="0"/>
                         </a:rPr>
-                        <a:t>Pd.notnull</a:t>
+                        <a:t>pd.notnull</a:t>
                       </a:r>
                       <a:r>
                         <a:rPr lang="en-US" sz="900" b="1" dirty="0" smtClean="0">

</xml_diff>

<commit_message>
Make various minor corrections
</commit_message>
<xml_diff>
--- a/doc/cheatsheet/Pandas_Cheat_Sheet.pptx
+++ b/doc/cheatsheet/Pandas_Cheat_Sheet.pptx
@@ -107,7 +107,7 @@
   </p:defaultTextStyle>
   <p:extLst>
     <p:ext uri="{EFAFB233-063F-42B5-8137-9DF3F51BA10A}">
-      <p15:sldGuideLst xmlns:p15="http://schemas.microsoft.com/office/powerpoint/2012/main"/>
+      <p15:sldGuideLst xmlns:p15="http://schemas.microsoft.com/office/powerpoint/2012/main" xmlns=""/>
     </p:ext>
   </p:extLst>
 </p:presentation>
@@ -244,7 +244,7 @@
           <a:p>
             <a:fld id="{79278B33-2949-49BE-B3B0-3F16CAF906FE}" type="datetimeFigureOut">
               <a:rPr lang="en-US" smtClean="0"/>
-              <a:t>12/31/2016</a:t>
+              <a:t>4/25/17</a:t>
             </a:fld>
             <a:endParaRPr lang="en-US"/>
           </a:p>
@@ -414,7 +414,7 @@
           <a:p>
             <a:fld id="{79278B33-2949-49BE-B3B0-3F16CAF906FE}" type="datetimeFigureOut">
               <a:rPr lang="en-US" smtClean="0"/>
-              <a:t>12/31/2016</a:t>
+              <a:t>4/25/17</a:t>
             </a:fld>
             <a:endParaRPr lang="en-US"/>
           </a:p>
@@ -594,7 +594,7 @@
           <a:p>
             <a:fld id="{79278B33-2949-49BE-B3B0-3F16CAF906FE}" type="datetimeFigureOut">
               <a:rPr lang="en-US" smtClean="0"/>
-              <a:t>12/31/2016</a:t>
+              <a:t>4/25/17</a:t>
             </a:fld>
             <a:endParaRPr lang="en-US"/>
           </a:p>
@@ -764,7 +764,7 @@
           <a:p>
             <a:fld id="{79278B33-2949-49BE-B3B0-3F16CAF906FE}" type="datetimeFigureOut">
               <a:rPr lang="en-US" smtClean="0"/>
-              <a:t>12/31/2016</a:t>
+              <a:t>4/25/17</a:t>
             </a:fld>
             <a:endParaRPr lang="en-US"/>
           </a:p>
@@ -1008,7 +1008,7 @@
           <a:p>
             <a:fld id="{79278B33-2949-49BE-B3B0-3F16CAF906FE}" type="datetimeFigureOut">
               <a:rPr lang="en-US" smtClean="0"/>
-              <a:t>12/31/2016</a:t>
+              <a:t>4/25/17</a:t>
             </a:fld>
             <a:endParaRPr lang="en-US"/>
           </a:p>
@@ -1240,7 +1240,7 @@
           <a:p>
             <a:fld id="{79278B33-2949-49BE-B3B0-3F16CAF906FE}" type="datetimeFigureOut">
               <a:rPr lang="en-US" smtClean="0"/>
-              <a:t>12/31/2016</a:t>
+              <a:t>4/25/17</a:t>
             </a:fld>
             <a:endParaRPr lang="en-US"/>
           </a:p>
@@ -1607,7 +1607,7 @@
           <a:p>
             <a:fld id="{79278B33-2949-49BE-B3B0-3F16CAF906FE}" type="datetimeFigureOut">
               <a:rPr lang="en-US" smtClean="0"/>
-              <a:t>12/31/2016</a:t>
+              <a:t>4/25/17</a:t>
             </a:fld>
             <a:endParaRPr lang="en-US"/>
           </a:p>
@@ -1725,7 +1725,7 @@
           <a:p>
             <a:fld id="{79278B33-2949-49BE-B3B0-3F16CAF906FE}" type="datetimeFigureOut">
               <a:rPr lang="en-US" smtClean="0"/>
-              <a:t>12/31/2016</a:t>
+              <a:t>4/25/17</a:t>
             </a:fld>
             <a:endParaRPr lang="en-US"/>
           </a:p>
@@ -1820,7 +1820,7 @@
           <a:p>
             <a:fld id="{79278B33-2949-49BE-B3B0-3F16CAF906FE}" type="datetimeFigureOut">
               <a:rPr lang="en-US" smtClean="0"/>
-              <a:t>12/31/2016</a:t>
+              <a:t>4/25/17</a:t>
             </a:fld>
             <a:endParaRPr lang="en-US"/>
           </a:p>
@@ -2097,7 +2097,7 @@
           <a:p>
             <a:fld id="{79278B33-2949-49BE-B3B0-3F16CAF906FE}" type="datetimeFigureOut">
               <a:rPr lang="en-US" smtClean="0"/>
-              <a:t>12/31/2016</a:t>
+              <a:t>4/25/17</a:t>
             </a:fld>
             <a:endParaRPr lang="en-US"/>
           </a:p>
@@ -2354,7 +2354,7 @@
           <a:p>
             <a:fld id="{79278B33-2949-49BE-B3B0-3F16CAF906FE}" type="datetimeFigureOut">
               <a:rPr lang="en-US" smtClean="0"/>
-              <a:t>12/31/2016</a:t>
+              <a:t>4/25/17</a:t>
             </a:fld>
             <a:endParaRPr lang="en-US"/>
           </a:p>
@@ -2567,7 +2567,7 @@
           <a:p>
             <a:fld id="{79278B33-2949-49BE-B3B0-3F16CAF906FE}" type="datetimeFigureOut">
               <a:rPr lang="en-US" smtClean="0"/>
-              <a:t>12/31/2016</a:t>
+              <a:t>4/25/17</a:t>
             </a:fld>
             <a:endParaRPr lang="en-US"/>
           </a:p>
@@ -7903,18 +7903,6 @@
               <a:rPr lang="en-US" sz="1200" b="1" dirty="0" err="1" smtClean="0">
                 <a:latin typeface="Consolas" panose="020B0609020204030204" pitchFamily="49" charset="0"/>
               </a:rPr>
-              <a:t>df</a:t>
-            </a:r>
-            <a:r>
-              <a:rPr lang="en-US" sz="1200" b="1" dirty="0" smtClean="0">
-                <a:latin typeface="Consolas" panose="020B0609020204030204" pitchFamily="49" charset="0"/>
-              </a:rPr>
-              <a:t>=</a:t>
-            </a:r>
-            <a:r>
-              <a:rPr lang="en-US" sz="1200" b="1" dirty="0" err="1" smtClean="0">
-                <a:latin typeface="Consolas" panose="020B0609020204030204" pitchFamily="49" charset="0"/>
-              </a:rPr>
               <a:t>df.sort_values</a:t>
             </a:r>
             <a:r>
@@ -7967,19 +7955,7 @@
           </a:p>
           <a:p>
             <a:r>
-              <a:rPr lang="en-US" sz="1200" b="1" dirty="0" err="1">
-                <a:latin typeface="Consolas" panose="020B0609020204030204" pitchFamily="49" charset="0"/>
-              </a:rPr>
-              <a:t>df</a:t>
-            </a:r>
-            <a:r>
-              <a:rPr lang="en-US" sz="1200" b="1" dirty="0">
-                <a:latin typeface="Consolas" panose="020B0609020204030204" pitchFamily="49" charset="0"/>
-              </a:rPr>
-              <a:t>=</a:t>
-            </a:r>
-            <a:r>
-              <a:rPr lang="en-US" sz="1200" b="1" dirty="0" err="1">
+              <a:rPr lang="en-US" sz="1200" b="1" dirty="0" err="1" smtClean="0">
                 <a:latin typeface="Consolas" panose="020B0609020204030204" pitchFamily="49" charset="0"/>
               </a:rPr>
               <a:t>df.sort_values</a:t>
@@ -8031,18 +8007,6 @@
               <a:rPr lang="en-US" sz="1200" b="1" dirty="0" err="1" smtClean="0">
                 <a:latin typeface="Consolas" panose="020B0609020204030204" pitchFamily="49" charset="0"/>
               </a:rPr>
-              <a:t>df</a:t>
-            </a:r>
-            <a:r>
-              <a:rPr lang="en-US" sz="1200" b="1" dirty="0" smtClean="0">
-                <a:latin typeface="Consolas" panose="020B0609020204030204" pitchFamily="49" charset="0"/>
-              </a:rPr>
-              <a:t>=</a:t>
-            </a:r>
-            <a:r>
-              <a:rPr lang="en-US" sz="1200" b="1" dirty="0" err="1" smtClean="0">
-                <a:latin typeface="Consolas" panose="020B0609020204030204" pitchFamily="49" charset="0"/>
-              </a:rPr>
               <a:t>df.rename</a:t>
             </a:r>
             <a:r>
@@ -8091,18 +8055,6 @@
               <a:rPr lang="en-US" sz="1200" b="1" dirty="0" err="1" smtClean="0">
                 <a:latin typeface="Consolas" panose="020B0609020204030204" pitchFamily="49" charset="0"/>
               </a:rPr>
-              <a:t>df</a:t>
-            </a:r>
-            <a:r>
-              <a:rPr lang="en-US" sz="1200" b="1" dirty="0" smtClean="0">
-                <a:latin typeface="Consolas" panose="020B0609020204030204" pitchFamily="49" charset="0"/>
-              </a:rPr>
-              <a:t>=</a:t>
-            </a:r>
-            <a:r>
-              <a:rPr lang="en-US" sz="1200" b="1" dirty="0" err="1" smtClean="0">
-                <a:latin typeface="Consolas" panose="020B0609020204030204" pitchFamily="49" charset="0"/>
-              </a:rPr>
               <a:t>df.sort_index</a:t>
             </a:r>
             <a:r>
@@ -8136,18 +8088,6 @@
               <a:rPr lang="en-US" sz="1200" b="1" dirty="0" err="1" smtClean="0">
                 <a:latin typeface="Consolas" panose="020B0609020204030204" pitchFamily="49" charset="0"/>
               </a:rPr>
-              <a:t>df</a:t>
-            </a:r>
-            <a:r>
-              <a:rPr lang="en-US" sz="1200" b="1" dirty="0" smtClean="0">
-                <a:latin typeface="Consolas" panose="020B0609020204030204" pitchFamily="49" charset="0"/>
-              </a:rPr>
-              <a:t>=</a:t>
-            </a:r>
-            <a:r>
-              <a:rPr lang="en-US" sz="1200" b="1" dirty="0" err="1" smtClean="0">
-                <a:latin typeface="Consolas" panose="020B0609020204030204" pitchFamily="49" charset="0"/>
-              </a:rPr>
               <a:t>df.reset_index</a:t>
             </a:r>
             <a:r>
@@ -8190,19 +8130,7 @@
           </a:p>
           <a:p>
             <a:r>
-              <a:rPr lang="en-US" sz="1200" b="1" dirty="0" err="1">
-                <a:latin typeface="Consolas" panose="020B0609020204030204" pitchFamily="49" charset="0"/>
-              </a:rPr>
-              <a:t>df</a:t>
-            </a:r>
-            <a:r>
-              <a:rPr lang="en-US" sz="1200" b="1" dirty="0">
-                <a:latin typeface="Consolas" panose="020B0609020204030204" pitchFamily="49" charset="0"/>
-              </a:rPr>
-              <a:t>=</a:t>
-            </a:r>
-            <a:r>
-              <a:rPr lang="en-US" sz="1200" b="1" dirty="0" err="1">
+              <a:rPr lang="en-US" sz="1200" b="1" dirty="0" err="1" smtClean="0">
                 <a:latin typeface="Consolas" panose="020B0609020204030204" pitchFamily="49" charset="0"/>
               </a:rPr>
               <a:t>df.drop</a:t>
@@ -11057,14 +10985,14 @@
           </a:ln>
           <a:effectLst/>
           <a:extLst>
-            <a:ext uri="{909E8E84-426E-40DD-AFC4-6F175D3DCCD1}">
+            <a:ext uri="{909E8E84-426E-40dd-AFC4-6F175D3DCCD1}">
               <a14:hiddenFill xmlns:a14="http://schemas.microsoft.com/office/drawing/2010/main">
                 <a:solidFill>
                   <a:schemeClr val="accent1"/>
                 </a:solidFill>
               </a14:hiddenFill>
             </a:ext>
-            <a:ext uri="{91240B29-F687-4F45-9708-019B960494DF}">
+            <a:ext uri="{91240B29-F687-4f45-9708-019B960494DF}">
               <a14:hiddenLine xmlns:a14="http://schemas.microsoft.com/office/drawing/2010/main" w="9525">
                 <a:solidFill>
                   <a:schemeClr val="tx1"/>
@@ -11074,7 +11002,7 @@
                 <a:tailEnd/>
               </a14:hiddenLine>
             </a:ext>
-            <a:ext uri="{AF507438-7753-43E0-B8FC-AC1667EBCBE1}">
+            <a:ext uri="{AF507438-7753-43e0-B8FC-AC1667EBCBE1}">
               <a14:hiddenEffects xmlns:a14="http://schemas.microsoft.com/office/drawing/2010/main">
                 <a:effectLst>
                   <a:outerShdw dist="35921" dir="2700000" algn="ctr" rotWithShape="0">
@@ -16409,7 +16337,7 @@
   <p:timing>
     <p:tnLst>
       <p:par>
-        <p:cTn id="1" dur="indefinite" restart="never" nodeType="tmRoot"/>
+        <p:cTn xmlns:p14="http://schemas.microsoft.com/office/powerpoint/2010/main" id="1" dur="indefinite" restart="never" nodeType="tmRoot"/>
       </p:par>
     </p:tnLst>
   </p:timing>
@@ -16618,7 +16546,11 @@
             <a:pPr algn="ctr"/>
             <a:r>
               <a:rPr lang="en-US" sz="2800" b="1" dirty="0" smtClean="0"/>
-              <a:t>Make New Variables</a:t>
+              <a:t>Make New </a:t>
+            </a:r>
+            <a:r>
+              <a:rPr lang="en-US" sz="2800" b="1" dirty="0" smtClean="0"/>
+              <a:t>Columns</a:t>
             </a:r>
             <a:endParaRPr lang="en-US" sz="2683" dirty="0"/>
           </a:p>
@@ -16700,7 +16632,13 @@
               <a:rPr lang="en-US" sz="1200" b="1" dirty="0" smtClean="0">
                 <a:latin typeface="Consolas" panose="020B0609020204030204" pitchFamily="49" charset="0"/>
               </a:rPr>
-              <a:t>['Length'].</a:t>
+              <a:t>['w'</a:t>
+            </a:r>
+            <a:r>
+              <a:rPr lang="en-US" sz="1200" b="1" dirty="0" smtClean="0">
+                <a:latin typeface="Consolas" panose="020B0609020204030204" pitchFamily="49" charset="0"/>
+              </a:rPr>
+              <a:t>].</a:t>
             </a:r>
             <a:r>
               <a:rPr lang="en-US" sz="1200" b="1" dirty="0" err="1" smtClean="0">
@@ -16764,29 +16702,38 @@
           </a:p>
           <a:p>
             <a:r>
-              <a:rPr lang="en-US" sz="1200" b="1" dirty="0" err="1">
-                <a:latin typeface="Consolas" panose="020B0609020204030204" pitchFamily="49" charset="0"/>
-              </a:rPr>
-              <a:t>len</a:t>
+              <a:rPr lang="en-US" sz="1200" b="1" dirty="0" err="1" smtClean="0">
+                <a:latin typeface="Consolas" panose="020B0609020204030204" pitchFamily="49" charset="0"/>
+              </a:rPr>
+              <a:t>df</a:t>
             </a:r>
             <a:r>
               <a:rPr lang="en-US" sz="1200" b="1" dirty="0">
                 <a:latin typeface="Consolas" panose="020B0609020204030204" pitchFamily="49" charset="0"/>
               </a:rPr>
-              <a:t>(</a:t>
-            </a:r>
-            <a:r>
-              <a:rPr lang="en-US" sz="1200" b="1" dirty="0" err="1">
-                <a:latin typeface="Consolas" panose="020B0609020204030204" pitchFamily="49" charset="0"/>
-              </a:rPr>
-              <a:t>df</a:t>
-            </a:r>
-            <a:r>
-              <a:rPr lang="en-US" sz="1200" b="1" dirty="0">
-                <a:latin typeface="Consolas" panose="020B0609020204030204" pitchFamily="49" charset="0"/>
-              </a:rPr>
-              <a:t>['w'].unique())</a:t>
-            </a:r>
+              <a:t>['w']</a:t>
+            </a:r>
+            <a:r>
+              <a:rPr lang="en-US" sz="1200" b="1" dirty="0" smtClean="0">
+                <a:latin typeface="Consolas" panose="020B0609020204030204" pitchFamily="49" charset="0"/>
+              </a:rPr>
+              <a:t>.</a:t>
+            </a:r>
+            <a:r>
+              <a:rPr lang="en-US" sz="1200" b="1" dirty="0" err="1" smtClean="0">
+                <a:latin typeface="Consolas" panose="020B0609020204030204" pitchFamily="49" charset="0"/>
+              </a:rPr>
+              <a:t>nunique</a:t>
+            </a:r>
+            <a:r>
+              <a:rPr lang="en-US" sz="1200" b="1" dirty="0" smtClean="0">
+                <a:latin typeface="Consolas" panose="020B0609020204030204" pitchFamily="49" charset="0"/>
+              </a:rPr>
+              <a:t>()</a:t>
+            </a:r>
+            <a:endParaRPr lang="en-US" sz="1200" b="1" dirty="0">
+              <a:latin typeface="Consolas" panose="020B0609020204030204" pitchFamily="49" charset="0"/>
+            </a:endParaRPr>
           </a:p>
           <a:p>
             <a:pPr marL="109538"/>
@@ -18576,18 +18523,6 @@
           </a:bodyPr>
           <a:lstStyle/>
           <a:p>
-            <a:r>
-              <a:rPr lang="en-US" sz="1200" b="1" dirty="0" err="1" smtClean="0">
-                <a:latin typeface="Consolas" panose="020B0609020204030204" pitchFamily="49" charset="0"/>
-              </a:rPr>
-              <a:t>df</a:t>
-            </a:r>
-            <a:r>
-              <a:rPr lang="en-US" sz="1200" b="1" dirty="0" smtClean="0">
-                <a:latin typeface="Consolas" panose="020B0609020204030204" pitchFamily="49" charset="0"/>
-              </a:rPr>
-              <a:t>=</a:t>
-            </a:r>
             <a:r>
               <a:rPr lang="en-US" sz="1200" b="1" dirty="0" err="1" smtClean="0">
                 <a:latin typeface="Consolas" panose="020B0609020204030204" pitchFamily="49" charset="0"/>
@@ -25600,7 +25535,19 @@
               <a:rPr lang="en-US" sz="1200" b="1" dirty="0" smtClean="0">
                 <a:latin typeface="Consolas" panose="020B0609020204030204" pitchFamily="49" charset="0"/>
               </a:rPr>
-              <a:t>clip(lower=-10,upper=10)</a:t>
+              <a:t>clip(lower=-10</a:t>
+            </a:r>
+            <a:r>
+              <a:rPr lang="en-US" sz="1200" b="1" dirty="0" smtClean="0">
+                <a:latin typeface="Consolas" panose="020B0609020204030204" pitchFamily="49" charset="0"/>
+              </a:rPr>
+              <a:t>,upper</a:t>
+            </a:r>
+            <a:r>
+              <a:rPr lang="en-US" sz="1200" b="1" dirty="0" smtClean="0">
+                <a:latin typeface="Consolas" panose="020B0609020204030204" pitchFamily="49" charset="0"/>
+              </a:rPr>
+              <a:t>=10)</a:t>
             </a:r>
             <a:endParaRPr lang="en-US" sz="1200" b="1" dirty="0">
               <a:latin typeface="Consolas" panose="020B0609020204030204" pitchFamily="49" charset="0"/>
@@ -26024,18 +25971,6 @@
               <a:rPr lang="en-US" sz="1200" b="1" dirty="0" err="1" smtClean="0">
                 <a:latin typeface="Consolas" panose="020B0609020204030204" pitchFamily="49" charset="0"/>
               </a:rPr>
-              <a:t>df</a:t>
-            </a:r>
-            <a:r>
-              <a:rPr lang="en-US" sz="1200" b="1" dirty="0" smtClean="0">
-                <a:latin typeface="Consolas" panose="020B0609020204030204" pitchFamily="49" charset="0"/>
-              </a:rPr>
-              <a:t>=</a:t>
-            </a:r>
-            <a:r>
-              <a:rPr lang="en-US" sz="1200" b="1" dirty="0" err="1" smtClean="0">
-                <a:latin typeface="Consolas" panose="020B0609020204030204" pitchFamily="49" charset="0"/>
-              </a:rPr>
               <a:t>df.dropna</a:t>
             </a:r>
             <a:r>
@@ -26059,18 +25994,6 @@
             </a:r>
           </a:p>
           <a:p>
-            <a:r>
-              <a:rPr lang="en-US" sz="1200" b="1" dirty="0" err="1" smtClean="0">
-                <a:latin typeface="Consolas" panose="020B0609020204030204" pitchFamily="49" charset="0"/>
-              </a:rPr>
-              <a:t>df</a:t>
-            </a:r>
-            <a:r>
-              <a:rPr lang="en-US" sz="1200" b="1" dirty="0" smtClean="0">
-                <a:latin typeface="Consolas" panose="020B0609020204030204" pitchFamily="49" charset="0"/>
-              </a:rPr>
-              <a:t>=</a:t>
-            </a:r>
             <a:r>
               <a:rPr lang="en-US" sz="1200" b="1" dirty="0" err="1" smtClean="0">
                 <a:latin typeface="Consolas" panose="020B0609020204030204" pitchFamily="49" charset="0"/>
@@ -26476,7 +26399,7 @@
     </a:clrScheme>
     <a:fontScheme name="Office Theme">
       <a:majorFont>
-        <a:latin typeface="Calibri Light" panose="020F0302020204030204"/>
+        <a:latin typeface="Calibri Light"/>
         <a:ea typeface=""/>
         <a:cs typeface=""/>
         <a:font script="Jpan" typeface="ＭＳ Ｐゴシック"/>
@@ -26511,7 +26434,7 @@
         <a:font script="Geor" typeface="Sylfaen"/>
       </a:majorFont>
       <a:minorFont>
-        <a:latin typeface="Calibri" panose="020F0502020204030204"/>
+        <a:latin typeface="Calibri"/>
         <a:ea typeface=""/>
         <a:cs typeface=""/>
         <a:font script="Jpan" typeface="ＭＳ Ｐゴシック"/>
@@ -26688,7 +26611,7 @@
   <a:extraClrSchemeLst/>
   <a:extLst>
     <a:ext uri="{05A4C25C-085E-4340-85A3-A5531E510DB2}">
-      <thm15:themeFamily xmlns:thm15="http://schemas.microsoft.com/office/thememl/2012/main" name="Office Theme" id="{62F939B6-93AF-4DB8-9C6B-D6C7DFDC589F}" vid="{4A3C46E8-61CC-4603-A589-7422A47A8E4A}"/>
+      <thm15:themeFamily xmlns:thm15="http://schemas.microsoft.com/office/thememl/2012/main" xmlns="" name="Office Theme" id="{62F939B6-93AF-4DB8-9C6B-D6C7DFDC589F}" vid="{4A3C46E8-61CC-4603-A589-7422A47A8E4A}"/>
     </a:ext>
   </a:extLst>
 </a:theme>

</xml_diff>

<commit_message>
Fix typo in Cheat sheet with regex
</commit_message>
<xml_diff>
--- a/doc/cheatsheet/Pandas_Cheat_Sheet.pptx
+++ b/doc/cheatsheet/Pandas_Cheat_Sheet.pptx
@@ -255,7 +255,7 @@
           <a:p>
             <a:fld id="{79278B33-2949-49BE-B3B0-3F16CAF906FE}" type="datetimeFigureOut">
               <a:rPr lang="en-US" smtClean="0"/>
-              <a:t>3/15/2018</a:t>
+              <a:t>2/7/2019</a:t>
             </a:fld>
             <a:endParaRPr lang="en-US"/>
           </a:p>
@@ -425,7 +425,7 @@
           <a:p>
             <a:fld id="{79278B33-2949-49BE-B3B0-3F16CAF906FE}" type="datetimeFigureOut">
               <a:rPr lang="en-US" smtClean="0"/>
-              <a:t>3/15/2018</a:t>
+              <a:t>2/7/2019</a:t>
             </a:fld>
             <a:endParaRPr lang="en-US"/>
           </a:p>
@@ -605,7 +605,7 @@
           <a:p>
             <a:fld id="{79278B33-2949-49BE-B3B0-3F16CAF906FE}" type="datetimeFigureOut">
               <a:rPr lang="en-US" smtClean="0"/>
-              <a:t>3/15/2018</a:t>
+              <a:t>2/7/2019</a:t>
             </a:fld>
             <a:endParaRPr lang="en-US"/>
           </a:p>
@@ -775,7 +775,7 @@
           <a:p>
             <a:fld id="{79278B33-2949-49BE-B3B0-3F16CAF906FE}" type="datetimeFigureOut">
               <a:rPr lang="en-US" smtClean="0"/>
-              <a:t>3/15/2018</a:t>
+              <a:t>2/7/2019</a:t>
             </a:fld>
             <a:endParaRPr lang="en-US"/>
           </a:p>
@@ -1019,7 +1019,7 @@
           <a:p>
             <a:fld id="{79278B33-2949-49BE-B3B0-3F16CAF906FE}" type="datetimeFigureOut">
               <a:rPr lang="en-US" smtClean="0"/>
-              <a:t>3/15/2018</a:t>
+              <a:t>2/7/2019</a:t>
             </a:fld>
             <a:endParaRPr lang="en-US"/>
           </a:p>
@@ -1251,7 +1251,7 @@
           <a:p>
             <a:fld id="{79278B33-2949-49BE-B3B0-3F16CAF906FE}" type="datetimeFigureOut">
               <a:rPr lang="en-US" smtClean="0"/>
-              <a:t>3/15/2018</a:t>
+              <a:t>2/7/2019</a:t>
             </a:fld>
             <a:endParaRPr lang="en-US"/>
           </a:p>
@@ -1618,7 +1618,7 @@
           <a:p>
             <a:fld id="{79278B33-2949-49BE-B3B0-3F16CAF906FE}" type="datetimeFigureOut">
               <a:rPr lang="en-US" smtClean="0"/>
-              <a:t>3/15/2018</a:t>
+              <a:t>2/7/2019</a:t>
             </a:fld>
             <a:endParaRPr lang="en-US"/>
           </a:p>
@@ -1736,7 +1736,7 @@
           <a:p>
             <a:fld id="{79278B33-2949-49BE-B3B0-3F16CAF906FE}" type="datetimeFigureOut">
               <a:rPr lang="en-US" smtClean="0"/>
-              <a:t>3/15/2018</a:t>
+              <a:t>2/7/2019</a:t>
             </a:fld>
             <a:endParaRPr lang="en-US"/>
           </a:p>
@@ -1831,7 +1831,7 @@
           <a:p>
             <a:fld id="{79278B33-2949-49BE-B3B0-3F16CAF906FE}" type="datetimeFigureOut">
               <a:rPr lang="en-US" smtClean="0"/>
-              <a:t>3/15/2018</a:t>
+              <a:t>2/7/2019</a:t>
             </a:fld>
             <a:endParaRPr lang="en-US"/>
           </a:p>
@@ -2108,7 +2108,7 @@
           <a:p>
             <a:fld id="{79278B33-2949-49BE-B3B0-3F16CAF906FE}" type="datetimeFigureOut">
               <a:rPr lang="en-US" smtClean="0"/>
-              <a:t>3/15/2018</a:t>
+              <a:t>2/7/2019</a:t>
             </a:fld>
             <a:endParaRPr lang="en-US"/>
           </a:p>
@@ -2365,7 +2365,7 @@
           <a:p>
             <a:fld id="{79278B33-2949-49BE-B3B0-3F16CAF906FE}" type="datetimeFigureOut">
               <a:rPr lang="en-US" smtClean="0"/>
-              <a:t>3/15/2018</a:t>
+              <a:t>2/7/2019</a:t>
             </a:fld>
             <a:endParaRPr lang="en-US"/>
           </a:p>
@@ -2578,7 +2578,7 @@
           <a:p>
             <a:fld id="{79278B33-2949-49BE-B3B0-3F16CAF906FE}" type="datetimeFigureOut">
               <a:rPr lang="en-US" smtClean="0"/>
-              <a:t>3/15/2018</a:t>
+              <a:t>2/7/2019</a:t>
             </a:fld>
             <a:endParaRPr lang="en-US"/>
           </a:p>
@@ -11332,14 +11332,14 @@
           <a:effectLst/>
           <a:extLst>
             <a:ext uri="{909E8E84-426E-40dd-AFC4-6F175D3DCCD1}">
-              <a14:hiddenFill xmlns:a14="http://schemas.microsoft.com/office/drawing/2010/main" xmlns="">
+              <a14:hiddenFill xmlns="" xmlns:a14="http://schemas.microsoft.com/office/drawing/2010/main">
                 <a:solidFill>
                   <a:schemeClr val="accent1"/>
                 </a:solidFill>
               </a14:hiddenFill>
             </a:ext>
             <a:ext uri="{91240B29-F687-4f45-9708-019B960494DF}">
-              <a14:hiddenLine xmlns:a14="http://schemas.microsoft.com/office/drawing/2010/main" xmlns="" w="9525">
+              <a14:hiddenLine xmlns="" xmlns:a14="http://schemas.microsoft.com/office/drawing/2010/main" w="9525">
                 <a:solidFill>
                   <a:schemeClr val="tx1"/>
                 </a:solidFill>
@@ -11349,7 +11349,7 @@
               </a14:hiddenLine>
             </a:ext>
             <a:ext uri="{AF507438-7753-43e0-B8FC-AC1667EBCBE1}">
-              <a14:hiddenEffects xmlns:a14="http://schemas.microsoft.com/office/drawing/2010/main" xmlns="">
+              <a14:hiddenEffects xmlns="" xmlns:a14="http://schemas.microsoft.com/office/drawing/2010/main">
                 <a:effectLst>
                   <a:outerShdw dist="35921" dir="2700000" algn="ctr" rotWithShape="0">
                     <a:schemeClr val="bg2"/>
@@ -15666,7 +15666,7 @@
           <p:nvPr>
             <p:extLst>
               <p:ext uri="{D42A27DB-BD31-4B8C-83A1-F6EECF244321}">
-                <p14:modId xmlns:p14="http://schemas.microsoft.com/office/powerpoint/2010/main" val="1269780901"/>
+                <p14:modId xmlns:p14="http://schemas.microsoft.com/office/powerpoint/2010/main" val="290246856"/>
               </p:ext>
             </p:extLst>
           </p:nvPr>
@@ -16299,7 +16299,7 @@
                         <a:rPr lang="en-US" sz="900" b="1" dirty="0">
                           <a:latin typeface="Consolas" panose="020B0609020204030204" pitchFamily="49" charset="0"/>
                         </a:rPr>
-                        <a:t>''^(?!Species$).*'</a:t>
+                        <a:t>'^(?!Species$).*'</a:t>
                       </a:r>
                     </a:p>
                   </a:txBody>

</xml_diff>

<commit_message>
Added links to official docs in cheat sheets
</commit_message>
<xml_diff>
--- a/doc/cheatsheet/Pandas_Cheat_Sheet.pptx
+++ b/doc/cheatsheet/Pandas_Cheat_Sheet.pptx
@@ -255,7 +255,7 @@
           <a:p>
             <a:fld id="{79278B33-2949-49BE-B3B0-3F16CAF906FE}" type="datetimeFigureOut">
               <a:rPr lang="en-US" smtClean="0"/>
-              <a:t>2/11/2019</a:t>
+              <a:t>2/9/2021</a:t>
             </a:fld>
             <a:endParaRPr lang="en-US"/>
           </a:p>
@@ -297,7 +297,7 @@
           <a:p>
             <a:fld id="{E8285EFA-DD28-4E69-ADE7-169C8C1119D8}" type="slidenum">
               <a:rPr lang="en-US" smtClean="0"/>
-              <a:t>‹#›</a:t>
+              <a:t>‹Nr.›</a:t>
             </a:fld>
             <a:endParaRPr lang="en-US"/>
           </a:p>
@@ -425,7 +425,7 @@
           <a:p>
             <a:fld id="{79278B33-2949-49BE-B3B0-3F16CAF906FE}" type="datetimeFigureOut">
               <a:rPr lang="en-US" smtClean="0"/>
-              <a:t>2/11/2019</a:t>
+              <a:t>2/9/2021</a:t>
             </a:fld>
             <a:endParaRPr lang="en-US"/>
           </a:p>
@@ -467,7 +467,7 @@
           <a:p>
             <a:fld id="{E8285EFA-DD28-4E69-ADE7-169C8C1119D8}" type="slidenum">
               <a:rPr lang="en-US" smtClean="0"/>
-              <a:t>‹#›</a:t>
+              <a:t>‹Nr.›</a:t>
             </a:fld>
             <a:endParaRPr lang="en-US"/>
           </a:p>
@@ -605,7 +605,7 @@
           <a:p>
             <a:fld id="{79278B33-2949-49BE-B3B0-3F16CAF906FE}" type="datetimeFigureOut">
               <a:rPr lang="en-US" smtClean="0"/>
-              <a:t>2/11/2019</a:t>
+              <a:t>2/9/2021</a:t>
             </a:fld>
             <a:endParaRPr lang="en-US"/>
           </a:p>
@@ -647,7 +647,7 @@
           <a:p>
             <a:fld id="{E8285EFA-DD28-4E69-ADE7-169C8C1119D8}" type="slidenum">
               <a:rPr lang="en-US" smtClean="0"/>
-              <a:t>‹#›</a:t>
+              <a:t>‹Nr.›</a:t>
             </a:fld>
             <a:endParaRPr lang="en-US"/>
           </a:p>
@@ -775,7 +775,7 @@
           <a:p>
             <a:fld id="{79278B33-2949-49BE-B3B0-3F16CAF906FE}" type="datetimeFigureOut">
               <a:rPr lang="en-US" smtClean="0"/>
-              <a:t>2/11/2019</a:t>
+              <a:t>2/9/2021</a:t>
             </a:fld>
             <a:endParaRPr lang="en-US"/>
           </a:p>
@@ -817,7 +817,7 @@
           <a:p>
             <a:fld id="{E8285EFA-DD28-4E69-ADE7-169C8C1119D8}" type="slidenum">
               <a:rPr lang="en-US" smtClean="0"/>
-              <a:t>‹#›</a:t>
+              <a:t>‹Nr.›</a:t>
             </a:fld>
             <a:endParaRPr lang="en-US"/>
           </a:p>
@@ -1019,7 +1019,7 @@
           <a:p>
             <a:fld id="{79278B33-2949-49BE-B3B0-3F16CAF906FE}" type="datetimeFigureOut">
               <a:rPr lang="en-US" smtClean="0"/>
-              <a:t>2/11/2019</a:t>
+              <a:t>2/9/2021</a:t>
             </a:fld>
             <a:endParaRPr lang="en-US"/>
           </a:p>
@@ -1061,7 +1061,7 @@
           <a:p>
             <a:fld id="{E8285EFA-DD28-4E69-ADE7-169C8C1119D8}" type="slidenum">
               <a:rPr lang="en-US" smtClean="0"/>
-              <a:t>‹#›</a:t>
+              <a:t>‹Nr.›</a:t>
             </a:fld>
             <a:endParaRPr lang="en-US"/>
           </a:p>
@@ -1251,7 +1251,7 @@
           <a:p>
             <a:fld id="{79278B33-2949-49BE-B3B0-3F16CAF906FE}" type="datetimeFigureOut">
               <a:rPr lang="en-US" smtClean="0"/>
-              <a:t>2/11/2019</a:t>
+              <a:t>2/9/2021</a:t>
             </a:fld>
             <a:endParaRPr lang="en-US"/>
           </a:p>
@@ -1293,7 +1293,7 @@
           <a:p>
             <a:fld id="{E8285EFA-DD28-4E69-ADE7-169C8C1119D8}" type="slidenum">
               <a:rPr lang="en-US" smtClean="0"/>
-              <a:t>‹#›</a:t>
+              <a:t>‹Nr.›</a:t>
             </a:fld>
             <a:endParaRPr lang="en-US"/>
           </a:p>
@@ -1618,7 +1618,7 @@
           <a:p>
             <a:fld id="{79278B33-2949-49BE-B3B0-3F16CAF906FE}" type="datetimeFigureOut">
               <a:rPr lang="en-US" smtClean="0"/>
-              <a:t>2/11/2019</a:t>
+              <a:t>2/9/2021</a:t>
             </a:fld>
             <a:endParaRPr lang="en-US"/>
           </a:p>
@@ -1660,7 +1660,7 @@
           <a:p>
             <a:fld id="{E8285EFA-DD28-4E69-ADE7-169C8C1119D8}" type="slidenum">
               <a:rPr lang="en-US" smtClean="0"/>
-              <a:t>‹#›</a:t>
+              <a:t>‹Nr.›</a:t>
             </a:fld>
             <a:endParaRPr lang="en-US"/>
           </a:p>
@@ -1736,7 +1736,7 @@
           <a:p>
             <a:fld id="{79278B33-2949-49BE-B3B0-3F16CAF906FE}" type="datetimeFigureOut">
               <a:rPr lang="en-US" smtClean="0"/>
-              <a:t>2/11/2019</a:t>
+              <a:t>2/9/2021</a:t>
             </a:fld>
             <a:endParaRPr lang="en-US"/>
           </a:p>
@@ -1778,7 +1778,7 @@
           <a:p>
             <a:fld id="{E8285EFA-DD28-4E69-ADE7-169C8C1119D8}" type="slidenum">
               <a:rPr lang="en-US" smtClean="0"/>
-              <a:t>‹#›</a:t>
+              <a:t>‹Nr.›</a:t>
             </a:fld>
             <a:endParaRPr lang="en-US"/>
           </a:p>
@@ -1831,7 +1831,7 @@
           <a:p>
             <a:fld id="{79278B33-2949-49BE-B3B0-3F16CAF906FE}" type="datetimeFigureOut">
               <a:rPr lang="en-US" smtClean="0"/>
-              <a:t>2/11/2019</a:t>
+              <a:t>2/9/2021</a:t>
             </a:fld>
             <a:endParaRPr lang="en-US"/>
           </a:p>
@@ -1873,7 +1873,7 @@
           <a:p>
             <a:fld id="{E8285EFA-DD28-4E69-ADE7-169C8C1119D8}" type="slidenum">
               <a:rPr lang="en-US" smtClean="0"/>
-              <a:t>‹#›</a:t>
+              <a:t>‹Nr.›</a:t>
             </a:fld>
             <a:endParaRPr lang="en-US"/>
           </a:p>
@@ -2108,7 +2108,7 @@
           <a:p>
             <a:fld id="{79278B33-2949-49BE-B3B0-3F16CAF906FE}" type="datetimeFigureOut">
               <a:rPr lang="en-US" smtClean="0"/>
-              <a:t>2/11/2019</a:t>
+              <a:t>2/9/2021</a:t>
             </a:fld>
             <a:endParaRPr lang="en-US"/>
           </a:p>
@@ -2150,7 +2150,7 @@
           <a:p>
             <a:fld id="{E8285EFA-DD28-4E69-ADE7-169C8C1119D8}" type="slidenum">
               <a:rPr lang="en-US" smtClean="0"/>
-              <a:t>‹#›</a:t>
+              <a:t>‹Nr.›</a:t>
             </a:fld>
             <a:endParaRPr lang="en-US"/>
           </a:p>
@@ -2365,7 +2365,7 @@
           <a:p>
             <a:fld id="{79278B33-2949-49BE-B3B0-3F16CAF906FE}" type="datetimeFigureOut">
               <a:rPr lang="en-US" smtClean="0"/>
-              <a:t>2/11/2019</a:t>
+              <a:t>2/9/2021</a:t>
             </a:fld>
             <a:endParaRPr lang="en-US"/>
           </a:p>
@@ -2407,7 +2407,7 @@
           <a:p>
             <a:fld id="{E8285EFA-DD28-4E69-ADE7-169C8C1119D8}" type="slidenum">
               <a:rPr lang="en-US" smtClean="0"/>
-              <a:t>‹#›</a:t>
+              <a:t>‹Nr.›</a:t>
             </a:fld>
             <a:endParaRPr lang="en-US"/>
           </a:p>
@@ -2578,7 +2578,7 @@
           <a:p>
             <a:fld id="{79278B33-2949-49BE-B3B0-3F16CAF906FE}" type="datetimeFigureOut">
               <a:rPr lang="en-US" smtClean="0"/>
-              <a:t>2/11/2019</a:t>
+              <a:t>2/9/2021</a:t>
             </a:fld>
             <a:endParaRPr lang="en-US"/>
           </a:p>
@@ -2656,7 +2656,7 @@
           <a:p>
             <a:fld id="{E8285EFA-DD28-4E69-ADE7-169C8C1119D8}" type="slidenum">
               <a:rPr lang="en-US" smtClean="0"/>
-              <a:t>‹#›</a:t>
+              <a:t>‹Nr.›</a:t>
             </a:fld>
             <a:endParaRPr lang="en-US"/>
           </a:p>
@@ -3388,22 +3388,70 @@
           <a:p>
             <a:pPr algn="ctr"/>
             <a:r>
-              <a:rPr lang="en-US" sz="2800" b="1" dirty="0"/>
+              <a:rPr lang="en-US" sz="2800" b="1" dirty="0">
+                <a:solidFill>
+                  <a:schemeClr val="bg1"/>
+                </a:solidFill>
+                <a:hlinkClick r:id="rId2">
+                  <a:extLst>
+                    <a:ext uri="{A12FA001-AC4F-418D-AE19-62706E023703}">
+                      <ahyp:hlinkClr xmlns:ahyp="http://schemas.microsoft.com/office/drawing/2018/hyperlinkcolor" val="tx"/>
+                    </a:ext>
+                  </a:extLst>
+                </a:hlinkClick>
+              </a:rPr>
               <a:t>Syntax</a:t>
             </a:r>
             <a:r>
-              <a:rPr lang="en-US" sz="2683" dirty="0"/>
+              <a:rPr lang="en-US" sz="2683" dirty="0">
+                <a:solidFill>
+                  <a:schemeClr val="bg1"/>
+                </a:solidFill>
+                <a:hlinkClick r:id="rId2">
+                  <a:extLst>
+                    <a:ext uri="{A12FA001-AC4F-418D-AE19-62706E023703}">
+                      <ahyp:hlinkClr xmlns:ahyp="http://schemas.microsoft.com/office/drawing/2018/hyperlinkcolor" val="tx"/>
+                    </a:ext>
+                  </a:extLst>
+                </a:hlinkClick>
+              </a:rPr>
               <a:t> </a:t>
             </a:r>
             <a:r>
-              <a:rPr lang="en-US" sz="1800" dirty="0"/>
+              <a:rPr lang="en-US" sz="1800" dirty="0">
+                <a:solidFill>
+                  <a:schemeClr val="bg1"/>
+                </a:solidFill>
+                <a:hlinkClick r:id="rId2">
+                  <a:extLst>
+                    <a:ext uri="{A12FA001-AC4F-418D-AE19-62706E023703}">
+                      <ahyp:hlinkClr xmlns:ahyp="http://schemas.microsoft.com/office/drawing/2018/hyperlinkcolor" val="tx"/>
+                    </a:ext>
+                  </a:extLst>
+                </a:hlinkClick>
+              </a:rPr>
               <a:t>– Creating </a:t>
             </a:r>
             <a:r>
-              <a:rPr lang="en-US" sz="1800" dirty="0" err="1"/>
+              <a:rPr lang="en-US" sz="1800" dirty="0" err="1">
+                <a:solidFill>
+                  <a:schemeClr val="bg1"/>
+                </a:solidFill>
+                <a:hlinkClick r:id="rId2">
+                  <a:extLst>
+                    <a:ext uri="{A12FA001-AC4F-418D-AE19-62706E023703}">
+                      <ahyp:hlinkClr xmlns:ahyp="http://schemas.microsoft.com/office/drawing/2018/hyperlinkcolor" val="tx"/>
+                    </a:ext>
+                  </a:extLst>
+                </a:hlinkClick>
+              </a:rPr>
               <a:t>DataFrames</a:t>
             </a:r>
-            <a:endParaRPr lang="en-US" sz="1800" dirty="0"/>
+            <a:endParaRPr lang="en-US" sz="1800" dirty="0">
+              <a:solidFill>
+                <a:schemeClr val="bg1"/>
+              </a:solidFill>
+            </a:endParaRPr>
           </a:p>
         </p:txBody>
       </p:sp>
@@ -4219,11 +4267,33 @@
           <a:p>
             <a:pPr algn="ctr"/>
             <a:r>
-              <a:rPr lang="en-US" sz="2800" b="1" dirty="0"/>
+              <a:rPr lang="en-US" sz="2800" b="1" dirty="0">
+                <a:solidFill>
+                  <a:schemeClr val="bg1"/>
+                </a:solidFill>
+                <a:hlinkClick r:id="rId3">
+                  <a:extLst>
+                    <a:ext uri="{A12FA001-AC4F-418D-AE19-62706E023703}">
+                      <ahyp:hlinkClr xmlns:ahyp="http://schemas.microsoft.com/office/drawing/2018/hyperlinkcolor" val="tx"/>
+                    </a:ext>
+                  </a:extLst>
+                </a:hlinkClick>
+              </a:rPr>
               <a:t>Reshaping Data</a:t>
             </a:r>
             <a:r>
-              <a:rPr lang="en-US" sz="2800" dirty="0"/>
+              <a:rPr lang="en-US" sz="2800" dirty="0">
+                <a:solidFill>
+                  <a:schemeClr val="bg1"/>
+                </a:solidFill>
+                <a:hlinkClick r:id="rId3">
+                  <a:extLst>
+                    <a:ext uri="{A12FA001-AC4F-418D-AE19-62706E023703}">
+                      <ahyp:hlinkClr xmlns:ahyp="http://schemas.microsoft.com/office/drawing/2018/hyperlinkcolor" val="tx"/>
+                    </a:ext>
+                  </a:extLst>
+                </a:hlinkClick>
+              </a:rPr>
               <a:t> </a:t>
             </a:r>
             <a:r>
@@ -5671,7 +5741,14 @@
               <a:rPr lang="en-US" sz="1200" b="1" dirty="0" err="1">
                 <a:latin typeface="Consolas" panose="020B0609020204030204" pitchFamily="49" charset="0"/>
               </a:rPr>
-              <a:t>pd.melt</a:t>
+              <a:t>pd.</a:t>
+            </a:r>
+            <a:r>
+              <a:rPr lang="en-US" sz="1200" b="1" dirty="0" err="1">
+                <a:latin typeface="Consolas" panose="020B0609020204030204" pitchFamily="49" charset="0"/>
+                <a:hlinkClick r:id="rId4"/>
+              </a:rPr>
+              <a:t>melt</a:t>
             </a:r>
             <a:r>
               <a:rPr lang="en-US" sz="1200" b="1" dirty="0">
@@ -6465,7 +6542,14 @@
               <a:rPr lang="en-US" sz="1200" b="1" dirty="0" err="1">
                 <a:latin typeface="Consolas" panose="020B0609020204030204" pitchFamily="49" charset="0"/>
               </a:rPr>
-              <a:t>df.pivot</a:t>
+              <a:t>df.</a:t>
+            </a:r>
+            <a:r>
+              <a:rPr lang="en-US" sz="1200" b="1" dirty="0" err="1">
+                <a:latin typeface="Consolas" panose="020B0609020204030204" pitchFamily="49" charset="0"/>
+                <a:hlinkClick r:id="rId5"/>
+              </a:rPr>
+              <a:t>pivot</a:t>
             </a:r>
             <a:r>
               <a:rPr lang="en-US" sz="1200" b="1" dirty="0">
@@ -7062,7 +7146,14 @@
               <a:rPr lang="en-US" sz="1200" b="1" dirty="0" err="1">
                 <a:latin typeface="Consolas" panose="020B0609020204030204" pitchFamily="49" charset="0"/>
               </a:rPr>
-              <a:t>pd.concat</a:t>
+              <a:t>pd.</a:t>
+            </a:r>
+            <a:r>
+              <a:rPr lang="en-US" sz="1200" b="1" dirty="0" err="1">
+                <a:latin typeface="Consolas" panose="020B0609020204030204" pitchFamily="49" charset="0"/>
+                <a:hlinkClick r:id="rId6"/>
+              </a:rPr>
+              <a:t>concat</a:t>
             </a:r>
             <a:r>
               <a:rPr lang="en-US" sz="1200" b="1" dirty="0">
@@ -8174,7 +8265,14 @@
               <a:rPr lang="en-US" sz="1200" b="1" dirty="0" err="1">
                 <a:latin typeface="Consolas" panose="020B0609020204030204" pitchFamily="49" charset="0"/>
               </a:rPr>
-              <a:t>pd.concat</a:t>
+              <a:t>pd.</a:t>
+            </a:r>
+            <a:r>
+              <a:rPr lang="en-US" sz="1200" b="1" dirty="0" err="1">
+                <a:latin typeface="Consolas" panose="020B0609020204030204" pitchFamily="49" charset="0"/>
+                <a:hlinkClick r:id="rId6"/>
+              </a:rPr>
+              <a:t>concat</a:t>
             </a:r>
             <a:r>
               <a:rPr lang="en-US" sz="1200" b="1" dirty="0">
@@ -8406,7 +8504,14 @@
               <a:rPr lang="en-US" sz="1200" b="1" dirty="0" err="1">
                 <a:latin typeface="Consolas" panose="020B0609020204030204" pitchFamily="49" charset="0"/>
               </a:rPr>
-              <a:t>df.sort_values</a:t>
+              <a:t>df.</a:t>
+            </a:r>
+            <a:r>
+              <a:rPr lang="en-US" sz="1200" b="1" dirty="0" err="1">
+                <a:latin typeface="Consolas" panose="020B0609020204030204" pitchFamily="49" charset="0"/>
+                <a:hlinkClick r:id="rId7"/>
+              </a:rPr>
+              <a:t>sort_values</a:t>
             </a:r>
             <a:r>
               <a:rPr lang="en-US" sz="1200" b="1" dirty="0">
@@ -8430,7 +8535,14 @@
               <a:rPr lang="en-US" sz="1200" b="1" dirty="0" err="1">
                 <a:latin typeface="Consolas" panose="020B0609020204030204" pitchFamily="49" charset="0"/>
               </a:rPr>
-              <a:t>df.sort_values</a:t>
+              <a:t>df.</a:t>
+            </a:r>
+            <a:r>
+              <a:rPr lang="en-US" sz="1200" b="1" dirty="0" err="1">
+                <a:latin typeface="Consolas" panose="020B0609020204030204" pitchFamily="49" charset="0"/>
+                <a:hlinkClick r:id="rId7"/>
+              </a:rPr>
+              <a:t>sort_values</a:t>
             </a:r>
             <a:r>
               <a:rPr lang="en-US" sz="1200" b="1" dirty="0">
@@ -8466,7 +8578,14 @@
               <a:rPr lang="en-US" sz="1200" b="1" dirty="0" err="1">
                 <a:latin typeface="Consolas" panose="020B0609020204030204" pitchFamily="49" charset="0"/>
               </a:rPr>
-              <a:t>df.rename</a:t>
+              <a:t>df.</a:t>
+            </a:r>
+            <a:r>
+              <a:rPr lang="en-US" sz="1200" b="1" dirty="0" err="1">
+                <a:latin typeface="Consolas" panose="020B0609020204030204" pitchFamily="49" charset="0"/>
+                <a:hlinkClick r:id="rId8"/>
+              </a:rPr>
+              <a:t>rename</a:t>
             </a:r>
             <a:r>
               <a:rPr lang="en-US" sz="1200" b="1" dirty="0">
@@ -8507,7 +8626,14 @@
               <a:rPr lang="en-US" sz="1200" b="1" dirty="0" err="1">
                 <a:latin typeface="Consolas" panose="020B0609020204030204" pitchFamily="49" charset="0"/>
               </a:rPr>
-              <a:t>df.sort_index</a:t>
+              <a:t>df.</a:t>
+            </a:r>
+            <a:r>
+              <a:rPr lang="en-US" sz="1200" b="1" dirty="0" err="1">
+                <a:latin typeface="Consolas" panose="020B0609020204030204" pitchFamily="49" charset="0"/>
+                <a:hlinkClick r:id="rId9"/>
+              </a:rPr>
+              <a:t>sort_index</a:t>
             </a:r>
             <a:r>
               <a:rPr lang="en-US" sz="1200" b="1" dirty="0">
@@ -8536,7 +8662,14 @@
               <a:rPr lang="en-US" sz="1200" b="1" dirty="0" err="1">
                 <a:latin typeface="Consolas" panose="020B0609020204030204" pitchFamily="49" charset="0"/>
               </a:rPr>
-              <a:t>df.reset_index</a:t>
+              <a:t>df.</a:t>
+            </a:r>
+            <a:r>
+              <a:rPr lang="en-US" sz="1200" b="1" dirty="0" err="1">
+                <a:latin typeface="Consolas" panose="020B0609020204030204" pitchFamily="49" charset="0"/>
+                <a:hlinkClick r:id="rId10"/>
+              </a:rPr>
+              <a:t>reset_index</a:t>
             </a:r>
             <a:r>
               <a:rPr lang="en-US" sz="1200" b="1" dirty="0">
@@ -8569,7 +8702,14 @@
               <a:rPr lang="en-US" sz="1200" b="1" dirty="0" err="1">
                 <a:latin typeface="Consolas" panose="020B0609020204030204" pitchFamily="49" charset="0"/>
               </a:rPr>
-              <a:t>df.drop</a:t>
+              <a:t>df.</a:t>
+            </a:r>
+            <a:r>
+              <a:rPr lang="en-US" sz="1200" b="1" dirty="0" err="1">
+                <a:latin typeface="Consolas" panose="020B0609020204030204" pitchFamily="49" charset="0"/>
+                <a:hlinkClick r:id="rId11"/>
+              </a:rPr>
+              <a:t>drop</a:t>
             </a:r>
             <a:r>
               <a:rPr lang="en-US" sz="1200" b="1" dirty="0">
@@ -8640,7 +8780,18 @@
           <a:p>
             <a:pPr algn="ctr"/>
             <a:r>
-              <a:rPr lang="en-US" sz="2800" b="1" dirty="0"/>
+              <a:rPr lang="en-US" sz="2800" b="1" dirty="0">
+                <a:solidFill>
+                  <a:schemeClr val="bg1"/>
+                </a:solidFill>
+                <a:hlinkClick r:id="rId12">
+                  <a:extLst>
+                    <a:ext uri="{A12FA001-AC4F-418D-AE19-62706E023703}">
+                      <ahyp:hlinkClr xmlns:ahyp="http://schemas.microsoft.com/office/drawing/2018/hyperlinkcolor" val="tx"/>
+                    </a:ext>
+                  </a:extLst>
+                </a:hlinkClick>
+              </a:rPr>
               <a:t>Subset Observations </a:t>
             </a:r>
             <a:r>
@@ -8688,7 +8839,18 @@
           <a:p>
             <a:pPr algn="ctr"/>
             <a:r>
-              <a:rPr lang="en-US" sz="2800" b="1" dirty="0"/>
+              <a:rPr lang="en-US" sz="2800" b="1" dirty="0">
+                <a:solidFill>
+                  <a:schemeClr val="bg1"/>
+                </a:solidFill>
+                <a:hlinkClick r:id="rId12">
+                  <a:extLst>
+                    <a:ext uri="{A12FA001-AC4F-418D-AE19-62706E023703}">
+                      <ahyp:hlinkClr xmlns:ahyp="http://schemas.microsoft.com/office/drawing/2018/hyperlinkcolor" val="tx"/>
+                    </a:ext>
+                  </a:extLst>
+                </a:hlinkClick>
+              </a:rPr>
               <a:t>Subset Variables </a:t>
             </a:r>
             <a:r>
@@ -9728,20 +9890,15 @@
           <a:lstStyle/>
           <a:p>
             <a:r>
+              <a:rPr lang="en-US" sz="1200" b="1" dirty="0">
+                <a:latin typeface="Consolas" panose="020B0609020204030204" pitchFamily="49" charset="0"/>
+              </a:rPr>
+              <a:t>df = </a:t>
+            </a:r>
+            <a:r>
               <a:rPr lang="en-US" sz="1200" b="1" dirty="0" err="1">
                 <a:latin typeface="Consolas" panose="020B0609020204030204" pitchFamily="49" charset="0"/>
-              </a:rPr>
-              <a:t>df</a:t>
-            </a:r>
-            <a:r>
-              <a:rPr lang="en-US" sz="1200" b="1" dirty="0">
-                <a:latin typeface="Consolas" panose="020B0609020204030204" pitchFamily="49" charset="0"/>
-              </a:rPr>
-              <a:t> = </a:t>
-            </a:r>
-            <a:r>
-              <a:rPr lang="en-US" sz="1200" b="1" dirty="0" err="1">
-                <a:latin typeface="Consolas" panose="020B0609020204030204" pitchFamily="49" charset="0"/>
+                <a:hlinkClick r:id="rId13"/>
               </a:rPr>
               <a:t>pd.DataFrame</a:t>
             </a:r>
@@ -9809,6 +9966,7 @@
             <a:r>
               <a:rPr lang="en-US" sz="1200" b="1" dirty="0" err="1">
                 <a:latin typeface="Consolas" panose="020B0609020204030204" pitchFamily="49" charset="0"/>
+                <a:hlinkClick r:id="rId13"/>
               </a:rPr>
               <a:t>pd.DataFrame</a:t>
             </a:r>
@@ -11432,22 +11590,60 @@
           <a:lstStyle/>
           <a:p>
             <a:r>
+              <a:rPr lang="en-US" sz="1200" b="1" dirty="0">
+                <a:latin typeface="Consolas" panose="020B0609020204030204" pitchFamily="49" charset="0"/>
+              </a:rPr>
+              <a:t>df = </a:t>
+            </a:r>
+            <a:r>
               <a:rPr lang="en-US" sz="1200" b="1" dirty="0" err="1">
                 <a:latin typeface="Consolas" panose="020B0609020204030204" pitchFamily="49" charset="0"/>
-              </a:rPr>
-              <a:t>df</a:t>
+                <a:hlinkClick r:id="rId13"/>
+              </a:rPr>
+              <a:t>pd.DataFrame</a:t>
             </a:r>
             <a:r>
               <a:rPr lang="en-US" sz="1200" b="1" dirty="0">
                 <a:latin typeface="Consolas" panose="020B0609020204030204" pitchFamily="49" charset="0"/>
               </a:rPr>
-              <a:t> = </a:t>
+              <a:t>(</a:t>
+            </a:r>
+          </a:p>
+          <a:p>
+            <a:r>
+              <a:rPr lang="en-US" sz="1200" b="1" dirty="0">
+                <a:latin typeface="Consolas" panose="020B0609020204030204" pitchFamily="49" charset="0"/>
+              </a:rPr>
+              <a:t>          {"a" : [4 ,5, 6], </a:t>
+            </a:r>
+          </a:p>
+          <a:p>
+            <a:r>
+              <a:rPr lang="en-US" sz="1200" b="1" dirty="0">
+                <a:latin typeface="Consolas" panose="020B0609020204030204" pitchFamily="49" charset="0"/>
+              </a:rPr>
+              <a:t>           "b" : [7, 8, 9], </a:t>
+            </a:r>
+          </a:p>
+          <a:p>
+            <a:r>
+              <a:rPr lang="en-US" sz="1200" b="1" dirty="0">
+                <a:latin typeface="Consolas" panose="020B0609020204030204" pitchFamily="49" charset="0"/>
+              </a:rPr>
+              <a:t>           "c" : [10, 11, 12]},    index = </a:t>
             </a:r>
             <a:r>
               <a:rPr lang="en-US" sz="1200" b="1" dirty="0" err="1">
                 <a:latin typeface="Consolas" panose="020B0609020204030204" pitchFamily="49" charset="0"/>
               </a:rPr>
-              <a:t>pd.DataFrame</a:t>
+              <a:t>pd.</a:t>
+            </a:r>
+            <a:r>
+              <a:rPr lang="en-US" sz="1200" b="1" dirty="0" err="1">
+                <a:latin typeface="Consolas" panose="020B0609020204030204" pitchFamily="49" charset="0"/>
+                <a:hlinkClick r:id="rId14"/>
+              </a:rPr>
+              <a:t>MultiIndex.from_tuples</a:t>
             </a:r>
             <a:r>
               <a:rPr lang="en-US" sz="1200" b="1" dirty="0">
@@ -11461,7 +11657,7 @@
               <a:rPr lang="en-US" sz="1200" b="1" dirty="0">
                 <a:latin typeface="Consolas" panose="020B0609020204030204" pitchFamily="49" charset="0"/>
               </a:rPr>
-              <a:t>          {"a" : [4 ,5, 6], </a:t>
+              <a:t>          [('d',1),('d',2),('e',2)],</a:t>
             </a:r>
           </a:p>
           <a:p>
@@ -11469,59 +11665,20 @@
               <a:rPr lang="en-US" sz="1200" b="1" dirty="0">
                 <a:latin typeface="Consolas" panose="020B0609020204030204" pitchFamily="49" charset="0"/>
               </a:rPr>
-              <a:t>           "b" : [7, 8, 9], </a:t>
-            </a:r>
-          </a:p>
-          <a:p>
+              <a:t>             names=['</a:t>
+            </a:r>
+            <a:r>
+              <a:rPr lang="en-US" sz="1200" b="1" dirty="0" err="1">
+                <a:latin typeface="Consolas" panose="020B0609020204030204" pitchFamily="49" charset="0"/>
+              </a:rPr>
+              <a:t>n','v</a:t>
+            </a:r>
             <a:r>
               <a:rPr lang="en-US" sz="1200" b="1" dirty="0">
                 <a:latin typeface="Consolas" panose="020B0609020204030204" pitchFamily="49" charset="0"/>
               </a:rPr>
-              <a:t>           "c" : [10, 11, 12]},    index = </a:t>
-            </a:r>
-            <a:r>
-              <a:rPr lang="en-US" sz="1200" b="1" dirty="0" err="1">
-                <a:latin typeface="Consolas" panose="020B0609020204030204" pitchFamily="49" charset="0"/>
-              </a:rPr>
-              <a:t>pd.MultiIndex.from_tuples</a:t>
-            </a:r>
-            <a:r>
-              <a:rPr lang="en-US" sz="1200" b="1" dirty="0">
-                <a:latin typeface="Consolas" panose="020B0609020204030204" pitchFamily="49" charset="0"/>
-              </a:rPr>
-              <a:t>(</a:t>
-            </a:r>
-          </a:p>
-          <a:p>
-            <a:r>
-              <a:rPr lang="en-US" sz="1200" b="1" dirty="0">
-                <a:latin typeface="Consolas" panose="020B0609020204030204" pitchFamily="49" charset="0"/>
-              </a:rPr>
-              <a:t>          [('d',1),('d',2),('e',2)],</a:t>
-            </a:r>
-          </a:p>
-          <a:p>
-            <a:r>
-              <a:rPr lang="en-US" sz="1200" b="1" dirty="0">
-                <a:latin typeface="Consolas" panose="020B0609020204030204" pitchFamily="49" charset="0"/>
-              </a:rPr>
-              <a:t>             names=['</a:t>
-            </a:r>
-            <a:r>
-              <a:rPr lang="en-US" sz="1200" b="1" dirty="0" err="1">
-                <a:latin typeface="Consolas" panose="020B0609020204030204" pitchFamily="49" charset="0"/>
-              </a:rPr>
-              <a:t>n','v</a:t>
-            </a:r>
-            <a:r>
-              <a:rPr lang="en-US" sz="1200" b="1">
-                <a:latin typeface="Consolas" panose="020B0609020204030204" pitchFamily="49" charset="0"/>
-              </a:rPr>
               <a:t>']))</a:t>
             </a:r>
-            <a:endParaRPr lang="en-US" sz="1200" b="1" dirty="0">
-              <a:latin typeface="Consolas" panose="020B0609020204030204" pitchFamily="49" charset="0"/>
-            </a:endParaRPr>
           </a:p>
           <a:p>
             <a:r>
@@ -11691,7 +11848,14 @@
               <a:rPr lang="en-US" sz="1200" b="1" dirty="0" err="1">
                 <a:latin typeface="Consolas" panose="020B0609020204030204" pitchFamily="49" charset="0"/>
               </a:rPr>
-              <a:t>pd.melt</a:t>
+              <a:t>pd.</a:t>
+            </a:r>
+            <a:r>
+              <a:rPr lang="en-US" sz="1200" b="1" dirty="0" err="1">
+                <a:latin typeface="Consolas" panose="020B0609020204030204" pitchFamily="49" charset="0"/>
+                <a:hlinkClick r:id="rId4"/>
+              </a:rPr>
+              <a:t>melt</a:t>
             </a:r>
             <a:r>
               <a:rPr lang="en-US" sz="1200" b="1" dirty="0">
@@ -11717,13 +11881,26 @@
               <a:rPr lang="en-US" sz="1200" b="1" dirty="0">
                 <a:latin typeface="Consolas" panose="020B0609020204030204" pitchFamily="49" charset="0"/>
               </a:rPr>
-              <a:t>        .rename(columns={</a:t>
-            </a:r>
-          </a:p>
-          <a:p>
+              <a:t>        .</a:t>
+            </a:r>
             <a:r>
               <a:rPr lang="en-US" sz="1200" b="1" dirty="0">
                 <a:latin typeface="Consolas" panose="020B0609020204030204" pitchFamily="49" charset="0"/>
+                <a:hlinkClick r:id="rId8"/>
+              </a:rPr>
+              <a:t>rename</a:t>
+            </a:r>
+            <a:r>
+              <a:rPr lang="en-US" sz="1200" b="1" dirty="0">
+                <a:latin typeface="Consolas" panose="020B0609020204030204" pitchFamily="49" charset="0"/>
+              </a:rPr>
+              <a:t>(columns={</a:t>
+            </a:r>
+          </a:p>
+          <a:p>
+            <a:r>
+              <a:rPr lang="en-US" sz="1200" b="1" dirty="0">
+                <a:latin typeface="Consolas" panose="020B0609020204030204" pitchFamily="49" charset="0"/>
               </a:rPr>
               <a:t>                'variable' : '</a:t>
             </a:r>
@@ -11765,7 +11942,20 @@
               <a:rPr lang="en-US" sz="1200" b="1" dirty="0">
                 <a:latin typeface="Consolas" panose="020B0609020204030204" pitchFamily="49" charset="0"/>
               </a:rPr>
-              <a:t>        .query('</a:t>
+              <a:t>        .</a:t>
+            </a:r>
+            <a:r>
+              <a:rPr lang="en-US" sz="1200" b="1" dirty="0">
+                <a:latin typeface="Consolas" panose="020B0609020204030204" pitchFamily="49" charset="0"/>
+                <a:hlinkClick r:id="rId15"/>
+              </a:rPr>
+              <a:t>query</a:t>
+            </a:r>
+            <a:r>
+              <a:rPr lang="en-US" sz="1200" b="1" dirty="0">
+                <a:latin typeface="Consolas" panose="020B0609020204030204" pitchFamily="49" charset="0"/>
+              </a:rPr>
+              <a:t>('</a:t>
             </a:r>
             <a:r>
               <a:rPr lang="en-US" sz="1200" b="1" dirty="0" err="1">
@@ -12711,7 +12901,14 @@
               <a:rPr lang="en-US" sz="1200" b="1" dirty="0" err="1">
                 <a:latin typeface="Consolas" panose="020B0609020204030204" pitchFamily="49" charset="0"/>
               </a:rPr>
-              <a:t>df.drop_duplicates</a:t>
+              <a:t>df.</a:t>
+            </a:r>
+            <a:r>
+              <a:rPr lang="en-US" sz="1200" b="1" dirty="0" err="1">
+                <a:latin typeface="Consolas" panose="020B0609020204030204" pitchFamily="49" charset="0"/>
+                <a:hlinkClick r:id="rId16"/>
+              </a:rPr>
+              <a:t>drop_duplicates</a:t>
             </a:r>
             <a:r>
               <a:rPr lang="en-US" sz="1200" b="1" dirty="0">
@@ -12732,7 +12929,14 @@
               <a:rPr lang="en-US" sz="1200" b="1" dirty="0" err="1">
                 <a:latin typeface="Consolas" panose="020B0609020204030204" pitchFamily="49" charset="0"/>
               </a:rPr>
-              <a:t>df.head</a:t>
+              <a:t>df.</a:t>
+            </a:r>
+            <a:r>
+              <a:rPr lang="en-US" sz="1200" b="1" dirty="0" err="1">
+                <a:latin typeface="Consolas" panose="020B0609020204030204" pitchFamily="49" charset="0"/>
+                <a:hlinkClick r:id="rId17"/>
+              </a:rPr>
+              <a:t>head</a:t>
             </a:r>
             <a:r>
               <a:rPr lang="en-US" sz="1200" b="1" dirty="0">
@@ -12753,7 +12957,14 @@
               <a:rPr lang="en-US" sz="1200" b="1" dirty="0" err="1">
                 <a:latin typeface="Consolas" panose="020B0609020204030204" pitchFamily="49" charset="0"/>
               </a:rPr>
-              <a:t>df.tail</a:t>
+              <a:t>df.</a:t>
+            </a:r>
+            <a:r>
+              <a:rPr lang="en-US" sz="1200" b="1" dirty="0" err="1">
+                <a:latin typeface="Consolas" panose="020B0609020204030204" pitchFamily="49" charset="0"/>
+                <a:hlinkClick r:id="rId18"/>
+              </a:rPr>
+              <a:t>tail</a:t>
             </a:r>
             <a:r>
               <a:rPr lang="en-US" sz="1200" b="1" dirty="0">
@@ -14320,7 +14531,7 @@
           <a:p>
             <a:r>
               <a:rPr lang="en-US" sz="800" dirty="0">
-                <a:hlinkClick r:id="rId2"/>
+                <a:hlinkClick r:id="rId19"/>
               </a:rPr>
               <a:t>http://pandas.pydata.org/</a:t>
             </a:r>
@@ -14346,7 +14557,7 @@
             </a:r>
             <a:r>
               <a:rPr lang="en-US" sz="800" dirty="0">
-                <a:hlinkClick r:id="rId3"/>
+                <a:hlinkClick r:id="rId20"/>
               </a:rPr>
               <a:t>https://www.rstudio.com/wp-content/uploads/2015/02/data-wrangling-cheatsheet.pdf</a:t>
             </a:r>
@@ -14356,7 +14567,7 @@
             </a:r>
             <a:r>
               <a:rPr lang="en-US" sz="800" dirty="0">
-                <a:hlinkClick r:id="rId4"/>
+                <a:hlinkClick r:id="rId21"/>
               </a:rPr>
               <a:t>Princeton Consultants</a:t>
             </a:r>
@@ -15513,7 +15724,14 @@
               <a:rPr lang="en-US" sz="1200" b="1" dirty="0" err="1">
                 <a:latin typeface="Consolas" panose="020B0609020204030204" pitchFamily="49" charset="0"/>
               </a:rPr>
-              <a:t>df.filter</a:t>
+              <a:t>df.</a:t>
+            </a:r>
+            <a:r>
+              <a:rPr lang="en-US" sz="1200" b="1" dirty="0" err="1">
+                <a:latin typeface="Consolas" panose="020B0609020204030204" pitchFamily="49" charset="0"/>
+                <a:hlinkClick r:id="rId22"/>
+              </a:rPr>
+              <a:t>filter</a:t>
             </a:r>
             <a:r>
               <a:rPr lang="en-US" sz="1200" b="1" dirty="0">
@@ -15579,7 +15797,14 @@
               <a:rPr lang="en-US" sz="1200" b="1" dirty="0" err="1">
                 <a:latin typeface="Consolas" panose="020B0609020204030204" pitchFamily="49" charset="0"/>
               </a:rPr>
-              <a:t>df.loc</a:t>
+              <a:t>df.</a:t>
+            </a:r>
+            <a:r>
+              <a:rPr lang="en-US" sz="1200" b="1" dirty="0" err="1">
+                <a:latin typeface="Consolas" panose="020B0609020204030204" pitchFamily="49" charset="0"/>
+                <a:hlinkClick r:id="rId23"/>
+              </a:rPr>
+              <a:t>loc</a:t>
             </a:r>
             <a:r>
               <a:rPr lang="en-US" sz="1200" b="1" dirty="0">
@@ -15599,7 +15824,14 @@
               <a:rPr lang="en-US" sz="1200" b="1" dirty="0" err="1">
                 <a:latin typeface="Consolas" panose="020B0609020204030204" pitchFamily="49" charset="0"/>
               </a:rPr>
-              <a:t>df.iloc</a:t>
+              <a:t>df.</a:t>
+            </a:r>
+            <a:r>
+              <a:rPr lang="en-US" sz="1200" b="1" dirty="0" err="1">
+                <a:latin typeface="Consolas" panose="020B0609020204030204" pitchFamily="49" charset="0"/>
+                <a:hlinkClick r:id="rId24"/>
+              </a:rPr>
+              <a:t>iloc</a:t>
             </a:r>
             <a:r>
               <a:rPr lang="en-US" sz="1200" b="1" dirty="0">
@@ -15619,7 +15851,14 @@
               <a:rPr lang="en-US" sz="1200" b="1" dirty="0" err="1">
                 <a:latin typeface="Consolas" panose="020B0609020204030204" pitchFamily="49" charset="0"/>
               </a:rPr>
-              <a:t>df.loc</a:t>
+              <a:t>df.</a:t>
+            </a:r>
+            <a:r>
+              <a:rPr lang="en-US" sz="1200" b="1" dirty="0" err="1">
+                <a:latin typeface="Consolas" panose="020B0609020204030204" pitchFamily="49" charset="0"/>
+                <a:hlinkClick r:id="rId23"/>
+              </a:rPr>
+              <a:t>loc</a:t>
             </a:r>
             <a:r>
               <a:rPr lang="en-US" sz="1200" b="1" dirty="0">
@@ -16452,7 +16691,14 @@
               <a:rPr lang="en-US" sz="1200" b="1" dirty="0" err="1">
                 <a:latin typeface="Consolas" panose="020B0609020204030204" pitchFamily="49" charset="0"/>
               </a:rPr>
-              <a:t>df.sample</a:t>
+              <a:t>df.</a:t>
+            </a:r>
+            <a:r>
+              <a:rPr lang="en-US" sz="1200" b="1" dirty="0" err="1">
+                <a:latin typeface="Consolas" panose="020B0609020204030204" pitchFamily="49" charset="0"/>
+                <a:hlinkClick r:id="rId25"/>
+              </a:rPr>
+              <a:t>sample</a:t>
             </a:r>
             <a:r>
               <a:rPr lang="en-US" sz="1200" b="1" dirty="0">
@@ -16485,7 +16731,14 @@
               <a:rPr lang="en-US" sz="1200" b="1" dirty="0" err="1">
                 <a:latin typeface="Consolas" panose="020B0609020204030204" pitchFamily="49" charset="0"/>
               </a:rPr>
-              <a:t>df.sample</a:t>
+              <a:t>df.</a:t>
+            </a:r>
+            <a:r>
+              <a:rPr lang="en-US" sz="1200" b="1" dirty="0" err="1">
+                <a:latin typeface="Consolas" panose="020B0609020204030204" pitchFamily="49" charset="0"/>
+                <a:hlinkClick r:id="rId25"/>
+              </a:rPr>
+              <a:t>sample</a:t>
             </a:r>
             <a:r>
               <a:rPr lang="en-US" sz="1200" b="1" dirty="0">
@@ -16505,7 +16758,14 @@
               <a:rPr lang="en-US" sz="1200" b="1" dirty="0" err="1">
                 <a:latin typeface="Consolas" panose="020B0609020204030204" pitchFamily="49" charset="0"/>
               </a:rPr>
-              <a:t>df.iloc</a:t>
+              <a:t>df.</a:t>
+            </a:r>
+            <a:r>
+              <a:rPr lang="en-US" sz="1200" b="1" dirty="0" err="1">
+                <a:latin typeface="Consolas" panose="020B0609020204030204" pitchFamily="49" charset="0"/>
+                <a:hlinkClick r:id="rId26"/>
+              </a:rPr>
+              <a:t>iloc</a:t>
             </a:r>
             <a:r>
               <a:rPr lang="en-US" sz="1200" b="1" dirty="0">
@@ -16525,7 +16785,14 @@
               <a:rPr lang="en-US" sz="1200" b="1" dirty="0" err="1">
                 <a:latin typeface="Consolas" panose="020B0609020204030204" pitchFamily="49" charset="0"/>
               </a:rPr>
-              <a:t>df.nlargest</a:t>
+              <a:t>df.</a:t>
+            </a:r>
+            <a:r>
+              <a:rPr lang="en-US" sz="1200" b="1" dirty="0" err="1">
+                <a:latin typeface="Consolas" panose="020B0609020204030204" pitchFamily="49" charset="0"/>
+                <a:hlinkClick r:id="rId27"/>
+              </a:rPr>
+              <a:t>nlargest</a:t>
             </a:r>
             <a:r>
               <a:rPr lang="en-US" sz="1200" b="1" dirty="0">
@@ -16545,7 +16812,14 @@
               <a:rPr lang="en-US" sz="1200" b="1" dirty="0" err="1">
                 <a:latin typeface="Consolas" panose="020B0609020204030204" pitchFamily="49" charset="0"/>
               </a:rPr>
-              <a:t>df.nsmallest</a:t>
+              <a:t>df.</a:t>
+            </a:r>
+            <a:r>
+              <a:rPr lang="en-US" sz="1200" b="1" dirty="0" err="1">
+                <a:latin typeface="Consolas" panose="020B0609020204030204" pitchFamily="49" charset="0"/>
+                <a:hlinkClick r:id="rId28"/>
+              </a:rPr>
+              <a:t>nsmallest</a:t>
             </a:r>
             <a:r>
               <a:rPr lang="en-US" sz="1200" b="1" dirty="0">
@@ -16733,10 +17007,25 @@
           <a:p>
             <a:pPr algn="ctr"/>
             <a:r>
-              <a:rPr lang="en-US" sz="2800" b="1" dirty="0"/>
+              <a:rPr lang="en-US" sz="2800" b="1" dirty="0">
+                <a:solidFill>
+                  <a:schemeClr val="bg1"/>
+                </a:solidFill>
+                <a:hlinkClick r:id="rId2">
+                  <a:extLst>
+                    <a:ext uri="{A12FA001-AC4F-418D-AE19-62706E023703}">
+                      <ahyp:hlinkClr xmlns:ahyp="http://schemas.microsoft.com/office/drawing/2018/hyperlinkcolor" val="tx"/>
+                    </a:ext>
+                  </a:extLst>
+                </a:hlinkClick>
+              </a:rPr>
               <a:t>Summarize Data</a:t>
             </a:r>
-            <a:endParaRPr lang="en-US" sz="2683" dirty="0"/>
+            <a:endParaRPr lang="en-US" sz="2683" dirty="0">
+              <a:solidFill>
+                <a:schemeClr val="bg1"/>
+              </a:solidFill>
+            </a:endParaRPr>
           </a:p>
         </p:txBody>
       </p:sp>
@@ -16821,10 +17110,25 @@
           <a:p>
             <a:pPr algn="ctr"/>
             <a:r>
-              <a:rPr lang="en-US" sz="2800" b="1" dirty="0"/>
+              <a:rPr lang="en-US" sz="2800" b="1" dirty="0">
+                <a:solidFill>
+                  <a:schemeClr val="bg1"/>
+                </a:solidFill>
+                <a:hlinkClick r:id="rId3">
+                  <a:extLst>
+                    <a:ext uri="{A12FA001-AC4F-418D-AE19-62706E023703}">
+                      <ahyp:hlinkClr xmlns:ahyp="http://schemas.microsoft.com/office/drawing/2018/hyperlinkcolor" val="tx"/>
+                    </a:ext>
+                  </a:extLst>
+                </a:hlinkClick>
+              </a:rPr>
               <a:t>Combine Data Sets</a:t>
             </a:r>
-            <a:endParaRPr lang="en-US" sz="2683" dirty="0"/>
+            <a:endParaRPr lang="en-US" sz="2683" dirty="0">
+              <a:solidFill>
+                <a:schemeClr val="bg1"/>
+              </a:solidFill>
+            </a:endParaRPr>
           </a:p>
         </p:txBody>
       </p:sp>
@@ -16865,6 +17169,7 @@
             <a:r>
               <a:rPr lang="en-US" sz="1200" b="1" dirty="0" err="1">
                 <a:latin typeface="Consolas" panose="020B0609020204030204" pitchFamily="49" charset="0"/>
+                <a:hlinkClick r:id="rId4"/>
               </a:rPr>
               <a:t>value_counts</a:t>
             </a:r>
@@ -16938,6 +17243,7 @@
             <a:r>
               <a:rPr lang="en-US" sz="1200" b="1" dirty="0" err="1">
                 <a:latin typeface="Consolas" panose="020B0609020204030204" pitchFamily="49" charset="0"/>
+                <a:hlinkClick r:id="rId5"/>
               </a:rPr>
               <a:t>nunique</a:t>
             </a:r>
@@ -16960,7 +17266,14 @@
               <a:rPr lang="en-US" sz="1200" b="1" dirty="0" err="1">
                 <a:latin typeface="Consolas" panose="020B0609020204030204" pitchFamily="49" charset="0"/>
               </a:rPr>
-              <a:t>df.describe</a:t>
+              <a:t>df.</a:t>
+            </a:r>
+            <a:r>
+              <a:rPr lang="en-US" sz="1200" b="1" dirty="0" err="1">
+                <a:latin typeface="Consolas" panose="020B0609020204030204" pitchFamily="49" charset="0"/>
+                <a:hlinkClick r:id="rId6"/>
+              </a:rPr>
+              <a:t>describe</a:t>
             </a:r>
             <a:r>
               <a:rPr lang="en-US" sz="1200" b="1" dirty="0">
@@ -17642,8 +17955,15 @@
             <a:r>
               <a:rPr lang="en-US" sz="1200" b="1" dirty="0">
                 <a:latin typeface="Consolas" panose="020B0609020204030204" pitchFamily="49" charset="0"/>
-              </a:rPr>
-              <a:t>sum()</a:t>
+                <a:hlinkClick r:id="rId7"/>
+              </a:rPr>
+              <a:t>sum</a:t>
+            </a:r>
+            <a:r>
+              <a:rPr lang="en-US" sz="1200" b="1" dirty="0">
+                <a:latin typeface="Consolas" panose="020B0609020204030204" pitchFamily="49" charset="0"/>
+              </a:rPr>
+              <a:t>()</a:t>
             </a:r>
           </a:p>
           <a:p>
@@ -17657,8 +17977,15 @@
             <a:r>
               <a:rPr lang="en-US" sz="1200" b="1" dirty="0">
                 <a:latin typeface="Consolas" panose="020B0609020204030204" pitchFamily="49" charset="0"/>
-              </a:rPr>
-              <a:t>count()</a:t>
+                <a:hlinkClick r:id="rId8"/>
+              </a:rPr>
+              <a:t>count</a:t>
+            </a:r>
+            <a:r>
+              <a:rPr lang="en-US" sz="1200" b="1" dirty="0">
+                <a:latin typeface="Consolas" panose="020B0609020204030204" pitchFamily="49" charset="0"/>
+              </a:rPr>
+              <a:t>()</a:t>
             </a:r>
           </a:p>
           <a:p>
@@ -17672,8 +17999,15 @@
             <a:r>
               <a:rPr lang="en-US" sz="1200" b="1" dirty="0">
                 <a:latin typeface="Consolas" panose="020B0609020204030204" pitchFamily="49" charset="0"/>
-              </a:rPr>
-              <a:t>median()</a:t>
+                <a:hlinkClick r:id="rId9"/>
+              </a:rPr>
+              <a:t>median</a:t>
+            </a:r>
+            <a:r>
+              <a:rPr lang="en-US" sz="1200" b="1" dirty="0">
+                <a:latin typeface="Consolas" panose="020B0609020204030204" pitchFamily="49" charset="0"/>
+              </a:rPr>
+              <a:t>()</a:t>
             </a:r>
           </a:p>
           <a:p>
@@ -17687,8 +18021,15 @@
             <a:r>
               <a:rPr lang="en-US" sz="1200" b="1" dirty="0">
                 <a:latin typeface="Consolas" panose="020B0609020204030204" pitchFamily="49" charset="0"/>
-              </a:rPr>
-              <a:t>quantile([0.25,0.75])</a:t>
+                <a:hlinkClick r:id="rId10"/>
+              </a:rPr>
+              <a:t>quantile</a:t>
+            </a:r>
+            <a:r>
+              <a:rPr lang="en-US" sz="1200" b="1" dirty="0">
+                <a:latin typeface="Consolas" panose="020B0609020204030204" pitchFamily="49" charset="0"/>
+              </a:rPr>
+              <a:t>([0.25,0.75])</a:t>
             </a:r>
           </a:p>
           <a:p>
@@ -17702,8 +18043,15 @@
             <a:r>
               <a:rPr lang="en-US" sz="1200" b="1" dirty="0">
                 <a:latin typeface="Consolas" panose="020B0609020204030204" pitchFamily="49" charset="0"/>
-              </a:rPr>
-              <a:t>apply(</a:t>
+                <a:hlinkClick r:id="rId11"/>
+              </a:rPr>
+              <a:t>apply</a:t>
+            </a:r>
+            <a:r>
+              <a:rPr lang="en-US" sz="1200" b="1" dirty="0">
+                <a:latin typeface="Consolas" panose="020B0609020204030204" pitchFamily="49" charset="0"/>
+              </a:rPr>
+              <a:t>(</a:t>
             </a:r>
             <a:r>
               <a:rPr lang="en-US" sz="1200" b="1" i="1" dirty="0">
@@ -17752,8 +18100,15 @@
             <a:r>
               <a:rPr lang="en-US" sz="1200" b="1" dirty="0">
                 <a:latin typeface="Consolas" panose="020B0609020204030204" pitchFamily="49" charset="0"/>
-              </a:rPr>
-              <a:t>min()</a:t>
+                <a:hlinkClick r:id="rId12"/>
+              </a:rPr>
+              <a:t>min</a:t>
+            </a:r>
+            <a:r>
+              <a:rPr lang="en-US" sz="1200" b="1" dirty="0">
+                <a:latin typeface="Consolas" panose="020B0609020204030204" pitchFamily="49" charset="0"/>
+              </a:rPr>
+              <a:t>()</a:t>
             </a:r>
           </a:p>
           <a:p>
@@ -17767,8 +18122,15 @@
             <a:r>
               <a:rPr lang="en-US" sz="1200" b="1" dirty="0">
                 <a:latin typeface="Consolas" panose="020B0609020204030204" pitchFamily="49" charset="0"/>
-              </a:rPr>
-              <a:t>max()</a:t>
+                <a:hlinkClick r:id="rId13"/>
+              </a:rPr>
+              <a:t>max</a:t>
+            </a:r>
+            <a:r>
+              <a:rPr lang="en-US" sz="1200" b="1" dirty="0">
+                <a:latin typeface="Consolas" panose="020B0609020204030204" pitchFamily="49" charset="0"/>
+              </a:rPr>
+              <a:t>()</a:t>
             </a:r>
           </a:p>
           <a:p>
@@ -17782,8 +18144,15 @@
             <a:r>
               <a:rPr lang="en-US" sz="1200" b="1" dirty="0">
                 <a:latin typeface="Consolas" panose="020B0609020204030204" pitchFamily="49" charset="0"/>
-              </a:rPr>
-              <a:t>mean()</a:t>
+                <a:hlinkClick r:id="rId14"/>
+              </a:rPr>
+              <a:t>mean</a:t>
+            </a:r>
+            <a:r>
+              <a:rPr lang="en-US" sz="1200" b="1" dirty="0">
+                <a:latin typeface="Consolas" panose="020B0609020204030204" pitchFamily="49" charset="0"/>
+              </a:rPr>
+              <a:t>()</a:t>
             </a:r>
           </a:p>
           <a:p>
@@ -17797,6 +18166,7 @@
             <a:r>
               <a:rPr lang="en-US" sz="1200" b="1" dirty="0" err="1">
                 <a:latin typeface="Consolas" panose="020B0609020204030204" pitchFamily="49" charset="0"/>
+                <a:hlinkClick r:id="rId15"/>
               </a:rPr>
               <a:t>var</a:t>
             </a:r>
@@ -17818,6 +18188,7 @@
             <a:r>
               <a:rPr lang="en-US" sz="1200" b="1" dirty="0" err="1">
                 <a:latin typeface="Consolas" panose="020B0609020204030204" pitchFamily="49" charset="0"/>
+                <a:hlinkClick r:id="rId16"/>
               </a:rPr>
               <a:t>std</a:t>
             </a:r>
@@ -18822,7 +19193,14 @@
               <a:rPr lang="en-US" sz="1200" b="1" dirty="0" err="1">
                 <a:latin typeface="Consolas" panose="020B0609020204030204" pitchFamily="49" charset="0"/>
               </a:rPr>
-              <a:t>df.assign</a:t>
+              <a:t>df.</a:t>
+            </a:r>
+            <a:r>
+              <a:rPr lang="en-US" sz="1200" b="1" dirty="0" err="1">
+                <a:latin typeface="Consolas" panose="020B0609020204030204" pitchFamily="49" charset="0"/>
+                <a:hlinkClick r:id="rId17"/>
+              </a:rPr>
+              <a:t>assign</a:t>
             </a:r>
             <a:r>
               <a:rPr lang="en-US" sz="1200" b="1" dirty="0">
@@ -18934,7 +19312,14 @@
               <a:rPr lang="en-US" sz="1200" b="1" dirty="0" err="1">
                 <a:latin typeface="Consolas" panose="020B0609020204030204" pitchFamily="49" charset="0"/>
               </a:rPr>
-              <a:t>pd.qcut</a:t>
+              <a:t>pd.</a:t>
+            </a:r>
+            <a:r>
+              <a:rPr lang="en-US" sz="1200" b="1" dirty="0" err="1">
+                <a:latin typeface="Consolas" panose="020B0609020204030204" pitchFamily="49" charset="0"/>
+                <a:hlinkClick r:id="rId18"/>
+              </a:rPr>
+              <a:t>qcut</a:t>
             </a:r>
             <a:r>
               <a:rPr lang="en-US" sz="1200" b="1" dirty="0">
@@ -20292,8 +20677,15 @@
             <a:r>
               <a:rPr lang="en-US" sz="1200" b="1" dirty="0">
                 <a:latin typeface="Consolas" panose="020B0609020204030204" pitchFamily="49" charset="0"/>
-              </a:rPr>
-              <a:t>shift(1)</a:t>
+                <a:hlinkClick r:id="rId19"/>
+              </a:rPr>
+              <a:t>shift</a:t>
+            </a:r>
+            <a:r>
+              <a:rPr lang="en-US" sz="1200" b="1" dirty="0">
+                <a:latin typeface="Consolas" panose="020B0609020204030204" pitchFamily="49" charset="0"/>
+              </a:rPr>
+              <a:t>(1)</a:t>
             </a:r>
           </a:p>
           <a:p>
@@ -20307,8 +20699,15 @@
             <a:r>
               <a:rPr lang="en-US" sz="1200" b="1" dirty="0">
                 <a:latin typeface="Consolas" panose="020B0609020204030204" pitchFamily="49" charset="0"/>
-              </a:rPr>
-              <a:t>rank(method='dense')</a:t>
+                <a:hlinkClick r:id="rId20"/>
+              </a:rPr>
+              <a:t>rank</a:t>
+            </a:r>
+            <a:r>
+              <a:rPr lang="en-US" sz="1200" b="1" dirty="0">
+                <a:latin typeface="Consolas" panose="020B0609020204030204" pitchFamily="49" charset="0"/>
+              </a:rPr>
+              <a:t>(method='dense')</a:t>
             </a:r>
           </a:p>
           <a:p>
@@ -20322,8 +20721,15 @@
             <a:r>
               <a:rPr lang="en-US" sz="1200" b="1" dirty="0">
                 <a:latin typeface="Consolas" panose="020B0609020204030204" pitchFamily="49" charset="0"/>
-              </a:rPr>
-              <a:t>rank(method='min')</a:t>
+                <a:hlinkClick r:id="rId20"/>
+              </a:rPr>
+              <a:t>rank</a:t>
+            </a:r>
+            <a:r>
+              <a:rPr lang="en-US" sz="1200" b="1" dirty="0">
+                <a:latin typeface="Consolas" panose="020B0609020204030204" pitchFamily="49" charset="0"/>
+              </a:rPr>
+              <a:t>(method='min')</a:t>
             </a:r>
           </a:p>
           <a:p>
@@ -20337,8 +20743,15 @@
             <a:r>
               <a:rPr lang="en-US" sz="1200" b="1" dirty="0">
                 <a:latin typeface="Consolas" panose="020B0609020204030204" pitchFamily="49" charset="0"/>
-              </a:rPr>
-              <a:t>rank(</a:t>
+                <a:hlinkClick r:id="rId20"/>
+              </a:rPr>
+              <a:t>rank</a:t>
+            </a:r>
+            <a:r>
+              <a:rPr lang="en-US" sz="1200" b="1" dirty="0">
+                <a:latin typeface="Consolas" panose="020B0609020204030204" pitchFamily="49" charset="0"/>
+              </a:rPr>
+              <a:t>(</a:t>
             </a:r>
             <a:r>
               <a:rPr lang="en-US" sz="1200" b="1" dirty="0" err="1">
@@ -20364,8 +20777,15 @@
             <a:r>
               <a:rPr lang="en-US" sz="1200" b="1" dirty="0">
                 <a:latin typeface="Consolas" panose="020B0609020204030204" pitchFamily="49" charset="0"/>
-              </a:rPr>
-              <a:t>rank(method='first')</a:t>
+                <a:hlinkClick r:id="rId20"/>
+              </a:rPr>
+              <a:t>rank</a:t>
+            </a:r>
+            <a:r>
+              <a:rPr lang="en-US" sz="1200" b="1" dirty="0">
+                <a:latin typeface="Consolas" panose="020B0609020204030204" pitchFamily="49" charset="0"/>
+              </a:rPr>
+              <a:t>(method='first')</a:t>
             </a:r>
           </a:p>
           <a:p>
@@ -20402,8 +20822,15 @@
             <a:r>
               <a:rPr lang="en-US" sz="1200" b="1" dirty="0">
                 <a:latin typeface="Consolas" panose="020B0609020204030204" pitchFamily="49" charset="0"/>
-              </a:rPr>
-              <a:t>shift(-1)</a:t>
+                <a:hlinkClick r:id="rId19"/>
+              </a:rPr>
+              <a:t>shift</a:t>
+            </a:r>
+            <a:r>
+              <a:rPr lang="en-US" sz="1200" b="1" dirty="0">
+                <a:latin typeface="Consolas" panose="020B0609020204030204" pitchFamily="49" charset="0"/>
+              </a:rPr>
+              <a:t>(-1)</a:t>
             </a:r>
           </a:p>
           <a:p>
@@ -20420,6 +20847,7 @@
             <a:r>
               <a:rPr lang="en-US" sz="1200" b="1" dirty="0" err="1">
                 <a:latin typeface="Consolas" panose="020B0609020204030204" pitchFamily="49" charset="0"/>
+                <a:hlinkClick r:id="rId21"/>
               </a:rPr>
               <a:t>cumsum</a:t>
             </a:r>
@@ -20441,6 +20869,7 @@
             <a:r>
               <a:rPr lang="en-US" sz="1200" b="1" dirty="0" err="1">
                 <a:latin typeface="Consolas" panose="020B0609020204030204" pitchFamily="49" charset="0"/>
+                <a:hlinkClick r:id="rId22"/>
               </a:rPr>
               <a:t>cummax</a:t>
             </a:r>
@@ -20462,6 +20891,7 @@
             <a:r>
               <a:rPr lang="en-US" sz="1200" b="1" dirty="0" err="1">
                 <a:latin typeface="Consolas" panose="020B0609020204030204" pitchFamily="49" charset="0"/>
+                <a:hlinkClick r:id="rId23"/>
               </a:rPr>
               <a:t>cummin</a:t>
             </a:r>
@@ -20483,6 +20913,7 @@
             <a:r>
               <a:rPr lang="en-US" sz="1200" b="1" dirty="0" err="1">
                 <a:latin typeface="Consolas" panose="020B0609020204030204" pitchFamily="49" charset="0"/>
+                <a:hlinkClick r:id="rId24"/>
               </a:rPr>
               <a:t>cumprod</a:t>
             </a:r>
@@ -22541,7 +22972,14 @@
               <a:rPr lang="en-US" sz="1200" b="1" dirty="0" err="1">
                 <a:latin typeface="Consolas" panose="020B0609020204030204" pitchFamily="49" charset="0"/>
               </a:rPr>
-              <a:t>pd.merge</a:t>
+              <a:t>pd.</a:t>
+            </a:r>
+            <a:r>
+              <a:rPr lang="en-US" sz="1200" b="1" dirty="0" err="1">
+                <a:latin typeface="Consolas" panose="020B0609020204030204" pitchFamily="49" charset="0"/>
+                <a:hlinkClick r:id="rId25"/>
+              </a:rPr>
+              <a:t>merge</a:t>
             </a:r>
             <a:r>
               <a:rPr lang="en-US" sz="1200" b="1" dirty="0">
@@ -22620,7 +23058,14 @@
               <a:rPr lang="en-US" sz="1200" b="1" dirty="0" err="1">
                 <a:latin typeface="Consolas" panose="020B0609020204030204" pitchFamily="49" charset="0"/>
               </a:rPr>
-              <a:t>pd.merge</a:t>
+              <a:t>pd.</a:t>
+            </a:r>
+            <a:r>
+              <a:rPr lang="en-US" sz="1200" b="1" dirty="0" err="1">
+                <a:latin typeface="Consolas" panose="020B0609020204030204" pitchFamily="49" charset="0"/>
+                <a:hlinkClick r:id="rId25"/>
+              </a:rPr>
+              <a:t>merge</a:t>
             </a:r>
             <a:r>
               <a:rPr lang="en-US" sz="1200" b="1" dirty="0">
@@ -22695,7 +23140,14 @@
               <a:rPr lang="en-US" sz="1200" b="1" dirty="0" err="1">
                 <a:latin typeface="Consolas" panose="020B0609020204030204" pitchFamily="49" charset="0"/>
               </a:rPr>
-              <a:t>pd.merge</a:t>
+              <a:t>pd.</a:t>
+            </a:r>
+            <a:r>
+              <a:rPr lang="en-US" sz="1200" b="1" dirty="0" err="1">
+                <a:latin typeface="Consolas" panose="020B0609020204030204" pitchFamily="49" charset="0"/>
+                <a:hlinkClick r:id="rId25"/>
+              </a:rPr>
+              <a:t>merge</a:t>
             </a:r>
             <a:r>
               <a:rPr lang="en-US" sz="1200" b="1" dirty="0">
@@ -22751,7 +23203,14 @@
               <a:rPr lang="en-US" sz="1200" b="1" dirty="0" err="1">
                 <a:latin typeface="Consolas" panose="020B0609020204030204" pitchFamily="49" charset="0"/>
               </a:rPr>
-              <a:t>pd.merge</a:t>
+              <a:t>pd.</a:t>
+            </a:r>
+            <a:r>
+              <a:rPr lang="en-US" sz="1200" b="1" dirty="0" err="1">
+                <a:latin typeface="Consolas" panose="020B0609020204030204" pitchFamily="49" charset="0"/>
+                <a:hlinkClick r:id="rId25"/>
+              </a:rPr>
+              <a:t>merge</a:t>
             </a:r>
             <a:r>
               <a:rPr lang="en-US" sz="1200" b="1" dirty="0">
@@ -23223,7 +23682,20 @@
               <a:rPr lang="en-US" sz="1200" b="1" dirty="0">
                 <a:latin typeface="Consolas" panose="020B0609020204030204" pitchFamily="49" charset="0"/>
               </a:rPr>
-              <a:t>[adf.x1.isin(bdf.x1)]</a:t>
+              <a:t>[adf.x1.</a:t>
+            </a:r>
+            <a:r>
+              <a:rPr lang="en-US" sz="1200" b="1" dirty="0">
+                <a:latin typeface="Consolas" panose="020B0609020204030204" pitchFamily="49" charset="0"/>
+                <a:hlinkClick r:id="rId26"/>
+              </a:rPr>
+              <a:t>isin</a:t>
+            </a:r>
+            <a:r>
+              <a:rPr lang="en-US" sz="1200" b="1" dirty="0">
+                <a:latin typeface="Consolas" panose="020B0609020204030204" pitchFamily="49" charset="0"/>
+              </a:rPr>
+              <a:t>(bdf.x1)]</a:t>
             </a:r>
           </a:p>
           <a:p>
@@ -23270,7 +23742,20 @@
               <a:rPr lang="en-US" sz="1200" b="1" dirty="0">
                 <a:latin typeface="Consolas" panose="020B0609020204030204" pitchFamily="49" charset="0"/>
               </a:rPr>
-              <a:t>[~adf.x1.isin(bdf.x1)]</a:t>
+              <a:t>[~adf.x1.</a:t>
+            </a:r>
+            <a:r>
+              <a:rPr lang="en-US" sz="1200" b="1" dirty="0">
+                <a:latin typeface="Consolas" panose="020B0609020204030204" pitchFamily="49" charset="0"/>
+                <a:hlinkClick r:id="rId26"/>
+              </a:rPr>
+              <a:t>isin</a:t>
+            </a:r>
+            <a:r>
+              <a:rPr lang="en-US" sz="1200" b="1" dirty="0">
+                <a:latin typeface="Consolas" panose="020B0609020204030204" pitchFamily="49" charset="0"/>
+              </a:rPr>
+              <a:t>(bdf.x1)]</a:t>
             </a:r>
           </a:p>
           <a:p>
@@ -24692,7 +25177,14 @@
               <a:rPr lang="en-US" sz="1200" b="1" dirty="0" err="1">
                 <a:latin typeface="Consolas" panose="020B0609020204030204" pitchFamily="49" charset="0"/>
               </a:rPr>
-              <a:t>pd.merge</a:t>
+              <a:t>pd.</a:t>
+            </a:r>
+            <a:r>
+              <a:rPr lang="en-US" sz="1200" b="1" dirty="0" err="1">
+                <a:latin typeface="Consolas" panose="020B0609020204030204" pitchFamily="49" charset="0"/>
+                <a:hlinkClick r:id="rId25"/>
+              </a:rPr>
+              <a:t>merge</a:t>
             </a:r>
             <a:r>
               <a:rPr lang="en-US" sz="1200" b="1" dirty="0">
@@ -24761,7 +25253,14 @@
               <a:rPr lang="en-US" sz="1200" b="1" dirty="0" err="1">
                 <a:latin typeface="Consolas" panose="020B0609020204030204" pitchFamily="49" charset="0"/>
               </a:rPr>
-              <a:t>pd.merge</a:t>
+              <a:t>pd.</a:t>
+            </a:r>
+            <a:r>
+              <a:rPr lang="en-US" sz="1200" b="1" dirty="0" err="1">
+                <a:latin typeface="Consolas" panose="020B0609020204030204" pitchFamily="49" charset="0"/>
+                <a:hlinkClick r:id="rId25"/>
+              </a:rPr>
+              <a:t>merge</a:t>
             </a:r>
             <a:r>
               <a:rPr lang="en-US" sz="1200" b="1" dirty="0">
@@ -24829,7 +25328,14 @@
               <a:rPr lang="en-US" sz="1200" b="1" dirty="0" err="1">
                 <a:latin typeface="Consolas" panose="020B0609020204030204" pitchFamily="49" charset="0"/>
               </a:rPr>
-              <a:t>pd.merge</a:t>
+              <a:t>pd.</a:t>
+            </a:r>
+            <a:r>
+              <a:rPr lang="en-US" sz="1200" b="1" dirty="0" err="1">
+                <a:latin typeface="Consolas" panose="020B0609020204030204" pitchFamily="49" charset="0"/>
+                <a:hlinkClick r:id="rId25"/>
+              </a:rPr>
+              <a:t>merge</a:t>
             </a:r>
             <a:r>
               <a:rPr lang="en-US" sz="1200" b="1" dirty="0">
@@ -24875,7 +25381,20 @@
               <a:rPr lang="en-US" sz="1200" b="1" dirty="0">
                 <a:latin typeface="Consolas" panose="020B0609020204030204" pitchFamily="49" charset="0"/>
               </a:rPr>
-              <a:t>.query('_merge == "</a:t>
+              <a:t>.</a:t>
+            </a:r>
+            <a:r>
+              <a:rPr lang="en-US" sz="1200" b="1" dirty="0">
+                <a:latin typeface="Consolas" panose="020B0609020204030204" pitchFamily="49" charset="0"/>
+                <a:hlinkClick r:id="rId27"/>
+              </a:rPr>
+              <a:t>query</a:t>
+            </a:r>
+            <a:r>
+              <a:rPr lang="en-US" sz="1200" b="1" dirty="0">
+                <a:latin typeface="Consolas" panose="020B0609020204030204" pitchFamily="49" charset="0"/>
+              </a:rPr>
+              <a:t>('_merge == "</a:t>
             </a:r>
             <a:r>
               <a:rPr lang="en-US" sz="1200" b="1" dirty="0" err="1">
@@ -24895,7 +25414,20 @@
               <a:rPr lang="en-US" sz="1200" b="1" dirty="0">
                 <a:latin typeface="Consolas" panose="020B0609020204030204" pitchFamily="49" charset="0"/>
               </a:rPr>
-              <a:t>.drop(columns=['_merge'])</a:t>
+              <a:t>.</a:t>
+            </a:r>
+            <a:r>
+              <a:rPr lang="en-US" sz="1200" b="1" dirty="0">
+                <a:latin typeface="Consolas" panose="020B0609020204030204" pitchFamily="49" charset="0"/>
+                <a:hlinkClick r:id="rId28"/>
+              </a:rPr>
+              <a:t>drop</a:t>
+            </a:r>
+            <a:r>
+              <a:rPr lang="en-US" sz="1200" b="1" dirty="0">
+                <a:latin typeface="Consolas" panose="020B0609020204030204" pitchFamily="49" charset="0"/>
+              </a:rPr>
+              <a:t>(columns=['_merge'])</a:t>
             </a:r>
           </a:p>
           <a:p>
@@ -24968,10 +25500,25 @@
           <a:p>
             <a:pPr algn="ctr"/>
             <a:r>
-              <a:rPr lang="en-US" sz="2800" b="1" dirty="0"/>
+              <a:rPr lang="en-US" sz="2800" b="1" dirty="0">
+                <a:solidFill>
+                  <a:schemeClr val="bg1"/>
+                </a:solidFill>
+                <a:hlinkClick r:id="rId29">
+                  <a:extLst>
+                    <a:ext uri="{A12FA001-AC4F-418D-AE19-62706E023703}">
+                      <ahyp:hlinkClr xmlns:ahyp="http://schemas.microsoft.com/office/drawing/2018/hyperlinkcolor" val="tx"/>
+                    </a:ext>
+                  </a:extLst>
+                </a:hlinkClick>
+              </a:rPr>
               <a:t>Group Data</a:t>
             </a:r>
-            <a:endParaRPr lang="en-US" sz="2683" dirty="0"/>
+            <a:endParaRPr lang="en-US" sz="2683" dirty="0">
+              <a:solidFill>
+                <a:schemeClr val="bg1"/>
+              </a:solidFill>
+            </a:endParaRPr>
           </a:p>
         </p:txBody>
       </p:sp>
@@ -25857,7 +26404,14 @@
               <a:rPr lang="en-US" sz="1200" b="1" dirty="0" err="1">
                 <a:latin typeface="Consolas" panose="020B0609020204030204" pitchFamily="49" charset="0"/>
               </a:rPr>
-              <a:t>df.groupby</a:t>
+              <a:t>df.</a:t>
+            </a:r>
+            <a:r>
+              <a:rPr lang="en-US" sz="1200" b="1" dirty="0" err="1">
+                <a:latin typeface="Consolas" panose="020B0609020204030204" pitchFamily="49" charset="0"/>
+                <a:hlinkClick r:id="rId30"/>
+              </a:rPr>
+              <a:t>groupby</a:t>
             </a:r>
             <a:r>
               <a:rPr lang="en-US" sz="1200" b="1" dirty="0">
@@ -25891,7 +26445,14 @@
               <a:rPr lang="en-US" sz="1200" b="1" dirty="0" err="1">
                 <a:latin typeface="Consolas" panose="020B0609020204030204" pitchFamily="49" charset="0"/>
               </a:rPr>
-              <a:t>df.groupby</a:t>
+              <a:t>df.</a:t>
+            </a:r>
+            <a:r>
+              <a:rPr lang="en-US" sz="1200" b="1" dirty="0" err="1">
+                <a:latin typeface="Consolas" panose="020B0609020204030204" pitchFamily="49" charset="0"/>
+                <a:hlinkClick r:id="rId30"/>
+              </a:rPr>
+              <a:t>groupby</a:t>
             </a:r>
             <a:r>
               <a:rPr lang="en-US" sz="1200" b="1" dirty="0">
@@ -25999,8 +26560,15 @@
             <a:r>
               <a:rPr lang="en-US" sz="1200" b="1" dirty="0">
                 <a:latin typeface="Consolas" panose="020B0609020204030204" pitchFamily="49" charset="0"/>
-              </a:rPr>
-              <a:t>max(axis=1)</a:t>
+                <a:hlinkClick r:id="rId13"/>
+              </a:rPr>
+              <a:t>max</a:t>
+            </a:r>
+            <a:r>
+              <a:rPr lang="en-US" sz="1200" b="1" dirty="0">
+                <a:latin typeface="Consolas" panose="020B0609020204030204" pitchFamily="49" charset="0"/>
+              </a:rPr>
+              <a:t>(axis=1)</a:t>
             </a:r>
           </a:p>
           <a:p>
@@ -26014,8 +26582,15 @@
             <a:r>
               <a:rPr lang="en-US" sz="1200" b="1" dirty="0">
                 <a:latin typeface="Consolas" panose="020B0609020204030204" pitchFamily="49" charset="0"/>
-              </a:rPr>
-              <a:t>clip(lower=-10,upper=10)</a:t>
+                <a:hlinkClick r:id="rId31"/>
+              </a:rPr>
+              <a:t>clip</a:t>
+            </a:r>
+            <a:r>
+              <a:rPr lang="en-US" sz="1200" b="1" dirty="0">
+                <a:latin typeface="Consolas" panose="020B0609020204030204" pitchFamily="49" charset="0"/>
+              </a:rPr>
+              <a:t>(lower=-10,upper=10)</a:t>
             </a:r>
           </a:p>
           <a:p>
@@ -26052,8 +26627,15 @@
             <a:r>
               <a:rPr lang="en-US" sz="1200" b="1" dirty="0">
                 <a:latin typeface="Consolas" panose="020B0609020204030204" pitchFamily="49" charset="0"/>
-              </a:rPr>
-              <a:t>min(axis=1)</a:t>
+                <a:hlinkClick r:id="rId12"/>
+              </a:rPr>
+              <a:t>min</a:t>
+            </a:r>
+            <a:r>
+              <a:rPr lang="en-US" sz="1200" b="1" dirty="0">
+                <a:latin typeface="Consolas" panose="020B0609020204030204" pitchFamily="49" charset="0"/>
+              </a:rPr>
+              <a:t>(axis=1)</a:t>
             </a:r>
           </a:p>
           <a:p>
@@ -26067,8 +26649,15 @@
             <a:r>
               <a:rPr lang="en-US" sz="1200" b="1" dirty="0">
                 <a:latin typeface="Consolas" panose="020B0609020204030204" pitchFamily="49" charset="0"/>
-              </a:rPr>
-              <a:t>abs()</a:t>
+                <a:hlinkClick r:id="rId32"/>
+              </a:rPr>
+              <a:t>abs</a:t>
+            </a:r>
+            <a:r>
+              <a:rPr lang="en-US" sz="1200" b="1" dirty="0">
+                <a:latin typeface="Consolas" panose="020B0609020204030204" pitchFamily="49" charset="0"/>
+              </a:rPr>
+              <a:t>()</a:t>
             </a:r>
           </a:p>
           <a:p>
@@ -26154,10 +26743,25 @@
           <a:p>
             <a:pPr algn="ctr"/>
             <a:r>
-              <a:rPr lang="en-US" sz="2800" b="1" dirty="0"/>
+              <a:rPr lang="en-US" sz="2800" b="1" dirty="0">
+                <a:solidFill>
+                  <a:schemeClr val="bg1"/>
+                </a:solidFill>
+                <a:hlinkClick r:id="rId33">
+                  <a:extLst>
+                    <a:ext uri="{A12FA001-AC4F-418D-AE19-62706E023703}">
+                      <ahyp:hlinkClr xmlns:ahyp="http://schemas.microsoft.com/office/drawing/2018/hyperlinkcolor" val="tx"/>
+                    </a:ext>
+                  </a:extLst>
+                </a:hlinkClick>
+              </a:rPr>
               <a:t>Windows</a:t>
             </a:r>
-            <a:endParaRPr lang="en-US" sz="2683" dirty="0"/>
+            <a:endParaRPr lang="en-US" sz="2683" dirty="0">
+              <a:solidFill>
+                <a:schemeClr val="bg1"/>
+              </a:solidFill>
+            </a:endParaRPr>
           </a:p>
         </p:txBody>
       </p:sp>
@@ -26187,7 +26791,14 @@
               <a:rPr lang="en-US" sz="1200" b="1" dirty="0" err="1">
                 <a:latin typeface="Consolas" panose="020B0609020204030204" pitchFamily="49" charset="0"/>
               </a:rPr>
-              <a:t>df.expanding</a:t>
+              <a:t>df.</a:t>
+            </a:r>
+            <a:r>
+              <a:rPr lang="en-US" sz="1200" b="1" dirty="0" err="1">
+                <a:latin typeface="Consolas" panose="020B0609020204030204" pitchFamily="49" charset="0"/>
+                <a:hlinkClick r:id="rId34"/>
+              </a:rPr>
+              <a:t>expanding</a:t>
             </a:r>
             <a:r>
               <a:rPr lang="en-US" sz="1200" b="1" dirty="0">
@@ -26211,7 +26822,14 @@
               <a:rPr lang="en-US" sz="1200" b="1" dirty="0" err="1">
                 <a:latin typeface="Consolas" panose="020B0609020204030204" pitchFamily="49" charset="0"/>
               </a:rPr>
-              <a:t>df.rolling</a:t>
+              <a:t>df.</a:t>
+            </a:r>
+            <a:r>
+              <a:rPr lang="en-US" sz="1200" b="1" dirty="0" err="1">
+                <a:latin typeface="Consolas" panose="020B0609020204030204" pitchFamily="49" charset="0"/>
+                <a:hlinkClick r:id="rId35"/>
+              </a:rPr>
+              <a:t>rolling</a:t>
             </a:r>
             <a:r>
               <a:rPr lang="en-US" sz="1200" b="1" dirty="0">
@@ -26254,8 +26872,15 @@
             <a:r>
               <a:rPr lang="en-US" sz="1200" b="1" dirty="0">
                 <a:latin typeface="Consolas" panose="020B0609020204030204" pitchFamily="49" charset="0"/>
-              </a:rPr>
-              <a:t>size()</a:t>
+                <a:hlinkClick r:id="rId36"/>
+              </a:rPr>
+              <a:t>size</a:t>
+            </a:r>
+            <a:r>
+              <a:rPr lang="en-US" sz="1200" b="1" dirty="0">
+                <a:latin typeface="Consolas" panose="020B0609020204030204" pitchFamily="49" charset="0"/>
+              </a:rPr>
+              <a:t>()</a:t>
             </a:r>
           </a:p>
           <a:p>
@@ -26292,6 +26917,7 @@
             <a:r>
               <a:rPr lang="en-US" sz="1200" b="1" dirty="0" err="1">
                 <a:latin typeface="Consolas" panose="020B0609020204030204" pitchFamily="49" charset="0"/>
+                <a:hlinkClick r:id="rId37"/>
               </a:rPr>
               <a:t>agg</a:t>
             </a:r>
@@ -26393,7 +27019,14 @@
               <a:rPr lang="en-US" sz="1200" b="1" dirty="0" err="1">
                 <a:latin typeface="Consolas" panose="020B0609020204030204" pitchFamily="49" charset="0"/>
               </a:rPr>
-              <a:t>df.dropna</a:t>
+              <a:t>df.</a:t>
+            </a:r>
+            <a:r>
+              <a:rPr lang="en-US" sz="1200" b="1" dirty="0" err="1">
+                <a:latin typeface="Consolas" panose="020B0609020204030204" pitchFamily="49" charset="0"/>
+                <a:hlinkClick r:id="rId38"/>
+              </a:rPr>
+              <a:t>dropna</a:t>
             </a:r>
             <a:r>
               <a:rPr lang="en-US" sz="1200" b="1" dirty="0">
@@ -26413,7 +27046,14 @@
               <a:rPr lang="en-US" sz="1200" b="1" dirty="0" err="1">
                 <a:latin typeface="Consolas" panose="020B0609020204030204" pitchFamily="49" charset="0"/>
               </a:rPr>
-              <a:t>df.fillna</a:t>
+              <a:t>df.</a:t>
+            </a:r>
+            <a:r>
+              <a:rPr lang="en-US" sz="1200" b="1" dirty="0" err="1">
+                <a:latin typeface="Consolas" panose="020B0609020204030204" pitchFamily="49" charset="0"/>
+                <a:hlinkClick r:id="rId39"/>
+              </a:rPr>
+              <a:t>fillna</a:t>
             </a:r>
             <a:r>
               <a:rPr lang="en-US" sz="1200" b="1" dirty="0">
@@ -26468,10 +27108,25 @@
           <a:p>
             <a:pPr algn="ctr"/>
             <a:r>
-              <a:rPr lang="en-US" sz="2800" b="1" dirty="0"/>
+              <a:rPr lang="en-US" sz="2800" b="1" dirty="0">
+                <a:solidFill>
+                  <a:schemeClr val="bg1"/>
+                </a:solidFill>
+                <a:hlinkClick r:id="rId40">
+                  <a:extLst>
+                    <a:ext uri="{A12FA001-AC4F-418D-AE19-62706E023703}">
+                      <ahyp:hlinkClr xmlns:ahyp="http://schemas.microsoft.com/office/drawing/2018/hyperlinkcolor" val="tx"/>
+                    </a:ext>
+                  </a:extLst>
+                </a:hlinkClick>
+              </a:rPr>
               <a:t>Plotting</a:t>
             </a:r>
-            <a:endParaRPr lang="en-US" sz="2683" dirty="0"/>
+            <a:endParaRPr lang="en-US" sz="2683" dirty="0">
+              <a:solidFill>
+                <a:schemeClr val="bg1"/>
+              </a:solidFill>
+            </a:endParaRPr>
           </a:p>
         </p:txBody>
       </p:sp>
@@ -26501,7 +27156,20 @@
               <a:rPr lang="en-US" sz="1200" b="1" dirty="0" err="1">
                 <a:latin typeface="Consolas" panose="020B0609020204030204" pitchFamily="49" charset="0"/>
               </a:rPr>
-              <a:t>df.plot.hist</a:t>
+              <a:t>df.</a:t>
+            </a:r>
+            <a:r>
+              <a:rPr lang="en-US" sz="1200" b="1" dirty="0" err="1">
+                <a:latin typeface="Consolas" panose="020B0609020204030204" pitchFamily="49" charset="0"/>
+                <a:hlinkClick r:id="rId41"/>
+              </a:rPr>
+              <a:t>plot</a:t>
+            </a:r>
+            <a:r>
+              <a:rPr lang="en-US" sz="1200" b="1" dirty="0" err="1">
+                <a:latin typeface="Consolas" panose="020B0609020204030204" pitchFamily="49" charset="0"/>
+              </a:rPr>
+              <a:t>.hist</a:t>
             </a:r>
             <a:r>
               <a:rPr lang="en-US" sz="1200" b="1" dirty="0">
@@ -26545,7 +27213,20 @@
               <a:rPr lang="en-US" sz="1200" b="1" dirty="0" err="1">
                 <a:latin typeface="Consolas" panose="020B0609020204030204" pitchFamily="49" charset="0"/>
               </a:rPr>
-              <a:t>df.plot.scatter</a:t>
+              <a:t>df.</a:t>
+            </a:r>
+            <a:r>
+              <a:rPr lang="en-US" sz="1200" b="1" dirty="0" err="1">
+                <a:latin typeface="Consolas" panose="020B0609020204030204" pitchFamily="49" charset="0"/>
+                <a:hlinkClick r:id="rId41"/>
+              </a:rPr>
+              <a:t>plot</a:t>
+            </a:r>
+            <a:r>
+              <a:rPr lang="en-US" sz="1200" b="1" dirty="0" err="1">
+                <a:latin typeface="Consolas" panose="020B0609020204030204" pitchFamily="49" charset="0"/>
+              </a:rPr>
+              <a:t>.scatter</a:t>
             </a:r>
             <a:r>
               <a:rPr lang="en-US" sz="1200" b="1" dirty="0">
@@ -26584,7 +27265,7 @@
           <p:nvPr/>
         </p:nvPicPr>
         <p:blipFill>
-          <a:blip r:embed="rId2"/>
+          <a:blip r:embed="rId42"/>
           <a:stretch>
             <a:fillRect/>
           </a:stretch>
@@ -26608,7 +27289,7 @@
           <p:nvPr/>
         </p:nvPicPr>
         <p:blipFill>
-          <a:blip r:embed="rId3"/>
+          <a:blip r:embed="rId43"/>
           <a:stretch>
             <a:fillRect/>
           </a:stretch>
@@ -26677,7 +27358,7 @@
           <a:p>
             <a:r>
               <a:rPr lang="en-US" sz="800" dirty="0">
-                <a:hlinkClick r:id="rId4"/>
+                <a:hlinkClick r:id="rId44"/>
               </a:rPr>
               <a:t>http://pandas.pydata.org/</a:t>
             </a:r>
@@ -26703,7 +27384,7 @@
             </a:r>
             <a:r>
               <a:rPr lang="en-US" sz="800" dirty="0">
-                <a:hlinkClick r:id="rId5"/>
+                <a:hlinkClick r:id="rId45"/>
               </a:rPr>
               <a:t>https://www.rstudio.com/wp-content/uploads/2015/02/data-wrangling-cheatsheet.pdf</a:t>
             </a:r>
@@ -26713,7 +27394,7 @@
             </a:r>
             <a:r>
               <a:rPr lang="en-US" sz="800" dirty="0">
-                <a:hlinkClick r:id="rId6"/>
+                <a:hlinkClick r:id="rId46"/>
               </a:rPr>
               <a:t>Princeton Consultants</a:t>
             </a:r>

</xml_diff>

<commit_message>
DOC: added links to official docs in cheat sheet (update)
</commit_message>
<xml_diff>
--- a/doc/cheatsheet/Pandas_Cheat_Sheet.pptx
+++ b/doc/cheatsheet/Pandas_Cheat_Sheet.pptx
@@ -255,7 +255,7 @@
           <a:p>
             <a:fld id="{79278B33-2949-49BE-B3B0-3F16CAF906FE}" type="datetimeFigureOut">
               <a:rPr lang="en-US" smtClean="0"/>
-              <a:t>2/11/2019</a:t>
+              <a:t>2/9/2021</a:t>
             </a:fld>
             <a:endParaRPr lang="en-US"/>
           </a:p>
@@ -297,7 +297,7 @@
           <a:p>
             <a:fld id="{E8285EFA-DD28-4E69-ADE7-169C8C1119D8}" type="slidenum">
               <a:rPr lang="en-US" smtClean="0"/>
-              <a:t>‹#›</a:t>
+              <a:t>‹Nr.›</a:t>
             </a:fld>
             <a:endParaRPr lang="en-US"/>
           </a:p>
@@ -425,7 +425,7 @@
           <a:p>
             <a:fld id="{79278B33-2949-49BE-B3B0-3F16CAF906FE}" type="datetimeFigureOut">
               <a:rPr lang="en-US" smtClean="0"/>
-              <a:t>2/11/2019</a:t>
+              <a:t>2/9/2021</a:t>
             </a:fld>
             <a:endParaRPr lang="en-US"/>
           </a:p>
@@ -467,7 +467,7 @@
           <a:p>
             <a:fld id="{E8285EFA-DD28-4E69-ADE7-169C8C1119D8}" type="slidenum">
               <a:rPr lang="en-US" smtClean="0"/>
-              <a:t>‹#›</a:t>
+              <a:t>‹Nr.›</a:t>
             </a:fld>
             <a:endParaRPr lang="en-US"/>
           </a:p>
@@ -605,7 +605,7 @@
           <a:p>
             <a:fld id="{79278B33-2949-49BE-B3B0-3F16CAF906FE}" type="datetimeFigureOut">
               <a:rPr lang="en-US" smtClean="0"/>
-              <a:t>2/11/2019</a:t>
+              <a:t>2/9/2021</a:t>
             </a:fld>
             <a:endParaRPr lang="en-US"/>
           </a:p>
@@ -647,7 +647,7 @@
           <a:p>
             <a:fld id="{E8285EFA-DD28-4E69-ADE7-169C8C1119D8}" type="slidenum">
               <a:rPr lang="en-US" smtClean="0"/>
-              <a:t>‹#›</a:t>
+              <a:t>‹Nr.›</a:t>
             </a:fld>
             <a:endParaRPr lang="en-US"/>
           </a:p>
@@ -775,7 +775,7 @@
           <a:p>
             <a:fld id="{79278B33-2949-49BE-B3B0-3F16CAF906FE}" type="datetimeFigureOut">
               <a:rPr lang="en-US" smtClean="0"/>
-              <a:t>2/11/2019</a:t>
+              <a:t>2/9/2021</a:t>
             </a:fld>
             <a:endParaRPr lang="en-US"/>
           </a:p>
@@ -817,7 +817,7 @@
           <a:p>
             <a:fld id="{E8285EFA-DD28-4E69-ADE7-169C8C1119D8}" type="slidenum">
               <a:rPr lang="en-US" smtClean="0"/>
-              <a:t>‹#›</a:t>
+              <a:t>‹Nr.›</a:t>
             </a:fld>
             <a:endParaRPr lang="en-US"/>
           </a:p>
@@ -1019,7 +1019,7 @@
           <a:p>
             <a:fld id="{79278B33-2949-49BE-B3B0-3F16CAF906FE}" type="datetimeFigureOut">
               <a:rPr lang="en-US" smtClean="0"/>
-              <a:t>2/11/2019</a:t>
+              <a:t>2/9/2021</a:t>
             </a:fld>
             <a:endParaRPr lang="en-US"/>
           </a:p>
@@ -1061,7 +1061,7 @@
           <a:p>
             <a:fld id="{E8285EFA-DD28-4E69-ADE7-169C8C1119D8}" type="slidenum">
               <a:rPr lang="en-US" smtClean="0"/>
-              <a:t>‹#›</a:t>
+              <a:t>‹Nr.›</a:t>
             </a:fld>
             <a:endParaRPr lang="en-US"/>
           </a:p>
@@ -1251,7 +1251,7 @@
           <a:p>
             <a:fld id="{79278B33-2949-49BE-B3B0-3F16CAF906FE}" type="datetimeFigureOut">
               <a:rPr lang="en-US" smtClean="0"/>
-              <a:t>2/11/2019</a:t>
+              <a:t>2/9/2021</a:t>
             </a:fld>
             <a:endParaRPr lang="en-US"/>
           </a:p>
@@ -1293,7 +1293,7 @@
           <a:p>
             <a:fld id="{E8285EFA-DD28-4E69-ADE7-169C8C1119D8}" type="slidenum">
               <a:rPr lang="en-US" smtClean="0"/>
-              <a:t>‹#›</a:t>
+              <a:t>‹Nr.›</a:t>
             </a:fld>
             <a:endParaRPr lang="en-US"/>
           </a:p>
@@ -1618,7 +1618,7 @@
           <a:p>
             <a:fld id="{79278B33-2949-49BE-B3B0-3F16CAF906FE}" type="datetimeFigureOut">
               <a:rPr lang="en-US" smtClean="0"/>
-              <a:t>2/11/2019</a:t>
+              <a:t>2/9/2021</a:t>
             </a:fld>
             <a:endParaRPr lang="en-US"/>
           </a:p>
@@ -1660,7 +1660,7 @@
           <a:p>
             <a:fld id="{E8285EFA-DD28-4E69-ADE7-169C8C1119D8}" type="slidenum">
               <a:rPr lang="en-US" smtClean="0"/>
-              <a:t>‹#›</a:t>
+              <a:t>‹Nr.›</a:t>
             </a:fld>
             <a:endParaRPr lang="en-US"/>
           </a:p>
@@ -1736,7 +1736,7 @@
           <a:p>
             <a:fld id="{79278B33-2949-49BE-B3B0-3F16CAF906FE}" type="datetimeFigureOut">
               <a:rPr lang="en-US" smtClean="0"/>
-              <a:t>2/11/2019</a:t>
+              <a:t>2/9/2021</a:t>
             </a:fld>
             <a:endParaRPr lang="en-US"/>
           </a:p>
@@ -1778,7 +1778,7 @@
           <a:p>
             <a:fld id="{E8285EFA-DD28-4E69-ADE7-169C8C1119D8}" type="slidenum">
               <a:rPr lang="en-US" smtClean="0"/>
-              <a:t>‹#›</a:t>
+              <a:t>‹Nr.›</a:t>
             </a:fld>
             <a:endParaRPr lang="en-US"/>
           </a:p>
@@ -1831,7 +1831,7 @@
           <a:p>
             <a:fld id="{79278B33-2949-49BE-B3B0-3F16CAF906FE}" type="datetimeFigureOut">
               <a:rPr lang="en-US" smtClean="0"/>
-              <a:t>2/11/2019</a:t>
+              <a:t>2/9/2021</a:t>
             </a:fld>
             <a:endParaRPr lang="en-US"/>
           </a:p>
@@ -1873,7 +1873,7 @@
           <a:p>
             <a:fld id="{E8285EFA-DD28-4E69-ADE7-169C8C1119D8}" type="slidenum">
               <a:rPr lang="en-US" smtClean="0"/>
-              <a:t>‹#›</a:t>
+              <a:t>‹Nr.›</a:t>
             </a:fld>
             <a:endParaRPr lang="en-US"/>
           </a:p>
@@ -2108,7 +2108,7 @@
           <a:p>
             <a:fld id="{79278B33-2949-49BE-B3B0-3F16CAF906FE}" type="datetimeFigureOut">
               <a:rPr lang="en-US" smtClean="0"/>
-              <a:t>2/11/2019</a:t>
+              <a:t>2/9/2021</a:t>
             </a:fld>
             <a:endParaRPr lang="en-US"/>
           </a:p>
@@ -2150,7 +2150,7 @@
           <a:p>
             <a:fld id="{E8285EFA-DD28-4E69-ADE7-169C8C1119D8}" type="slidenum">
               <a:rPr lang="en-US" smtClean="0"/>
-              <a:t>‹#›</a:t>
+              <a:t>‹Nr.›</a:t>
             </a:fld>
             <a:endParaRPr lang="en-US"/>
           </a:p>
@@ -2365,7 +2365,7 @@
           <a:p>
             <a:fld id="{79278B33-2949-49BE-B3B0-3F16CAF906FE}" type="datetimeFigureOut">
               <a:rPr lang="en-US" smtClean="0"/>
-              <a:t>2/11/2019</a:t>
+              <a:t>2/9/2021</a:t>
             </a:fld>
             <a:endParaRPr lang="en-US"/>
           </a:p>
@@ -2407,7 +2407,7 @@
           <a:p>
             <a:fld id="{E8285EFA-DD28-4E69-ADE7-169C8C1119D8}" type="slidenum">
               <a:rPr lang="en-US" smtClean="0"/>
-              <a:t>‹#›</a:t>
+              <a:t>‹Nr.›</a:t>
             </a:fld>
             <a:endParaRPr lang="en-US"/>
           </a:p>
@@ -2578,7 +2578,7 @@
           <a:p>
             <a:fld id="{79278B33-2949-49BE-B3B0-3F16CAF906FE}" type="datetimeFigureOut">
               <a:rPr lang="en-US" smtClean="0"/>
-              <a:t>2/11/2019</a:t>
+              <a:t>2/9/2021</a:t>
             </a:fld>
             <a:endParaRPr lang="en-US"/>
           </a:p>
@@ -2656,7 +2656,7 @@
           <a:p>
             <a:fld id="{E8285EFA-DD28-4E69-ADE7-169C8C1119D8}" type="slidenum">
               <a:rPr lang="en-US" smtClean="0"/>
-              <a:t>‹#›</a:t>
+              <a:t>‹Nr.›</a:t>
             </a:fld>
             <a:endParaRPr lang="en-US"/>
           </a:p>
@@ -3388,22 +3388,70 @@
           <a:p>
             <a:pPr algn="ctr"/>
             <a:r>
-              <a:rPr lang="en-US" sz="2800" b="1" dirty="0"/>
+              <a:rPr lang="en-US" sz="2800" b="1" dirty="0">
+                <a:solidFill>
+                  <a:schemeClr val="bg1"/>
+                </a:solidFill>
+                <a:hlinkClick r:id="rId2">
+                  <a:extLst>
+                    <a:ext uri="{A12FA001-AC4F-418D-AE19-62706E023703}">
+                      <ahyp:hlinkClr xmlns:ahyp="http://schemas.microsoft.com/office/drawing/2018/hyperlinkcolor" val="tx"/>
+                    </a:ext>
+                  </a:extLst>
+                </a:hlinkClick>
+              </a:rPr>
               <a:t>Syntax</a:t>
             </a:r>
             <a:r>
-              <a:rPr lang="en-US" sz="2683" dirty="0"/>
+              <a:rPr lang="en-US" sz="2683" dirty="0">
+                <a:solidFill>
+                  <a:schemeClr val="bg1"/>
+                </a:solidFill>
+                <a:hlinkClick r:id="rId2">
+                  <a:extLst>
+                    <a:ext uri="{A12FA001-AC4F-418D-AE19-62706E023703}">
+                      <ahyp:hlinkClr xmlns:ahyp="http://schemas.microsoft.com/office/drawing/2018/hyperlinkcolor" val="tx"/>
+                    </a:ext>
+                  </a:extLst>
+                </a:hlinkClick>
+              </a:rPr>
               <a:t> </a:t>
             </a:r>
             <a:r>
-              <a:rPr lang="en-US" sz="1800" dirty="0"/>
+              <a:rPr lang="en-US" sz="1800" dirty="0">
+                <a:solidFill>
+                  <a:schemeClr val="bg1"/>
+                </a:solidFill>
+                <a:hlinkClick r:id="rId2">
+                  <a:extLst>
+                    <a:ext uri="{A12FA001-AC4F-418D-AE19-62706E023703}">
+                      <ahyp:hlinkClr xmlns:ahyp="http://schemas.microsoft.com/office/drawing/2018/hyperlinkcolor" val="tx"/>
+                    </a:ext>
+                  </a:extLst>
+                </a:hlinkClick>
+              </a:rPr>
               <a:t>– Creating </a:t>
             </a:r>
             <a:r>
-              <a:rPr lang="en-US" sz="1800" dirty="0" err="1"/>
+              <a:rPr lang="en-US" sz="1800" dirty="0" err="1">
+                <a:solidFill>
+                  <a:schemeClr val="bg1"/>
+                </a:solidFill>
+                <a:hlinkClick r:id="rId2">
+                  <a:extLst>
+                    <a:ext uri="{A12FA001-AC4F-418D-AE19-62706E023703}">
+                      <ahyp:hlinkClr xmlns:ahyp="http://schemas.microsoft.com/office/drawing/2018/hyperlinkcolor" val="tx"/>
+                    </a:ext>
+                  </a:extLst>
+                </a:hlinkClick>
+              </a:rPr>
               <a:t>DataFrames</a:t>
             </a:r>
-            <a:endParaRPr lang="en-US" sz="1800" dirty="0"/>
+            <a:endParaRPr lang="en-US" sz="1800" dirty="0">
+              <a:solidFill>
+                <a:schemeClr val="bg1"/>
+              </a:solidFill>
+            </a:endParaRPr>
           </a:p>
         </p:txBody>
       </p:sp>
@@ -4219,11 +4267,33 @@
           <a:p>
             <a:pPr algn="ctr"/>
             <a:r>
-              <a:rPr lang="en-US" sz="2800" b="1" dirty="0"/>
+              <a:rPr lang="en-US" sz="2800" b="1" dirty="0">
+                <a:solidFill>
+                  <a:schemeClr val="bg1"/>
+                </a:solidFill>
+                <a:hlinkClick r:id="rId3">
+                  <a:extLst>
+                    <a:ext uri="{A12FA001-AC4F-418D-AE19-62706E023703}">
+                      <ahyp:hlinkClr xmlns:ahyp="http://schemas.microsoft.com/office/drawing/2018/hyperlinkcolor" val="tx"/>
+                    </a:ext>
+                  </a:extLst>
+                </a:hlinkClick>
+              </a:rPr>
               <a:t>Reshaping Data</a:t>
             </a:r>
             <a:r>
-              <a:rPr lang="en-US" sz="2800" dirty="0"/>
+              <a:rPr lang="en-US" sz="2800" dirty="0">
+                <a:solidFill>
+                  <a:schemeClr val="bg1"/>
+                </a:solidFill>
+                <a:hlinkClick r:id="rId3">
+                  <a:extLst>
+                    <a:ext uri="{A12FA001-AC4F-418D-AE19-62706E023703}">
+                      <ahyp:hlinkClr xmlns:ahyp="http://schemas.microsoft.com/office/drawing/2018/hyperlinkcolor" val="tx"/>
+                    </a:ext>
+                  </a:extLst>
+                </a:hlinkClick>
+              </a:rPr>
               <a:t> </a:t>
             </a:r>
             <a:r>
@@ -5671,7 +5741,14 @@
               <a:rPr lang="en-US" sz="1200" b="1" dirty="0" err="1">
                 <a:latin typeface="Consolas" panose="020B0609020204030204" pitchFamily="49" charset="0"/>
               </a:rPr>
-              <a:t>pd.melt</a:t>
+              <a:t>pd.</a:t>
+            </a:r>
+            <a:r>
+              <a:rPr lang="en-US" sz="1200" b="1" dirty="0" err="1">
+                <a:latin typeface="Consolas" panose="020B0609020204030204" pitchFamily="49" charset="0"/>
+                <a:hlinkClick r:id="rId4"/>
+              </a:rPr>
+              <a:t>melt</a:t>
             </a:r>
             <a:r>
               <a:rPr lang="en-US" sz="1200" b="1" dirty="0">
@@ -6465,7 +6542,14 @@
               <a:rPr lang="en-US" sz="1200" b="1" dirty="0" err="1">
                 <a:latin typeface="Consolas" panose="020B0609020204030204" pitchFamily="49" charset="0"/>
               </a:rPr>
-              <a:t>df.pivot</a:t>
+              <a:t>df.</a:t>
+            </a:r>
+            <a:r>
+              <a:rPr lang="en-US" sz="1200" b="1" dirty="0" err="1">
+                <a:latin typeface="Consolas" panose="020B0609020204030204" pitchFamily="49" charset="0"/>
+                <a:hlinkClick r:id="rId5"/>
+              </a:rPr>
+              <a:t>pivot</a:t>
             </a:r>
             <a:r>
               <a:rPr lang="en-US" sz="1200" b="1" dirty="0">
@@ -7062,7 +7146,14 @@
               <a:rPr lang="en-US" sz="1200" b="1" dirty="0" err="1">
                 <a:latin typeface="Consolas" panose="020B0609020204030204" pitchFamily="49" charset="0"/>
               </a:rPr>
-              <a:t>pd.concat</a:t>
+              <a:t>pd.</a:t>
+            </a:r>
+            <a:r>
+              <a:rPr lang="en-US" sz="1200" b="1" dirty="0" err="1">
+                <a:latin typeface="Consolas" panose="020B0609020204030204" pitchFamily="49" charset="0"/>
+                <a:hlinkClick r:id="rId6"/>
+              </a:rPr>
+              <a:t>concat</a:t>
             </a:r>
             <a:r>
               <a:rPr lang="en-US" sz="1200" b="1" dirty="0">
@@ -8174,7 +8265,14 @@
               <a:rPr lang="en-US" sz="1200" b="1" dirty="0" err="1">
                 <a:latin typeface="Consolas" panose="020B0609020204030204" pitchFamily="49" charset="0"/>
               </a:rPr>
-              <a:t>pd.concat</a:t>
+              <a:t>pd.</a:t>
+            </a:r>
+            <a:r>
+              <a:rPr lang="en-US" sz="1200" b="1" dirty="0" err="1">
+                <a:latin typeface="Consolas" panose="020B0609020204030204" pitchFamily="49" charset="0"/>
+                <a:hlinkClick r:id="rId6"/>
+              </a:rPr>
+              <a:t>concat</a:t>
             </a:r>
             <a:r>
               <a:rPr lang="en-US" sz="1200" b="1" dirty="0">
@@ -8406,7 +8504,14 @@
               <a:rPr lang="en-US" sz="1200" b="1" dirty="0" err="1">
                 <a:latin typeface="Consolas" panose="020B0609020204030204" pitchFamily="49" charset="0"/>
               </a:rPr>
-              <a:t>df.sort_values</a:t>
+              <a:t>df.</a:t>
+            </a:r>
+            <a:r>
+              <a:rPr lang="en-US" sz="1200" b="1" dirty="0" err="1">
+                <a:latin typeface="Consolas" panose="020B0609020204030204" pitchFamily="49" charset="0"/>
+                <a:hlinkClick r:id="rId7"/>
+              </a:rPr>
+              <a:t>sort_values</a:t>
             </a:r>
             <a:r>
               <a:rPr lang="en-US" sz="1200" b="1" dirty="0">
@@ -8430,7 +8535,14 @@
               <a:rPr lang="en-US" sz="1200" b="1" dirty="0" err="1">
                 <a:latin typeface="Consolas" panose="020B0609020204030204" pitchFamily="49" charset="0"/>
               </a:rPr>
-              <a:t>df.sort_values</a:t>
+              <a:t>df.</a:t>
+            </a:r>
+            <a:r>
+              <a:rPr lang="en-US" sz="1200" b="1" dirty="0" err="1">
+                <a:latin typeface="Consolas" panose="020B0609020204030204" pitchFamily="49" charset="0"/>
+                <a:hlinkClick r:id="rId7"/>
+              </a:rPr>
+              <a:t>sort_values</a:t>
             </a:r>
             <a:r>
               <a:rPr lang="en-US" sz="1200" b="1" dirty="0">
@@ -8466,7 +8578,14 @@
               <a:rPr lang="en-US" sz="1200" b="1" dirty="0" err="1">
                 <a:latin typeface="Consolas" panose="020B0609020204030204" pitchFamily="49" charset="0"/>
               </a:rPr>
-              <a:t>df.rename</a:t>
+              <a:t>df.</a:t>
+            </a:r>
+            <a:r>
+              <a:rPr lang="en-US" sz="1200" b="1" dirty="0" err="1">
+                <a:latin typeface="Consolas" panose="020B0609020204030204" pitchFamily="49" charset="0"/>
+                <a:hlinkClick r:id="rId8"/>
+              </a:rPr>
+              <a:t>rename</a:t>
             </a:r>
             <a:r>
               <a:rPr lang="en-US" sz="1200" b="1" dirty="0">
@@ -8507,7 +8626,14 @@
               <a:rPr lang="en-US" sz="1200" b="1" dirty="0" err="1">
                 <a:latin typeface="Consolas" panose="020B0609020204030204" pitchFamily="49" charset="0"/>
               </a:rPr>
-              <a:t>df.sort_index</a:t>
+              <a:t>df.</a:t>
+            </a:r>
+            <a:r>
+              <a:rPr lang="en-US" sz="1200" b="1" dirty="0" err="1">
+                <a:latin typeface="Consolas" panose="020B0609020204030204" pitchFamily="49" charset="0"/>
+                <a:hlinkClick r:id="rId9"/>
+              </a:rPr>
+              <a:t>sort_index</a:t>
             </a:r>
             <a:r>
               <a:rPr lang="en-US" sz="1200" b="1" dirty="0">
@@ -8536,7 +8662,14 @@
               <a:rPr lang="en-US" sz="1200" b="1" dirty="0" err="1">
                 <a:latin typeface="Consolas" panose="020B0609020204030204" pitchFamily="49" charset="0"/>
               </a:rPr>
-              <a:t>df.reset_index</a:t>
+              <a:t>df.</a:t>
+            </a:r>
+            <a:r>
+              <a:rPr lang="en-US" sz="1200" b="1" dirty="0" err="1">
+                <a:latin typeface="Consolas" panose="020B0609020204030204" pitchFamily="49" charset="0"/>
+                <a:hlinkClick r:id="rId10"/>
+              </a:rPr>
+              <a:t>reset_index</a:t>
             </a:r>
             <a:r>
               <a:rPr lang="en-US" sz="1200" b="1" dirty="0">
@@ -8569,7 +8702,14 @@
               <a:rPr lang="en-US" sz="1200" b="1" dirty="0" err="1">
                 <a:latin typeface="Consolas" panose="020B0609020204030204" pitchFamily="49" charset="0"/>
               </a:rPr>
-              <a:t>df.drop</a:t>
+              <a:t>df.</a:t>
+            </a:r>
+            <a:r>
+              <a:rPr lang="en-US" sz="1200" b="1" dirty="0" err="1">
+                <a:latin typeface="Consolas" panose="020B0609020204030204" pitchFamily="49" charset="0"/>
+                <a:hlinkClick r:id="rId11"/>
+              </a:rPr>
+              <a:t>drop</a:t>
             </a:r>
             <a:r>
               <a:rPr lang="en-US" sz="1200" b="1" dirty="0">
@@ -8640,7 +8780,18 @@
           <a:p>
             <a:pPr algn="ctr"/>
             <a:r>
-              <a:rPr lang="en-US" sz="2800" b="1" dirty="0"/>
+              <a:rPr lang="en-US" sz="2800" b="1" dirty="0">
+                <a:solidFill>
+                  <a:schemeClr val="bg1"/>
+                </a:solidFill>
+                <a:hlinkClick r:id="rId12">
+                  <a:extLst>
+                    <a:ext uri="{A12FA001-AC4F-418D-AE19-62706E023703}">
+                      <ahyp:hlinkClr xmlns:ahyp="http://schemas.microsoft.com/office/drawing/2018/hyperlinkcolor" val="tx"/>
+                    </a:ext>
+                  </a:extLst>
+                </a:hlinkClick>
+              </a:rPr>
               <a:t>Subset Observations </a:t>
             </a:r>
             <a:r>
@@ -8688,7 +8839,18 @@
           <a:p>
             <a:pPr algn="ctr"/>
             <a:r>
-              <a:rPr lang="en-US" sz="2800" b="1" dirty="0"/>
+              <a:rPr lang="en-US" sz="2800" b="1" dirty="0">
+                <a:solidFill>
+                  <a:schemeClr val="bg1"/>
+                </a:solidFill>
+                <a:hlinkClick r:id="rId12">
+                  <a:extLst>
+                    <a:ext uri="{A12FA001-AC4F-418D-AE19-62706E023703}">
+                      <ahyp:hlinkClr xmlns:ahyp="http://schemas.microsoft.com/office/drawing/2018/hyperlinkcolor" val="tx"/>
+                    </a:ext>
+                  </a:extLst>
+                </a:hlinkClick>
+              </a:rPr>
               <a:t>Subset Variables </a:t>
             </a:r>
             <a:r>
@@ -9728,20 +9890,15 @@
           <a:lstStyle/>
           <a:p>
             <a:r>
+              <a:rPr lang="en-US" sz="1200" b="1" dirty="0">
+                <a:latin typeface="Consolas" panose="020B0609020204030204" pitchFamily="49" charset="0"/>
+              </a:rPr>
+              <a:t>df = </a:t>
+            </a:r>
+            <a:r>
               <a:rPr lang="en-US" sz="1200" b="1" dirty="0" err="1">
                 <a:latin typeface="Consolas" panose="020B0609020204030204" pitchFamily="49" charset="0"/>
-              </a:rPr>
-              <a:t>df</a:t>
-            </a:r>
-            <a:r>
-              <a:rPr lang="en-US" sz="1200" b="1" dirty="0">
-                <a:latin typeface="Consolas" panose="020B0609020204030204" pitchFamily="49" charset="0"/>
-              </a:rPr>
-              <a:t> = </a:t>
-            </a:r>
-            <a:r>
-              <a:rPr lang="en-US" sz="1200" b="1" dirty="0" err="1">
-                <a:latin typeface="Consolas" panose="020B0609020204030204" pitchFamily="49" charset="0"/>
+                <a:hlinkClick r:id="rId13"/>
               </a:rPr>
               <a:t>pd.DataFrame</a:t>
             </a:r>
@@ -9809,6 +9966,7 @@
             <a:r>
               <a:rPr lang="en-US" sz="1200" b="1" dirty="0" err="1">
                 <a:latin typeface="Consolas" panose="020B0609020204030204" pitchFamily="49" charset="0"/>
+                <a:hlinkClick r:id="rId13"/>
               </a:rPr>
               <a:t>pd.DataFrame</a:t>
             </a:r>
@@ -11432,22 +11590,60 @@
           <a:lstStyle/>
           <a:p>
             <a:r>
+              <a:rPr lang="en-US" sz="1200" b="1" dirty="0">
+                <a:latin typeface="Consolas" panose="020B0609020204030204" pitchFamily="49" charset="0"/>
+              </a:rPr>
+              <a:t>df = </a:t>
+            </a:r>
+            <a:r>
               <a:rPr lang="en-US" sz="1200" b="1" dirty="0" err="1">
                 <a:latin typeface="Consolas" panose="020B0609020204030204" pitchFamily="49" charset="0"/>
-              </a:rPr>
-              <a:t>df</a:t>
+                <a:hlinkClick r:id="rId13"/>
+              </a:rPr>
+              <a:t>pd.DataFrame</a:t>
             </a:r>
             <a:r>
               <a:rPr lang="en-US" sz="1200" b="1" dirty="0">
                 <a:latin typeface="Consolas" panose="020B0609020204030204" pitchFamily="49" charset="0"/>
               </a:rPr>
-              <a:t> = </a:t>
+              <a:t>(</a:t>
+            </a:r>
+          </a:p>
+          <a:p>
+            <a:r>
+              <a:rPr lang="en-US" sz="1200" b="1" dirty="0">
+                <a:latin typeface="Consolas" panose="020B0609020204030204" pitchFamily="49" charset="0"/>
+              </a:rPr>
+              <a:t>          {"a" : [4 ,5, 6], </a:t>
+            </a:r>
+          </a:p>
+          <a:p>
+            <a:r>
+              <a:rPr lang="en-US" sz="1200" b="1" dirty="0">
+                <a:latin typeface="Consolas" panose="020B0609020204030204" pitchFamily="49" charset="0"/>
+              </a:rPr>
+              <a:t>           "b" : [7, 8, 9], </a:t>
+            </a:r>
+          </a:p>
+          <a:p>
+            <a:r>
+              <a:rPr lang="en-US" sz="1200" b="1" dirty="0">
+                <a:latin typeface="Consolas" panose="020B0609020204030204" pitchFamily="49" charset="0"/>
+              </a:rPr>
+              <a:t>           "c" : [10, 11, 12]},    index = </a:t>
             </a:r>
             <a:r>
               <a:rPr lang="en-US" sz="1200" b="1" dirty="0" err="1">
                 <a:latin typeface="Consolas" panose="020B0609020204030204" pitchFamily="49" charset="0"/>
               </a:rPr>
-              <a:t>pd.DataFrame</a:t>
+              <a:t>pd.</a:t>
+            </a:r>
+            <a:r>
+              <a:rPr lang="en-US" sz="1200" b="1" dirty="0" err="1">
+                <a:latin typeface="Consolas" panose="020B0609020204030204" pitchFamily="49" charset="0"/>
+                <a:hlinkClick r:id="rId14"/>
+              </a:rPr>
+              <a:t>MultiIndex.from_tuples</a:t>
             </a:r>
             <a:r>
               <a:rPr lang="en-US" sz="1200" b="1" dirty="0">
@@ -11461,7 +11657,7 @@
               <a:rPr lang="en-US" sz="1200" b="1" dirty="0">
                 <a:latin typeface="Consolas" panose="020B0609020204030204" pitchFamily="49" charset="0"/>
               </a:rPr>
-              <a:t>          {"a" : [4 ,5, 6], </a:t>
+              <a:t>          [('d',1),('d',2),('e',2)],</a:t>
             </a:r>
           </a:p>
           <a:p>
@@ -11469,59 +11665,20 @@
               <a:rPr lang="en-US" sz="1200" b="1" dirty="0">
                 <a:latin typeface="Consolas" panose="020B0609020204030204" pitchFamily="49" charset="0"/>
               </a:rPr>
-              <a:t>           "b" : [7, 8, 9], </a:t>
-            </a:r>
-          </a:p>
-          <a:p>
+              <a:t>             names=['</a:t>
+            </a:r>
+            <a:r>
+              <a:rPr lang="en-US" sz="1200" b="1" dirty="0" err="1">
+                <a:latin typeface="Consolas" panose="020B0609020204030204" pitchFamily="49" charset="0"/>
+              </a:rPr>
+              <a:t>n','v</a:t>
+            </a:r>
             <a:r>
               <a:rPr lang="en-US" sz="1200" b="1" dirty="0">
                 <a:latin typeface="Consolas" panose="020B0609020204030204" pitchFamily="49" charset="0"/>
               </a:rPr>
-              <a:t>           "c" : [10, 11, 12]},    index = </a:t>
-            </a:r>
-            <a:r>
-              <a:rPr lang="en-US" sz="1200" b="1" dirty="0" err="1">
-                <a:latin typeface="Consolas" panose="020B0609020204030204" pitchFamily="49" charset="0"/>
-              </a:rPr>
-              <a:t>pd.MultiIndex.from_tuples</a:t>
-            </a:r>
-            <a:r>
-              <a:rPr lang="en-US" sz="1200" b="1" dirty="0">
-                <a:latin typeface="Consolas" panose="020B0609020204030204" pitchFamily="49" charset="0"/>
-              </a:rPr>
-              <a:t>(</a:t>
-            </a:r>
-          </a:p>
-          <a:p>
-            <a:r>
-              <a:rPr lang="en-US" sz="1200" b="1" dirty="0">
-                <a:latin typeface="Consolas" panose="020B0609020204030204" pitchFamily="49" charset="0"/>
-              </a:rPr>
-              <a:t>          [('d',1),('d',2),('e',2)],</a:t>
-            </a:r>
-          </a:p>
-          <a:p>
-            <a:r>
-              <a:rPr lang="en-US" sz="1200" b="1" dirty="0">
-                <a:latin typeface="Consolas" panose="020B0609020204030204" pitchFamily="49" charset="0"/>
-              </a:rPr>
-              <a:t>             names=['</a:t>
-            </a:r>
-            <a:r>
-              <a:rPr lang="en-US" sz="1200" b="1" dirty="0" err="1">
-                <a:latin typeface="Consolas" panose="020B0609020204030204" pitchFamily="49" charset="0"/>
-              </a:rPr>
-              <a:t>n','v</a:t>
-            </a:r>
-            <a:r>
-              <a:rPr lang="en-US" sz="1200" b="1">
-                <a:latin typeface="Consolas" panose="020B0609020204030204" pitchFamily="49" charset="0"/>
-              </a:rPr>
               <a:t>']))</a:t>
             </a:r>
-            <a:endParaRPr lang="en-US" sz="1200" b="1" dirty="0">
-              <a:latin typeface="Consolas" panose="020B0609020204030204" pitchFamily="49" charset="0"/>
-            </a:endParaRPr>
           </a:p>
           <a:p>
             <a:r>
@@ -11691,7 +11848,14 @@
               <a:rPr lang="en-US" sz="1200" b="1" dirty="0" err="1">
                 <a:latin typeface="Consolas" panose="020B0609020204030204" pitchFamily="49" charset="0"/>
               </a:rPr>
-              <a:t>pd.melt</a:t>
+              <a:t>pd.</a:t>
+            </a:r>
+            <a:r>
+              <a:rPr lang="en-US" sz="1200" b="1" dirty="0" err="1">
+                <a:latin typeface="Consolas" panose="020B0609020204030204" pitchFamily="49" charset="0"/>
+                <a:hlinkClick r:id="rId4"/>
+              </a:rPr>
+              <a:t>melt</a:t>
             </a:r>
             <a:r>
               <a:rPr lang="en-US" sz="1200" b="1" dirty="0">
@@ -11717,13 +11881,26 @@
               <a:rPr lang="en-US" sz="1200" b="1" dirty="0">
                 <a:latin typeface="Consolas" panose="020B0609020204030204" pitchFamily="49" charset="0"/>
               </a:rPr>
-              <a:t>        .rename(columns={</a:t>
-            </a:r>
-          </a:p>
-          <a:p>
+              <a:t>        .</a:t>
+            </a:r>
             <a:r>
               <a:rPr lang="en-US" sz="1200" b="1" dirty="0">
                 <a:latin typeface="Consolas" panose="020B0609020204030204" pitchFamily="49" charset="0"/>
+                <a:hlinkClick r:id="rId8"/>
+              </a:rPr>
+              <a:t>rename</a:t>
+            </a:r>
+            <a:r>
+              <a:rPr lang="en-US" sz="1200" b="1" dirty="0">
+                <a:latin typeface="Consolas" panose="020B0609020204030204" pitchFamily="49" charset="0"/>
+              </a:rPr>
+              <a:t>(columns={</a:t>
+            </a:r>
+          </a:p>
+          <a:p>
+            <a:r>
+              <a:rPr lang="en-US" sz="1200" b="1" dirty="0">
+                <a:latin typeface="Consolas" panose="020B0609020204030204" pitchFamily="49" charset="0"/>
               </a:rPr>
               <a:t>                'variable' : '</a:t>
             </a:r>
@@ -11765,7 +11942,20 @@
               <a:rPr lang="en-US" sz="1200" b="1" dirty="0">
                 <a:latin typeface="Consolas" panose="020B0609020204030204" pitchFamily="49" charset="0"/>
               </a:rPr>
-              <a:t>        .query('</a:t>
+              <a:t>        .</a:t>
+            </a:r>
+            <a:r>
+              <a:rPr lang="en-US" sz="1200" b="1" dirty="0">
+                <a:latin typeface="Consolas" panose="020B0609020204030204" pitchFamily="49" charset="0"/>
+                <a:hlinkClick r:id="rId15"/>
+              </a:rPr>
+              <a:t>query</a:t>
+            </a:r>
+            <a:r>
+              <a:rPr lang="en-US" sz="1200" b="1" dirty="0">
+                <a:latin typeface="Consolas" panose="020B0609020204030204" pitchFamily="49" charset="0"/>
+              </a:rPr>
+              <a:t>('</a:t>
             </a:r>
             <a:r>
               <a:rPr lang="en-US" sz="1200" b="1" dirty="0" err="1">
@@ -12711,7 +12901,14 @@
               <a:rPr lang="en-US" sz="1200" b="1" dirty="0" err="1">
                 <a:latin typeface="Consolas" panose="020B0609020204030204" pitchFamily="49" charset="0"/>
               </a:rPr>
-              <a:t>df.drop_duplicates</a:t>
+              <a:t>df.</a:t>
+            </a:r>
+            <a:r>
+              <a:rPr lang="en-US" sz="1200" b="1" dirty="0" err="1">
+                <a:latin typeface="Consolas" panose="020B0609020204030204" pitchFamily="49" charset="0"/>
+                <a:hlinkClick r:id="rId16"/>
+              </a:rPr>
+              <a:t>drop_duplicates</a:t>
             </a:r>
             <a:r>
               <a:rPr lang="en-US" sz="1200" b="1" dirty="0">
@@ -12732,7 +12929,14 @@
               <a:rPr lang="en-US" sz="1200" b="1" dirty="0" err="1">
                 <a:latin typeface="Consolas" panose="020B0609020204030204" pitchFamily="49" charset="0"/>
               </a:rPr>
-              <a:t>df.head</a:t>
+              <a:t>df.</a:t>
+            </a:r>
+            <a:r>
+              <a:rPr lang="en-US" sz="1200" b="1" dirty="0" err="1">
+                <a:latin typeface="Consolas" panose="020B0609020204030204" pitchFamily="49" charset="0"/>
+                <a:hlinkClick r:id="rId17"/>
+              </a:rPr>
+              <a:t>head</a:t>
             </a:r>
             <a:r>
               <a:rPr lang="en-US" sz="1200" b="1" dirty="0">
@@ -12753,7 +12957,14 @@
               <a:rPr lang="en-US" sz="1200" b="1" dirty="0" err="1">
                 <a:latin typeface="Consolas" panose="020B0609020204030204" pitchFamily="49" charset="0"/>
               </a:rPr>
-              <a:t>df.tail</a:t>
+              <a:t>df.</a:t>
+            </a:r>
+            <a:r>
+              <a:rPr lang="en-US" sz="1200" b="1" dirty="0" err="1">
+                <a:latin typeface="Consolas" panose="020B0609020204030204" pitchFamily="49" charset="0"/>
+                <a:hlinkClick r:id="rId18"/>
+              </a:rPr>
+              <a:t>tail</a:t>
             </a:r>
             <a:r>
               <a:rPr lang="en-US" sz="1200" b="1" dirty="0">
@@ -14320,7 +14531,7 @@
           <a:p>
             <a:r>
               <a:rPr lang="en-US" sz="800" dirty="0">
-                <a:hlinkClick r:id="rId2"/>
+                <a:hlinkClick r:id="rId19"/>
               </a:rPr>
               <a:t>http://pandas.pydata.org/</a:t>
             </a:r>
@@ -14346,7 +14557,7 @@
             </a:r>
             <a:r>
               <a:rPr lang="en-US" sz="800" dirty="0">
-                <a:hlinkClick r:id="rId3"/>
+                <a:hlinkClick r:id="rId20"/>
               </a:rPr>
               <a:t>https://www.rstudio.com/wp-content/uploads/2015/02/data-wrangling-cheatsheet.pdf</a:t>
             </a:r>
@@ -14356,7 +14567,7 @@
             </a:r>
             <a:r>
               <a:rPr lang="en-US" sz="800" dirty="0">
-                <a:hlinkClick r:id="rId4"/>
+                <a:hlinkClick r:id="rId21"/>
               </a:rPr>
               <a:t>Princeton Consultants</a:t>
             </a:r>
@@ -15513,7 +15724,14 @@
               <a:rPr lang="en-US" sz="1200" b="1" dirty="0" err="1">
                 <a:latin typeface="Consolas" panose="020B0609020204030204" pitchFamily="49" charset="0"/>
               </a:rPr>
-              <a:t>df.filter</a:t>
+              <a:t>df.</a:t>
+            </a:r>
+            <a:r>
+              <a:rPr lang="en-US" sz="1200" b="1" dirty="0" err="1">
+                <a:latin typeface="Consolas" panose="020B0609020204030204" pitchFamily="49" charset="0"/>
+                <a:hlinkClick r:id="rId22"/>
+              </a:rPr>
+              <a:t>filter</a:t>
             </a:r>
             <a:r>
               <a:rPr lang="en-US" sz="1200" b="1" dirty="0">
@@ -15579,7 +15797,14 @@
               <a:rPr lang="en-US" sz="1200" b="1" dirty="0" err="1">
                 <a:latin typeface="Consolas" panose="020B0609020204030204" pitchFamily="49" charset="0"/>
               </a:rPr>
-              <a:t>df.loc</a:t>
+              <a:t>df.</a:t>
+            </a:r>
+            <a:r>
+              <a:rPr lang="en-US" sz="1200" b="1" dirty="0" err="1">
+                <a:latin typeface="Consolas" panose="020B0609020204030204" pitchFamily="49" charset="0"/>
+                <a:hlinkClick r:id="rId23"/>
+              </a:rPr>
+              <a:t>loc</a:t>
             </a:r>
             <a:r>
               <a:rPr lang="en-US" sz="1200" b="1" dirty="0">
@@ -15599,7 +15824,14 @@
               <a:rPr lang="en-US" sz="1200" b="1" dirty="0" err="1">
                 <a:latin typeface="Consolas" panose="020B0609020204030204" pitchFamily="49" charset="0"/>
               </a:rPr>
-              <a:t>df.iloc</a:t>
+              <a:t>df.</a:t>
+            </a:r>
+            <a:r>
+              <a:rPr lang="en-US" sz="1200" b="1" dirty="0" err="1">
+                <a:latin typeface="Consolas" panose="020B0609020204030204" pitchFamily="49" charset="0"/>
+                <a:hlinkClick r:id="rId24"/>
+              </a:rPr>
+              <a:t>iloc</a:t>
             </a:r>
             <a:r>
               <a:rPr lang="en-US" sz="1200" b="1" dirty="0">
@@ -15619,7 +15851,14 @@
               <a:rPr lang="en-US" sz="1200" b="1" dirty="0" err="1">
                 <a:latin typeface="Consolas" panose="020B0609020204030204" pitchFamily="49" charset="0"/>
               </a:rPr>
-              <a:t>df.loc</a:t>
+              <a:t>df.</a:t>
+            </a:r>
+            <a:r>
+              <a:rPr lang="en-US" sz="1200" b="1" dirty="0" err="1">
+                <a:latin typeface="Consolas" panose="020B0609020204030204" pitchFamily="49" charset="0"/>
+                <a:hlinkClick r:id="rId23"/>
+              </a:rPr>
+              <a:t>loc</a:t>
             </a:r>
             <a:r>
               <a:rPr lang="en-US" sz="1200" b="1" dirty="0">
@@ -16452,7 +16691,14 @@
               <a:rPr lang="en-US" sz="1200" b="1" dirty="0" err="1">
                 <a:latin typeface="Consolas" panose="020B0609020204030204" pitchFamily="49" charset="0"/>
               </a:rPr>
-              <a:t>df.sample</a:t>
+              <a:t>df.</a:t>
+            </a:r>
+            <a:r>
+              <a:rPr lang="en-US" sz="1200" b="1" dirty="0" err="1">
+                <a:latin typeface="Consolas" panose="020B0609020204030204" pitchFamily="49" charset="0"/>
+                <a:hlinkClick r:id="rId25"/>
+              </a:rPr>
+              <a:t>sample</a:t>
             </a:r>
             <a:r>
               <a:rPr lang="en-US" sz="1200" b="1" dirty="0">
@@ -16485,7 +16731,14 @@
               <a:rPr lang="en-US" sz="1200" b="1" dirty="0" err="1">
                 <a:latin typeface="Consolas" panose="020B0609020204030204" pitchFamily="49" charset="0"/>
               </a:rPr>
-              <a:t>df.sample</a:t>
+              <a:t>df.</a:t>
+            </a:r>
+            <a:r>
+              <a:rPr lang="en-US" sz="1200" b="1" dirty="0" err="1">
+                <a:latin typeface="Consolas" panose="020B0609020204030204" pitchFamily="49" charset="0"/>
+                <a:hlinkClick r:id="rId25"/>
+              </a:rPr>
+              <a:t>sample</a:t>
             </a:r>
             <a:r>
               <a:rPr lang="en-US" sz="1200" b="1" dirty="0">
@@ -16505,7 +16758,14 @@
               <a:rPr lang="en-US" sz="1200" b="1" dirty="0" err="1">
                 <a:latin typeface="Consolas" panose="020B0609020204030204" pitchFamily="49" charset="0"/>
               </a:rPr>
-              <a:t>df.iloc</a:t>
+              <a:t>df.</a:t>
+            </a:r>
+            <a:r>
+              <a:rPr lang="en-US" sz="1200" b="1" dirty="0" err="1">
+                <a:latin typeface="Consolas" panose="020B0609020204030204" pitchFamily="49" charset="0"/>
+                <a:hlinkClick r:id="rId26"/>
+              </a:rPr>
+              <a:t>iloc</a:t>
             </a:r>
             <a:r>
               <a:rPr lang="en-US" sz="1200" b="1" dirty="0">
@@ -16525,7 +16785,14 @@
               <a:rPr lang="en-US" sz="1200" b="1" dirty="0" err="1">
                 <a:latin typeface="Consolas" panose="020B0609020204030204" pitchFamily="49" charset="0"/>
               </a:rPr>
-              <a:t>df.nlargest</a:t>
+              <a:t>df.</a:t>
+            </a:r>
+            <a:r>
+              <a:rPr lang="en-US" sz="1200" b="1" dirty="0" err="1">
+                <a:latin typeface="Consolas" panose="020B0609020204030204" pitchFamily="49" charset="0"/>
+                <a:hlinkClick r:id="rId27"/>
+              </a:rPr>
+              <a:t>nlargest</a:t>
             </a:r>
             <a:r>
               <a:rPr lang="en-US" sz="1200" b="1" dirty="0">
@@ -16545,7 +16812,14 @@
               <a:rPr lang="en-US" sz="1200" b="1" dirty="0" err="1">
                 <a:latin typeface="Consolas" panose="020B0609020204030204" pitchFamily="49" charset="0"/>
               </a:rPr>
-              <a:t>df.nsmallest</a:t>
+              <a:t>df.</a:t>
+            </a:r>
+            <a:r>
+              <a:rPr lang="en-US" sz="1200" b="1" dirty="0" err="1">
+                <a:latin typeface="Consolas" panose="020B0609020204030204" pitchFamily="49" charset="0"/>
+                <a:hlinkClick r:id="rId28"/>
+              </a:rPr>
+              <a:t>nsmallest</a:t>
             </a:r>
             <a:r>
               <a:rPr lang="en-US" sz="1200" b="1" dirty="0">
@@ -16733,10 +17007,25 @@
           <a:p>
             <a:pPr algn="ctr"/>
             <a:r>
-              <a:rPr lang="en-US" sz="2800" b="1" dirty="0"/>
+              <a:rPr lang="en-US" sz="2800" b="1" dirty="0">
+                <a:solidFill>
+                  <a:schemeClr val="bg1"/>
+                </a:solidFill>
+                <a:hlinkClick r:id="rId2">
+                  <a:extLst>
+                    <a:ext uri="{A12FA001-AC4F-418D-AE19-62706E023703}">
+                      <ahyp:hlinkClr xmlns:ahyp="http://schemas.microsoft.com/office/drawing/2018/hyperlinkcolor" val="tx"/>
+                    </a:ext>
+                  </a:extLst>
+                </a:hlinkClick>
+              </a:rPr>
               <a:t>Summarize Data</a:t>
             </a:r>
-            <a:endParaRPr lang="en-US" sz="2683" dirty="0"/>
+            <a:endParaRPr lang="en-US" sz="2683" dirty="0">
+              <a:solidFill>
+                <a:schemeClr val="bg1"/>
+              </a:solidFill>
+            </a:endParaRPr>
           </a:p>
         </p:txBody>
       </p:sp>
@@ -16821,10 +17110,25 @@
           <a:p>
             <a:pPr algn="ctr"/>
             <a:r>
-              <a:rPr lang="en-US" sz="2800" b="1" dirty="0"/>
+              <a:rPr lang="en-US" sz="2800" b="1" dirty="0">
+                <a:solidFill>
+                  <a:schemeClr val="bg1"/>
+                </a:solidFill>
+                <a:hlinkClick r:id="rId3">
+                  <a:extLst>
+                    <a:ext uri="{A12FA001-AC4F-418D-AE19-62706E023703}">
+                      <ahyp:hlinkClr xmlns:ahyp="http://schemas.microsoft.com/office/drawing/2018/hyperlinkcolor" val="tx"/>
+                    </a:ext>
+                  </a:extLst>
+                </a:hlinkClick>
+              </a:rPr>
               <a:t>Combine Data Sets</a:t>
             </a:r>
-            <a:endParaRPr lang="en-US" sz="2683" dirty="0"/>
+            <a:endParaRPr lang="en-US" sz="2683" dirty="0">
+              <a:solidFill>
+                <a:schemeClr val="bg1"/>
+              </a:solidFill>
+            </a:endParaRPr>
           </a:p>
         </p:txBody>
       </p:sp>
@@ -16865,6 +17169,7 @@
             <a:r>
               <a:rPr lang="en-US" sz="1200" b="1" dirty="0" err="1">
                 <a:latin typeface="Consolas" panose="020B0609020204030204" pitchFamily="49" charset="0"/>
+                <a:hlinkClick r:id="rId4"/>
               </a:rPr>
               <a:t>value_counts</a:t>
             </a:r>
@@ -16938,6 +17243,7 @@
             <a:r>
               <a:rPr lang="en-US" sz="1200" b="1" dirty="0" err="1">
                 <a:latin typeface="Consolas" panose="020B0609020204030204" pitchFamily="49" charset="0"/>
+                <a:hlinkClick r:id="rId5"/>
               </a:rPr>
               <a:t>nunique</a:t>
             </a:r>
@@ -16960,7 +17266,14 @@
               <a:rPr lang="en-US" sz="1200" b="1" dirty="0" err="1">
                 <a:latin typeface="Consolas" panose="020B0609020204030204" pitchFamily="49" charset="0"/>
               </a:rPr>
-              <a:t>df.describe</a:t>
+              <a:t>df.</a:t>
+            </a:r>
+            <a:r>
+              <a:rPr lang="en-US" sz="1200" b="1" dirty="0" err="1">
+                <a:latin typeface="Consolas" panose="020B0609020204030204" pitchFamily="49" charset="0"/>
+                <a:hlinkClick r:id="rId6"/>
+              </a:rPr>
+              <a:t>describe</a:t>
             </a:r>
             <a:r>
               <a:rPr lang="en-US" sz="1200" b="1" dirty="0">
@@ -17642,8 +17955,15 @@
             <a:r>
               <a:rPr lang="en-US" sz="1200" b="1" dirty="0">
                 <a:latin typeface="Consolas" panose="020B0609020204030204" pitchFamily="49" charset="0"/>
-              </a:rPr>
-              <a:t>sum()</a:t>
+                <a:hlinkClick r:id="rId7"/>
+              </a:rPr>
+              <a:t>sum</a:t>
+            </a:r>
+            <a:r>
+              <a:rPr lang="en-US" sz="1200" b="1" dirty="0">
+                <a:latin typeface="Consolas" panose="020B0609020204030204" pitchFamily="49" charset="0"/>
+              </a:rPr>
+              <a:t>()</a:t>
             </a:r>
           </a:p>
           <a:p>
@@ -17657,8 +17977,15 @@
             <a:r>
               <a:rPr lang="en-US" sz="1200" b="1" dirty="0">
                 <a:latin typeface="Consolas" panose="020B0609020204030204" pitchFamily="49" charset="0"/>
-              </a:rPr>
-              <a:t>count()</a:t>
+                <a:hlinkClick r:id="rId8"/>
+              </a:rPr>
+              <a:t>count</a:t>
+            </a:r>
+            <a:r>
+              <a:rPr lang="en-US" sz="1200" b="1" dirty="0">
+                <a:latin typeface="Consolas" panose="020B0609020204030204" pitchFamily="49" charset="0"/>
+              </a:rPr>
+              <a:t>()</a:t>
             </a:r>
           </a:p>
           <a:p>
@@ -17672,8 +17999,15 @@
             <a:r>
               <a:rPr lang="en-US" sz="1200" b="1" dirty="0">
                 <a:latin typeface="Consolas" panose="020B0609020204030204" pitchFamily="49" charset="0"/>
-              </a:rPr>
-              <a:t>median()</a:t>
+                <a:hlinkClick r:id="rId9"/>
+              </a:rPr>
+              <a:t>median</a:t>
+            </a:r>
+            <a:r>
+              <a:rPr lang="en-US" sz="1200" b="1" dirty="0">
+                <a:latin typeface="Consolas" panose="020B0609020204030204" pitchFamily="49" charset="0"/>
+              </a:rPr>
+              <a:t>()</a:t>
             </a:r>
           </a:p>
           <a:p>
@@ -17687,8 +18021,15 @@
             <a:r>
               <a:rPr lang="en-US" sz="1200" b="1" dirty="0">
                 <a:latin typeface="Consolas" panose="020B0609020204030204" pitchFamily="49" charset="0"/>
-              </a:rPr>
-              <a:t>quantile([0.25,0.75])</a:t>
+                <a:hlinkClick r:id="rId10"/>
+              </a:rPr>
+              <a:t>quantile</a:t>
+            </a:r>
+            <a:r>
+              <a:rPr lang="en-US" sz="1200" b="1" dirty="0">
+                <a:latin typeface="Consolas" panose="020B0609020204030204" pitchFamily="49" charset="0"/>
+              </a:rPr>
+              <a:t>([0.25,0.75])</a:t>
             </a:r>
           </a:p>
           <a:p>
@@ -17702,8 +18043,15 @@
             <a:r>
               <a:rPr lang="en-US" sz="1200" b="1" dirty="0">
                 <a:latin typeface="Consolas" panose="020B0609020204030204" pitchFamily="49" charset="0"/>
-              </a:rPr>
-              <a:t>apply(</a:t>
+                <a:hlinkClick r:id="rId11"/>
+              </a:rPr>
+              <a:t>apply</a:t>
+            </a:r>
+            <a:r>
+              <a:rPr lang="en-US" sz="1200" b="1" dirty="0">
+                <a:latin typeface="Consolas" panose="020B0609020204030204" pitchFamily="49" charset="0"/>
+              </a:rPr>
+              <a:t>(</a:t>
             </a:r>
             <a:r>
               <a:rPr lang="en-US" sz="1200" b="1" i="1" dirty="0">
@@ -17752,8 +18100,15 @@
             <a:r>
               <a:rPr lang="en-US" sz="1200" b="1" dirty="0">
                 <a:latin typeface="Consolas" panose="020B0609020204030204" pitchFamily="49" charset="0"/>
-              </a:rPr>
-              <a:t>min()</a:t>
+                <a:hlinkClick r:id="rId12"/>
+              </a:rPr>
+              <a:t>min</a:t>
+            </a:r>
+            <a:r>
+              <a:rPr lang="en-US" sz="1200" b="1" dirty="0">
+                <a:latin typeface="Consolas" panose="020B0609020204030204" pitchFamily="49" charset="0"/>
+              </a:rPr>
+              <a:t>()</a:t>
             </a:r>
           </a:p>
           <a:p>
@@ -17767,8 +18122,15 @@
             <a:r>
               <a:rPr lang="en-US" sz="1200" b="1" dirty="0">
                 <a:latin typeface="Consolas" panose="020B0609020204030204" pitchFamily="49" charset="0"/>
-              </a:rPr>
-              <a:t>max()</a:t>
+                <a:hlinkClick r:id="rId13"/>
+              </a:rPr>
+              <a:t>max</a:t>
+            </a:r>
+            <a:r>
+              <a:rPr lang="en-US" sz="1200" b="1" dirty="0">
+                <a:latin typeface="Consolas" panose="020B0609020204030204" pitchFamily="49" charset="0"/>
+              </a:rPr>
+              <a:t>()</a:t>
             </a:r>
           </a:p>
           <a:p>
@@ -17782,8 +18144,15 @@
             <a:r>
               <a:rPr lang="en-US" sz="1200" b="1" dirty="0">
                 <a:latin typeface="Consolas" panose="020B0609020204030204" pitchFamily="49" charset="0"/>
-              </a:rPr>
-              <a:t>mean()</a:t>
+                <a:hlinkClick r:id="rId14"/>
+              </a:rPr>
+              <a:t>mean</a:t>
+            </a:r>
+            <a:r>
+              <a:rPr lang="en-US" sz="1200" b="1" dirty="0">
+                <a:latin typeface="Consolas" panose="020B0609020204030204" pitchFamily="49" charset="0"/>
+              </a:rPr>
+              <a:t>()</a:t>
             </a:r>
           </a:p>
           <a:p>
@@ -17797,6 +18166,7 @@
             <a:r>
               <a:rPr lang="en-US" sz="1200" b="1" dirty="0" err="1">
                 <a:latin typeface="Consolas" panose="020B0609020204030204" pitchFamily="49" charset="0"/>
+                <a:hlinkClick r:id="rId15"/>
               </a:rPr>
               <a:t>var</a:t>
             </a:r>
@@ -17818,6 +18188,7 @@
             <a:r>
               <a:rPr lang="en-US" sz="1200" b="1" dirty="0" err="1">
                 <a:latin typeface="Consolas" panose="020B0609020204030204" pitchFamily="49" charset="0"/>
+                <a:hlinkClick r:id="rId16"/>
               </a:rPr>
               <a:t>std</a:t>
             </a:r>
@@ -18822,7 +19193,14 @@
               <a:rPr lang="en-US" sz="1200" b="1" dirty="0" err="1">
                 <a:latin typeface="Consolas" panose="020B0609020204030204" pitchFamily="49" charset="0"/>
               </a:rPr>
-              <a:t>df.assign</a:t>
+              <a:t>df.</a:t>
+            </a:r>
+            <a:r>
+              <a:rPr lang="en-US" sz="1200" b="1" dirty="0" err="1">
+                <a:latin typeface="Consolas" panose="020B0609020204030204" pitchFamily="49" charset="0"/>
+                <a:hlinkClick r:id="rId17"/>
+              </a:rPr>
+              <a:t>assign</a:t>
             </a:r>
             <a:r>
               <a:rPr lang="en-US" sz="1200" b="1" dirty="0">
@@ -18934,7 +19312,14 @@
               <a:rPr lang="en-US" sz="1200" b="1" dirty="0" err="1">
                 <a:latin typeface="Consolas" panose="020B0609020204030204" pitchFamily="49" charset="0"/>
               </a:rPr>
-              <a:t>pd.qcut</a:t>
+              <a:t>pd.</a:t>
+            </a:r>
+            <a:r>
+              <a:rPr lang="en-US" sz="1200" b="1" dirty="0" err="1">
+                <a:latin typeface="Consolas" panose="020B0609020204030204" pitchFamily="49" charset="0"/>
+                <a:hlinkClick r:id="rId18"/>
+              </a:rPr>
+              <a:t>qcut</a:t>
             </a:r>
             <a:r>
               <a:rPr lang="en-US" sz="1200" b="1" dirty="0">
@@ -20292,8 +20677,15 @@
             <a:r>
               <a:rPr lang="en-US" sz="1200" b="1" dirty="0">
                 <a:latin typeface="Consolas" panose="020B0609020204030204" pitchFamily="49" charset="0"/>
-              </a:rPr>
-              <a:t>shift(1)</a:t>
+                <a:hlinkClick r:id="rId19"/>
+              </a:rPr>
+              <a:t>shift</a:t>
+            </a:r>
+            <a:r>
+              <a:rPr lang="en-US" sz="1200" b="1" dirty="0">
+                <a:latin typeface="Consolas" panose="020B0609020204030204" pitchFamily="49" charset="0"/>
+              </a:rPr>
+              <a:t>(1)</a:t>
             </a:r>
           </a:p>
           <a:p>
@@ -20307,8 +20699,15 @@
             <a:r>
               <a:rPr lang="en-US" sz="1200" b="1" dirty="0">
                 <a:latin typeface="Consolas" panose="020B0609020204030204" pitchFamily="49" charset="0"/>
-              </a:rPr>
-              <a:t>rank(method='dense')</a:t>
+                <a:hlinkClick r:id="rId20"/>
+              </a:rPr>
+              <a:t>rank</a:t>
+            </a:r>
+            <a:r>
+              <a:rPr lang="en-US" sz="1200" b="1" dirty="0">
+                <a:latin typeface="Consolas" panose="020B0609020204030204" pitchFamily="49" charset="0"/>
+              </a:rPr>
+              <a:t>(method='dense')</a:t>
             </a:r>
           </a:p>
           <a:p>
@@ -20322,8 +20721,15 @@
             <a:r>
               <a:rPr lang="en-US" sz="1200" b="1" dirty="0">
                 <a:latin typeface="Consolas" panose="020B0609020204030204" pitchFamily="49" charset="0"/>
-              </a:rPr>
-              <a:t>rank(method='min')</a:t>
+                <a:hlinkClick r:id="rId20"/>
+              </a:rPr>
+              <a:t>rank</a:t>
+            </a:r>
+            <a:r>
+              <a:rPr lang="en-US" sz="1200" b="1" dirty="0">
+                <a:latin typeface="Consolas" panose="020B0609020204030204" pitchFamily="49" charset="0"/>
+              </a:rPr>
+              <a:t>(method='min')</a:t>
             </a:r>
           </a:p>
           <a:p>
@@ -20337,8 +20743,15 @@
             <a:r>
               <a:rPr lang="en-US" sz="1200" b="1" dirty="0">
                 <a:latin typeface="Consolas" panose="020B0609020204030204" pitchFamily="49" charset="0"/>
-              </a:rPr>
-              <a:t>rank(</a:t>
+                <a:hlinkClick r:id="rId20"/>
+              </a:rPr>
+              <a:t>rank</a:t>
+            </a:r>
+            <a:r>
+              <a:rPr lang="en-US" sz="1200" b="1" dirty="0">
+                <a:latin typeface="Consolas" panose="020B0609020204030204" pitchFamily="49" charset="0"/>
+              </a:rPr>
+              <a:t>(</a:t>
             </a:r>
             <a:r>
               <a:rPr lang="en-US" sz="1200" b="1" dirty="0" err="1">
@@ -20364,8 +20777,15 @@
             <a:r>
               <a:rPr lang="en-US" sz="1200" b="1" dirty="0">
                 <a:latin typeface="Consolas" panose="020B0609020204030204" pitchFamily="49" charset="0"/>
-              </a:rPr>
-              <a:t>rank(method='first')</a:t>
+                <a:hlinkClick r:id="rId20"/>
+              </a:rPr>
+              <a:t>rank</a:t>
+            </a:r>
+            <a:r>
+              <a:rPr lang="en-US" sz="1200" b="1" dirty="0">
+                <a:latin typeface="Consolas" panose="020B0609020204030204" pitchFamily="49" charset="0"/>
+              </a:rPr>
+              <a:t>(method='first')</a:t>
             </a:r>
           </a:p>
           <a:p>
@@ -20402,8 +20822,15 @@
             <a:r>
               <a:rPr lang="en-US" sz="1200" b="1" dirty="0">
                 <a:latin typeface="Consolas" panose="020B0609020204030204" pitchFamily="49" charset="0"/>
-              </a:rPr>
-              <a:t>shift(-1)</a:t>
+                <a:hlinkClick r:id="rId19"/>
+              </a:rPr>
+              <a:t>shift</a:t>
+            </a:r>
+            <a:r>
+              <a:rPr lang="en-US" sz="1200" b="1" dirty="0">
+                <a:latin typeface="Consolas" panose="020B0609020204030204" pitchFamily="49" charset="0"/>
+              </a:rPr>
+              <a:t>(-1)</a:t>
             </a:r>
           </a:p>
           <a:p>
@@ -20420,6 +20847,7 @@
             <a:r>
               <a:rPr lang="en-US" sz="1200" b="1" dirty="0" err="1">
                 <a:latin typeface="Consolas" panose="020B0609020204030204" pitchFamily="49" charset="0"/>
+                <a:hlinkClick r:id="rId21"/>
               </a:rPr>
               <a:t>cumsum</a:t>
             </a:r>
@@ -20441,6 +20869,7 @@
             <a:r>
               <a:rPr lang="en-US" sz="1200" b="1" dirty="0" err="1">
                 <a:latin typeface="Consolas" panose="020B0609020204030204" pitchFamily="49" charset="0"/>
+                <a:hlinkClick r:id="rId22"/>
               </a:rPr>
               <a:t>cummax</a:t>
             </a:r>
@@ -20462,6 +20891,7 @@
             <a:r>
               <a:rPr lang="en-US" sz="1200" b="1" dirty="0" err="1">
                 <a:latin typeface="Consolas" panose="020B0609020204030204" pitchFamily="49" charset="0"/>
+                <a:hlinkClick r:id="rId23"/>
               </a:rPr>
               <a:t>cummin</a:t>
             </a:r>
@@ -20483,6 +20913,7 @@
             <a:r>
               <a:rPr lang="en-US" sz="1200" b="1" dirty="0" err="1">
                 <a:latin typeface="Consolas" panose="020B0609020204030204" pitchFamily="49" charset="0"/>
+                <a:hlinkClick r:id="rId24"/>
               </a:rPr>
               <a:t>cumprod</a:t>
             </a:r>
@@ -22541,7 +22972,14 @@
               <a:rPr lang="en-US" sz="1200" b="1" dirty="0" err="1">
                 <a:latin typeface="Consolas" panose="020B0609020204030204" pitchFamily="49" charset="0"/>
               </a:rPr>
-              <a:t>pd.merge</a:t>
+              <a:t>pd.</a:t>
+            </a:r>
+            <a:r>
+              <a:rPr lang="en-US" sz="1200" b="1" dirty="0" err="1">
+                <a:latin typeface="Consolas" panose="020B0609020204030204" pitchFamily="49" charset="0"/>
+                <a:hlinkClick r:id="rId25"/>
+              </a:rPr>
+              <a:t>merge</a:t>
             </a:r>
             <a:r>
               <a:rPr lang="en-US" sz="1200" b="1" dirty="0">
@@ -22620,7 +23058,14 @@
               <a:rPr lang="en-US" sz="1200" b="1" dirty="0" err="1">
                 <a:latin typeface="Consolas" panose="020B0609020204030204" pitchFamily="49" charset="0"/>
               </a:rPr>
-              <a:t>pd.merge</a:t>
+              <a:t>pd.</a:t>
+            </a:r>
+            <a:r>
+              <a:rPr lang="en-US" sz="1200" b="1" dirty="0" err="1">
+                <a:latin typeface="Consolas" panose="020B0609020204030204" pitchFamily="49" charset="0"/>
+                <a:hlinkClick r:id="rId25"/>
+              </a:rPr>
+              <a:t>merge</a:t>
             </a:r>
             <a:r>
               <a:rPr lang="en-US" sz="1200" b="1" dirty="0">
@@ -22695,7 +23140,14 @@
               <a:rPr lang="en-US" sz="1200" b="1" dirty="0" err="1">
                 <a:latin typeface="Consolas" panose="020B0609020204030204" pitchFamily="49" charset="0"/>
               </a:rPr>
-              <a:t>pd.merge</a:t>
+              <a:t>pd.</a:t>
+            </a:r>
+            <a:r>
+              <a:rPr lang="en-US" sz="1200" b="1" dirty="0" err="1">
+                <a:latin typeface="Consolas" panose="020B0609020204030204" pitchFamily="49" charset="0"/>
+                <a:hlinkClick r:id="rId25"/>
+              </a:rPr>
+              <a:t>merge</a:t>
             </a:r>
             <a:r>
               <a:rPr lang="en-US" sz="1200" b="1" dirty="0">
@@ -22751,7 +23203,14 @@
               <a:rPr lang="en-US" sz="1200" b="1" dirty="0" err="1">
                 <a:latin typeface="Consolas" panose="020B0609020204030204" pitchFamily="49" charset="0"/>
               </a:rPr>
-              <a:t>pd.merge</a:t>
+              <a:t>pd.</a:t>
+            </a:r>
+            <a:r>
+              <a:rPr lang="en-US" sz="1200" b="1" dirty="0" err="1">
+                <a:latin typeface="Consolas" panose="020B0609020204030204" pitchFamily="49" charset="0"/>
+                <a:hlinkClick r:id="rId25"/>
+              </a:rPr>
+              <a:t>merge</a:t>
             </a:r>
             <a:r>
               <a:rPr lang="en-US" sz="1200" b="1" dirty="0">
@@ -23223,7 +23682,20 @@
               <a:rPr lang="en-US" sz="1200" b="1" dirty="0">
                 <a:latin typeface="Consolas" panose="020B0609020204030204" pitchFamily="49" charset="0"/>
               </a:rPr>
-              <a:t>[adf.x1.isin(bdf.x1)]</a:t>
+              <a:t>[adf.x1.</a:t>
+            </a:r>
+            <a:r>
+              <a:rPr lang="en-US" sz="1200" b="1" dirty="0">
+                <a:latin typeface="Consolas" panose="020B0609020204030204" pitchFamily="49" charset="0"/>
+                <a:hlinkClick r:id="rId26"/>
+              </a:rPr>
+              <a:t>isin</a:t>
+            </a:r>
+            <a:r>
+              <a:rPr lang="en-US" sz="1200" b="1" dirty="0">
+                <a:latin typeface="Consolas" panose="020B0609020204030204" pitchFamily="49" charset="0"/>
+              </a:rPr>
+              <a:t>(bdf.x1)]</a:t>
             </a:r>
           </a:p>
           <a:p>
@@ -23270,7 +23742,20 @@
               <a:rPr lang="en-US" sz="1200" b="1" dirty="0">
                 <a:latin typeface="Consolas" panose="020B0609020204030204" pitchFamily="49" charset="0"/>
               </a:rPr>
-              <a:t>[~adf.x1.isin(bdf.x1)]</a:t>
+              <a:t>[~adf.x1.</a:t>
+            </a:r>
+            <a:r>
+              <a:rPr lang="en-US" sz="1200" b="1" dirty="0">
+                <a:latin typeface="Consolas" panose="020B0609020204030204" pitchFamily="49" charset="0"/>
+                <a:hlinkClick r:id="rId26"/>
+              </a:rPr>
+              <a:t>isin</a:t>
+            </a:r>
+            <a:r>
+              <a:rPr lang="en-US" sz="1200" b="1" dirty="0">
+                <a:latin typeface="Consolas" panose="020B0609020204030204" pitchFamily="49" charset="0"/>
+              </a:rPr>
+              <a:t>(bdf.x1)]</a:t>
             </a:r>
           </a:p>
           <a:p>
@@ -24692,7 +25177,14 @@
               <a:rPr lang="en-US" sz="1200" b="1" dirty="0" err="1">
                 <a:latin typeface="Consolas" panose="020B0609020204030204" pitchFamily="49" charset="0"/>
               </a:rPr>
-              <a:t>pd.merge</a:t>
+              <a:t>pd.</a:t>
+            </a:r>
+            <a:r>
+              <a:rPr lang="en-US" sz="1200" b="1" dirty="0" err="1">
+                <a:latin typeface="Consolas" panose="020B0609020204030204" pitchFamily="49" charset="0"/>
+                <a:hlinkClick r:id="rId25"/>
+              </a:rPr>
+              <a:t>merge</a:t>
             </a:r>
             <a:r>
               <a:rPr lang="en-US" sz="1200" b="1" dirty="0">
@@ -24761,7 +25253,14 @@
               <a:rPr lang="en-US" sz="1200" b="1" dirty="0" err="1">
                 <a:latin typeface="Consolas" panose="020B0609020204030204" pitchFamily="49" charset="0"/>
               </a:rPr>
-              <a:t>pd.merge</a:t>
+              <a:t>pd.</a:t>
+            </a:r>
+            <a:r>
+              <a:rPr lang="en-US" sz="1200" b="1" dirty="0" err="1">
+                <a:latin typeface="Consolas" panose="020B0609020204030204" pitchFamily="49" charset="0"/>
+                <a:hlinkClick r:id="rId25"/>
+              </a:rPr>
+              <a:t>merge</a:t>
             </a:r>
             <a:r>
               <a:rPr lang="en-US" sz="1200" b="1" dirty="0">
@@ -24829,7 +25328,14 @@
               <a:rPr lang="en-US" sz="1200" b="1" dirty="0" err="1">
                 <a:latin typeface="Consolas" panose="020B0609020204030204" pitchFamily="49" charset="0"/>
               </a:rPr>
-              <a:t>pd.merge</a:t>
+              <a:t>pd.</a:t>
+            </a:r>
+            <a:r>
+              <a:rPr lang="en-US" sz="1200" b="1" dirty="0" err="1">
+                <a:latin typeface="Consolas" panose="020B0609020204030204" pitchFamily="49" charset="0"/>
+                <a:hlinkClick r:id="rId25"/>
+              </a:rPr>
+              <a:t>merge</a:t>
             </a:r>
             <a:r>
               <a:rPr lang="en-US" sz="1200" b="1" dirty="0">
@@ -24875,7 +25381,20 @@
               <a:rPr lang="en-US" sz="1200" b="1" dirty="0">
                 <a:latin typeface="Consolas" panose="020B0609020204030204" pitchFamily="49" charset="0"/>
               </a:rPr>
-              <a:t>.query('_merge == "</a:t>
+              <a:t>.</a:t>
+            </a:r>
+            <a:r>
+              <a:rPr lang="en-US" sz="1200" b="1" dirty="0">
+                <a:latin typeface="Consolas" panose="020B0609020204030204" pitchFamily="49" charset="0"/>
+                <a:hlinkClick r:id="rId27"/>
+              </a:rPr>
+              <a:t>query</a:t>
+            </a:r>
+            <a:r>
+              <a:rPr lang="en-US" sz="1200" b="1" dirty="0">
+                <a:latin typeface="Consolas" panose="020B0609020204030204" pitchFamily="49" charset="0"/>
+              </a:rPr>
+              <a:t>('_merge == "</a:t>
             </a:r>
             <a:r>
               <a:rPr lang="en-US" sz="1200" b="1" dirty="0" err="1">
@@ -24895,7 +25414,20 @@
               <a:rPr lang="en-US" sz="1200" b="1" dirty="0">
                 <a:latin typeface="Consolas" panose="020B0609020204030204" pitchFamily="49" charset="0"/>
               </a:rPr>
-              <a:t>.drop(columns=['_merge'])</a:t>
+              <a:t>.</a:t>
+            </a:r>
+            <a:r>
+              <a:rPr lang="en-US" sz="1200" b="1" dirty="0">
+                <a:latin typeface="Consolas" panose="020B0609020204030204" pitchFamily="49" charset="0"/>
+                <a:hlinkClick r:id="rId28"/>
+              </a:rPr>
+              <a:t>drop</a:t>
+            </a:r>
+            <a:r>
+              <a:rPr lang="en-US" sz="1200" b="1" dirty="0">
+                <a:latin typeface="Consolas" panose="020B0609020204030204" pitchFamily="49" charset="0"/>
+              </a:rPr>
+              <a:t>(columns=['_merge'])</a:t>
             </a:r>
           </a:p>
           <a:p>
@@ -24968,10 +25500,25 @@
           <a:p>
             <a:pPr algn="ctr"/>
             <a:r>
-              <a:rPr lang="en-US" sz="2800" b="1" dirty="0"/>
+              <a:rPr lang="en-US" sz="2800" b="1" dirty="0">
+                <a:solidFill>
+                  <a:schemeClr val="bg1"/>
+                </a:solidFill>
+                <a:hlinkClick r:id="rId29">
+                  <a:extLst>
+                    <a:ext uri="{A12FA001-AC4F-418D-AE19-62706E023703}">
+                      <ahyp:hlinkClr xmlns:ahyp="http://schemas.microsoft.com/office/drawing/2018/hyperlinkcolor" val="tx"/>
+                    </a:ext>
+                  </a:extLst>
+                </a:hlinkClick>
+              </a:rPr>
               <a:t>Group Data</a:t>
             </a:r>
-            <a:endParaRPr lang="en-US" sz="2683" dirty="0"/>
+            <a:endParaRPr lang="en-US" sz="2683" dirty="0">
+              <a:solidFill>
+                <a:schemeClr val="bg1"/>
+              </a:solidFill>
+            </a:endParaRPr>
           </a:p>
         </p:txBody>
       </p:sp>
@@ -25857,7 +26404,14 @@
               <a:rPr lang="en-US" sz="1200" b="1" dirty="0" err="1">
                 <a:latin typeface="Consolas" panose="020B0609020204030204" pitchFamily="49" charset="0"/>
               </a:rPr>
-              <a:t>df.groupby</a:t>
+              <a:t>df.</a:t>
+            </a:r>
+            <a:r>
+              <a:rPr lang="en-US" sz="1200" b="1" dirty="0" err="1">
+                <a:latin typeface="Consolas" panose="020B0609020204030204" pitchFamily="49" charset="0"/>
+                <a:hlinkClick r:id="rId30"/>
+              </a:rPr>
+              <a:t>groupby</a:t>
             </a:r>
             <a:r>
               <a:rPr lang="en-US" sz="1200" b="1" dirty="0">
@@ -25891,7 +26445,14 @@
               <a:rPr lang="en-US" sz="1200" b="1" dirty="0" err="1">
                 <a:latin typeface="Consolas" panose="020B0609020204030204" pitchFamily="49" charset="0"/>
               </a:rPr>
-              <a:t>df.groupby</a:t>
+              <a:t>df.</a:t>
+            </a:r>
+            <a:r>
+              <a:rPr lang="en-US" sz="1200" b="1" dirty="0" err="1">
+                <a:latin typeface="Consolas" panose="020B0609020204030204" pitchFamily="49" charset="0"/>
+                <a:hlinkClick r:id="rId30"/>
+              </a:rPr>
+              <a:t>groupby</a:t>
             </a:r>
             <a:r>
               <a:rPr lang="en-US" sz="1200" b="1" dirty="0">
@@ -25999,8 +26560,15 @@
             <a:r>
               <a:rPr lang="en-US" sz="1200" b="1" dirty="0">
                 <a:latin typeface="Consolas" panose="020B0609020204030204" pitchFamily="49" charset="0"/>
-              </a:rPr>
-              <a:t>max(axis=1)</a:t>
+                <a:hlinkClick r:id="rId13"/>
+              </a:rPr>
+              <a:t>max</a:t>
+            </a:r>
+            <a:r>
+              <a:rPr lang="en-US" sz="1200" b="1" dirty="0">
+                <a:latin typeface="Consolas" panose="020B0609020204030204" pitchFamily="49" charset="0"/>
+              </a:rPr>
+              <a:t>(axis=1)</a:t>
             </a:r>
           </a:p>
           <a:p>
@@ -26014,8 +26582,15 @@
             <a:r>
               <a:rPr lang="en-US" sz="1200" b="1" dirty="0">
                 <a:latin typeface="Consolas" panose="020B0609020204030204" pitchFamily="49" charset="0"/>
-              </a:rPr>
-              <a:t>clip(lower=-10,upper=10)</a:t>
+                <a:hlinkClick r:id="rId31"/>
+              </a:rPr>
+              <a:t>clip</a:t>
+            </a:r>
+            <a:r>
+              <a:rPr lang="en-US" sz="1200" b="1" dirty="0">
+                <a:latin typeface="Consolas" panose="020B0609020204030204" pitchFamily="49" charset="0"/>
+              </a:rPr>
+              <a:t>(lower=-10,upper=10)</a:t>
             </a:r>
           </a:p>
           <a:p>
@@ -26052,8 +26627,15 @@
             <a:r>
               <a:rPr lang="en-US" sz="1200" b="1" dirty="0">
                 <a:latin typeface="Consolas" panose="020B0609020204030204" pitchFamily="49" charset="0"/>
-              </a:rPr>
-              <a:t>min(axis=1)</a:t>
+                <a:hlinkClick r:id="rId12"/>
+              </a:rPr>
+              <a:t>min</a:t>
+            </a:r>
+            <a:r>
+              <a:rPr lang="en-US" sz="1200" b="1" dirty="0">
+                <a:latin typeface="Consolas" panose="020B0609020204030204" pitchFamily="49" charset="0"/>
+              </a:rPr>
+              <a:t>(axis=1)</a:t>
             </a:r>
           </a:p>
           <a:p>
@@ -26067,8 +26649,15 @@
             <a:r>
               <a:rPr lang="en-US" sz="1200" b="1" dirty="0">
                 <a:latin typeface="Consolas" panose="020B0609020204030204" pitchFamily="49" charset="0"/>
-              </a:rPr>
-              <a:t>abs()</a:t>
+                <a:hlinkClick r:id="rId32"/>
+              </a:rPr>
+              <a:t>abs</a:t>
+            </a:r>
+            <a:r>
+              <a:rPr lang="en-US" sz="1200" b="1" dirty="0">
+                <a:latin typeface="Consolas" panose="020B0609020204030204" pitchFamily="49" charset="0"/>
+              </a:rPr>
+              <a:t>()</a:t>
             </a:r>
           </a:p>
           <a:p>
@@ -26154,10 +26743,25 @@
           <a:p>
             <a:pPr algn="ctr"/>
             <a:r>
-              <a:rPr lang="en-US" sz="2800" b="1" dirty="0"/>
+              <a:rPr lang="en-US" sz="2800" b="1" dirty="0">
+                <a:solidFill>
+                  <a:schemeClr val="bg1"/>
+                </a:solidFill>
+                <a:hlinkClick r:id="rId33">
+                  <a:extLst>
+                    <a:ext uri="{A12FA001-AC4F-418D-AE19-62706E023703}">
+                      <ahyp:hlinkClr xmlns:ahyp="http://schemas.microsoft.com/office/drawing/2018/hyperlinkcolor" val="tx"/>
+                    </a:ext>
+                  </a:extLst>
+                </a:hlinkClick>
+              </a:rPr>
               <a:t>Windows</a:t>
             </a:r>
-            <a:endParaRPr lang="en-US" sz="2683" dirty="0"/>
+            <a:endParaRPr lang="en-US" sz="2683" dirty="0">
+              <a:solidFill>
+                <a:schemeClr val="bg1"/>
+              </a:solidFill>
+            </a:endParaRPr>
           </a:p>
         </p:txBody>
       </p:sp>
@@ -26187,7 +26791,14 @@
               <a:rPr lang="en-US" sz="1200" b="1" dirty="0" err="1">
                 <a:latin typeface="Consolas" panose="020B0609020204030204" pitchFamily="49" charset="0"/>
               </a:rPr>
-              <a:t>df.expanding</a:t>
+              <a:t>df.</a:t>
+            </a:r>
+            <a:r>
+              <a:rPr lang="en-US" sz="1200" b="1" dirty="0" err="1">
+                <a:latin typeface="Consolas" panose="020B0609020204030204" pitchFamily="49" charset="0"/>
+                <a:hlinkClick r:id="rId34"/>
+              </a:rPr>
+              <a:t>expanding</a:t>
             </a:r>
             <a:r>
               <a:rPr lang="en-US" sz="1200" b="1" dirty="0">
@@ -26211,7 +26822,14 @@
               <a:rPr lang="en-US" sz="1200" b="1" dirty="0" err="1">
                 <a:latin typeface="Consolas" panose="020B0609020204030204" pitchFamily="49" charset="0"/>
               </a:rPr>
-              <a:t>df.rolling</a:t>
+              <a:t>df.</a:t>
+            </a:r>
+            <a:r>
+              <a:rPr lang="en-US" sz="1200" b="1" dirty="0" err="1">
+                <a:latin typeface="Consolas" panose="020B0609020204030204" pitchFamily="49" charset="0"/>
+                <a:hlinkClick r:id="rId35"/>
+              </a:rPr>
+              <a:t>rolling</a:t>
             </a:r>
             <a:r>
               <a:rPr lang="en-US" sz="1200" b="1" dirty="0">
@@ -26254,8 +26872,15 @@
             <a:r>
               <a:rPr lang="en-US" sz="1200" b="1" dirty="0">
                 <a:latin typeface="Consolas" panose="020B0609020204030204" pitchFamily="49" charset="0"/>
-              </a:rPr>
-              <a:t>size()</a:t>
+                <a:hlinkClick r:id="rId36"/>
+              </a:rPr>
+              <a:t>size</a:t>
+            </a:r>
+            <a:r>
+              <a:rPr lang="en-US" sz="1200" b="1" dirty="0">
+                <a:latin typeface="Consolas" panose="020B0609020204030204" pitchFamily="49" charset="0"/>
+              </a:rPr>
+              <a:t>()</a:t>
             </a:r>
           </a:p>
           <a:p>
@@ -26292,6 +26917,7 @@
             <a:r>
               <a:rPr lang="en-US" sz="1200" b="1" dirty="0" err="1">
                 <a:latin typeface="Consolas" panose="020B0609020204030204" pitchFamily="49" charset="0"/>
+                <a:hlinkClick r:id="rId37"/>
               </a:rPr>
               <a:t>agg</a:t>
             </a:r>
@@ -26393,7 +27019,14 @@
               <a:rPr lang="en-US" sz="1200" b="1" dirty="0" err="1">
                 <a:latin typeface="Consolas" panose="020B0609020204030204" pitchFamily="49" charset="0"/>
               </a:rPr>
-              <a:t>df.dropna</a:t>
+              <a:t>df.</a:t>
+            </a:r>
+            <a:r>
+              <a:rPr lang="en-US" sz="1200" b="1" dirty="0" err="1">
+                <a:latin typeface="Consolas" panose="020B0609020204030204" pitchFamily="49" charset="0"/>
+                <a:hlinkClick r:id="rId38"/>
+              </a:rPr>
+              <a:t>dropna</a:t>
             </a:r>
             <a:r>
               <a:rPr lang="en-US" sz="1200" b="1" dirty="0">
@@ -26413,7 +27046,14 @@
               <a:rPr lang="en-US" sz="1200" b="1" dirty="0" err="1">
                 <a:latin typeface="Consolas" panose="020B0609020204030204" pitchFamily="49" charset="0"/>
               </a:rPr>
-              <a:t>df.fillna</a:t>
+              <a:t>df.</a:t>
+            </a:r>
+            <a:r>
+              <a:rPr lang="en-US" sz="1200" b="1" dirty="0" err="1">
+                <a:latin typeface="Consolas" panose="020B0609020204030204" pitchFamily="49" charset="0"/>
+                <a:hlinkClick r:id="rId39"/>
+              </a:rPr>
+              <a:t>fillna</a:t>
             </a:r>
             <a:r>
               <a:rPr lang="en-US" sz="1200" b="1" dirty="0">
@@ -26468,10 +27108,25 @@
           <a:p>
             <a:pPr algn="ctr"/>
             <a:r>
-              <a:rPr lang="en-US" sz="2800" b="1" dirty="0"/>
+              <a:rPr lang="en-US" sz="2800" b="1" dirty="0">
+                <a:solidFill>
+                  <a:schemeClr val="bg1"/>
+                </a:solidFill>
+                <a:hlinkClick r:id="rId40">
+                  <a:extLst>
+                    <a:ext uri="{A12FA001-AC4F-418D-AE19-62706E023703}">
+                      <ahyp:hlinkClr xmlns:ahyp="http://schemas.microsoft.com/office/drawing/2018/hyperlinkcolor" val="tx"/>
+                    </a:ext>
+                  </a:extLst>
+                </a:hlinkClick>
+              </a:rPr>
               <a:t>Plotting</a:t>
             </a:r>
-            <a:endParaRPr lang="en-US" sz="2683" dirty="0"/>
+            <a:endParaRPr lang="en-US" sz="2683" dirty="0">
+              <a:solidFill>
+                <a:schemeClr val="bg1"/>
+              </a:solidFill>
+            </a:endParaRPr>
           </a:p>
         </p:txBody>
       </p:sp>
@@ -26501,7 +27156,20 @@
               <a:rPr lang="en-US" sz="1200" b="1" dirty="0" err="1">
                 <a:latin typeface="Consolas" panose="020B0609020204030204" pitchFamily="49" charset="0"/>
               </a:rPr>
-              <a:t>df.plot.hist</a:t>
+              <a:t>df.</a:t>
+            </a:r>
+            <a:r>
+              <a:rPr lang="en-US" sz="1200" b="1" dirty="0" err="1">
+                <a:latin typeface="Consolas" panose="020B0609020204030204" pitchFamily="49" charset="0"/>
+                <a:hlinkClick r:id="rId41"/>
+              </a:rPr>
+              <a:t>plot</a:t>
+            </a:r>
+            <a:r>
+              <a:rPr lang="en-US" sz="1200" b="1" dirty="0" err="1">
+                <a:latin typeface="Consolas" panose="020B0609020204030204" pitchFamily="49" charset="0"/>
+              </a:rPr>
+              <a:t>.hist</a:t>
             </a:r>
             <a:r>
               <a:rPr lang="en-US" sz="1200" b="1" dirty="0">
@@ -26545,7 +27213,20 @@
               <a:rPr lang="en-US" sz="1200" b="1" dirty="0" err="1">
                 <a:latin typeface="Consolas" panose="020B0609020204030204" pitchFamily="49" charset="0"/>
               </a:rPr>
-              <a:t>df.plot.scatter</a:t>
+              <a:t>df.</a:t>
+            </a:r>
+            <a:r>
+              <a:rPr lang="en-US" sz="1200" b="1" dirty="0" err="1">
+                <a:latin typeface="Consolas" panose="020B0609020204030204" pitchFamily="49" charset="0"/>
+                <a:hlinkClick r:id="rId41"/>
+              </a:rPr>
+              <a:t>plot</a:t>
+            </a:r>
+            <a:r>
+              <a:rPr lang="en-US" sz="1200" b="1" dirty="0" err="1">
+                <a:latin typeface="Consolas" panose="020B0609020204030204" pitchFamily="49" charset="0"/>
+              </a:rPr>
+              <a:t>.scatter</a:t>
             </a:r>
             <a:r>
               <a:rPr lang="en-US" sz="1200" b="1" dirty="0">
@@ -26584,7 +27265,7 @@
           <p:nvPr/>
         </p:nvPicPr>
         <p:blipFill>
-          <a:blip r:embed="rId2"/>
+          <a:blip r:embed="rId42"/>
           <a:stretch>
             <a:fillRect/>
           </a:stretch>
@@ -26608,7 +27289,7 @@
           <p:nvPr/>
         </p:nvPicPr>
         <p:blipFill>
-          <a:blip r:embed="rId3"/>
+          <a:blip r:embed="rId43"/>
           <a:stretch>
             <a:fillRect/>
           </a:stretch>
@@ -26677,7 +27358,7 @@
           <a:p>
             <a:r>
               <a:rPr lang="en-US" sz="800" dirty="0">
-                <a:hlinkClick r:id="rId4"/>
+                <a:hlinkClick r:id="rId44"/>
               </a:rPr>
               <a:t>http://pandas.pydata.org/</a:t>
             </a:r>
@@ -26703,7 +27384,7 @@
             </a:r>
             <a:r>
               <a:rPr lang="en-US" sz="800" dirty="0">
-                <a:hlinkClick r:id="rId5"/>
+                <a:hlinkClick r:id="rId45"/>
               </a:rPr>
               <a:t>https://www.rstudio.com/wp-content/uploads/2015/02/data-wrangling-cheatsheet.pdf</a:t>
             </a:r>
@@ -26713,7 +27394,7 @@
             </a:r>
             <a:r>
               <a:rPr lang="en-US" sz="800" dirty="0">
-                <a:hlinkClick r:id="rId6"/>
+                <a:hlinkClick r:id="rId46"/>
               </a:rPr>
               <a:t>Princeton Consultants</a:t>
             </a:r>

</xml_diff>

<commit_message>
DOC: minor changes cheatsheet; update honors
</commit_message>
<xml_diff>
--- a/doc/cheatsheet/Pandas_Cheat_Sheet.pptx
+++ b/doc/cheatsheet/Pandas_Cheat_Sheet.pptx
@@ -9886,14 +9886,14 @@
           <a:effectLst/>
           <a:extLst>
             <a:ext uri="{909E8E84-426E-40dd-AFC4-6F175D3DCCD1}">
-              <a14:hiddenFill xmlns:a14="http://schemas.microsoft.com/office/drawing/2010/main" xmlns="">
+              <a14:hiddenFill xmlns="" xmlns:a14="http://schemas.microsoft.com/office/drawing/2010/main">
                 <a:solidFill>
                   <a:schemeClr val="accent1"/>
                 </a:solidFill>
               </a14:hiddenFill>
             </a:ext>
             <a:ext uri="{91240B29-F687-4f45-9708-019B960494DF}">
-              <a14:hiddenLine xmlns:a14="http://schemas.microsoft.com/office/drawing/2010/main" xmlns="" w="9525">
+              <a14:hiddenLine xmlns="" xmlns:a14="http://schemas.microsoft.com/office/drawing/2010/main" w="9525">
                 <a:solidFill>
                   <a:schemeClr val="tx1"/>
                 </a:solidFill>
@@ -9903,7 +9903,7 @@
               </a14:hiddenLine>
             </a:ext>
             <a:ext uri="{AF507438-7753-43e0-B8FC-AC1667EBCBE1}">
-              <a14:hiddenEffects xmlns:a14="http://schemas.microsoft.com/office/drawing/2010/main" xmlns="">
+              <a14:hiddenEffects xmlns="" xmlns:a14="http://schemas.microsoft.com/office/drawing/2010/main">
                 <a:effectLst>
                   <a:outerShdw dist="35921" dir="2700000" algn="ctr" rotWithShape="0">
                     <a:schemeClr val="bg2"/>
@@ -13713,7 +13713,7 @@
         <p:spPr>
           <a:xfrm>
             <a:off x="7850695" y="502120"/>
-            <a:ext cx="3691389" cy="1133259"/>
+            <a:ext cx="3691389" cy="1015663"/>
           </a:xfrm>
           <a:prstGeom prst="rect">
             <a:avLst/>
@@ -13726,11 +13726,6 @@
           </a:bodyPr>
           <a:lstStyle/>
           <a:p>
-            <a:pPr>
-              <a:lnSpc>
-                <a:spcPts val="1800"/>
-              </a:lnSpc>
-            </a:pPr>
             <a:r>
               <a:rPr lang="en-US" sz="1200" b="1">
                 <a:hlinkClick r:id="rId34"/>
@@ -13741,78 +13736,62 @@
               <a:rPr lang="en-US" sz="1200" b="1"/>
               <a:t> in plots</a:t>
             </a:r>
-          </a:p>
-          <a:p>
-            <a:pPr>
-              <a:lnSpc>
-                <a:spcPts val="1600"/>
-              </a:lnSpc>
-            </a:pPr>
+            <a:br>
+              <a:rPr lang="en-US" sz="1200" b="1"/>
+            </a:br>
             <a:r>
               <a:rPr lang="en-US" sz="1200" b="1">
                 <a:latin typeface="Consolas" panose="020B0609020204030204" pitchFamily="49" charset="0"/>
+              </a:rPr>
+              <a:t>df.</a:t>
+            </a:r>
+            <a:r>
+              <a:rPr lang="en-US" sz="1200" b="1">
+                <a:latin typeface="Consolas" panose="020B0609020204030204" pitchFamily="49" charset="0"/>
                 <a:hlinkClick r:id="rId35"/>
               </a:rPr>
-              <a:t>seaborn.pairplot</a:t>
+              <a:t>plot</a:t>
             </a:r>
             <a:r>
               <a:rPr lang="en-US" sz="1200" b="1">
                 <a:latin typeface="Consolas" panose="020B0609020204030204" pitchFamily="49" charset="0"/>
               </a:rPr>
-              <a:t>(df,</a:t>
-            </a:r>
-            <a:br>
+              <a:t>.hist()</a:t>
+            </a:r>
+          </a:p>
+          <a:p>
+            <a:pPr marL="111125"/>
+            <a:r>
+              <a:rPr lang="en-US" sz="1200"/>
+              <a:t>Histogram for each column</a:t>
+            </a:r>
+          </a:p>
+          <a:p>
+            <a:r>
               <a:rPr lang="en-US" sz="1200" b="1">
                 <a:latin typeface="Consolas" panose="020B0609020204030204" pitchFamily="49" charset="0"/>
               </a:rPr>
-            </a:br>
+              <a:t>df.</a:t>
+            </a:r>
             <a:r>
               <a:rPr lang="en-US" sz="1200" b="1">
                 <a:latin typeface="Consolas" panose="020B0609020204030204" pitchFamily="49" charset="0"/>
-              </a:rPr>
-              <a:t>  hue=‘</a:t>
-            </a:r>
-            <a:r>
-              <a:rPr lang="en-US" sz="1200" i="1">
-                <a:latin typeface="Consolas" panose="020B0609020204030204" pitchFamily="49" charset="0"/>
-              </a:rPr>
-              <a:t>column_name</a:t>
+                <a:hlinkClick r:id="rId35"/>
+              </a:rPr>
+              <a:t>plot</a:t>
             </a:r>
             <a:r>
               <a:rPr lang="en-US" sz="1200" b="1">
                 <a:latin typeface="Consolas" panose="020B0609020204030204" pitchFamily="49" charset="0"/>
               </a:rPr>
-              <a:t>’)</a:t>
-            </a:r>
-          </a:p>
-          <a:p>
-            <a:pPr>
-              <a:lnSpc>
-                <a:spcPts val="1600"/>
-              </a:lnSpc>
-            </a:pPr>
-            <a:r>
-              <a:rPr lang="en-US" sz="1200" b="1"/>
-              <a:t>   </a:t>
-            </a:r>
+              <a:t>.scatter(x='w',y='h')</a:t>
+            </a:r>
+          </a:p>
+          <a:p>
+            <a:pPr marL="111125"/>
             <a:r>
               <a:rPr lang="en-US" sz="1200"/>
-              <a:t>Matrix of pairwise</a:t>
-            </a:r>
-            <a:br>
-              <a:rPr lang="en-US" sz="1200"/>
-            </a:br>
-            <a:r>
-              <a:rPr lang="en-US" sz="1200"/>
-              <a:t>   relationship (for </a:t>
-            </a:r>
-            <a:r>
-              <a:rPr lang="en-US" sz="1200" u="sng"/>
-              <a:t>classification</a:t>
-            </a:r>
-            <a:r>
-              <a:rPr lang="en-US" sz="1200"/>
-              <a:t>)</a:t>
+              <a:t>Scatter chart using pairs of points</a:t>
             </a:r>
           </a:p>
         </p:txBody>
@@ -13832,7 +13811,7 @@
         <p:spPr>
           <a:xfrm>
             <a:off x="10640253" y="610673"/>
-            <a:ext cx="2682419" cy="1569660"/>
+            <a:ext cx="2856672" cy="1836400"/>
           </a:xfrm>
           <a:prstGeom prst="rect">
             <a:avLst/>
@@ -13846,90 +13825,23 @@
           <a:lstStyle/>
           <a:p>
             <a:r>
-              <a:rPr lang="en-US" sz="1200" b="1" dirty="0" err="1">
-                <a:latin typeface="Consolas" panose="020B0609020204030204" pitchFamily="49" charset="0"/>
-              </a:rPr>
-              <a:t>df.</a:t>
-            </a:r>
-            <a:r>
-              <a:rPr lang="en-US" sz="1200" b="1" dirty="0" err="1">
+              <a:rPr lang="en-US" sz="1200" b="1">
+                <a:latin typeface="Consolas" panose="020B0609020204030204" pitchFamily="49" charset="0"/>
+              </a:rPr>
+              <a:t>df.plotting.</a:t>
+            </a:r>
+            <a:r>
+              <a:rPr lang="en-US" sz="1200" b="1">
                 <a:latin typeface="Consolas" panose="020B0609020204030204" pitchFamily="49" charset="0"/>
                 <a:hlinkClick r:id="rId36"/>
               </a:rPr>
-              <a:t>plot</a:t>
-            </a:r>
-            <a:r>
-              <a:rPr lang="en-US" sz="1200" b="1" dirty="0" err="1">
-                <a:latin typeface="Consolas" panose="020B0609020204030204" pitchFamily="49" charset="0"/>
-              </a:rPr>
-              <a:t>.hist</a:t>
-            </a:r>
-            <a:r>
-              <a:rPr lang="en-US" sz="1200" b="1" dirty="0">
-                <a:latin typeface="Consolas" panose="020B0609020204030204" pitchFamily="49" charset="0"/>
-              </a:rPr>
-              <a:t>()</a:t>
-            </a:r>
-          </a:p>
-          <a:p>
-            <a:pPr marL="111125"/>
-            <a:r>
-              <a:rPr lang="en-US" sz="1200" dirty="0"/>
-              <a:t>Histogram for </a:t>
-            </a:r>
-            <a:r>
-              <a:rPr lang="en-US" sz="1200"/>
-              <a:t>each column</a:t>
-            </a:r>
-            <a:endParaRPr lang="en-US" sz="1200" dirty="0"/>
-          </a:p>
-          <a:p>
+              <a:t>scatter_matrix</a:t>
+            </a:r>
             <a:r>
               <a:rPr lang="en-US" sz="1200" b="1">
                 <a:latin typeface="Consolas" panose="020B0609020204030204" pitchFamily="49" charset="0"/>
               </a:rPr>
-              <a:t>df.</a:t>
-            </a:r>
-            <a:r>
-              <a:rPr lang="en-US" sz="1200" b="1">
-                <a:latin typeface="Consolas" panose="020B0609020204030204" pitchFamily="49" charset="0"/>
-                <a:hlinkClick r:id="rId36"/>
-              </a:rPr>
-              <a:t>plot</a:t>
-            </a:r>
-            <a:r>
-              <a:rPr lang="en-US" sz="1200" b="1">
-                <a:latin typeface="Consolas" panose="020B0609020204030204" pitchFamily="49" charset="0"/>
-              </a:rPr>
-              <a:t>.scatter(x='w',y='h')</a:t>
-            </a:r>
-          </a:p>
-          <a:p>
-            <a:pPr marL="111125"/>
-            <a:r>
-              <a:rPr lang="en-US" sz="1200"/>
-              <a:t>Scatter chart using pairs of points</a:t>
-            </a:r>
-          </a:p>
-          <a:p>
-            <a:r>
-              <a:rPr lang="en-US" sz="1200" b="1">
-                <a:latin typeface="Consolas" panose="020B0609020204030204" pitchFamily="49" charset="0"/>
-              </a:rPr>
-              <a:t>df.</a:t>
-            </a:r>
-            <a:r>
-              <a:rPr lang="en-US" sz="1200" b="1">
-                <a:latin typeface="Consolas" panose="020B0609020204030204" pitchFamily="49" charset="0"/>
-                <a:hlinkClick r:id="rId37"/>
-              </a:rPr>
-              <a:t>plotting.scatter_matrix</a:t>
-            </a:r>
-            <a:r>
-              <a:rPr lang="en-US" sz="1200">
-                <a:latin typeface="Consolas" panose="020B0609020204030204" pitchFamily="49" charset="0"/>
-              </a:rPr>
-              <a:t>(…) </a:t>
+              <a:t>() </a:t>
             </a:r>
             <a:br>
               <a:rPr lang="en-US" sz="1200">
@@ -13961,6 +13873,88 @@
               <a:rPr lang="en-US" sz="1200"/>
               <a:t>)</a:t>
             </a:r>
+            <a:endParaRPr lang="en-US" sz="1200" b="1"/>
+          </a:p>
+          <a:p>
+            <a:pPr>
+              <a:lnSpc>
+                <a:spcPts val="1600"/>
+              </a:lnSpc>
+            </a:pPr>
+            <a:r>
+              <a:rPr lang="en-US" sz="1200" b="1">
+                <a:latin typeface="Consolas" panose="020B0609020204030204" pitchFamily="49" charset="0"/>
+              </a:rPr>
+              <a:t>seaborn.</a:t>
+            </a:r>
+            <a:r>
+              <a:rPr lang="en-US" sz="1200" b="1">
+                <a:latin typeface="Consolas" panose="020B0609020204030204" pitchFamily="49" charset="0"/>
+                <a:hlinkClick r:id="rId37"/>
+              </a:rPr>
+              <a:t>pairplot</a:t>
+            </a:r>
+            <a:r>
+              <a:rPr lang="en-US" sz="1200" b="1">
+                <a:latin typeface="Consolas" panose="020B0609020204030204" pitchFamily="49" charset="0"/>
+              </a:rPr>
+              <a:t>(df,</a:t>
+            </a:r>
+            <a:br>
+              <a:rPr lang="en-US" sz="1200" b="1">
+                <a:latin typeface="Consolas" panose="020B0609020204030204" pitchFamily="49" charset="0"/>
+              </a:rPr>
+            </a:br>
+            <a:r>
+              <a:rPr lang="en-US" sz="1200" b="1">
+                <a:latin typeface="Consolas" panose="020B0609020204030204" pitchFamily="49" charset="0"/>
+              </a:rPr>
+              <a:t>  hue=‘</a:t>
+            </a:r>
+            <a:r>
+              <a:rPr lang="en-US" sz="1200" i="1">
+                <a:latin typeface="Consolas" panose="020B0609020204030204" pitchFamily="49" charset="0"/>
+              </a:rPr>
+              <a:t>column_name</a:t>
+            </a:r>
+            <a:r>
+              <a:rPr lang="en-US" sz="1200" b="1">
+                <a:latin typeface="Consolas" panose="020B0609020204030204" pitchFamily="49" charset="0"/>
+              </a:rPr>
+              <a:t>’)</a:t>
+            </a:r>
+          </a:p>
+          <a:p>
+            <a:pPr>
+              <a:lnSpc>
+                <a:spcPts val="1600"/>
+              </a:lnSpc>
+            </a:pPr>
+            <a:r>
+              <a:rPr lang="en-US" sz="1200" b="1"/>
+              <a:t>   </a:t>
+            </a:r>
+            <a:r>
+              <a:rPr lang="en-US" sz="1200"/>
+              <a:t>Matrix of pairwise relationship</a:t>
+            </a:r>
+            <a:br>
+              <a:rPr lang="en-US" sz="1200"/>
+            </a:br>
+            <a:r>
+              <a:rPr lang="en-US" sz="1200"/>
+              <a:t>   (for </a:t>
+            </a:r>
+            <a:r>
+              <a:rPr lang="en-US" sz="1200" u="sng"/>
+              <a:t>classification</a:t>
+            </a:r>
+            <a:r>
+              <a:rPr lang="en-US" sz="1200"/>
+              <a:t>)</a:t>
+            </a:r>
+          </a:p>
+          <a:p>
             <a:br>
               <a:rPr lang="en-US" sz="1200"/>
             </a:br>
@@ -13990,7 +13984,7 @@
         </p:blipFill>
         <p:spPr>
           <a:xfrm>
-            <a:off x="13222237" y="574754"/>
+            <a:off x="9819755" y="645238"/>
             <a:ext cx="692025" cy="381260"/>
           </a:xfrm>
           <a:prstGeom prst="rect">
@@ -14020,8 +14014,8 @@
         </p:blipFill>
         <p:spPr>
           <a:xfrm>
-            <a:off x="13206153" y="998696"/>
-            <a:ext cx="724194" cy="439194"/>
+            <a:off x="9793908" y="1500437"/>
+            <a:ext cx="748242" cy="453778"/>
           </a:xfrm>
           <a:prstGeom prst="rect">
             <a:avLst/>
@@ -14050,7 +14044,7 @@
         </p:blipFill>
         <p:spPr>
           <a:xfrm>
-            <a:off x="13296681" y="1480772"/>
+            <a:off x="13296681" y="734384"/>
             <a:ext cx="591453" cy="488967"/>
           </a:xfrm>
           <a:prstGeom prst="rect">
@@ -14080,7 +14074,7 @@
         </p:blipFill>
         <p:spPr>
           <a:xfrm>
-            <a:off x="9961418" y="983783"/>
+            <a:off x="13290057" y="1370936"/>
             <a:ext cx="630692" cy="577128"/>
           </a:xfrm>
           <a:prstGeom prst="rect">
@@ -14102,8 +14096,8 @@
         </p:nvSpPr>
         <p:spPr>
           <a:xfrm>
-            <a:off x="4465319" y="10618708"/>
-            <a:ext cx="11178899" cy="215444"/>
+            <a:off x="7875270" y="10618708"/>
+            <a:ext cx="6412230" cy="215444"/>
           </a:xfrm>
           <a:prstGeom prst="rect">
             <a:avLst/>
@@ -14140,69 +14134,49 @@
             </a:r>
             <a:r>
               <a:rPr lang="en-US" sz="800"/>
-              <a:t> ) based on the </a:t>
+              <a:t> ) inspired </a:t>
+            </a:r>
+            <a:r>
+              <a:rPr lang="en-US" sz="800" dirty="0"/>
+              <a:t>by </a:t>
+            </a:r>
+            <a:r>
+              <a:rPr lang="en-US" sz="800" dirty="0" err="1">
+                <a:hlinkClick r:id="rId43"/>
+              </a:rPr>
+              <a:t>Rstudio</a:t>
+            </a:r>
+            <a:r>
+              <a:rPr lang="en-US" sz="800" dirty="0">
+                <a:hlinkClick r:id="rId43"/>
+              </a:rPr>
+              <a:t> Data Wrangling </a:t>
+            </a:r>
+            <a:r>
+              <a:rPr lang="en-US" sz="800" err="1">
+                <a:hlinkClick r:id="rId43"/>
+              </a:rPr>
+              <a:t>Cheatsheet</a:t>
             </a:r>
             <a:r>
               <a:rPr lang="en-US" sz="800">
                 <a:hlinkClick r:id="rId43"/>
               </a:rPr>
-              <a:t>official cheatsheet</a:t>
+              <a:t> </a:t>
             </a:r>
             <a:r>
               <a:rPr lang="en-US" sz="800"/>
-              <a:t> which itself was inspired </a:t>
+              <a:t>written </a:t>
             </a:r>
             <a:r>
               <a:rPr lang="en-US" sz="800" dirty="0"/>
-              <a:t>by </a:t>
-            </a:r>
-            <a:r>
-              <a:rPr lang="en-US" sz="800" dirty="0" err="1">
-                <a:hlinkClick r:id="rId44"/>
-              </a:rPr>
-              <a:t>Rstudio</a:t>
-            </a:r>
-            <a:r>
-              <a:rPr lang="en-US" sz="800" dirty="0">
-                <a:hlinkClick r:id="rId44"/>
-              </a:rPr>
-              <a:t> Data Wrangling </a:t>
-            </a:r>
-            <a:r>
-              <a:rPr lang="en-US" sz="800" err="1">
-                <a:hlinkClick r:id="rId44"/>
-              </a:rPr>
-              <a:t>Cheatsheet</a:t>
+              <a:t>by Irv Lustig, </a:t>
             </a:r>
             <a:r>
               <a:rPr lang="en-US" sz="800">
                 <a:hlinkClick r:id="rId44"/>
               </a:rPr>
-              <a:t> </a:t>
-            </a:r>
-            <a:r>
-              <a:rPr lang="en-US" sz="800"/>
-              <a:t>Written </a:t>
-            </a:r>
-            <a:r>
-              <a:rPr lang="en-US" sz="800" dirty="0"/>
-              <a:t>by Irv Lustig, </a:t>
-            </a:r>
-            <a:r>
-              <a:rPr lang="en-US" sz="800">
-                <a:hlinkClick r:id="rId45"/>
-              </a:rPr>
               <a:t>Princeton Consultants</a:t>
-            </a:r>
-            <a:r>
-              <a:rPr lang="en-US" sz="800"/>
-              <a:t>. Source: </a:t>
-            </a:r>
-            <a:r>
-              <a:rPr lang="en-US" sz="800">
-                <a:hlinkClick r:id="rId46"/>
-              </a:rPr>
-              <a:t>https://github.com/OliEfr</a:t>
             </a:r>
             <a:endParaRPr lang="en-US" sz="800" dirty="0"/>
           </a:p>
@@ -14247,7 +14221,7 @@
             </a:r>
             <a:r>
               <a:rPr lang="de-DE" sz="1200" b="1">
-                <a:hlinkClick r:id="rId47"/>
+                <a:hlinkClick r:id="rId45"/>
               </a:rPr>
               <a:t>API Reference</a:t>
             </a:r>
@@ -14264,7 +14238,7 @@
             </a:r>
             <a:r>
               <a:rPr lang="de-DE" sz="1200" b="1">
-                <a:hlinkClick r:id="rId48"/>
+                <a:hlinkClick r:id="rId46"/>
               </a:rPr>
               <a:t>API Reference </a:t>
             </a:r>
@@ -24918,10 +24892,10 @@
       </p:sp>
       <p:sp>
         <p:nvSpPr>
-          <p:cNvPr id="88" name="TextBox 19">
+          <p:cNvPr id="81" name="TextBox 19">
             <a:extLst>
               <a:ext uri="{FF2B5EF4-FFF2-40B4-BE49-F238E27FC236}">
-                <a16:creationId xmlns:a16="http://schemas.microsoft.com/office/drawing/2014/main" id="{72015019-4200-48E3-850E-110CFECAC67C}"/>
+                <a16:creationId xmlns:a16="http://schemas.microsoft.com/office/drawing/2014/main" id="{E143DE1B-0EA6-483A-B68D-A2D31E60AA9A}"/>
               </a:ext>
             </a:extLst>
           </p:cNvPr>
@@ -24930,8 +24904,8 @@
         </p:nvSpPr>
         <p:spPr>
           <a:xfrm>
-            <a:off x="4453072" y="10654201"/>
-            <a:ext cx="9815024" cy="215444"/>
+            <a:off x="7875270" y="10618708"/>
+            <a:ext cx="6412230" cy="215444"/>
           </a:xfrm>
           <a:prstGeom prst="rect">
             <a:avLst/>
@@ -24968,69 +24942,49 @@
             </a:r>
             <a:r>
               <a:rPr lang="en-US" sz="800"/>
-              <a:t> ) based on the </a:t>
+              <a:t> ) inspired </a:t>
+            </a:r>
+            <a:r>
+              <a:rPr lang="en-US" sz="800" dirty="0"/>
+              <a:t>by </a:t>
+            </a:r>
+            <a:r>
+              <a:rPr lang="en-US" sz="800" dirty="0" err="1">
+                <a:hlinkClick r:id="rId51"/>
+              </a:rPr>
+              <a:t>Rstudio</a:t>
+            </a:r>
+            <a:r>
+              <a:rPr lang="en-US" sz="800" dirty="0">
+                <a:hlinkClick r:id="rId51"/>
+              </a:rPr>
+              <a:t> Data Wrangling </a:t>
+            </a:r>
+            <a:r>
+              <a:rPr lang="en-US" sz="800" err="1">
+                <a:hlinkClick r:id="rId51"/>
+              </a:rPr>
+              <a:t>Cheatsheet</a:t>
             </a:r>
             <a:r>
               <a:rPr lang="en-US" sz="800">
                 <a:hlinkClick r:id="rId51"/>
               </a:rPr>
-              <a:t>official cheatsheet</a:t>
+              <a:t> </a:t>
             </a:r>
             <a:r>
               <a:rPr lang="en-US" sz="800"/>
-              <a:t> which itself was inspired </a:t>
+              <a:t>written </a:t>
             </a:r>
             <a:r>
               <a:rPr lang="en-US" sz="800" dirty="0"/>
-              <a:t>by </a:t>
-            </a:r>
-            <a:r>
-              <a:rPr lang="en-US" sz="800" dirty="0" err="1">
-                <a:hlinkClick r:id="rId52"/>
-              </a:rPr>
-              <a:t>Rstudio</a:t>
-            </a:r>
-            <a:r>
-              <a:rPr lang="en-US" sz="800" dirty="0">
-                <a:hlinkClick r:id="rId52"/>
-              </a:rPr>
-              <a:t> Data Wrangling </a:t>
-            </a:r>
-            <a:r>
-              <a:rPr lang="en-US" sz="800" err="1">
-                <a:hlinkClick r:id="rId52"/>
-              </a:rPr>
-              <a:t>Cheatsheet</a:t>
+              <a:t>by Irv Lustig, </a:t>
             </a:r>
             <a:r>
               <a:rPr lang="en-US" sz="800">
                 <a:hlinkClick r:id="rId52"/>
               </a:rPr>
-              <a:t> </a:t>
-            </a:r>
-            <a:r>
-              <a:rPr lang="en-US" sz="800"/>
-              <a:t>Written </a:t>
-            </a:r>
-            <a:r>
-              <a:rPr lang="en-US" sz="800" dirty="0"/>
-              <a:t>by Irv Lustig, </a:t>
-            </a:r>
-            <a:r>
-              <a:rPr lang="en-US" sz="800">
-                <a:hlinkClick r:id="rId53"/>
-              </a:rPr>
               <a:t>Princeton Consultants</a:t>
-            </a:r>
-            <a:r>
-              <a:rPr lang="en-US" sz="800"/>
-              <a:t>. Source: </a:t>
-            </a:r>
-            <a:r>
-              <a:rPr lang="en-US" sz="800">
-                <a:hlinkClick r:id="rId54"/>
-              </a:rPr>
-              <a:t>https://github.com/OliEfr</a:t>
             </a:r>
             <a:endParaRPr lang="en-US" sz="800" dirty="0"/>
           </a:p>

</xml_diff>

<commit_message>
#fixed syntax and grammatical errors, Added quick notes for simple go through. (Open to further updates)
#fixed syntax and grammatical errors, Added quick notes for simple go through. (Open to further updates)
</commit_message>
<xml_diff>
--- a/doc/cheatsheet/Pandas_Cheat_Sheet.pptx
+++ b/doc/cheatsheet/Pandas_Cheat_Sheet.pptx
@@ -126,7 +126,7 @@
 
 <file path=ppt/commentAuthors.xml><?xml version="1.0" encoding="utf-8"?>
 <p:cmAuthorLst xmlns:a="http://schemas.openxmlformats.org/drawingml/2006/main" xmlns:r="http://schemas.openxmlformats.org/officeDocument/2006/relationships" xmlns:p="http://schemas.openxmlformats.org/presentationml/2006/main">
-  <p:cmAuthor id="2" name="Autor" initials="A" lastIdx="0" clrIdx="1"/>
+  <p:cmAuthor id="3" name="Author" initials="A" lastIdx="0" clrIdx="2"/>
 </p:cmAuthorLst>
 </file>
 
@@ -261,7 +261,7 @@
           <a:p>
             <a:fld id="{79278B33-2949-49BE-B3B0-3F16CAF906FE}" type="datetimeFigureOut">
               <a:rPr lang="en-US" smtClean="0"/>
-              <a:t>3/29/2021</a:t>
+              <a:t>8/17/2021</a:t>
             </a:fld>
             <a:endParaRPr lang="en-US"/>
           </a:p>
@@ -303,7 +303,7 @@
           <a:p>
             <a:fld id="{E8285EFA-DD28-4E69-ADE7-169C8C1119D8}" type="slidenum">
               <a:rPr lang="en-US" smtClean="0"/>
-              <a:t>‹Nr.›</a:t>
+              <a:t>‹#›</a:t>
             </a:fld>
             <a:endParaRPr lang="en-US"/>
           </a:p>
@@ -431,7 +431,7 @@
           <a:p>
             <a:fld id="{79278B33-2949-49BE-B3B0-3F16CAF906FE}" type="datetimeFigureOut">
               <a:rPr lang="en-US" smtClean="0"/>
-              <a:t>3/29/2021</a:t>
+              <a:t>8/17/2021</a:t>
             </a:fld>
             <a:endParaRPr lang="en-US"/>
           </a:p>
@@ -473,7 +473,7 @@
           <a:p>
             <a:fld id="{E8285EFA-DD28-4E69-ADE7-169C8C1119D8}" type="slidenum">
               <a:rPr lang="en-US" smtClean="0"/>
-              <a:t>‹Nr.›</a:t>
+              <a:t>‹#›</a:t>
             </a:fld>
             <a:endParaRPr lang="en-US"/>
           </a:p>
@@ -611,7 +611,7 @@
           <a:p>
             <a:fld id="{79278B33-2949-49BE-B3B0-3F16CAF906FE}" type="datetimeFigureOut">
               <a:rPr lang="en-US" smtClean="0"/>
-              <a:t>3/29/2021</a:t>
+              <a:t>8/17/2021</a:t>
             </a:fld>
             <a:endParaRPr lang="en-US"/>
           </a:p>
@@ -653,7 +653,7 @@
           <a:p>
             <a:fld id="{E8285EFA-DD28-4E69-ADE7-169C8C1119D8}" type="slidenum">
               <a:rPr lang="en-US" smtClean="0"/>
-              <a:t>‹Nr.›</a:t>
+              <a:t>‹#›</a:t>
             </a:fld>
             <a:endParaRPr lang="en-US"/>
           </a:p>
@@ -781,7 +781,7 @@
           <a:p>
             <a:fld id="{79278B33-2949-49BE-B3B0-3F16CAF906FE}" type="datetimeFigureOut">
               <a:rPr lang="en-US" smtClean="0"/>
-              <a:t>3/29/2021</a:t>
+              <a:t>8/17/2021</a:t>
             </a:fld>
             <a:endParaRPr lang="en-US"/>
           </a:p>
@@ -823,7 +823,7 @@
           <a:p>
             <a:fld id="{E8285EFA-DD28-4E69-ADE7-169C8C1119D8}" type="slidenum">
               <a:rPr lang="en-US" smtClean="0"/>
-              <a:t>‹Nr.›</a:t>
+              <a:t>‹#›</a:t>
             </a:fld>
             <a:endParaRPr lang="en-US"/>
           </a:p>
@@ -1025,7 +1025,7 @@
           <a:p>
             <a:fld id="{79278B33-2949-49BE-B3B0-3F16CAF906FE}" type="datetimeFigureOut">
               <a:rPr lang="en-US" smtClean="0"/>
-              <a:t>3/29/2021</a:t>
+              <a:t>8/17/2021</a:t>
             </a:fld>
             <a:endParaRPr lang="en-US"/>
           </a:p>
@@ -1067,7 +1067,7 @@
           <a:p>
             <a:fld id="{E8285EFA-DD28-4E69-ADE7-169C8C1119D8}" type="slidenum">
               <a:rPr lang="en-US" smtClean="0"/>
-              <a:t>‹Nr.›</a:t>
+              <a:t>‹#›</a:t>
             </a:fld>
             <a:endParaRPr lang="en-US"/>
           </a:p>
@@ -1257,7 +1257,7 @@
           <a:p>
             <a:fld id="{79278B33-2949-49BE-B3B0-3F16CAF906FE}" type="datetimeFigureOut">
               <a:rPr lang="en-US" smtClean="0"/>
-              <a:t>3/29/2021</a:t>
+              <a:t>8/17/2021</a:t>
             </a:fld>
             <a:endParaRPr lang="en-US"/>
           </a:p>
@@ -1299,7 +1299,7 @@
           <a:p>
             <a:fld id="{E8285EFA-DD28-4E69-ADE7-169C8C1119D8}" type="slidenum">
               <a:rPr lang="en-US" smtClean="0"/>
-              <a:t>‹Nr.›</a:t>
+              <a:t>‹#›</a:t>
             </a:fld>
             <a:endParaRPr lang="en-US"/>
           </a:p>
@@ -1624,7 +1624,7 @@
           <a:p>
             <a:fld id="{79278B33-2949-49BE-B3B0-3F16CAF906FE}" type="datetimeFigureOut">
               <a:rPr lang="en-US" smtClean="0"/>
-              <a:t>3/29/2021</a:t>
+              <a:t>8/17/2021</a:t>
             </a:fld>
             <a:endParaRPr lang="en-US"/>
           </a:p>
@@ -1666,7 +1666,7 @@
           <a:p>
             <a:fld id="{E8285EFA-DD28-4E69-ADE7-169C8C1119D8}" type="slidenum">
               <a:rPr lang="en-US" smtClean="0"/>
-              <a:t>‹Nr.›</a:t>
+              <a:t>‹#›</a:t>
             </a:fld>
             <a:endParaRPr lang="en-US"/>
           </a:p>
@@ -1742,7 +1742,7 @@
           <a:p>
             <a:fld id="{79278B33-2949-49BE-B3B0-3F16CAF906FE}" type="datetimeFigureOut">
               <a:rPr lang="en-US" smtClean="0"/>
-              <a:t>3/29/2021</a:t>
+              <a:t>8/17/2021</a:t>
             </a:fld>
             <a:endParaRPr lang="en-US"/>
           </a:p>
@@ -1784,7 +1784,7 @@
           <a:p>
             <a:fld id="{E8285EFA-DD28-4E69-ADE7-169C8C1119D8}" type="slidenum">
               <a:rPr lang="en-US" smtClean="0"/>
-              <a:t>‹Nr.›</a:t>
+              <a:t>‹#›</a:t>
             </a:fld>
             <a:endParaRPr lang="en-US"/>
           </a:p>
@@ -1837,7 +1837,7 @@
           <a:p>
             <a:fld id="{79278B33-2949-49BE-B3B0-3F16CAF906FE}" type="datetimeFigureOut">
               <a:rPr lang="en-US" smtClean="0"/>
-              <a:t>3/29/2021</a:t>
+              <a:t>8/17/2021</a:t>
             </a:fld>
             <a:endParaRPr lang="en-US"/>
           </a:p>
@@ -1879,7 +1879,7 @@
           <a:p>
             <a:fld id="{E8285EFA-DD28-4E69-ADE7-169C8C1119D8}" type="slidenum">
               <a:rPr lang="en-US" smtClean="0"/>
-              <a:t>‹Nr.›</a:t>
+              <a:t>‹#›</a:t>
             </a:fld>
             <a:endParaRPr lang="en-US"/>
           </a:p>
@@ -2114,7 +2114,7 @@
           <a:p>
             <a:fld id="{79278B33-2949-49BE-B3B0-3F16CAF906FE}" type="datetimeFigureOut">
               <a:rPr lang="en-US" smtClean="0"/>
-              <a:t>3/29/2021</a:t>
+              <a:t>8/17/2021</a:t>
             </a:fld>
             <a:endParaRPr lang="en-US"/>
           </a:p>
@@ -2156,7 +2156,7 @@
           <a:p>
             <a:fld id="{E8285EFA-DD28-4E69-ADE7-169C8C1119D8}" type="slidenum">
               <a:rPr lang="en-US" smtClean="0"/>
-              <a:t>‹Nr.›</a:t>
+              <a:t>‹#›</a:t>
             </a:fld>
             <a:endParaRPr lang="en-US"/>
           </a:p>
@@ -2371,7 +2371,7 @@
           <a:p>
             <a:fld id="{79278B33-2949-49BE-B3B0-3F16CAF906FE}" type="datetimeFigureOut">
               <a:rPr lang="en-US" smtClean="0"/>
-              <a:t>3/29/2021</a:t>
+              <a:t>8/17/2021</a:t>
             </a:fld>
             <a:endParaRPr lang="en-US"/>
           </a:p>
@@ -2413,7 +2413,7 @@
           <a:p>
             <a:fld id="{E8285EFA-DD28-4E69-ADE7-169C8C1119D8}" type="slidenum">
               <a:rPr lang="en-US" smtClean="0"/>
-              <a:t>‹Nr.›</a:t>
+              <a:t>‹#›</a:t>
             </a:fld>
             <a:endParaRPr lang="en-US"/>
           </a:p>
@@ -2584,7 +2584,7 @@
           <a:p>
             <a:fld id="{79278B33-2949-49BE-B3B0-3F16CAF906FE}" type="datetimeFigureOut">
               <a:rPr lang="en-US" smtClean="0"/>
-              <a:t>3/29/2021</a:t>
+              <a:t>8/17/2021</a:t>
             </a:fld>
             <a:endParaRPr lang="en-US"/>
           </a:p>
@@ -2662,7 +2662,7 @@
           <a:p>
             <a:fld id="{E8285EFA-DD28-4E69-ADE7-169C8C1119D8}" type="slidenum">
               <a:rPr lang="en-US" smtClean="0"/>
-              <a:t>‹Nr.›</a:t>
+              <a:t>‹#›</a:t>
             </a:fld>
             <a:endParaRPr lang="en-US"/>
           </a:p>
@@ -9694,14 +9694,14 @@
           <a:effectLst/>
           <a:extLst>
             <a:ext uri="{909E8E84-426E-40dd-AFC4-6F175D3DCCD1}">
-              <a14:hiddenFill xmlns="" xmlns:a14="http://schemas.microsoft.com/office/drawing/2010/main">
+              <a14:hiddenFill xmlns:a14="http://schemas.microsoft.com/office/drawing/2010/main" xmlns="">
                 <a:solidFill>
                   <a:schemeClr val="accent1"/>
                 </a:solidFill>
               </a14:hiddenFill>
             </a:ext>
             <a:ext uri="{91240B29-F687-4f45-9708-019B960494DF}">
-              <a14:hiddenLine xmlns="" xmlns:a14="http://schemas.microsoft.com/office/drawing/2010/main" w="9525">
+              <a14:hiddenLine xmlns:a14="http://schemas.microsoft.com/office/drawing/2010/main" xmlns="" w="9525">
                 <a:solidFill>
                   <a:schemeClr val="tx1"/>
                 </a:solidFill>
@@ -9711,7 +9711,7 @@
               </a14:hiddenLine>
             </a:ext>
             <a:ext uri="{AF507438-7753-43e0-B8FC-AC1667EBCBE1}">
-              <a14:hiddenEffects xmlns="" xmlns:a14="http://schemas.microsoft.com/office/drawing/2010/main">
+              <a14:hiddenEffects xmlns:a14="http://schemas.microsoft.com/office/drawing/2010/main" xmlns="">
                 <a:effectLst>
                   <a:outerShdw dist="35921" dir="2700000" algn="ctr" rotWithShape="0">
                     <a:schemeClr val="bg2"/>
@@ -16356,16 +16356,10 @@
           </a:p>
           <a:p>
             <a:r>
-              <a:rPr lang="en-US" sz="1200" b="1">
-                <a:latin typeface="Consolas" panose="020B0609020204030204" pitchFamily="49" charset="0"/>
-              </a:rPr>
-              <a:t>df</a:t>
-            </a:r>
-            <a:r>
               <a:rPr lang="en-US" sz="1200" b="1" dirty="0" err="1">
                 <a:latin typeface="Consolas" panose="020B0609020204030204" pitchFamily="49" charset="0"/>
               </a:rPr>
-              <a:t>.</a:t>
+              <a:t>df.</a:t>
             </a:r>
             <a:r>
               <a:rPr lang="en-US" sz="1200" b="1" dirty="0" err="1">
@@ -16390,20 +16384,20 @@
           </a:p>
           <a:p>
             <a:r>
-              <a:rPr lang="en-US" sz="1200" b="1">
+              <a:rPr lang="en-US" sz="1200" b="1" dirty="0" err="1">
                 <a:latin typeface="Consolas" panose="020B0609020204030204" pitchFamily="49" charset="0"/>
               </a:rPr>
               <a:t>df.</a:t>
             </a:r>
             <a:r>
-              <a:rPr lang="en-US" sz="1200" b="1">
+              <a:rPr lang="en-US" sz="1200" b="1" dirty="0" err="1">
                 <a:latin typeface="Consolas" panose="020B0609020204030204" pitchFamily="49" charset="0"/>
                 <a:hlinkClick r:id="rId25"/>
               </a:rPr>
               <a:t>sample</a:t>
             </a:r>
             <a:r>
-              <a:rPr lang="en-US" sz="1200" b="1">
+              <a:rPr lang="en-US" sz="1200" b="1" dirty="0">
                 <a:latin typeface="Consolas" panose="020B0609020204030204" pitchFamily="49" charset="0"/>
               </a:rPr>
               <a:t>(frac=0.5)</a:t>
@@ -16412,82 +16406,82 @@
           <a:p>
             <a:pPr marL="174625"/>
             <a:r>
-              <a:rPr lang="en-US" sz="1200"/>
+              <a:rPr lang="en-US" sz="1200" dirty="0"/>
               <a:t>Randomly select fraction of rows. </a:t>
             </a:r>
           </a:p>
           <a:p>
             <a:r>
-              <a:rPr lang="en-US" sz="1200" b="1">
+              <a:rPr lang="en-US" sz="1200" b="1" dirty="0" err="1">
                 <a:latin typeface="Consolas" panose="020B0609020204030204" pitchFamily="49" charset="0"/>
               </a:rPr>
               <a:t>df.</a:t>
             </a:r>
             <a:r>
-              <a:rPr lang="en-US" sz="1200" b="1">
+              <a:rPr lang="en-US" sz="1200" b="1" dirty="0" err="1">
                 <a:latin typeface="Consolas" panose="020B0609020204030204" pitchFamily="49" charset="0"/>
                 <a:hlinkClick r:id="rId25"/>
               </a:rPr>
               <a:t>sample</a:t>
             </a:r>
             <a:r>
-              <a:rPr lang="en-US" sz="1200" b="1">
+              <a:rPr lang="en-US" sz="1200" b="1" dirty="0">
                 <a:latin typeface="Consolas" panose="020B0609020204030204" pitchFamily="49" charset="0"/>
               </a:rPr>
               <a:t>(n=10) </a:t>
             </a:r>
             <a:r>
-              <a:rPr lang="en-US" sz="1200"/>
+              <a:rPr lang="en-US" sz="1200" dirty="0"/>
               <a:t>Randomly select n rows.</a:t>
             </a:r>
           </a:p>
           <a:p>
             <a:pPr marL="185738" indent="-185738"/>
             <a:r>
-              <a:rPr lang="en-US" sz="1200" b="1">
+              <a:rPr lang="en-US" sz="1200" b="1" dirty="0" err="1">
                 <a:latin typeface="Consolas" panose="020B0609020204030204" pitchFamily="49" charset="0"/>
               </a:rPr>
               <a:t>df.</a:t>
             </a:r>
             <a:r>
-              <a:rPr lang="en-US" sz="1200" b="1">
+              <a:rPr lang="en-US" sz="1200" b="1" dirty="0" err="1">
                 <a:latin typeface="Consolas" panose="020B0609020204030204" pitchFamily="49" charset="0"/>
                 <a:hlinkClick r:id="rId26"/>
               </a:rPr>
               <a:t>nlargest</a:t>
             </a:r>
             <a:r>
-              <a:rPr lang="en-US" sz="1200" b="1">
+              <a:rPr lang="en-US" sz="1200" b="1" dirty="0">
                 <a:latin typeface="Consolas" panose="020B0609020204030204" pitchFamily="49" charset="0"/>
               </a:rPr>
               <a:t>(n, 'value’)</a:t>
             </a:r>
             <a:br>
-              <a:rPr lang="en-US" sz="1200" b="1">
+              <a:rPr lang="en-US" sz="1200" b="1" dirty="0">
                 <a:latin typeface="Consolas" panose="020B0609020204030204" pitchFamily="49" charset="0"/>
               </a:rPr>
             </a:br>
             <a:r>
-              <a:rPr lang="en-US" sz="1200"/>
+              <a:rPr lang="en-US" sz="1200" dirty="0"/>
               <a:t>Select and order top n entries.</a:t>
             </a:r>
           </a:p>
           <a:p>
             <a:r>
-              <a:rPr lang="en-US" sz="1200" b="1">
+              <a:rPr lang="en-US" sz="1200" b="1" dirty="0" err="1">
                 <a:latin typeface="Consolas" panose="020B0609020204030204" pitchFamily="49" charset="0"/>
               </a:rPr>
               <a:t>df.</a:t>
             </a:r>
             <a:r>
-              <a:rPr lang="en-US" sz="1200" b="1">
+              <a:rPr lang="en-US" sz="1200" b="1" dirty="0" err="1">
                 <a:latin typeface="Consolas" panose="020B0609020204030204" pitchFamily="49" charset="0"/>
                 <a:hlinkClick r:id="rId27"/>
               </a:rPr>
               <a:t>nsmallest</a:t>
             </a:r>
             <a:r>
-              <a:rPr lang="en-US" sz="1200" b="1">
+              <a:rPr lang="en-US" sz="1200" b="1" dirty="0">
                 <a:latin typeface="Consolas" panose="020B0609020204030204" pitchFamily="49" charset="0"/>
               </a:rPr>
               <a:t>(n, 'value')</a:t>
@@ -16496,26 +16490,26 @@
           <a:p>
             <a:pPr marL="174625"/>
             <a:r>
-              <a:rPr lang="en-US" sz="1200"/>
+              <a:rPr lang="en-US" sz="1200" dirty="0"/>
               <a:t>Select and order bottom n entries.</a:t>
             </a:r>
           </a:p>
           <a:p>
             <a:r>
-              <a:rPr lang="en-US" sz="1200" b="1">
+              <a:rPr lang="en-US" sz="1200" b="1" dirty="0" err="1">
                 <a:latin typeface="Consolas" panose="020B0609020204030204" pitchFamily="49" charset="0"/>
               </a:rPr>
               <a:t>df.</a:t>
             </a:r>
             <a:r>
-              <a:rPr lang="en-US" sz="1200" b="1">
+              <a:rPr lang="en-US" sz="1200" b="1" dirty="0" err="1">
                 <a:latin typeface="Consolas" panose="020B0609020204030204" pitchFamily="49" charset="0"/>
                 <a:hlinkClick r:id="rId28"/>
               </a:rPr>
               <a:t>head</a:t>
             </a:r>
             <a:r>
-              <a:rPr lang="en-US" sz="1200" b="1">
+              <a:rPr lang="en-US" sz="1200" b="1" dirty="0">
                 <a:latin typeface="Consolas" panose="020B0609020204030204" pitchFamily="49" charset="0"/>
               </a:rPr>
               <a:t>(n)</a:t>
@@ -16524,26 +16518,26 @@
           <a:p>
             <a:pPr marL="92075"/>
             <a:r>
-              <a:rPr lang="en-US" sz="1200"/>
+              <a:rPr lang="en-US" sz="1200" dirty="0"/>
               <a:t>Select first n rows.</a:t>
             </a:r>
           </a:p>
           <a:p>
             <a:r>
-              <a:rPr lang="en-US" sz="1200" b="1">
+              <a:rPr lang="en-US" sz="1200" b="1" dirty="0" err="1">
                 <a:latin typeface="Consolas" panose="020B0609020204030204" pitchFamily="49" charset="0"/>
               </a:rPr>
               <a:t>df.</a:t>
             </a:r>
             <a:r>
-              <a:rPr lang="en-US" sz="1200" b="1">
+              <a:rPr lang="en-US" sz="1200" b="1" dirty="0" err="1">
                 <a:latin typeface="Consolas" panose="020B0609020204030204" pitchFamily="49" charset="0"/>
                 <a:hlinkClick r:id="rId29"/>
               </a:rPr>
               <a:t>tail</a:t>
             </a:r>
             <a:r>
-              <a:rPr lang="en-US" sz="1200" b="1">
+              <a:rPr lang="en-US" sz="1200" b="1" dirty="0">
                 <a:latin typeface="Consolas" panose="020B0609020204030204" pitchFamily="49" charset="0"/>
               </a:rPr>
               <a:t>(n)</a:t>
@@ -16552,10 +16546,9 @@
           <a:p>
             <a:pPr marL="92075"/>
             <a:r>
-              <a:rPr lang="en-US" sz="1200"/>
+              <a:rPr lang="en-US" sz="1200" dirty="0"/>
               <a:t>Select last n rows.</a:t>
             </a:r>
-            <a:endParaRPr lang="en-US" sz="1200" dirty="0"/>
           </a:p>
         </p:txBody>
       </p:sp>
@@ -17216,75 +17209,92 @@
           <a:lstStyle/>
           <a:p>
             <a:r>
-              <a:rPr lang="en-US" sz="1200"/>
+              <a:rPr lang="en-US" sz="1200" dirty="0"/>
               <a:t>Use </a:t>
             </a:r>
             <a:r>
-              <a:rPr lang="en-US" sz="1200" b="1">
-                <a:latin typeface="Consolas" panose="020B0609020204030204" pitchFamily="49" charset="0"/>
-              </a:rPr>
-              <a:t>df.loc[]</a:t>
-            </a:r>
-            <a:r>
-              <a:rPr lang="en-US" sz="1200">
+              <a:rPr lang="en-US" sz="1200" b="1" dirty="0" err="1">
+                <a:latin typeface="Consolas" panose="020B0609020204030204" pitchFamily="49" charset="0"/>
+              </a:rPr>
+              <a:t>df.loc</a:t>
+            </a:r>
+            <a:r>
+              <a:rPr lang="en-US" sz="1200" b="1" dirty="0">
+                <a:latin typeface="Consolas" panose="020B0609020204030204" pitchFamily="49" charset="0"/>
+              </a:rPr>
+              <a:t>[]</a:t>
+            </a:r>
+            <a:r>
+              <a:rPr lang="en-US" sz="1200" dirty="0">
                 <a:latin typeface="Consolas" panose="020B0609020204030204" pitchFamily="49" charset="0"/>
               </a:rPr>
               <a:t> </a:t>
             </a:r>
             <a:r>
-              <a:rPr lang="en-US" sz="1200"/>
+              <a:rPr lang="en-US" sz="1200" dirty="0"/>
               <a:t>and </a:t>
             </a:r>
             <a:r>
-              <a:rPr lang="en-US" sz="1200" b="1">
-                <a:latin typeface="Consolas" panose="020B0609020204030204" pitchFamily="49" charset="0"/>
-              </a:rPr>
-              <a:t>df.iloc[]</a:t>
-            </a:r>
-            <a:r>
-              <a:rPr lang="en-US" sz="1200">
+              <a:rPr lang="en-US" sz="1200" b="1" dirty="0" err="1">
+                <a:latin typeface="Consolas" panose="020B0609020204030204" pitchFamily="49" charset="0"/>
+              </a:rPr>
+              <a:t>df.iloc</a:t>
+            </a:r>
+            <a:r>
+              <a:rPr lang="en-US" sz="1200" b="1" dirty="0">
+                <a:latin typeface="Consolas" panose="020B0609020204030204" pitchFamily="49" charset="0"/>
+              </a:rPr>
+              <a:t>[]</a:t>
+            </a:r>
+            <a:r>
+              <a:rPr lang="en-US" sz="1200" dirty="0">
                 <a:latin typeface="Consolas" panose="020B0609020204030204" pitchFamily="49" charset="0"/>
               </a:rPr>
               <a:t> </a:t>
             </a:r>
             <a:r>
-              <a:rPr lang="en-US" sz="1200"/>
+              <a:rPr lang="en-US" sz="1200" dirty="0"/>
               <a:t>to select only rows, only columns or both.</a:t>
             </a:r>
             <a:br>
-              <a:rPr lang="en-US" sz="1200"/>
+              <a:rPr lang="en-US" sz="1200" dirty="0"/>
             </a:br>
             <a:r>
-              <a:rPr lang="en-US" sz="1200"/>
+              <a:rPr lang="en-US" sz="1200" dirty="0"/>
               <a:t>Use </a:t>
             </a:r>
             <a:r>
-              <a:rPr lang="en-US" sz="1200" b="1">
+              <a:rPr lang="en-US" sz="1200" b="1" dirty="0">
                 <a:latin typeface="Consolas" panose="020B0609020204030204" pitchFamily="49" charset="0"/>
               </a:rPr>
               <a:t>df.at[] </a:t>
             </a:r>
             <a:r>
-              <a:rPr lang="en-US" sz="1200"/>
+              <a:rPr lang="en-US" sz="1200" dirty="0"/>
               <a:t>and </a:t>
             </a:r>
             <a:r>
-              <a:rPr lang="en-US" sz="1200" b="1">
-                <a:latin typeface="Consolas" panose="020B0609020204030204" pitchFamily="49" charset="0"/>
-              </a:rPr>
-              <a:t>df.iat[] </a:t>
-            </a:r>
-            <a:r>
-              <a:rPr lang="en-US" sz="1200"/>
+              <a:rPr lang="en-US" sz="1200" b="1" dirty="0" err="1">
+                <a:latin typeface="Consolas" panose="020B0609020204030204" pitchFamily="49" charset="0"/>
+              </a:rPr>
+              <a:t>df.iat</a:t>
+            </a:r>
+            <a:r>
+              <a:rPr lang="en-US" sz="1200" b="1" dirty="0">
+                <a:latin typeface="Consolas" panose="020B0609020204030204" pitchFamily="49" charset="0"/>
+              </a:rPr>
+              <a:t>[] </a:t>
+            </a:r>
+            <a:r>
+              <a:rPr lang="en-US" sz="1200" dirty="0"/>
               <a:t>to access a single value by row and column.</a:t>
             </a:r>
           </a:p>
           <a:p>
             <a:r>
-              <a:rPr lang="en-US" sz="1200"/>
+              <a:rPr lang="en-US" sz="1200" dirty="0"/>
               <a:t>First index selects rows, second index columns.</a:t>
             </a:r>
-            <a:endParaRPr lang="en-US" sz="1200" dirty="0"/>
           </a:p>
         </p:txBody>
       </p:sp>
@@ -18011,12 +18021,8 @@
           <a:p>
             <a:pPr marL="92075"/>
             <a:r>
-              <a:rPr lang="en-US" sz="1200"/>
-              <a:t> Count </a:t>
-            </a:r>
-            <a:r>
               <a:rPr lang="en-US" sz="1200" dirty="0"/>
-              <a:t>number of rows with each unique value of variable</a:t>
+              <a:t> Count number of rows with each unique value of variable</a:t>
             </a:r>
           </a:p>
           <a:p>
@@ -18052,39 +18058,46 @@
               <a:t># of rows in </a:t>
             </a:r>
             <a:r>
-              <a:rPr lang="en-US" sz="1200" err="1"/>
+              <a:rPr lang="en-US" sz="1200" dirty="0" err="1"/>
               <a:t>DataFrame</a:t>
             </a:r>
             <a:r>
-              <a:rPr lang="en-US" sz="1200"/>
+              <a:rPr lang="en-US" sz="1200" dirty="0"/>
               <a:t>.</a:t>
             </a:r>
           </a:p>
           <a:p>
             <a:r>
-              <a:rPr lang="en-US" sz="1200" b="1">
+              <a:rPr lang="en-US" sz="1200" b="1" dirty="0" err="1">
                 <a:latin typeface="Consolas" panose="020B0609020204030204" pitchFamily="49" charset="0"/>
               </a:rPr>
               <a:t>df.</a:t>
             </a:r>
             <a:r>
-              <a:rPr lang="en-US" sz="1200" b="1">
+              <a:rPr lang="en-US" sz="1200" b="1" dirty="0" err="1">
                 <a:latin typeface="Consolas" panose="020B0609020204030204" pitchFamily="49" charset="0"/>
                 <a:hlinkClick r:id="rId5"/>
               </a:rPr>
               <a:t>shape</a:t>
             </a:r>
-            <a:endParaRPr lang="en-US" sz="1200" b="1">
+            <a:endParaRPr lang="en-US" sz="1200" b="1" dirty="0">
               <a:latin typeface="Consolas" panose="020B0609020204030204" pitchFamily="49" charset="0"/>
             </a:endParaRPr>
           </a:p>
           <a:p>
             <a:pPr marL="92075"/>
             <a:r>
-              <a:rPr lang="en-US" sz="1200"/>
-              <a:t> Tuple of # of rows, # of columns in DataFrame.</a:t>
-            </a:r>
-            <a:endParaRPr lang="en-US" sz="1200" dirty="0"/>
+              <a:rPr lang="en-US" sz="1200" dirty="0"/>
+              <a:t> Tuple of # of rows, # of columns in </a:t>
+            </a:r>
+            <a:r>
+              <a:rPr lang="en-US" sz="1200" dirty="0" err="1"/>
+              <a:t>DataFrame</a:t>
+            </a:r>
+            <a:r>
+              <a:rPr lang="en-US" sz="1200" dirty="0"/>
+              <a:t>.</a:t>
+            </a:r>
           </a:p>
           <a:p>
             <a:r>
@@ -18128,14 +18141,14 @@
               <a:t>df.</a:t>
             </a:r>
             <a:r>
-              <a:rPr lang="en-US" sz="1200" b="1" err="1">
+              <a:rPr lang="en-US" sz="1200" b="1" dirty="0" err="1">
                 <a:latin typeface="Consolas" panose="020B0609020204030204" pitchFamily="49" charset="0"/>
                 <a:hlinkClick r:id="rId7"/>
               </a:rPr>
               <a:t>describe</a:t>
             </a:r>
             <a:r>
-              <a:rPr lang="en-US" sz="1200" b="1">
+              <a:rPr lang="en-US" sz="1200" b="1" dirty="0">
                 <a:latin typeface="Consolas" panose="020B0609020204030204" pitchFamily="49" charset="0"/>
               </a:rPr>
               <a:t>()</a:t>
@@ -18144,8 +18157,16 @@
           <a:p>
             <a:pPr marL="92075"/>
             <a:r>
-              <a:rPr lang="en-US" sz="1200"/>
-              <a:t>Basic descriptive and statistics for each column (or GroupBy).</a:t>
+              <a:rPr lang="en-US" sz="1200" dirty="0"/>
+              <a:t>Basic descriptive and statistics for each column (or </a:t>
+            </a:r>
+            <a:r>
+              <a:rPr lang="en-US" sz="1200" dirty="0" err="1"/>
+              <a:t>GroupBy</a:t>
+            </a:r>
+            <a:r>
+              <a:rPr lang="en-US" sz="1200" dirty="0"/>
+              <a:t>).</a:t>
             </a:r>
           </a:p>
         </p:txBody>

</xml_diff>

<commit_message>
#Added 3rd Page (doc update)
More features can be added further!
</commit_message>
<xml_diff>
--- a/doc/cheatsheet/Pandas_Cheat_Sheet.pptx
+++ b/doc/cheatsheet/Pandas_Cheat_Sheet.pptx
@@ -7,6 +7,7 @@
   <p:sldIdLst>
     <p:sldId id="257" r:id="rId2"/>
     <p:sldId id="258" r:id="rId3"/>
+    <p:sldId id="259" r:id="rId4"/>
   </p:sldIdLst>
   <p:sldSz cx="13971588" cy="10799763"/>
   <p:notesSz cx="6858000" cy="9144000"/>
@@ -261,7 +262,7 @@
           <a:p>
             <a:fld id="{79278B33-2949-49BE-B3B0-3F16CAF906FE}" type="datetimeFigureOut">
               <a:rPr lang="en-US" smtClean="0"/>
-              <a:t>8/17/2021</a:t>
+              <a:t>8/18/2021</a:t>
             </a:fld>
             <a:endParaRPr lang="en-US"/>
           </a:p>
@@ -431,7 +432,7 @@
           <a:p>
             <a:fld id="{79278B33-2949-49BE-B3B0-3F16CAF906FE}" type="datetimeFigureOut">
               <a:rPr lang="en-US" smtClean="0"/>
-              <a:t>8/17/2021</a:t>
+              <a:t>8/18/2021</a:t>
             </a:fld>
             <a:endParaRPr lang="en-US"/>
           </a:p>
@@ -611,7 +612,7 @@
           <a:p>
             <a:fld id="{79278B33-2949-49BE-B3B0-3F16CAF906FE}" type="datetimeFigureOut">
               <a:rPr lang="en-US" smtClean="0"/>
-              <a:t>8/17/2021</a:t>
+              <a:t>8/18/2021</a:t>
             </a:fld>
             <a:endParaRPr lang="en-US"/>
           </a:p>
@@ -781,7 +782,7 @@
           <a:p>
             <a:fld id="{79278B33-2949-49BE-B3B0-3F16CAF906FE}" type="datetimeFigureOut">
               <a:rPr lang="en-US" smtClean="0"/>
-              <a:t>8/17/2021</a:t>
+              <a:t>8/18/2021</a:t>
             </a:fld>
             <a:endParaRPr lang="en-US"/>
           </a:p>
@@ -1025,7 +1026,7 @@
           <a:p>
             <a:fld id="{79278B33-2949-49BE-B3B0-3F16CAF906FE}" type="datetimeFigureOut">
               <a:rPr lang="en-US" smtClean="0"/>
-              <a:t>8/17/2021</a:t>
+              <a:t>8/18/2021</a:t>
             </a:fld>
             <a:endParaRPr lang="en-US"/>
           </a:p>
@@ -1257,7 +1258,7 @@
           <a:p>
             <a:fld id="{79278B33-2949-49BE-B3B0-3F16CAF906FE}" type="datetimeFigureOut">
               <a:rPr lang="en-US" smtClean="0"/>
-              <a:t>8/17/2021</a:t>
+              <a:t>8/18/2021</a:t>
             </a:fld>
             <a:endParaRPr lang="en-US"/>
           </a:p>
@@ -1624,7 +1625,7 @@
           <a:p>
             <a:fld id="{79278B33-2949-49BE-B3B0-3F16CAF906FE}" type="datetimeFigureOut">
               <a:rPr lang="en-US" smtClean="0"/>
-              <a:t>8/17/2021</a:t>
+              <a:t>8/18/2021</a:t>
             </a:fld>
             <a:endParaRPr lang="en-US"/>
           </a:p>
@@ -1742,7 +1743,7 @@
           <a:p>
             <a:fld id="{79278B33-2949-49BE-B3B0-3F16CAF906FE}" type="datetimeFigureOut">
               <a:rPr lang="en-US" smtClean="0"/>
-              <a:t>8/17/2021</a:t>
+              <a:t>8/18/2021</a:t>
             </a:fld>
             <a:endParaRPr lang="en-US"/>
           </a:p>
@@ -1837,7 +1838,7 @@
           <a:p>
             <a:fld id="{79278B33-2949-49BE-B3B0-3F16CAF906FE}" type="datetimeFigureOut">
               <a:rPr lang="en-US" smtClean="0"/>
-              <a:t>8/17/2021</a:t>
+              <a:t>8/18/2021</a:t>
             </a:fld>
             <a:endParaRPr lang="en-US"/>
           </a:p>
@@ -2114,7 +2115,7 @@
           <a:p>
             <a:fld id="{79278B33-2949-49BE-B3B0-3F16CAF906FE}" type="datetimeFigureOut">
               <a:rPr lang="en-US" smtClean="0"/>
-              <a:t>8/17/2021</a:t>
+              <a:t>8/18/2021</a:t>
             </a:fld>
             <a:endParaRPr lang="en-US"/>
           </a:p>
@@ -2371,7 +2372,7 @@
           <a:p>
             <a:fld id="{79278B33-2949-49BE-B3B0-3F16CAF906FE}" type="datetimeFigureOut">
               <a:rPr lang="en-US" smtClean="0"/>
-              <a:t>8/17/2021</a:t>
+              <a:t>8/18/2021</a:t>
             </a:fld>
             <a:endParaRPr lang="en-US"/>
           </a:p>
@@ -2584,7 +2585,7 @@
           <a:p>
             <a:fld id="{79278B33-2949-49BE-B3B0-3F16CAF906FE}" type="datetimeFigureOut">
               <a:rPr lang="en-US" smtClean="0"/>
-              <a:t>8/17/2021</a:t>
+              <a:t>8/18/2021</a:t>
             </a:fld>
             <a:endParaRPr lang="en-US"/>
           </a:p>
@@ -9694,14 +9695,14 @@
           <a:effectLst/>
           <a:extLst>
             <a:ext uri="{909E8E84-426E-40dd-AFC4-6F175D3DCCD1}">
-              <a14:hiddenFill xmlns:a14="http://schemas.microsoft.com/office/drawing/2010/main" xmlns="">
+              <a14:hiddenFill xmlns="" xmlns:a14="http://schemas.microsoft.com/office/drawing/2010/main">
                 <a:solidFill>
                   <a:schemeClr val="accent1"/>
                 </a:solidFill>
               </a14:hiddenFill>
             </a:ext>
             <a:ext uri="{91240B29-F687-4f45-9708-019B960494DF}">
-              <a14:hiddenLine xmlns:a14="http://schemas.microsoft.com/office/drawing/2010/main" xmlns="" w="9525">
+              <a14:hiddenLine xmlns="" xmlns:a14="http://schemas.microsoft.com/office/drawing/2010/main" w="9525">
                 <a:solidFill>
                   <a:schemeClr val="tx1"/>
                 </a:solidFill>
@@ -9711,7 +9712,7 @@
               </a14:hiddenLine>
             </a:ext>
             <a:ext uri="{AF507438-7753-43e0-B8FC-AC1667EBCBE1}">
-              <a14:hiddenEffects xmlns:a14="http://schemas.microsoft.com/office/drawing/2010/main" xmlns="">
+              <a14:hiddenEffects xmlns="" xmlns:a14="http://schemas.microsoft.com/office/drawing/2010/main">
                 <a:effectLst>
                   <a:outerShdw dist="35921" dir="2700000" algn="ctr" rotWithShape="0">
                     <a:schemeClr val="bg2"/>
@@ -23853,7 +23854,21 @@
                 <a:latin typeface="Consolas" panose="020B0609020204030204" pitchFamily="49" charset="0"/>
                 <a:hlinkClick r:id="rId26"/>
               </a:rPr>
-              <a:t>merge</a:t>
+              <a:t>mer</a:t>
+            </a:r>
+            <a:r>
+              <a:rPr lang="en-US" sz="1200" b="1" dirty="0" err="1">
+                <a:latin typeface="Consolas" panose="020B0609020204030204" pitchFamily="49" charset="0"/>
+                <a:hlinkClick r:id="rId26"/>
+              </a:rPr>
+              <a:t>g</a:t>
+            </a:r>
+            <a:r>
+              <a:rPr lang="en-US" sz="1200" b="1" dirty="0" err="1">
+                <a:latin typeface="Consolas" panose="020B0609020204030204" pitchFamily="49" charset="0"/>
+                <a:hlinkClick r:id="rId26"/>
+              </a:rPr>
+              <a:t>e</a:t>
             </a:r>
             <a:r>
               <a:rPr lang="en-US" sz="1200" b="1" dirty="0">
@@ -28350,6 +28365,3194 @@
     <p:extLst>
       <p:ext uri="{BB962C8B-B14F-4D97-AF65-F5344CB8AC3E}">
         <p14:creationId xmlns:p14="http://schemas.microsoft.com/office/powerpoint/2010/main" val="3046017032"/>
+      </p:ext>
+    </p:extLst>
+  </p:cSld>
+  <p:clrMapOvr>
+    <a:masterClrMapping/>
+  </p:clrMapOvr>
+</p:sld>
+</file>
+
+<file path=ppt/slides/slide3.xml><?xml version="1.0" encoding="utf-8"?>
+<p:sld xmlns:a="http://schemas.openxmlformats.org/drawingml/2006/main" xmlns:r="http://schemas.openxmlformats.org/officeDocument/2006/relationships" xmlns:p="http://schemas.openxmlformats.org/presentationml/2006/main">
+  <p:cSld>
+    <p:spTree>
+      <p:nvGrpSpPr>
+        <p:cNvPr id="1" name=""/>
+        <p:cNvGrpSpPr/>
+        <p:nvPr/>
+      </p:nvGrpSpPr>
+      <p:grpSpPr>
+        <a:xfrm>
+          <a:off x="0" y="0"/>
+          <a:ext cx="0" cy="0"/>
+          <a:chOff x="0" y="0"/>
+          <a:chExt cx="0" cy="0"/>
+        </a:xfrm>
+      </p:grpSpPr>
+      <p:sp>
+        <p:nvSpPr>
+          <p:cNvPr id="2" name="Rounded Rectangle 1"/>
+          <p:cNvSpPr/>
+          <p:nvPr/>
+        </p:nvSpPr>
+        <p:spPr>
+          <a:xfrm>
+            <a:off x="134509" y="224145"/>
+            <a:ext cx="4389120" cy="423293"/>
+          </a:xfrm>
+          <a:prstGeom prst="roundRect">
+            <a:avLst/>
+          </a:prstGeom>
+        </p:spPr>
+        <p:style>
+          <a:lnRef idx="2">
+            <a:schemeClr val="accent1">
+              <a:shade val="50000"/>
+            </a:schemeClr>
+          </a:lnRef>
+          <a:fillRef idx="1">
+            <a:schemeClr val="accent1"/>
+          </a:fillRef>
+          <a:effectRef idx="0">
+            <a:schemeClr val="accent1"/>
+          </a:effectRef>
+          <a:fontRef idx="minor">
+            <a:schemeClr val="lt1"/>
+          </a:fontRef>
+        </p:style>
+        <p:txBody>
+          <a:bodyPr rtlCol="0" anchor="ctr"/>
+          <a:lstStyle/>
+          <a:p>
+            <a:pPr algn="ctr"/>
+            <a:r>
+              <a:rPr lang="en-US" sz="2800" b="1" dirty="0">
+                <a:solidFill>
+                  <a:schemeClr val="bg1"/>
+                </a:solidFill>
+              </a:rPr>
+              <a:t>Data Selection</a:t>
+            </a:r>
+            <a:endParaRPr lang="en-US" sz="2683" dirty="0">
+              <a:solidFill>
+                <a:schemeClr val="bg1"/>
+              </a:solidFill>
+            </a:endParaRPr>
+          </a:p>
+        </p:txBody>
+      </p:sp>
+      <p:sp>
+        <p:nvSpPr>
+          <p:cNvPr id="5" name="TextBox 4"/>
+          <p:cNvSpPr txBox="1"/>
+          <p:nvPr/>
+        </p:nvSpPr>
+        <p:spPr>
+          <a:xfrm>
+            <a:off x="145643" y="653638"/>
+            <a:ext cx="4377986" cy="3364383"/>
+          </a:xfrm>
+          <a:prstGeom prst="rect">
+            <a:avLst/>
+          </a:prstGeom>
+          <a:solidFill>
+            <a:schemeClr val="accent1">
+              <a:lumMod val="20000"/>
+              <a:lumOff val="80000"/>
+            </a:schemeClr>
+          </a:solidFill>
+        </p:spPr>
+        <p:txBody>
+          <a:bodyPr wrap="square" rtlCol="0">
+            <a:spAutoFit/>
+          </a:bodyPr>
+          <a:lstStyle/>
+          <a:p>
+            <a:pPr>
+              <a:lnSpc>
+                <a:spcPct val="200000"/>
+              </a:lnSpc>
+            </a:pPr>
+            <a:r>
+              <a:rPr lang="en-US" sz="1200" b="0" i="0" dirty="0">
+                <a:effectLst/>
+              </a:rPr>
+              <a:t>Use these commands to select a specific subset of your data.</a:t>
+            </a:r>
+            <a:endParaRPr lang="en-US" sz="1200" b="1" dirty="0"/>
+          </a:p>
+          <a:p>
+            <a:pPr>
+              <a:lnSpc>
+                <a:spcPct val="200000"/>
+              </a:lnSpc>
+            </a:pPr>
+            <a:r>
+              <a:rPr lang="en-US" sz="1200" b="1" dirty="0">
+                <a:latin typeface="Consolas" panose="020B0609020204030204" pitchFamily="49" charset="0"/>
+              </a:rPr>
+              <a:t>df</a:t>
+            </a:r>
+            <a:r>
+              <a:rPr lang="en-US" sz="1200" b="1" dirty="0">
+                <a:solidFill>
+                  <a:srgbClr val="0070C0"/>
+                </a:solidFill>
+                <a:latin typeface="Consolas" panose="020B0609020204030204" pitchFamily="49" charset="0"/>
+              </a:rPr>
+              <a:t>[col] </a:t>
+            </a:r>
+            <a:r>
+              <a:rPr lang="en-US" sz="1200" b="1" dirty="0">
+                <a:latin typeface="Consolas" panose="020B0609020204030204" pitchFamily="49" charset="0"/>
+              </a:rPr>
+              <a:t>-&gt; </a:t>
+            </a:r>
+            <a:r>
+              <a:rPr lang="en-US" sz="1200" dirty="0">
+                <a:latin typeface="Consolas" panose="020B0609020204030204" pitchFamily="49" charset="0"/>
+              </a:rPr>
+              <a:t>Returns column with label col as Series</a:t>
+            </a:r>
+          </a:p>
+          <a:p>
+            <a:pPr>
+              <a:lnSpc>
+                <a:spcPct val="200000"/>
+              </a:lnSpc>
+            </a:pPr>
+            <a:r>
+              <a:rPr lang="en-US" sz="1200" b="1" dirty="0">
+                <a:latin typeface="Consolas" panose="020B0609020204030204" pitchFamily="49" charset="0"/>
+              </a:rPr>
+              <a:t>df</a:t>
+            </a:r>
+            <a:r>
+              <a:rPr lang="en-US" sz="1200" b="1" dirty="0">
+                <a:solidFill>
+                  <a:srgbClr val="0070C0"/>
+                </a:solidFill>
+                <a:latin typeface="Consolas" panose="020B0609020204030204" pitchFamily="49" charset="0"/>
+              </a:rPr>
+              <a:t>[[col1, col2]]</a:t>
+            </a:r>
+            <a:r>
+              <a:rPr lang="en-US" sz="1200" b="1" dirty="0">
+                <a:latin typeface="Consolas" panose="020B0609020204030204" pitchFamily="49" charset="0"/>
+              </a:rPr>
+              <a:t> -&gt; </a:t>
+            </a:r>
+            <a:r>
+              <a:rPr lang="en-US" sz="1200" dirty="0">
+                <a:latin typeface="Consolas" panose="020B0609020204030204" pitchFamily="49" charset="0"/>
+              </a:rPr>
+              <a:t>Returns columns as a new 	      </a:t>
+            </a:r>
+            <a:r>
+              <a:rPr lang="en-US" sz="1200" dirty="0" err="1">
+                <a:latin typeface="Consolas" panose="020B0609020204030204" pitchFamily="49" charset="0"/>
+              </a:rPr>
+              <a:t>DataFrame</a:t>
+            </a:r>
+            <a:endParaRPr lang="en-US" sz="1200" dirty="0">
+              <a:latin typeface="Consolas" panose="020B0609020204030204" pitchFamily="49" charset="0"/>
+            </a:endParaRPr>
+          </a:p>
+          <a:p>
+            <a:pPr>
+              <a:lnSpc>
+                <a:spcPct val="200000"/>
+              </a:lnSpc>
+            </a:pPr>
+            <a:r>
+              <a:rPr lang="en-US" sz="1200" b="1" dirty="0" err="1">
+                <a:latin typeface="Consolas" panose="020B0609020204030204" pitchFamily="49" charset="0"/>
+              </a:rPr>
+              <a:t>s.</a:t>
+            </a:r>
+            <a:r>
+              <a:rPr lang="en-US" sz="1200" b="1" dirty="0" err="1">
+                <a:solidFill>
+                  <a:srgbClr val="0070C0"/>
+                </a:solidFill>
+                <a:latin typeface="Consolas" panose="020B0609020204030204" pitchFamily="49" charset="0"/>
+              </a:rPr>
+              <a:t>iloc</a:t>
+            </a:r>
+            <a:r>
+              <a:rPr lang="en-US" sz="1200" b="1" dirty="0">
+                <a:solidFill>
+                  <a:srgbClr val="0070C0"/>
+                </a:solidFill>
+                <a:latin typeface="Consolas" panose="020B0609020204030204" pitchFamily="49" charset="0"/>
+              </a:rPr>
+              <a:t>[0]</a:t>
+            </a:r>
+            <a:r>
+              <a:rPr lang="en-US" sz="1200" b="1" dirty="0">
+                <a:latin typeface="Consolas" panose="020B0609020204030204" pitchFamily="49" charset="0"/>
+              </a:rPr>
+              <a:t> -&gt; </a:t>
+            </a:r>
+            <a:r>
+              <a:rPr lang="en-US" sz="1200" dirty="0">
+                <a:latin typeface="Consolas" panose="020B0609020204030204" pitchFamily="49" charset="0"/>
+              </a:rPr>
+              <a:t>Selection by position</a:t>
+            </a:r>
+          </a:p>
+          <a:p>
+            <a:pPr>
+              <a:lnSpc>
+                <a:spcPct val="200000"/>
+              </a:lnSpc>
+            </a:pPr>
+            <a:r>
+              <a:rPr lang="en-US" sz="1200" b="1" dirty="0" err="1">
+                <a:latin typeface="Consolas" panose="020B0609020204030204" pitchFamily="49" charset="0"/>
+              </a:rPr>
+              <a:t>s.</a:t>
+            </a:r>
+            <a:r>
+              <a:rPr lang="en-US" sz="1200" b="1" dirty="0" err="1">
+                <a:solidFill>
+                  <a:srgbClr val="0070C0"/>
+                </a:solidFill>
+                <a:latin typeface="Consolas" panose="020B0609020204030204" pitchFamily="49" charset="0"/>
+              </a:rPr>
+              <a:t>loc</a:t>
+            </a:r>
+            <a:r>
+              <a:rPr lang="en-US" sz="1200" b="1" dirty="0">
+                <a:solidFill>
+                  <a:srgbClr val="0070C0"/>
+                </a:solidFill>
+                <a:latin typeface="Consolas" panose="020B0609020204030204" pitchFamily="49" charset="0"/>
+              </a:rPr>
+              <a:t>['</a:t>
+            </a:r>
+            <a:r>
+              <a:rPr lang="en-US" sz="1200" b="1" dirty="0" err="1">
+                <a:solidFill>
+                  <a:srgbClr val="0070C0"/>
+                </a:solidFill>
+                <a:latin typeface="Consolas" panose="020B0609020204030204" pitchFamily="49" charset="0"/>
+              </a:rPr>
+              <a:t>index_one</a:t>
+            </a:r>
+            <a:r>
+              <a:rPr lang="en-US" sz="1200" b="1" dirty="0">
+                <a:solidFill>
+                  <a:srgbClr val="0070C0"/>
+                </a:solidFill>
+                <a:latin typeface="Consolas" panose="020B0609020204030204" pitchFamily="49" charset="0"/>
+              </a:rPr>
+              <a:t>'] </a:t>
+            </a:r>
+            <a:r>
+              <a:rPr lang="en-US" sz="1200" b="1" dirty="0">
+                <a:latin typeface="Consolas" panose="020B0609020204030204" pitchFamily="49" charset="0"/>
+              </a:rPr>
+              <a:t>-&gt; </a:t>
+            </a:r>
+            <a:r>
+              <a:rPr lang="en-US" sz="1200" dirty="0">
+                <a:latin typeface="Consolas" panose="020B0609020204030204" pitchFamily="49" charset="0"/>
+              </a:rPr>
+              <a:t>Selection by index</a:t>
+            </a:r>
+          </a:p>
+          <a:p>
+            <a:pPr>
+              <a:lnSpc>
+                <a:spcPct val="200000"/>
+              </a:lnSpc>
+            </a:pPr>
+            <a:r>
+              <a:rPr lang="en-US" sz="1200" b="1" dirty="0" err="1">
+                <a:latin typeface="Consolas" panose="020B0609020204030204" pitchFamily="49" charset="0"/>
+              </a:rPr>
+              <a:t>df.</a:t>
+            </a:r>
+            <a:r>
+              <a:rPr lang="en-US" sz="1200" b="1" dirty="0" err="1">
+                <a:solidFill>
+                  <a:srgbClr val="0070C0"/>
+                </a:solidFill>
+                <a:latin typeface="Consolas" panose="020B0609020204030204" pitchFamily="49" charset="0"/>
+              </a:rPr>
+              <a:t>iloc</a:t>
+            </a:r>
+            <a:r>
+              <a:rPr lang="en-US" sz="1200" b="1" dirty="0">
+                <a:solidFill>
+                  <a:srgbClr val="0070C0"/>
+                </a:solidFill>
+                <a:latin typeface="Consolas" panose="020B0609020204030204" pitchFamily="49" charset="0"/>
+              </a:rPr>
+              <a:t>[0,:] </a:t>
+            </a:r>
+            <a:r>
+              <a:rPr lang="en-US" sz="1200" b="1" dirty="0">
+                <a:latin typeface="Consolas" panose="020B0609020204030204" pitchFamily="49" charset="0"/>
+              </a:rPr>
+              <a:t>-&gt; </a:t>
+            </a:r>
+            <a:r>
+              <a:rPr lang="en-US" sz="1200" dirty="0">
+                <a:latin typeface="Consolas" panose="020B0609020204030204" pitchFamily="49" charset="0"/>
+              </a:rPr>
+              <a:t>First row</a:t>
+            </a:r>
+          </a:p>
+          <a:p>
+            <a:pPr>
+              <a:lnSpc>
+                <a:spcPct val="200000"/>
+              </a:lnSpc>
+            </a:pPr>
+            <a:r>
+              <a:rPr lang="en-US" sz="1200" b="1" dirty="0" err="1">
+                <a:latin typeface="Consolas" panose="020B0609020204030204" pitchFamily="49" charset="0"/>
+              </a:rPr>
+              <a:t>df.</a:t>
+            </a:r>
+            <a:r>
+              <a:rPr lang="en-US" sz="1200" b="1" dirty="0" err="1">
+                <a:solidFill>
+                  <a:srgbClr val="0070C0"/>
+                </a:solidFill>
+                <a:latin typeface="Consolas" panose="020B0609020204030204" pitchFamily="49" charset="0"/>
+              </a:rPr>
+              <a:t>iloc</a:t>
+            </a:r>
+            <a:r>
+              <a:rPr lang="en-US" sz="1200" b="1" dirty="0">
+                <a:solidFill>
+                  <a:srgbClr val="0070C0"/>
+                </a:solidFill>
+                <a:latin typeface="Consolas" panose="020B0609020204030204" pitchFamily="49" charset="0"/>
+              </a:rPr>
+              <a:t>[0,0] </a:t>
+            </a:r>
+            <a:r>
+              <a:rPr lang="en-US" sz="1200" b="1" dirty="0">
+                <a:latin typeface="Consolas" panose="020B0609020204030204" pitchFamily="49" charset="0"/>
+              </a:rPr>
+              <a:t>-&gt; </a:t>
+            </a:r>
+            <a:r>
+              <a:rPr lang="en-US" sz="1200" dirty="0">
+                <a:latin typeface="Consolas" panose="020B0609020204030204" pitchFamily="49" charset="0"/>
+              </a:rPr>
+              <a:t>First element of first column</a:t>
+            </a:r>
+            <a:endParaRPr lang="en-US" sz="1200" dirty="0"/>
+          </a:p>
+        </p:txBody>
+      </p:sp>
+      <p:sp>
+        <p:nvSpPr>
+          <p:cNvPr id="9" name="TextBox 8"/>
+          <p:cNvSpPr txBox="1"/>
+          <p:nvPr/>
+        </p:nvSpPr>
+        <p:spPr>
+          <a:xfrm>
+            <a:off x="134509" y="4189548"/>
+            <a:ext cx="4377986" cy="617733"/>
+          </a:xfrm>
+          <a:prstGeom prst="rect">
+            <a:avLst/>
+          </a:prstGeom>
+          <a:solidFill>
+            <a:schemeClr val="accent1">
+              <a:lumMod val="20000"/>
+              <a:lumOff val="80000"/>
+            </a:schemeClr>
+          </a:solidFill>
+        </p:spPr>
+        <p:txBody>
+          <a:bodyPr wrap="square" rtlCol="0">
+            <a:spAutoFit/>
+          </a:bodyPr>
+          <a:lstStyle/>
+          <a:p>
+            <a:pPr>
+              <a:lnSpc>
+                <a:spcPct val="150000"/>
+              </a:lnSpc>
+            </a:pPr>
+            <a:r>
+              <a:rPr lang="en-US" sz="1200" dirty="0"/>
+              <a:t>pandas provides a many </a:t>
+            </a:r>
+            <a:r>
+              <a:rPr lang="en-US" sz="1200" b="1" dirty="0">
+                <a:hlinkClick r:id="rId2"/>
+              </a:rPr>
+              <a:t>data selection functions</a:t>
+            </a:r>
+            <a:r>
+              <a:rPr lang="en-US" sz="1200" b="1" dirty="0"/>
+              <a:t> </a:t>
+            </a:r>
+            <a:r>
+              <a:rPr lang="en-US" sz="1200" dirty="0"/>
+              <a:t>which are used to fetch and select the values from a given </a:t>
+            </a:r>
+            <a:r>
+              <a:rPr lang="en-US" sz="1200" dirty="0" err="1"/>
+              <a:t>DataFrame</a:t>
+            </a:r>
+            <a:r>
+              <a:rPr lang="en-US" sz="1200" dirty="0"/>
+              <a:t> using python.</a:t>
+            </a:r>
+          </a:p>
+        </p:txBody>
+      </p:sp>
+      <p:sp>
+        <p:nvSpPr>
+          <p:cNvPr id="62" name="Rounded Rectangle 61"/>
+          <p:cNvSpPr/>
+          <p:nvPr/>
+        </p:nvSpPr>
+        <p:spPr>
+          <a:xfrm>
+            <a:off x="171635" y="5118363"/>
+            <a:ext cx="4389120" cy="423293"/>
+          </a:xfrm>
+          <a:prstGeom prst="roundRect">
+            <a:avLst/>
+          </a:prstGeom>
+        </p:spPr>
+        <p:style>
+          <a:lnRef idx="2">
+            <a:schemeClr val="accent1">
+              <a:shade val="50000"/>
+            </a:schemeClr>
+          </a:lnRef>
+          <a:fillRef idx="1">
+            <a:schemeClr val="accent1"/>
+          </a:fillRef>
+          <a:effectRef idx="0">
+            <a:schemeClr val="accent1"/>
+          </a:effectRef>
+          <a:fontRef idx="minor">
+            <a:schemeClr val="lt1"/>
+          </a:fontRef>
+        </p:style>
+        <p:txBody>
+          <a:bodyPr rtlCol="0" anchor="ctr"/>
+          <a:lstStyle/>
+          <a:p>
+            <a:pPr algn="ctr"/>
+            <a:r>
+              <a:rPr lang="en-US" sz="2800" b="1" dirty="0">
+                <a:solidFill>
+                  <a:schemeClr val="bg1"/>
+                </a:solidFill>
+              </a:rPr>
+              <a:t>Statistics</a:t>
+            </a:r>
+            <a:endParaRPr lang="en-US" sz="2683" dirty="0">
+              <a:solidFill>
+                <a:schemeClr val="bg1"/>
+              </a:solidFill>
+            </a:endParaRPr>
+          </a:p>
+        </p:txBody>
+      </p:sp>
+      <p:sp>
+        <p:nvSpPr>
+          <p:cNvPr id="79" name="Rounded Rectangle 78"/>
+          <p:cNvSpPr/>
+          <p:nvPr/>
+        </p:nvSpPr>
+        <p:spPr>
+          <a:xfrm>
+            <a:off x="4703100" y="235863"/>
+            <a:ext cx="8958782" cy="423293"/>
+          </a:xfrm>
+          <a:prstGeom prst="roundRect">
+            <a:avLst/>
+          </a:prstGeom>
+        </p:spPr>
+        <p:style>
+          <a:lnRef idx="2">
+            <a:schemeClr val="accent1">
+              <a:shade val="50000"/>
+            </a:schemeClr>
+          </a:lnRef>
+          <a:fillRef idx="1">
+            <a:schemeClr val="accent1"/>
+          </a:fillRef>
+          <a:effectRef idx="0">
+            <a:schemeClr val="accent1"/>
+          </a:effectRef>
+          <a:fontRef idx="minor">
+            <a:schemeClr val="lt1"/>
+          </a:fontRef>
+        </p:style>
+        <p:txBody>
+          <a:bodyPr rtlCol="0" anchor="ctr"/>
+          <a:lstStyle/>
+          <a:p>
+            <a:pPr algn="ctr"/>
+            <a:r>
+              <a:rPr lang="en-US" sz="2800" b="1" dirty="0">
+                <a:solidFill>
+                  <a:schemeClr val="bg1"/>
+                </a:solidFill>
+              </a:rPr>
+              <a:t>Data Cleaning</a:t>
+            </a:r>
+            <a:endParaRPr lang="en-US" sz="2683" dirty="0">
+              <a:solidFill>
+                <a:schemeClr val="bg1"/>
+              </a:solidFill>
+            </a:endParaRPr>
+          </a:p>
+        </p:txBody>
+      </p:sp>
+      <p:sp>
+        <p:nvSpPr>
+          <p:cNvPr id="80" name="TextBox 79"/>
+          <p:cNvSpPr txBox="1"/>
+          <p:nvPr/>
+        </p:nvSpPr>
+        <p:spPr>
+          <a:xfrm>
+            <a:off x="4798116" y="764979"/>
+            <a:ext cx="8863766" cy="6319294"/>
+          </a:xfrm>
+          <a:prstGeom prst="rect">
+            <a:avLst/>
+          </a:prstGeom>
+          <a:solidFill>
+            <a:schemeClr val="accent1">
+              <a:lumMod val="20000"/>
+              <a:lumOff val="80000"/>
+            </a:schemeClr>
+          </a:solidFill>
+        </p:spPr>
+        <p:txBody>
+          <a:bodyPr wrap="square" rtlCol="0">
+            <a:spAutoFit/>
+          </a:bodyPr>
+          <a:lstStyle/>
+          <a:p>
+            <a:pPr>
+              <a:lnSpc>
+                <a:spcPct val="200000"/>
+              </a:lnSpc>
+            </a:pPr>
+            <a:r>
+              <a:rPr lang="en-US" sz="1200" b="0" i="0" dirty="0">
+                <a:effectLst/>
+              </a:rPr>
+              <a:t>Use these commands to perform a variety of data cleaning tasks</a:t>
+            </a:r>
+          </a:p>
+          <a:p>
+            <a:pPr>
+              <a:lnSpc>
+                <a:spcPct val="200000"/>
+              </a:lnSpc>
+            </a:pPr>
+            <a:r>
+              <a:rPr lang="en-US" sz="1200" b="1" i="0" dirty="0" err="1">
+                <a:effectLst/>
+                <a:latin typeface="Consolas" panose="020B0609020204030204" pitchFamily="49" charset="0"/>
+              </a:rPr>
+              <a:t>df.</a:t>
+            </a:r>
+            <a:r>
+              <a:rPr lang="en-US" sz="1200" b="1" i="0" dirty="0" err="1">
+                <a:solidFill>
+                  <a:srgbClr val="0070C0"/>
+                </a:solidFill>
+                <a:effectLst/>
+                <a:latin typeface="Consolas" panose="020B0609020204030204" pitchFamily="49" charset="0"/>
+              </a:rPr>
+              <a:t>columns</a:t>
+            </a:r>
+            <a:r>
+              <a:rPr lang="en-US" sz="1200" b="1" i="0" dirty="0">
+                <a:effectLst/>
+                <a:latin typeface="Consolas" panose="020B0609020204030204" pitchFamily="49" charset="0"/>
+              </a:rPr>
+              <a:t> = ['</a:t>
+            </a:r>
+            <a:r>
+              <a:rPr lang="en-US" sz="1200" b="1" i="0" dirty="0" err="1">
+                <a:effectLst/>
+                <a:latin typeface="Consolas" panose="020B0609020204030204" pitchFamily="49" charset="0"/>
+              </a:rPr>
+              <a:t>a','b','c</a:t>
+            </a:r>
+            <a:r>
+              <a:rPr lang="en-US" sz="1200" b="1" i="0" dirty="0">
+                <a:effectLst/>
+                <a:latin typeface="Consolas" panose="020B0609020204030204" pitchFamily="49" charset="0"/>
+              </a:rPr>
+              <a:t>'] </a:t>
+            </a:r>
+            <a:r>
+              <a:rPr lang="en-US" sz="1200" b="0" i="0" dirty="0">
+                <a:effectLst/>
+              </a:rPr>
+              <a:t>| Rename columns</a:t>
+            </a:r>
+          </a:p>
+          <a:p>
+            <a:pPr>
+              <a:lnSpc>
+                <a:spcPct val="200000"/>
+              </a:lnSpc>
+            </a:pPr>
+            <a:r>
+              <a:rPr lang="en-US" sz="1200" b="1" i="0" dirty="0" err="1">
+                <a:effectLst/>
+                <a:latin typeface="Consolas" panose="020B0609020204030204" pitchFamily="49" charset="0"/>
+              </a:rPr>
+              <a:t>pd.</a:t>
+            </a:r>
+            <a:r>
+              <a:rPr lang="en-US" sz="1200" b="1" i="0" dirty="0" err="1">
+                <a:solidFill>
+                  <a:srgbClr val="0070C0"/>
+                </a:solidFill>
+                <a:effectLst/>
+                <a:latin typeface="Consolas" panose="020B0609020204030204" pitchFamily="49" charset="0"/>
+              </a:rPr>
+              <a:t>isnull</a:t>
+            </a:r>
+            <a:r>
+              <a:rPr lang="en-US" sz="1200" b="1" i="0" dirty="0">
+                <a:solidFill>
+                  <a:srgbClr val="0070C0"/>
+                </a:solidFill>
+                <a:effectLst/>
+                <a:latin typeface="Consolas" panose="020B0609020204030204" pitchFamily="49" charset="0"/>
+              </a:rPr>
+              <a:t>() </a:t>
+            </a:r>
+            <a:r>
+              <a:rPr lang="en-US" sz="1200" b="0" i="0" dirty="0">
+                <a:effectLst/>
+              </a:rPr>
+              <a:t>| Checks for null Values, Returns Boolean </a:t>
+            </a:r>
+            <a:r>
+              <a:rPr lang="en-US" sz="1200" b="0" i="0" dirty="0" err="1">
+                <a:effectLst/>
+              </a:rPr>
+              <a:t>Arrray</a:t>
+            </a:r>
+            <a:endParaRPr lang="en-US" sz="1200" b="0" i="0" dirty="0">
+              <a:effectLst/>
+            </a:endParaRPr>
+          </a:p>
+          <a:p>
+            <a:pPr>
+              <a:lnSpc>
+                <a:spcPct val="200000"/>
+              </a:lnSpc>
+            </a:pPr>
+            <a:r>
+              <a:rPr lang="en-US" sz="1200" b="1" i="0" dirty="0" err="1">
+                <a:effectLst/>
+                <a:latin typeface="Consolas" panose="020B0609020204030204" pitchFamily="49" charset="0"/>
+              </a:rPr>
+              <a:t>pd.</a:t>
+            </a:r>
+            <a:r>
+              <a:rPr lang="en-US" sz="1200" b="1" i="0" dirty="0" err="1">
+                <a:solidFill>
+                  <a:srgbClr val="0070C0"/>
+                </a:solidFill>
+                <a:effectLst/>
+                <a:latin typeface="Consolas" panose="020B0609020204030204" pitchFamily="49" charset="0"/>
+              </a:rPr>
+              <a:t>notnull</a:t>
+            </a:r>
+            <a:r>
+              <a:rPr lang="en-US" sz="1200" b="1" i="0" dirty="0">
+                <a:solidFill>
+                  <a:srgbClr val="0070C0"/>
+                </a:solidFill>
+                <a:effectLst/>
+                <a:latin typeface="Consolas" panose="020B0609020204030204" pitchFamily="49" charset="0"/>
+              </a:rPr>
+              <a:t>() </a:t>
+            </a:r>
+            <a:r>
+              <a:rPr lang="en-US" sz="1200" b="0" i="0" dirty="0">
+                <a:effectLst/>
+              </a:rPr>
+              <a:t>| Opposite of </a:t>
+            </a:r>
+            <a:r>
+              <a:rPr lang="en-US" sz="1200" b="0" i="0" dirty="0" err="1">
+                <a:effectLst/>
+              </a:rPr>
+              <a:t>pd.isnull</a:t>
+            </a:r>
+            <a:r>
+              <a:rPr lang="en-US" sz="1200" b="0" i="0" dirty="0">
+                <a:effectLst/>
+              </a:rPr>
+              <a:t>()		</a:t>
+            </a:r>
+          </a:p>
+          <a:p>
+            <a:pPr>
+              <a:lnSpc>
+                <a:spcPct val="200000"/>
+              </a:lnSpc>
+            </a:pPr>
+            <a:r>
+              <a:rPr lang="en-US" sz="1200" b="1" i="0" dirty="0" err="1">
+                <a:effectLst/>
+                <a:latin typeface="Consolas" panose="020B0609020204030204" pitchFamily="49" charset="0"/>
+              </a:rPr>
+              <a:t>df.</a:t>
+            </a:r>
+            <a:r>
+              <a:rPr lang="en-US" sz="1200" b="1" i="0" dirty="0" err="1">
+                <a:solidFill>
+                  <a:srgbClr val="0070C0"/>
+                </a:solidFill>
+                <a:effectLst/>
+                <a:latin typeface="Consolas" panose="020B0609020204030204" pitchFamily="49" charset="0"/>
+              </a:rPr>
+              <a:t>dropna</a:t>
+            </a:r>
+            <a:r>
+              <a:rPr lang="en-US" sz="1200" b="1" i="0" dirty="0">
+                <a:solidFill>
+                  <a:srgbClr val="0070C0"/>
+                </a:solidFill>
+                <a:effectLst/>
+                <a:latin typeface="Consolas" panose="020B0609020204030204" pitchFamily="49" charset="0"/>
+              </a:rPr>
+              <a:t>() </a:t>
+            </a:r>
+            <a:r>
+              <a:rPr lang="en-US" sz="1200" b="0" i="0" dirty="0">
+                <a:effectLst/>
+              </a:rPr>
+              <a:t>| Drop all rows that contain null values</a:t>
+            </a:r>
+          </a:p>
+          <a:p>
+            <a:pPr>
+              <a:lnSpc>
+                <a:spcPct val="200000"/>
+              </a:lnSpc>
+            </a:pPr>
+            <a:r>
+              <a:rPr lang="en-US" sz="1200" b="1" i="0" dirty="0" err="1">
+                <a:effectLst/>
+                <a:latin typeface="Consolas" panose="020B0609020204030204" pitchFamily="49" charset="0"/>
+              </a:rPr>
+              <a:t>df.</a:t>
+            </a:r>
+            <a:r>
+              <a:rPr lang="en-US" sz="1200" b="1" i="0" dirty="0" err="1">
+                <a:solidFill>
+                  <a:srgbClr val="0070C0"/>
+                </a:solidFill>
+                <a:effectLst/>
+                <a:latin typeface="Consolas" panose="020B0609020204030204" pitchFamily="49" charset="0"/>
+              </a:rPr>
+              <a:t>dropna</a:t>
+            </a:r>
+            <a:r>
+              <a:rPr lang="en-US" sz="1200" b="1" i="0" dirty="0">
+                <a:solidFill>
+                  <a:srgbClr val="0070C0"/>
+                </a:solidFill>
+                <a:effectLst/>
+                <a:latin typeface="Consolas" panose="020B0609020204030204" pitchFamily="49" charset="0"/>
+              </a:rPr>
+              <a:t>(axis=1) </a:t>
+            </a:r>
+            <a:r>
+              <a:rPr lang="en-US" sz="1200" b="0" i="0" dirty="0">
+                <a:effectLst/>
+              </a:rPr>
+              <a:t>| Drop all columns that contain null values</a:t>
+            </a:r>
+          </a:p>
+          <a:p>
+            <a:pPr>
+              <a:lnSpc>
+                <a:spcPct val="200000"/>
+              </a:lnSpc>
+            </a:pPr>
+            <a:r>
+              <a:rPr lang="en-US" sz="1200" b="1" i="0" dirty="0" err="1">
+                <a:effectLst/>
+                <a:latin typeface="Consolas" panose="020B0609020204030204" pitchFamily="49" charset="0"/>
+              </a:rPr>
+              <a:t>df.</a:t>
+            </a:r>
+            <a:r>
+              <a:rPr lang="en-US" sz="1200" b="1" i="0" dirty="0" err="1">
+                <a:solidFill>
+                  <a:srgbClr val="0070C0"/>
+                </a:solidFill>
+                <a:effectLst/>
+                <a:latin typeface="Consolas" panose="020B0609020204030204" pitchFamily="49" charset="0"/>
+              </a:rPr>
+              <a:t>dropna</a:t>
+            </a:r>
+            <a:r>
+              <a:rPr lang="en-US" sz="1200" b="1" i="0" dirty="0">
+                <a:solidFill>
+                  <a:srgbClr val="0070C0"/>
+                </a:solidFill>
+                <a:effectLst/>
+                <a:latin typeface="Consolas" panose="020B0609020204030204" pitchFamily="49" charset="0"/>
+              </a:rPr>
+              <a:t>(axis=1,thresh=n) </a:t>
+            </a:r>
+            <a:r>
+              <a:rPr lang="en-US" sz="1200" b="0" i="0" dirty="0">
+                <a:effectLst/>
+              </a:rPr>
+              <a:t>| Drop all rows have </a:t>
+            </a:r>
+            <a:r>
+              <a:rPr lang="en-US" sz="1200" b="0" i="0" dirty="0" err="1">
+                <a:effectLst/>
+              </a:rPr>
+              <a:t>have</a:t>
+            </a:r>
+            <a:r>
+              <a:rPr lang="en-US" sz="1200" b="0" i="0" dirty="0">
+                <a:effectLst/>
+              </a:rPr>
+              <a:t> less than n non null values</a:t>
+            </a:r>
+          </a:p>
+          <a:p>
+            <a:pPr>
+              <a:lnSpc>
+                <a:spcPct val="200000"/>
+              </a:lnSpc>
+            </a:pPr>
+            <a:r>
+              <a:rPr lang="en-US" sz="1200" b="1" i="0" dirty="0" err="1">
+                <a:effectLst/>
+                <a:latin typeface="Consolas" panose="020B0609020204030204" pitchFamily="49" charset="0"/>
+              </a:rPr>
+              <a:t>df.</a:t>
+            </a:r>
+            <a:r>
+              <a:rPr lang="en-US" sz="1200" b="1" i="0" dirty="0" err="1">
+                <a:solidFill>
+                  <a:srgbClr val="0070C0"/>
+                </a:solidFill>
+                <a:effectLst/>
+                <a:latin typeface="Consolas" panose="020B0609020204030204" pitchFamily="49" charset="0"/>
+              </a:rPr>
+              <a:t>fillna</a:t>
+            </a:r>
+            <a:r>
+              <a:rPr lang="en-US" sz="1200" b="1" i="0" dirty="0">
+                <a:solidFill>
+                  <a:srgbClr val="0070C0"/>
+                </a:solidFill>
+                <a:effectLst/>
+                <a:latin typeface="Consolas" panose="020B0609020204030204" pitchFamily="49" charset="0"/>
+              </a:rPr>
+              <a:t>(x)</a:t>
+            </a:r>
+            <a:r>
+              <a:rPr lang="en-US" sz="1200" b="1" i="0" dirty="0">
+                <a:effectLst/>
+                <a:latin typeface="Consolas" panose="020B0609020204030204" pitchFamily="49" charset="0"/>
+              </a:rPr>
+              <a:t> </a:t>
+            </a:r>
+            <a:r>
+              <a:rPr lang="en-US" sz="1200" b="0" i="0" dirty="0">
+                <a:effectLst/>
+              </a:rPr>
+              <a:t>| Replace all null values with x</a:t>
+            </a:r>
+          </a:p>
+          <a:p>
+            <a:pPr>
+              <a:lnSpc>
+                <a:spcPct val="200000"/>
+              </a:lnSpc>
+            </a:pPr>
+            <a:r>
+              <a:rPr lang="en-US" sz="1200" b="1" i="0" dirty="0" err="1">
+                <a:effectLst/>
+                <a:latin typeface="Consolas" panose="020B0609020204030204" pitchFamily="49" charset="0"/>
+              </a:rPr>
+              <a:t>s.</a:t>
+            </a:r>
+            <a:r>
+              <a:rPr lang="en-US" sz="1200" b="1" i="0" dirty="0" err="1">
+                <a:solidFill>
+                  <a:srgbClr val="0070C0"/>
+                </a:solidFill>
+                <a:effectLst/>
+                <a:latin typeface="Consolas" panose="020B0609020204030204" pitchFamily="49" charset="0"/>
+              </a:rPr>
+              <a:t>fillna</a:t>
+            </a:r>
+            <a:r>
+              <a:rPr lang="en-US" sz="1200" b="1" i="0" dirty="0">
+                <a:solidFill>
+                  <a:srgbClr val="0070C0"/>
+                </a:solidFill>
+                <a:effectLst/>
+                <a:latin typeface="Consolas" panose="020B0609020204030204" pitchFamily="49" charset="0"/>
+              </a:rPr>
+              <a:t>(</a:t>
+            </a:r>
+            <a:r>
+              <a:rPr lang="en-US" sz="1200" b="1" i="0" dirty="0" err="1">
+                <a:solidFill>
+                  <a:srgbClr val="0070C0"/>
+                </a:solidFill>
+                <a:effectLst/>
+                <a:latin typeface="Consolas" panose="020B0609020204030204" pitchFamily="49" charset="0"/>
+              </a:rPr>
+              <a:t>s.mean</a:t>
+            </a:r>
+            <a:r>
+              <a:rPr lang="en-US" sz="1200" b="1" i="0" dirty="0">
+                <a:solidFill>
+                  <a:srgbClr val="0070C0"/>
+                </a:solidFill>
+                <a:effectLst/>
+                <a:latin typeface="Consolas" panose="020B0609020204030204" pitchFamily="49" charset="0"/>
+              </a:rPr>
+              <a:t>()) </a:t>
+            </a:r>
+            <a:r>
+              <a:rPr lang="en-US" sz="1200" b="0" i="0" dirty="0">
+                <a:effectLst/>
+              </a:rPr>
+              <a:t>| Replace all null values with the mean (mean can be replaced with almost any function from the statistics module)</a:t>
+            </a:r>
+          </a:p>
+          <a:p>
+            <a:pPr>
+              <a:lnSpc>
+                <a:spcPct val="200000"/>
+              </a:lnSpc>
+            </a:pPr>
+            <a:r>
+              <a:rPr lang="en-US" sz="1200" b="1" i="0" dirty="0" err="1">
+                <a:effectLst/>
+                <a:latin typeface="Consolas" panose="020B0609020204030204" pitchFamily="49" charset="0"/>
+              </a:rPr>
+              <a:t>s.</a:t>
+            </a:r>
+            <a:r>
+              <a:rPr lang="en-US" sz="1200" b="1" i="0" dirty="0" err="1">
+                <a:solidFill>
+                  <a:srgbClr val="0070C0"/>
+                </a:solidFill>
+                <a:effectLst/>
+                <a:latin typeface="Consolas" panose="020B0609020204030204" pitchFamily="49" charset="0"/>
+              </a:rPr>
+              <a:t>astype</a:t>
+            </a:r>
+            <a:r>
+              <a:rPr lang="en-US" sz="1200" b="1" i="0" dirty="0">
+                <a:solidFill>
+                  <a:srgbClr val="0070C0"/>
+                </a:solidFill>
+                <a:effectLst/>
+                <a:latin typeface="Consolas" panose="020B0609020204030204" pitchFamily="49" charset="0"/>
+              </a:rPr>
+              <a:t>(float) </a:t>
+            </a:r>
+            <a:r>
+              <a:rPr lang="en-US" sz="1200" b="0" i="0" dirty="0">
+                <a:effectLst/>
+              </a:rPr>
+              <a:t>| Convert the datatype of the series to float</a:t>
+            </a:r>
+          </a:p>
+          <a:p>
+            <a:pPr>
+              <a:lnSpc>
+                <a:spcPct val="200000"/>
+              </a:lnSpc>
+            </a:pPr>
+            <a:r>
+              <a:rPr lang="en-US" sz="1200" b="1" i="0" dirty="0" err="1">
+                <a:effectLst/>
+                <a:latin typeface="Consolas" panose="020B0609020204030204" pitchFamily="49" charset="0"/>
+              </a:rPr>
+              <a:t>s.</a:t>
+            </a:r>
+            <a:r>
+              <a:rPr lang="en-US" sz="1200" b="1" i="0" dirty="0" err="1">
+                <a:solidFill>
+                  <a:srgbClr val="0070C0"/>
+                </a:solidFill>
+                <a:effectLst/>
+                <a:latin typeface="Consolas" panose="020B0609020204030204" pitchFamily="49" charset="0"/>
+              </a:rPr>
+              <a:t>replace</a:t>
+            </a:r>
+            <a:r>
+              <a:rPr lang="en-US" sz="1200" b="1" i="0" dirty="0">
+                <a:solidFill>
+                  <a:srgbClr val="0070C0"/>
+                </a:solidFill>
+                <a:effectLst/>
+                <a:latin typeface="Consolas" panose="020B0609020204030204" pitchFamily="49" charset="0"/>
+              </a:rPr>
+              <a:t>(1,'one') </a:t>
+            </a:r>
+            <a:r>
+              <a:rPr lang="en-US" sz="1200" b="0" i="0" dirty="0">
+                <a:effectLst/>
+              </a:rPr>
+              <a:t>| Replace all values equal to 1 with 'one'</a:t>
+            </a:r>
+          </a:p>
+          <a:p>
+            <a:pPr>
+              <a:lnSpc>
+                <a:spcPct val="200000"/>
+              </a:lnSpc>
+            </a:pPr>
+            <a:r>
+              <a:rPr lang="en-US" sz="1200" b="1" i="0" dirty="0" err="1">
+                <a:effectLst/>
+                <a:latin typeface="Consolas" panose="020B0609020204030204" pitchFamily="49" charset="0"/>
+              </a:rPr>
+              <a:t>s.</a:t>
+            </a:r>
+            <a:r>
+              <a:rPr lang="en-US" sz="1200" b="1" i="0" dirty="0" err="1">
+                <a:solidFill>
+                  <a:srgbClr val="0070C0"/>
+                </a:solidFill>
+                <a:effectLst/>
+                <a:latin typeface="Consolas" panose="020B0609020204030204" pitchFamily="49" charset="0"/>
+              </a:rPr>
+              <a:t>replace</a:t>
+            </a:r>
+            <a:r>
+              <a:rPr lang="en-US" sz="1200" b="1" i="0" dirty="0">
+                <a:solidFill>
+                  <a:srgbClr val="0070C0"/>
+                </a:solidFill>
+                <a:effectLst/>
+                <a:latin typeface="Consolas" panose="020B0609020204030204" pitchFamily="49" charset="0"/>
+              </a:rPr>
+              <a:t>([1,3],['</a:t>
+            </a:r>
+            <a:r>
+              <a:rPr lang="en-US" sz="1200" b="1" i="0" dirty="0" err="1">
+                <a:solidFill>
+                  <a:srgbClr val="0070C0"/>
+                </a:solidFill>
+                <a:effectLst/>
+                <a:latin typeface="Consolas" panose="020B0609020204030204" pitchFamily="49" charset="0"/>
+              </a:rPr>
+              <a:t>one','three</a:t>
+            </a:r>
+            <a:r>
+              <a:rPr lang="en-US" sz="1200" b="1" i="0" dirty="0">
+                <a:solidFill>
+                  <a:srgbClr val="0070C0"/>
+                </a:solidFill>
+                <a:effectLst/>
+                <a:latin typeface="Consolas" panose="020B0609020204030204" pitchFamily="49" charset="0"/>
+              </a:rPr>
+              <a:t>']) </a:t>
+            </a:r>
+            <a:r>
+              <a:rPr lang="en-US" sz="1200" b="0" i="0" dirty="0">
+                <a:effectLst/>
+              </a:rPr>
+              <a:t>| Replace all 1 with 'one' and 3 with 'three'</a:t>
+            </a:r>
+          </a:p>
+          <a:p>
+            <a:pPr>
+              <a:lnSpc>
+                <a:spcPct val="200000"/>
+              </a:lnSpc>
+            </a:pPr>
+            <a:r>
+              <a:rPr lang="en-US" sz="1200" b="1" i="0" dirty="0" err="1">
+                <a:effectLst/>
+                <a:latin typeface="Consolas" panose="020B0609020204030204" pitchFamily="49" charset="0"/>
+              </a:rPr>
+              <a:t>df.</a:t>
+            </a:r>
+            <a:r>
+              <a:rPr lang="en-US" sz="1200" b="1" i="0" dirty="0" err="1">
+                <a:solidFill>
+                  <a:srgbClr val="0070C0"/>
+                </a:solidFill>
+                <a:effectLst/>
+                <a:latin typeface="Consolas" panose="020B0609020204030204" pitchFamily="49" charset="0"/>
+              </a:rPr>
+              <a:t>rename</a:t>
+            </a:r>
+            <a:r>
+              <a:rPr lang="en-US" sz="1200" b="1" i="0" dirty="0">
+                <a:solidFill>
+                  <a:srgbClr val="0070C0"/>
+                </a:solidFill>
+                <a:effectLst/>
+                <a:latin typeface="Consolas" panose="020B0609020204030204" pitchFamily="49" charset="0"/>
+              </a:rPr>
+              <a:t>(columns=lambda x: x + 1) </a:t>
+            </a:r>
+            <a:r>
+              <a:rPr lang="en-US" sz="1200" b="0" i="0" dirty="0">
+                <a:effectLst/>
+              </a:rPr>
+              <a:t>| Mass renaming of columns</a:t>
+            </a:r>
+          </a:p>
+          <a:p>
+            <a:pPr>
+              <a:lnSpc>
+                <a:spcPct val="200000"/>
+              </a:lnSpc>
+            </a:pPr>
+            <a:r>
+              <a:rPr lang="en-US" sz="1200" b="1" i="0" dirty="0" err="1">
+                <a:effectLst/>
+                <a:latin typeface="Consolas" panose="020B0609020204030204" pitchFamily="49" charset="0"/>
+              </a:rPr>
+              <a:t>df.</a:t>
+            </a:r>
+            <a:r>
+              <a:rPr lang="en-US" sz="1200" b="1" i="0" dirty="0" err="1">
+                <a:solidFill>
+                  <a:srgbClr val="0070C0"/>
+                </a:solidFill>
+                <a:effectLst/>
+                <a:latin typeface="Consolas" panose="020B0609020204030204" pitchFamily="49" charset="0"/>
+              </a:rPr>
+              <a:t>rename</a:t>
+            </a:r>
+            <a:r>
+              <a:rPr lang="en-US" sz="1200" b="1" i="0" dirty="0">
+                <a:solidFill>
+                  <a:srgbClr val="0070C0"/>
+                </a:solidFill>
+                <a:effectLst/>
+                <a:latin typeface="Consolas" panose="020B0609020204030204" pitchFamily="49" charset="0"/>
+              </a:rPr>
+              <a:t>(columns={'</a:t>
+            </a:r>
+            <a:r>
+              <a:rPr lang="en-US" sz="1200" b="1" i="0" dirty="0" err="1">
+                <a:solidFill>
+                  <a:srgbClr val="0070C0"/>
+                </a:solidFill>
+                <a:effectLst/>
+                <a:latin typeface="Consolas" panose="020B0609020204030204" pitchFamily="49" charset="0"/>
+              </a:rPr>
+              <a:t>old_name</a:t>
+            </a:r>
+            <a:r>
+              <a:rPr lang="en-US" sz="1200" b="1" i="0" dirty="0">
+                <a:solidFill>
+                  <a:srgbClr val="0070C0"/>
+                </a:solidFill>
+                <a:effectLst/>
+                <a:latin typeface="Consolas" panose="020B0609020204030204" pitchFamily="49" charset="0"/>
+              </a:rPr>
+              <a:t>': 'new_ name'}) </a:t>
+            </a:r>
+            <a:r>
+              <a:rPr lang="en-US" sz="1200" b="0" i="0" dirty="0">
+                <a:effectLst/>
+              </a:rPr>
+              <a:t>| Selective renaming</a:t>
+            </a:r>
+          </a:p>
+          <a:p>
+            <a:pPr>
+              <a:lnSpc>
+                <a:spcPct val="200000"/>
+              </a:lnSpc>
+            </a:pPr>
+            <a:r>
+              <a:rPr lang="en-US" sz="1200" b="1" i="0" dirty="0" err="1">
+                <a:effectLst/>
+                <a:latin typeface="Consolas" panose="020B0609020204030204" pitchFamily="49" charset="0"/>
+              </a:rPr>
+              <a:t>df.</a:t>
+            </a:r>
+            <a:r>
+              <a:rPr lang="en-US" sz="1200" b="1" i="0" dirty="0" err="1">
+                <a:solidFill>
+                  <a:srgbClr val="0070C0"/>
+                </a:solidFill>
+                <a:effectLst/>
+                <a:latin typeface="Consolas" panose="020B0609020204030204" pitchFamily="49" charset="0"/>
+              </a:rPr>
+              <a:t>set_index</a:t>
+            </a:r>
+            <a:r>
+              <a:rPr lang="en-US" sz="1200" b="1" i="0" dirty="0">
+                <a:solidFill>
+                  <a:srgbClr val="0070C0"/>
+                </a:solidFill>
+                <a:effectLst/>
+                <a:latin typeface="Consolas" panose="020B0609020204030204" pitchFamily="49" charset="0"/>
+              </a:rPr>
+              <a:t>('</a:t>
+            </a:r>
+            <a:r>
+              <a:rPr lang="en-US" sz="1200" b="1" i="0" dirty="0" err="1">
+                <a:solidFill>
+                  <a:srgbClr val="0070C0"/>
+                </a:solidFill>
+                <a:effectLst/>
+                <a:latin typeface="Consolas" panose="020B0609020204030204" pitchFamily="49" charset="0"/>
+              </a:rPr>
+              <a:t>column_one</a:t>
+            </a:r>
+            <a:r>
+              <a:rPr lang="en-US" sz="1200" b="1" i="0" dirty="0">
+                <a:solidFill>
+                  <a:srgbClr val="0070C0"/>
+                </a:solidFill>
+                <a:effectLst/>
+                <a:latin typeface="Consolas" panose="020B0609020204030204" pitchFamily="49" charset="0"/>
+              </a:rPr>
+              <a:t>') </a:t>
+            </a:r>
+            <a:r>
+              <a:rPr lang="en-US" sz="1200" b="0" i="0" dirty="0">
+                <a:effectLst/>
+              </a:rPr>
+              <a:t>| Change the index</a:t>
+            </a:r>
+          </a:p>
+          <a:p>
+            <a:pPr>
+              <a:lnSpc>
+                <a:spcPct val="200000"/>
+              </a:lnSpc>
+            </a:pPr>
+            <a:r>
+              <a:rPr lang="en-US" sz="1200" b="1" i="0" dirty="0" err="1">
+                <a:effectLst/>
+                <a:latin typeface="Consolas" panose="020B0609020204030204" pitchFamily="49" charset="0"/>
+              </a:rPr>
+              <a:t>df.</a:t>
+            </a:r>
+            <a:r>
+              <a:rPr lang="en-US" sz="1200" b="1" i="0" dirty="0" err="1">
+                <a:solidFill>
+                  <a:srgbClr val="0070C0"/>
+                </a:solidFill>
+                <a:effectLst/>
+                <a:latin typeface="Consolas" panose="020B0609020204030204" pitchFamily="49" charset="0"/>
+              </a:rPr>
+              <a:t>rename</a:t>
+            </a:r>
+            <a:r>
+              <a:rPr lang="en-US" sz="1200" b="1" i="0" dirty="0">
+                <a:solidFill>
+                  <a:srgbClr val="0070C0"/>
+                </a:solidFill>
+                <a:effectLst/>
+                <a:latin typeface="Consolas" panose="020B0609020204030204" pitchFamily="49" charset="0"/>
+              </a:rPr>
+              <a:t>(index=lambda x: x + 1) </a:t>
+            </a:r>
+            <a:r>
+              <a:rPr lang="en-US" sz="1200" b="0" i="0" dirty="0">
+                <a:effectLst/>
+              </a:rPr>
+              <a:t>| Mass renaming of index</a:t>
+            </a:r>
+            <a:endParaRPr lang="en-US" sz="1200" b="1" dirty="0"/>
+          </a:p>
+        </p:txBody>
+      </p:sp>
+      <p:sp>
+        <p:nvSpPr>
+          <p:cNvPr id="85" name="TextBox 84">
+            <a:extLst>
+              <a:ext uri="{FF2B5EF4-FFF2-40B4-BE49-F238E27FC236}">
+                <a16:creationId xmlns:a16="http://schemas.microsoft.com/office/drawing/2014/main" id="{228F649B-F765-4F7A-AE8A-55FD3CC48C75}"/>
+              </a:ext>
+            </a:extLst>
+          </p:cNvPr>
+          <p:cNvSpPr txBox="1"/>
+          <p:nvPr/>
+        </p:nvSpPr>
+        <p:spPr>
+          <a:xfrm>
+            <a:off x="233569" y="5713183"/>
+            <a:ext cx="4377986" cy="617733"/>
+          </a:xfrm>
+          <a:prstGeom prst="rect">
+            <a:avLst/>
+          </a:prstGeom>
+          <a:solidFill>
+            <a:schemeClr val="accent1">
+              <a:lumMod val="20000"/>
+              <a:lumOff val="80000"/>
+            </a:schemeClr>
+          </a:solidFill>
+        </p:spPr>
+        <p:txBody>
+          <a:bodyPr wrap="square" rtlCol="0">
+            <a:spAutoFit/>
+          </a:bodyPr>
+          <a:lstStyle/>
+          <a:p>
+            <a:pPr>
+              <a:lnSpc>
+                <a:spcPct val="150000"/>
+              </a:lnSpc>
+            </a:pPr>
+            <a:r>
+              <a:rPr lang="en-US" sz="1200" b="0" i="0" dirty="0">
+                <a:effectLst/>
+                <a:ea typeface="Yu Mincho Light" panose="020B0400000000000000" pitchFamily="18" charset="-128"/>
+              </a:rPr>
+              <a:t>Use these commands to perform various </a:t>
+            </a:r>
+            <a:r>
+              <a:rPr lang="en-US" sz="1200" b="1" i="0" u="sng" dirty="0">
+                <a:solidFill>
+                  <a:srgbClr val="0070C0"/>
+                </a:solidFill>
+                <a:effectLst/>
+                <a:ea typeface="Yu Mincho Light" panose="020B0400000000000000" pitchFamily="18" charset="-128"/>
+              </a:rPr>
+              <a:t>statistical tests</a:t>
+            </a:r>
+            <a:r>
+              <a:rPr lang="en-US" sz="1200" b="0" i="0" dirty="0">
+                <a:effectLst/>
+                <a:ea typeface="Yu Mincho Light" panose="020B0400000000000000" pitchFamily="18" charset="-128"/>
+              </a:rPr>
+              <a:t>. (These can all be applied to a series as well.)</a:t>
+            </a:r>
+            <a:endParaRPr lang="en-US" sz="1200" dirty="0">
+              <a:ea typeface="Yu Mincho Light" panose="020B0400000000000000" pitchFamily="18" charset="-128"/>
+            </a:endParaRPr>
+          </a:p>
+        </p:txBody>
+      </p:sp>
+      <p:sp>
+        <p:nvSpPr>
+          <p:cNvPr id="89" name="TextBox 88">
+            <a:extLst>
+              <a:ext uri="{FF2B5EF4-FFF2-40B4-BE49-F238E27FC236}">
+                <a16:creationId xmlns:a16="http://schemas.microsoft.com/office/drawing/2014/main" id="{2AAE598A-335D-46E7-8A31-7480E9AE83C1}"/>
+              </a:ext>
+            </a:extLst>
+          </p:cNvPr>
+          <p:cNvSpPr txBox="1"/>
+          <p:nvPr/>
+        </p:nvSpPr>
+        <p:spPr>
+          <a:xfrm>
+            <a:off x="273775" y="6574156"/>
+            <a:ext cx="4377986" cy="3970318"/>
+          </a:xfrm>
+          <a:prstGeom prst="rect">
+            <a:avLst/>
+          </a:prstGeom>
+          <a:solidFill>
+            <a:schemeClr val="accent1">
+              <a:lumMod val="20000"/>
+              <a:lumOff val="80000"/>
+            </a:schemeClr>
+          </a:solidFill>
+        </p:spPr>
+        <p:txBody>
+          <a:bodyPr wrap="square" rtlCol="0">
+            <a:spAutoFit/>
+          </a:bodyPr>
+          <a:lstStyle/>
+          <a:p>
+            <a:pPr>
+              <a:lnSpc>
+                <a:spcPct val="200000"/>
+              </a:lnSpc>
+            </a:pPr>
+            <a:r>
+              <a:rPr lang="en-US" sz="1200" b="1" dirty="0" err="1">
+                <a:latin typeface="Consolas" panose="020B0609020204030204" pitchFamily="49" charset="0"/>
+              </a:rPr>
+              <a:t>df.</a:t>
+            </a:r>
+            <a:r>
+              <a:rPr lang="en-US" sz="1200" b="1" u="sng" dirty="0" err="1">
+                <a:solidFill>
+                  <a:srgbClr val="0070C0"/>
+                </a:solidFill>
+                <a:latin typeface="Consolas" panose="020B0609020204030204" pitchFamily="49" charset="0"/>
+              </a:rPr>
+              <a:t>describe</a:t>
+            </a:r>
+            <a:r>
+              <a:rPr lang="en-US" sz="1200" b="1" u="sng" dirty="0">
+                <a:solidFill>
+                  <a:srgbClr val="0070C0"/>
+                </a:solidFill>
+                <a:latin typeface="Consolas" panose="020B0609020204030204" pitchFamily="49" charset="0"/>
+              </a:rPr>
+              <a:t>()</a:t>
+            </a:r>
+            <a:r>
+              <a:rPr lang="en-US" sz="1200" b="1" dirty="0">
+                <a:solidFill>
+                  <a:srgbClr val="0070C0"/>
+                </a:solidFill>
+                <a:latin typeface="Consolas" panose="020B0609020204030204" pitchFamily="49" charset="0"/>
+              </a:rPr>
+              <a:t>	</a:t>
+            </a:r>
+            <a:r>
+              <a:rPr lang="en-US" sz="1200" dirty="0"/>
+              <a:t>| Summary statistics for numerical columns</a:t>
+            </a:r>
+          </a:p>
+          <a:p>
+            <a:pPr>
+              <a:lnSpc>
+                <a:spcPct val="200000"/>
+              </a:lnSpc>
+            </a:pPr>
+            <a:r>
+              <a:rPr lang="en-US" sz="1200" b="1" dirty="0" err="1">
+                <a:latin typeface="Consolas" panose="020B0609020204030204" pitchFamily="49" charset="0"/>
+              </a:rPr>
+              <a:t>df.</a:t>
+            </a:r>
+            <a:r>
+              <a:rPr lang="en-US" sz="1200" b="1" u="sng" dirty="0" err="1">
+                <a:solidFill>
+                  <a:srgbClr val="0070C0"/>
+                </a:solidFill>
+                <a:latin typeface="Consolas" panose="020B0609020204030204" pitchFamily="49" charset="0"/>
+              </a:rPr>
+              <a:t>mean</a:t>
+            </a:r>
+            <a:r>
+              <a:rPr lang="en-US" sz="1200" b="1" u="sng" dirty="0">
+                <a:solidFill>
+                  <a:srgbClr val="0070C0"/>
+                </a:solidFill>
+                <a:latin typeface="Consolas" panose="020B0609020204030204" pitchFamily="49" charset="0"/>
+              </a:rPr>
+              <a:t>()</a:t>
+            </a:r>
+            <a:r>
+              <a:rPr lang="en-US" sz="1200" b="1" dirty="0">
+                <a:solidFill>
+                  <a:srgbClr val="0070C0"/>
+                </a:solidFill>
+                <a:latin typeface="Consolas" panose="020B0609020204030204" pitchFamily="49" charset="0"/>
+              </a:rPr>
+              <a:t> </a:t>
+            </a:r>
+            <a:r>
+              <a:rPr lang="en-US" sz="1200" dirty="0"/>
+              <a:t>| Returns the mean of all columns</a:t>
+            </a:r>
+          </a:p>
+          <a:p>
+            <a:pPr>
+              <a:lnSpc>
+                <a:spcPct val="200000"/>
+              </a:lnSpc>
+            </a:pPr>
+            <a:r>
+              <a:rPr lang="en-US" sz="1200" b="1" dirty="0" err="1">
+                <a:latin typeface="Consolas" panose="020B0609020204030204" pitchFamily="49" charset="0"/>
+              </a:rPr>
+              <a:t>df.</a:t>
+            </a:r>
+            <a:r>
+              <a:rPr lang="en-US" sz="1200" b="1" u="sng" dirty="0" err="1">
+                <a:solidFill>
+                  <a:srgbClr val="0070C0"/>
+                </a:solidFill>
+                <a:latin typeface="Consolas" panose="020B0609020204030204" pitchFamily="49" charset="0"/>
+              </a:rPr>
+              <a:t>corr</a:t>
+            </a:r>
+            <a:r>
+              <a:rPr lang="en-US" sz="1200" b="1" u="sng" dirty="0">
+                <a:solidFill>
+                  <a:srgbClr val="0070C0"/>
+                </a:solidFill>
+                <a:latin typeface="Consolas" panose="020B0609020204030204" pitchFamily="49" charset="0"/>
+              </a:rPr>
+              <a:t>()</a:t>
+            </a:r>
+            <a:r>
+              <a:rPr lang="en-US" sz="1200" b="1" dirty="0">
+                <a:solidFill>
+                  <a:srgbClr val="0070C0"/>
+                </a:solidFill>
+                <a:latin typeface="Consolas" panose="020B0609020204030204" pitchFamily="49" charset="0"/>
+              </a:rPr>
+              <a:t> </a:t>
+            </a:r>
+            <a:r>
+              <a:rPr lang="en-US" sz="1200" dirty="0"/>
+              <a:t>| Returns the correlation between columns in a </a:t>
+            </a:r>
+            <a:r>
+              <a:rPr lang="en-US" sz="1200" dirty="0" err="1"/>
+              <a:t>DataFrame</a:t>
+            </a:r>
+            <a:endParaRPr lang="en-US" sz="1200" dirty="0"/>
+          </a:p>
+          <a:p>
+            <a:pPr>
+              <a:lnSpc>
+                <a:spcPct val="200000"/>
+              </a:lnSpc>
+            </a:pPr>
+            <a:r>
+              <a:rPr lang="en-US" sz="1200" b="1" dirty="0" err="1">
+                <a:latin typeface="Consolas" panose="020B0609020204030204" pitchFamily="49" charset="0"/>
+              </a:rPr>
+              <a:t>df.</a:t>
+            </a:r>
+            <a:r>
+              <a:rPr lang="en-US" sz="1200" b="1" u="sng" dirty="0" err="1">
+                <a:solidFill>
+                  <a:srgbClr val="0070C0"/>
+                </a:solidFill>
+                <a:latin typeface="Consolas" panose="020B0609020204030204" pitchFamily="49" charset="0"/>
+              </a:rPr>
+              <a:t>count</a:t>
+            </a:r>
+            <a:r>
+              <a:rPr lang="en-US" sz="1200" b="1" u="sng" dirty="0">
+                <a:solidFill>
+                  <a:srgbClr val="0070C0"/>
+                </a:solidFill>
+                <a:latin typeface="Consolas" panose="020B0609020204030204" pitchFamily="49" charset="0"/>
+              </a:rPr>
+              <a:t>()</a:t>
+            </a:r>
+            <a:r>
+              <a:rPr lang="en-US" sz="1200" b="1" dirty="0">
+                <a:solidFill>
+                  <a:srgbClr val="0070C0"/>
+                </a:solidFill>
+                <a:latin typeface="Consolas" panose="020B0609020204030204" pitchFamily="49" charset="0"/>
+              </a:rPr>
+              <a:t> </a:t>
+            </a:r>
+            <a:r>
+              <a:rPr lang="en-US" sz="1200" dirty="0"/>
+              <a:t>| Returns the number of non-null values in each </a:t>
+            </a:r>
+            <a:r>
+              <a:rPr lang="en-US" sz="1200" dirty="0" err="1"/>
+              <a:t>DataFrame</a:t>
+            </a:r>
+            <a:r>
+              <a:rPr lang="en-US" sz="1200" dirty="0"/>
+              <a:t> column</a:t>
+            </a:r>
+          </a:p>
+          <a:p>
+            <a:pPr>
+              <a:lnSpc>
+                <a:spcPct val="200000"/>
+              </a:lnSpc>
+            </a:pPr>
+            <a:r>
+              <a:rPr lang="en-US" sz="1200" b="1" dirty="0" err="1">
+                <a:latin typeface="Consolas" panose="020B0609020204030204" pitchFamily="49" charset="0"/>
+              </a:rPr>
+              <a:t>df.</a:t>
+            </a:r>
+            <a:r>
+              <a:rPr lang="en-US" sz="1200" b="1" u="sng" dirty="0" err="1">
+                <a:solidFill>
+                  <a:srgbClr val="0070C0"/>
+                </a:solidFill>
+                <a:latin typeface="Consolas" panose="020B0609020204030204" pitchFamily="49" charset="0"/>
+              </a:rPr>
+              <a:t>max</a:t>
+            </a:r>
+            <a:r>
+              <a:rPr lang="en-US" sz="1200" b="1" u="sng" dirty="0">
+                <a:solidFill>
+                  <a:srgbClr val="0070C0"/>
+                </a:solidFill>
+                <a:latin typeface="Consolas" panose="020B0609020204030204" pitchFamily="49" charset="0"/>
+              </a:rPr>
+              <a:t>()</a:t>
+            </a:r>
+            <a:r>
+              <a:rPr lang="en-US" sz="1200" b="1" dirty="0">
+                <a:solidFill>
+                  <a:srgbClr val="0070C0"/>
+                </a:solidFill>
+                <a:latin typeface="Consolas" panose="020B0609020204030204" pitchFamily="49" charset="0"/>
+              </a:rPr>
+              <a:t> </a:t>
+            </a:r>
+            <a:r>
+              <a:rPr lang="en-US" sz="1200" dirty="0"/>
+              <a:t>| Returns the highest value in each column</a:t>
+            </a:r>
+          </a:p>
+          <a:p>
+            <a:pPr>
+              <a:lnSpc>
+                <a:spcPct val="200000"/>
+              </a:lnSpc>
+            </a:pPr>
+            <a:r>
+              <a:rPr lang="en-US" sz="1200" b="1" dirty="0" err="1">
+                <a:latin typeface="Consolas" panose="020B0609020204030204" pitchFamily="49" charset="0"/>
+              </a:rPr>
+              <a:t>df.</a:t>
+            </a:r>
+            <a:r>
+              <a:rPr lang="en-US" sz="1200" b="1" u="sng" dirty="0" err="1">
+                <a:solidFill>
+                  <a:srgbClr val="0070C0"/>
+                </a:solidFill>
+                <a:latin typeface="Consolas" panose="020B0609020204030204" pitchFamily="49" charset="0"/>
+              </a:rPr>
+              <a:t>min</a:t>
+            </a:r>
+            <a:r>
+              <a:rPr lang="en-US" sz="1200" b="1" u="sng" dirty="0">
+                <a:solidFill>
+                  <a:srgbClr val="0070C0"/>
+                </a:solidFill>
+                <a:latin typeface="Consolas" panose="020B0609020204030204" pitchFamily="49" charset="0"/>
+              </a:rPr>
+              <a:t>()</a:t>
+            </a:r>
+            <a:r>
+              <a:rPr lang="en-US" sz="1200" b="1" dirty="0">
+                <a:solidFill>
+                  <a:srgbClr val="0070C0"/>
+                </a:solidFill>
+                <a:latin typeface="Consolas" panose="020B0609020204030204" pitchFamily="49" charset="0"/>
+              </a:rPr>
+              <a:t> </a:t>
+            </a:r>
+            <a:r>
+              <a:rPr lang="en-US" sz="1200" dirty="0"/>
+              <a:t>| Returns the lowest value in each column</a:t>
+            </a:r>
+          </a:p>
+          <a:p>
+            <a:pPr>
+              <a:lnSpc>
+                <a:spcPct val="200000"/>
+              </a:lnSpc>
+            </a:pPr>
+            <a:r>
+              <a:rPr lang="en-US" sz="1200" b="1" dirty="0" err="1">
+                <a:latin typeface="Consolas" panose="020B0609020204030204" pitchFamily="49" charset="0"/>
+              </a:rPr>
+              <a:t>df.</a:t>
+            </a:r>
+            <a:r>
+              <a:rPr lang="en-US" sz="1200" b="1" u="sng" dirty="0" err="1">
+                <a:solidFill>
+                  <a:srgbClr val="0070C0"/>
+                </a:solidFill>
+                <a:latin typeface="Consolas" panose="020B0609020204030204" pitchFamily="49" charset="0"/>
+              </a:rPr>
+              <a:t>median</a:t>
+            </a:r>
+            <a:r>
+              <a:rPr lang="en-US" sz="1200" b="1" u="sng" dirty="0">
+                <a:solidFill>
+                  <a:srgbClr val="0070C0"/>
+                </a:solidFill>
+                <a:latin typeface="Consolas" panose="020B0609020204030204" pitchFamily="49" charset="0"/>
+              </a:rPr>
+              <a:t>()</a:t>
+            </a:r>
+            <a:r>
+              <a:rPr lang="en-US" sz="1200" b="1" dirty="0">
+                <a:solidFill>
+                  <a:srgbClr val="0070C0"/>
+                </a:solidFill>
+                <a:latin typeface="Consolas" panose="020B0609020204030204" pitchFamily="49" charset="0"/>
+              </a:rPr>
+              <a:t> </a:t>
+            </a:r>
+            <a:r>
+              <a:rPr lang="en-US" sz="1200" dirty="0"/>
+              <a:t>| Returns the median of each column</a:t>
+            </a:r>
+          </a:p>
+          <a:p>
+            <a:pPr>
+              <a:lnSpc>
+                <a:spcPct val="200000"/>
+              </a:lnSpc>
+            </a:pPr>
+            <a:r>
+              <a:rPr lang="en-US" sz="1200" b="1" dirty="0" err="1">
+                <a:latin typeface="Consolas" panose="020B0609020204030204" pitchFamily="49" charset="0"/>
+              </a:rPr>
+              <a:t>df.</a:t>
+            </a:r>
+            <a:r>
+              <a:rPr lang="en-US" sz="1200" b="1" u="sng" dirty="0" err="1">
+                <a:solidFill>
+                  <a:srgbClr val="0070C0"/>
+                </a:solidFill>
+                <a:latin typeface="Consolas" panose="020B0609020204030204" pitchFamily="49" charset="0"/>
+              </a:rPr>
+              <a:t>std</a:t>
+            </a:r>
+            <a:r>
+              <a:rPr lang="en-US" sz="1200" b="1" u="sng" dirty="0">
+                <a:solidFill>
+                  <a:srgbClr val="0070C0"/>
+                </a:solidFill>
+                <a:latin typeface="Consolas" panose="020B0609020204030204" pitchFamily="49" charset="0"/>
+              </a:rPr>
+              <a:t>()</a:t>
+            </a:r>
+            <a:r>
+              <a:rPr lang="en-US" sz="1200" b="1" dirty="0">
+                <a:solidFill>
+                  <a:srgbClr val="0070C0"/>
+                </a:solidFill>
+                <a:latin typeface="Consolas" panose="020B0609020204030204" pitchFamily="49" charset="0"/>
+              </a:rPr>
+              <a:t> </a:t>
+            </a:r>
+            <a:r>
+              <a:rPr lang="en-US" sz="1200" dirty="0"/>
+              <a:t>| Returns the standard deviation of each column</a:t>
+            </a:r>
+          </a:p>
+          <a:p>
+            <a:endParaRPr lang="en-US" sz="1200" dirty="0"/>
+          </a:p>
+        </p:txBody>
+      </p:sp>
+      <p:graphicFrame>
+        <p:nvGraphicFramePr>
+          <p:cNvPr id="90" name="Table 89">
+            <a:extLst>
+              <a:ext uri="{FF2B5EF4-FFF2-40B4-BE49-F238E27FC236}">
+                <a16:creationId xmlns:a16="http://schemas.microsoft.com/office/drawing/2014/main" id="{E1EB5B3C-5E6F-4B3B-808C-E4EDA5267C6C}"/>
+              </a:ext>
+            </a:extLst>
+          </p:cNvPr>
+          <p:cNvGraphicFramePr>
+            <a:graphicFrameLocks noGrp="1"/>
+          </p:cNvGraphicFramePr>
+          <p:nvPr>
+            <p:extLst>
+              <p:ext uri="{D42A27DB-BD31-4B8C-83A1-F6EECF244321}">
+                <p14:modId xmlns:p14="http://schemas.microsoft.com/office/powerpoint/2010/main" val="529465521"/>
+              </p:ext>
+            </p:extLst>
+          </p:nvPr>
+        </p:nvGraphicFramePr>
+        <p:xfrm>
+          <a:off x="9855589" y="1102512"/>
+          <a:ext cx="1097280" cy="548640"/>
+        </p:xfrm>
+        <a:graphic>
+          <a:graphicData uri="http://schemas.openxmlformats.org/drawingml/2006/table">
+            <a:tbl>
+              <a:tblPr bandRow="1">
+                <a:tableStyleId>{5C22544A-7EE6-4342-B048-85BDC9FD1C3A}</a:tableStyleId>
+              </a:tblPr>
+              <a:tblGrid>
+                <a:gridCol w="274320">
+                  <a:extLst>
+                    <a:ext uri="{9D8B030D-6E8A-4147-A177-3AD203B41FA5}">
+                      <a16:colId xmlns:a16="http://schemas.microsoft.com/office/drawing/2014/main" val="20000"/>
+                    </a:ext>
+                  </a:extLst>
+                </a:gridCol>
+                <a:gridCol w="274320">
+                  <a:extLst>
+                    <a:ext uri="{9D8B030D-6E8A-4147-A177-3AD203B41FA5}">
+                      <a16:colId xmlns:a16="http://schemas.microsoft.com/office/drawing/2014/main" val="20001"/>
+                    </a:ext>
+                  </a:extLst>
+                </a:gridCol>
+                <a:gridCol w="274320">
+                  <a:extLst>
+                    <a:ext uri="{9D8B030D-6E8A-4147-A177-3AD203B41FA5}">
+                      <a16:colId xmlns:a16="http://schemas.microsoft.com/office/drawing/2014/main" val="20002"/>
+                    </a:ext>
+                  </a:extLst>
+                </a:gridCol>
+                <a:gridCol w="274320">
+                  <a:extLst>
+                    <a:ext uri="{9D8B030D-6E8A-4147-A177-3AD203B41FA5}">
+                      <a16:colId xmlns:a16="http://schemas.microsoft.com/office/drawing/2014/main" val="20003"/>
+                    </a:ext>
+                  </a:extLst>
+                </a:gridCol>
+              </a:tblGrid>
+              <a:tr h="137160">
+                <a:tc>
+                  <a:txBody>
+                    <a:bodyPr/>
+                    <a:lstStyle/>
+                    <a:p>
+                      <a:endParaRPr lang="en-US" sz="300" dirty="0"/>
+                    </a:p>
+                  </a:txBody>
+                  <a:tcPr marL="0" marR="0" marT="0" marB="0">
+                    <a:solidFill>
+                      <a:schemeClr val="bg2">
+                        <a:lumMod val="75000"/>
+                      </a:schemeClr>
+                    </a:solidFill>
+                  </a:tcPr>
+                </a:tc>
+                <a:tc>
+                  <a:txBody>
+                    <a:bodyPr/>
+                    <a:lstStyle/>
+                    <a:p>
+                      <a:endParaRPr lang="en-US" sz="300" dirty="0"/>
+                    </a:p>
+                  </a:txBody>
+                  <a:tcPr marL="0" marR="0" marT="0" marB="0">
+                    <a:solidFill>
+                      <a:schemeClr val="accent6"/>
+                    </a:solidFill>
+                  </a:tcPr>
+                </a:tc>
+                <a:tc>
+                  <a:txBody>
+                    <a:bodyPr/>
+                    <a:lstStyle/>
+                    <a:p>
+                      <a:endParaRPr lang="en-US" sz="300" dirty="0"/>
+                    </a:p>
+                  </a:txBody>
+                  <a:tcPr marL="0" marR="0" marT="0" marB="0">
+                    <a:solidFill>
+                      <a:schemeClr val="accent2"/>
+                    </a:solidFill>
+                  </a:tcPr>
+                </a:tc>
+                <a:tc>
+                  <a:txBody>
+                    <a:bodyPr/>
+                    <a:lstStyle/>
+                    <a:p>
+                      <a:endParaRPr lang="en-US" sz="300" dirty="0"/>
+                    </a:p>
+                  </a:txBody>
+                  <a:tcPr marL="0" marR="0" marT="0" marB="0">
+                    <a:solidFill>
+                      <a:schemeClr val="accent5"/>
+                    </a:solidFill>
+                  </a:tcPr>
+                </a:tc>
+                <a:extLst>
+                  <a:ext uri="{0D108BD9-81ED-4DB2-BD59-A6C34878D82A}">
+                    <a16:rowId xmlns:a16="http://schemas.microsoft.com/office/drawing/2014/main" val="10000"/>
+                  </a:ext>
+                </a:extLst>
+              </a:tr>
+              <a:tr h="137160">
+                <a:tc>
+                  <a:txBody>
+                    <a:bodyPr/>
+                    <a:lstStyle/>
+                    <a:p>
+                      <a:endParaRPr lang="en-US" sz="300" dirty="0"/>
+                    </a:p>
+                  </a:txBody>
+                  <a:tcPr marL="0" marR="0" marT="0" marB="0">
+                    <a:solidFill>
+                      <a:schemeClr val="bg2"/>
+                    </a:solidFill>
+                  </a:tcPr>
+                </a:tc>
+                <a:tc>
+                  <a:txBody>
+                    <a:bodyPr/>
+                    <a:lstStyle/>
+                    <a:p>
+                      <a:endParaRPr lang="en-US" sz="300" dirty="0"/>
+                    </a:p>
+                  </a:txBody>
+                  <a:tcPr marL="0" marR="0" marT="0" marB="0">
+                    <a:solidFill>
+                      <a:schemeClr val="accent6">
+                        <a:lumMod val="40000"/>
+                        <a:lumOff val="60000"/>
+                      </a:schemeClr>
+                    </a:solidFill>
+                  </a:tcPr>
+                </a:tc>
+                <a:tc>
+                  <a:txBody>
+                    <a:bodyPr/>
+                    <a:lstStyle/>
+                    <a:p>
+                      <a:endParaRPr lang="en-US" sz="300" dirty="0"/>
+                    </a:p>
+                  </a:txBody>
+                  <a:tcPr marL="0" marR="0" marT="0" marB="0">
+                    <a:solidFill>
+                      <a:schemeClr val="accent2">
+                        <a:lumMod val="40000"/>
+                        <a:lumOff val="60000"/>
+                      </a:schemeClr>
+                    </a:solidFill>
+                  </a:tcPr>
+                </a:tc>
+                <a:tc>
+                  <a:txBody>
+                    <a:bodyPr/>
+                    <a:lstStyle/>
+                    <a:p>
+                      <a:endParaRPr lang="en-US" sz="300" dirty="0"/>
+                    </a:p>
+                  </a:txBody>
+                  <a:tcPr marL="0" marR="0" marT="0" marB="0">
+                    <a:solidFill>
+                      <a:schemeClr val="accent1">
+                        <a:lumMod val="40000"/>
+                        <a:lumOff val="60000"/>
+                      </a:schemeClr>
+                    </a:solidFill>
+                  </a:tcPr>
+                </a:tc>
+                <a:extLst>
+                  <a:ext uri="{0D108BD9-81ED-4DB2-BD59-A6C34878D82A}">
+                    <a16:rowId xmlns:a16="http://schemas.microsoft.com/office/drawing/2014/main" val="10001"/>
+                  </a:ext>
+                </a:extLst>
+              </a:tr>
+              <a:tr h="137160">
+                <a:tc>
+                  <a:txBody>
+                    <a:bodyPr/>
+                    <a:lstStyle/>
+                    <a:p>
+                      <a:endParaRPr lang="en-US" sz="300" dirty="0"/>
+                    </a:p>
+                  </a:txBody>
+                  <a:tcPr marL="0" marR="0" marT="0" marB="0">
+                    <a:solidFill>
+                      <a:schemeClr val="bg2"/>
+                    </a:solidFill>
+                  </a:tcPr>
+                </a:tc>
+                <a:tc>
+                  <a:txBody>
+                    <a:bodyPr/>
+                    <a:lstStyle/>
+                    <a:p>
+                      <a:endParaRPr lang="en-US" sz="300" dirty="0"/>
+                    </a:p>
+                  </a:txBody>
+                  <a:tcPr marL="0" marR="0" marT="0" marB="0">
+                    <a:solidFill>
+                      <a:schemeClr val="accent6">
+                        <a:lumMod val="40000"/>
+                        <a:lumOff val="60000"/>
+                      </a:schemeClr>
+                    </a:solidFill>
+                  </a:tcPr>
+                </a:tc>
+                <a:tc>
+                  <a:txBody>
+                    <a:bodyPr/>
+                    <a:lstStyle/>
+                    <a:p>
+                      <a:endParaRPr lang="en-US" sz="300" dirty="0"/>
+                    </a:p>
+                  </a:txBody>
+                  <a:tcPr marL="0" marR="0" marT="0" marB="0">
+                    <a:solidFill>
+                      <a:schemeClr val="accent2">
+                        <a:lumMod val="40000"/>
+                        <a:lumOff val="60000"/>
+                      </a:schemeClr>
+                    </a:solidFill>
+                  </a:tcPr>
+                </a:tc>
+                <a:tc>
+                  <a:txBody>
+                    <a:bodyPr/>
+                    <a:lstStyle/>
+                    <a:p>
+                      <a:endParaRPr lang="en-US" sz="300" dirty="0"/>
+                    </a:p>
+                  </a:txBody>
+                  <a:tcPr marL="0" marR="0" marT="0" marB="0">
+                    <a:solidFill>
+                      <a:schemeClr val="accent1">
+                        <a:lumMod val="40000"/>
+                        <a:lumOff val="60000"/>
+                      </a:schemeClr>
+                    </a:solidFill>
+                  </a:tcPr>
+                </a:tc>
+                <a:extLst>
+                  <a:ext uri="{0D108BD9-81ED-4DB2-BD59-A6C34878D82A}">
+                    <a16:rowId xmlns:a16="http://schemas.microsoft.com/office/drawing/2014/main" val="10002"/>
+                  </a:ext>
+                </a:extLst>
+              </a:tr>
+              <a:tr h="137160">
+                <a:tc>
+                  <a:txBody>
+                    <a:bodyPr/>
+                    <a:lstStyle/>
+                    <a:p>
+                      <a:endParaRPr lang="en-US" sz="300" dirty="0"/>
+                    </a:p>
+                  </a:txBody>
+                  <a:tcPr marL="0" marR="0" marT="0" marB="0">
+                    <a:solidFill>
+                      <a:schemeClr val="bg2"/>
+                    </a:solidFill>
+                  </a:tcPr>
+                </a:tc>
+                <a:tc>
+                  <a:txBody>
+                    <a:bodyPr/>
+                    <a:lstStyle/>
+                    <a:p>
+                      <a:endParaRPr lang="en-US" sz="300" dirty="0"/>
+                    </a:p>
+                  </a:txBody>
+                  <a:tcPr marL="0" marR="0" marT="0" marB="0">
+                    <a:solidFill>
+                      <a:schemeClr val="accent6">
+                        <a:lumMod val="40000"/>
+                        <a:lumOff val="60000"/>
+                      </a:schemeClr>
+                    </a:solidFill>
+                  </a:tcPr>
+                </a:tc>
+                <a:tc>
+                  <a:txBody>
+                    <a:bodyPr/>
+                    <a:lstStyle/>
+                    <a:p>
+                      <a:endParaRPr lang="en-US" sz="300" dirty="0"/>
+                    </a:p>
+                  </a:txBody>
+                  <a:tcPr marL="0" marR="0" marT="0" marB="0">
+                    <a:solidFill>
+                      <a:schemeClr val="accent2">
+                        <a:lumMod val="40000"/>
+                        <a:lumOff val="60000"/>
+                      </a:schemeClr>
+                    </a:solidFill>
+                  </a:tcPr>
+                </a:tc>
+                <a:tc>
+                  <a:txBody>
+                    <a:bodyPr/>
+                    <a:lstStyle/>
+                    <a:p>
+                      <a:endParaRPr lang="en-US" sz="300" dirty="0"/>
+                    </a:p>
+                  </a:txBody>
+                  <a:tcPr marL="0" marR="0" marT="0" marB="0">
+                    <a:solidFill>
+                      <a:schemeClr val="accent1">
+                        <a:lumMod val="40000"/>
+                        <a:lumOff val="60000"/>
+                      </a:schemeClr>
+                    </a:solidFill>
+                  </a:tcPr>
+                </a:tc>
+                <a:extLst>
+                  <a:ext uri="{0D108BD9-81ED-4DB2-BD59-A6C34878D82A}">
+                    <a16:rowId xmlns:a16="http://schemas.microsoft.com/office/drawing/2014/main" val="10003"/>
+                  </a:ext>
+                </a:extLst>
+              </a:tr>
+            </a:tbl>
+          </a:graphicData>
+        </a:graphic>
+      </p:graphicFrame>
+      <p:graphicFrame>
+        <p:nvGraphicFramePr>
+          <p:cNvPr id="91" name="Table 90">
+            <a:extLst>
+              <a:ext uri="{FF2B5EF4-FFF2-40B4-BE49-F238E27FC236}">
+                <a16:creationId xmlns:a16="http://schemas.microsoft.com/office/drawing/2014/main" id="{CB809FB5-645F-4F9D-86F0-9985E92EC07E}"/>
+              </a:ext>
+            </a:extLst>
+          </p:cNvPr>
+          <p:cNvGraphicFramePr>
+            <a:graphicFrameLocks noGrp="1"/>
+          </p:cNvGraphicFramePr>
+          <p:nvPr>
+            <p:extLst>
+              <p:ext uri="{D42A27DB-BD31-4B8C-83A1-F6EECF244321}">
+                <p14:modId xmlns:p14="http://schemas.microsoft.com/office/powerpoint/2010/main" val="2223396775"/>
+              </p:ext>
+            </p:extLst>
+          </p:nvPr>
+        </p:nvGraphicFramePr>
+        <p:xfrm>
+          <a:off x="11633197" y="1082449"/>
+          <a:ext cx="548640" cy="548640"/>
+        </p:xfrm>
+        <a:graphic>
+          <a:graphicData uri="http://schemas.openxmlformats.org/drawingml/2006/table">
+            <a:tbl>
+              <a:tblPr bandRow="1">
+                <a:tableStyleId>{5C22544A-7EE6-4342-B048-85BDC9FD1C3A}</a:tableStyleId>
+              </a:tblPr>
+              <a:tblGrid>
+                <a:gridCol w="274320">
+                  <a:extLst>
+                    <a:ext uri="{9D8B030D-6E8A-4147-A177-3AD203B41FA5}">
+                      <a16:colId xmlns:a16="http://schemas.microsoft.com/office/drawing/2014/main" val="20000"/>
+                    </a:ext>
+                  </a:extLst>
+                </a:gridCol>
+                <a:gridCol w="274320">
+                  <a:extLst>
+                    <a:ext uri="{9D8B030D-6E8A-4147-A177-3AD203B41FA5}">
+                      <a16:colId xmlns:a16="http://schemas.microsoft.com/office/drawing/2014/main" val="20001"/>
+                    </a:ext>
+                  </a:extLst>
+                </a:gridCol>
+              </a:tblGrid>
+              <a:tr h="137160">
+                <a:tc>
+                  <a:txBody>
+                    <a:bodyPr/>
+                    <a:lstStyle/>
+                    <a:p>
+                      <a:endParaRPr lang="en-US" sz="300" dirty="0"/>
+                    </a:p>
+                  </a:txBody>
+                  <a:tcPr marL="0" marR="0" marT="0" marB="0">
+                    <a:solidFill>
+                      <a:schemeClr val="bg2">
+                        <a:lumMod val="75000"/>
+                      </a:schemeClr>
+                    </a:solidFill>
+                  </a:tcPr>
+                </a:tc>
+                <a:tc>
+                  <a:txBody>
+                    <a:bodyPr/>
+                    <a:lstStyle/>
+                    <a:p>
+                      <a:endParaRPr lang="en-US" sz="300" dirty="0"/>
+                    </a:p>
+                  </a:txBody>
+                  <a:tcPr marL="0" marR="0" marT="0" marB="0">
+                    <a:solidFill>
+                      <a:schemeClr val="accent4"/>
+                    </a:solidFill>
+                  </a:tcPr>
+                </a:tc>
+                <a:extLst>
+                  <a:ext uri="{0D108BD9-81ED-4DB2-BD59-A6C34878D82A}">
+                    <a16:rowId xmlns:a16="http://schemas.microsoft.com/office/drawing/2014/main" val="10000"/>
+                  </a:ext>
+                </a:extLst>
+              </a:tr>
+              <a:tr h="137160">
+                <a:tc>
+                  <a:txBody>
+                    <a:bodyPr/>
+                    <a:lstStyle/>
+                    <a:p>
+                      <a:endParaRPr lang="en-US" sz="300" dirty="0"/>
+                    </a:p>
+                  </a:txBody>
+                  <a:tcPr marL="0" marR="0" marT="0" marB="0">
+                    <a:solidFill>
+                      <a:schemeClr val="accent6"/>
+                    </a:solidFill>
+                  </a:tcPr>
+                </a:tc>
+                <a:tc>
+                  <a:txBody>
+                    <a:bodyPr/>
+                    <a:lstStyle/>
+                    <a:p>
+                      <a:endParaRPr lang="en-US" sz="300" dirty="0"/>
+                    </a:p>
+                  </a:txBody>
+                  <a:tcPr marL="0" marR="0" marT="0" marB="0">
+                    <a:solidFill>
+                      <a:schemeClr val="accent4">
+                        <a:lumMod val="40000"/>
+                        <a:lumOff val="60000"/>
+                      </a:schemeClr>
+                    </a:solidFill>
+                  </a:tcPr>
+                </a:tc>
+                <a:extLst>
+                  <a:ext uri="{0D108BD9-81ED-4DB2-BD59-A6C34878D82A}">
+                    <a16:rowId xmlns:a16="http://schemas.microsoft.com/office/drawing/2014/main" val="10001"/>
+                  </a:ext>
+                </a:extLst>
+              </a:tr>
+              <a:tr h="137160">
+                <a:tc>
+                  <a:txBody>
+                    <a:bodyPr/>
+                    <a:lstStyle/>
+                    <a:p>
+                      <a:endParaRPr lang="en-US" sz="300" dirty="0"/>
+                    </a:p>
+                  </a:txBody>
+                  <a:tcPr marL="0" marR="0" marT="0" marB="0">
+                    <a:solidFill>
+                      <a:schemeClr val="accent2"/>
+                    </a:solidFill>
+                  </a:tcPr>
+                </a:tc>
+                <a:tc>
+                  <a:txBody>
+                    <a:bodyPr/>
+                    <a:lstStyle/>
+                    <a:p>
+                      <a:endParaRPr lang="en-US" sz="300" dirty="0"/>
+                    </a:p>
+                  </a:txBody>
+                  <a:tcPr marL="0" marR="0" marT="0" marB="0">
+                    <a:solidFill>
+                      <a:schemeClr val="accent4">
+                        <a:lumMod val="40000"/>
+                        <a:lumOff val="60000"/>
+                      </a:schemeClr>
+                    </a:solidFill>
+                  </a:tcPr>
+                </a:tc>
+                <a:extLst>
+                  <a:ext uri="{0D108BD9-81ED-4DB2-BD59-A6C34878D82A}">
+                    <a16:rowId xmlns:a16="http://schemas.microsoft.com/office/drawing/2014/main" val="10002"/>
+                  </a:ext>
+                </a:extLst>
+              </a:tr>
+              <a:tr h="137160">
+                <a:tc>
+                  <a:txBody>
+                    <a:bodyPr/>
+                    <a:lstStyle/>
+                    <a:p>
+                      <a:endParaRPr lang="en-US" sz="300" dirty="0"/>
+                    </a:p>
+                  </a:txBody>
+                  <a:tcPr marL="0" marR="0" marT="0" marB="0">
+                    <a:solidFill>
+                      <a:schemeClr val="accent5"/>
+                    </a:solidFill>
+                  </a:tcPr>
+                </a:tc>
+                <a:tc>
+                  <a:txBody>
+                    <a:bodyPr/>
+                    <a:lstStyle/>
+                    <a:p>
+                      <a:endParaRPr lang="en-US" sz="300" dirty="0"/>
+                    </a:p>
+                  </a:txBody>
+                  <a:tcPr marL="0" marR="0" marT="0" marB="0">
+                    <a:solidFill>
+                      <a:schemeClr val="accent4">
+                        <a:lumMod val="40000"/>
+                        <a:lumOff val="60000"/>
+                      </a:schemeClr>
+                    </a:solidFill>
+                  </a:tcPr>
+                </a:tc>
+                <a:extLst>
+                  <a:ext uri="{0D108BD9-81ED-4DB2-BD59-A6C34878D82A}">
+                    <a16:rowId xmlns:a16="http://schemas.microsoft.com/office/drawing/2014/main" val="10003"/>
+                  </a:ext>
+                </a:extLst>
+              </a:tr>
+            </a:tbl>
+          </a:graphicData>
+        </a:graphic>
+      </p:graphicFrame>
+      <p:cxnSp>
+        <p:nvCxnSpPr>
+          <p:cNvPr id="92" name="Straight Arrow Connector 91">
+            <a:extLst>
+              <a:ext uri="{FF2B5EF4-FFF2-40B4-BE49-F238E27FC236}">
+                <a16:creationId xmlns:a16="http://schemas.microsoft.com/office/drawing/2014/main" id="{2C76FC26-5B0D-484A-81F4-C161977C2477}"/>
+              </a:ext>
+            </a:extLst>
+          </p:cNvPr>
+          <p:cNvCxnSpPr>
+            <a:cxnSpLocks/>
+          </p:cNvCxnSpPr>
+          <p:nvPr/>
+        </p:nvCxnSpPr>
+        <p:spPr>
+          <a:xfrm>
+            <a:off x="11111493" y="1360796"/>
+            <a:ext cx="363152" cy="0"/>
+          </a:xfrm>
+          <a:prstGeom prst="straightConnector1">
+            <a:avLst/>
+          </a:prstGeom>
+          <a:ln w="63500">
+            <a:solidFill>
+              <a:schemeClr val="tx1"/>
+            </a:solidFill>
+            <a:tailEnd type="stealth"/>
+          </a:ln>
+        </p:spPr>
+        <p:style>
+          <a:lnRef idx="1">
+            <a:schemeClr val="accent1"/>
+          </a:lnRef>
+          <a:fillRef idx="0">
+            <a:schemeClr val="accent1"/>
+          </a:fillRef>
+          <a:effectRef idx="0">
+            <a:schemeClr val="accent1"/>
+          </a:effectRef>
+          <a:fontRef idx="minor">
+            <a:schemeClr val="tx1"/>
+          </a:fontRef>
+        </p:style>
+      </p:cxnSp>
+      <p:sp>
+        <p:nvSpPr>
+          <p:cNvPr id="93" name="Rounded Rectangle 61">
+            <a:extLst>
+              <a:ext uri="{FF2B5EF4-FFF2-40B4-BE49-F238E27FC236}">
+                <a16:creationId xmlns:a16="http://schemas.microsoft.com/office/drawing/2014/main" id="{A21D49AC-F0DC-451F-937F-36A76F8E7DAB}"/>
+              </a:ext>
+            </a:extLst>
+          </p:cNvPr>
+          <p:cNvSpPr/>
+          <p:nvPr/>
+        </p:nvSpPr>
+        <p:spPr>
+          <a:xfrm>
+            <a:off x="4791234" y="7190096"/>
+            <a:ext cx="8764498" cy="423293"/>
+          </a:xfrm>
+          <a:prstGeom prst="roundRect">
+            <a:avLst/>
+          </a:prstGeom>
+        </p:spPr>
+        <p:style>
+          <a:lnRef idx="2">
+            <a:schemeClr val="accent1">
+              <a:shade val="50000"/>
+            </a:schemeClr>
+          </a:lnRef>
+          <a:fillRef idx="1">
+            <a:schemeClr val="accent1"/>
+          </a:fillRef>
+          <a:effectRef idx="0">
+            <a:schemeClr val="accent1"/>
+          </a:effectRef>
+          <a:fontRef idx="minor">
+            <a:schemeClr val="lt1"/>
+          </a:fontRef>
+        </p:style>
+        <p:txBody>
+          <a:bodyPr rtlCol="0" anchor="ctr"/>
+          <a:lstStyle/>
+          <a:p>
+            <a:pPr algn="ctr"/>
+            <a:r>
+              <a:rPr lang="en-US" sz="2800" b="1" dirty="0">
+                <a:solidFill>
+                  <a:schemeClr val="bg1"/>
+                </a:solidFill>
+              </a:rPr>
+              <a:t>Exporting Data</a:t>
+            </a:r>
+            <a:endParaRPr lang="en-US" sz="2683" dirty="0">
+              <a:solidFill>
+                <a:schemeClr val="bg1"/>
+              </a:solidFill>
+            </a:endParaRPr>
+          </a:p>
+        </p:txBody>
+      </p:sp>
+      <p:sp>
+        <p:nvSpPr>
+          <p:cNvPr id="94" name="TextBox 93">
+            <a:extLst>
+              <a:ext uri="{FF2B5EF4-FFF2-40B4-BE49-F238E27FC236}">
+                <a16:creationId xmlns:a16="http://schemas.microsoft.com/office/drawing/2014/main" id="{0D068CA7-5084-4E4C-8935-3C5BFE5BE356}"/>
+              </a:ext>
+            </a:extLst>
+          </p:cNvPr>
+          <p:cNvSpPr txBox="1"/>
+          <p:nvPr/>
+        </p:nvSpPr>
+        <p:spPr>
+          <a:xfrm>
+            <a:off x="4798116" y="7774122"/>
+            <a:ext cx="8870648" cy="2492990"/>
+          </a:xfrm>
+          <a:prstGeom prst="rect">
+            <a:avLst/>
+          </a:prstGeom>
+          <a:solidFill>
+            <a:schemeClr val="accent1">
+              <a:lumMod val="20000"/>
+              <a:lumOff val="80000"/>
+            </a:schemeClr>
+          </a:solidFill>
+        </p:spPr>
+        <p:txBody>
+          <a:bodyPr wrap="square" rtlCol="0">
+            <a:spAutoFit/>
+          </a:bodyPr>
+          <a:lstStyle/>
+          <a:p>
+            <a:pPr>
+              <a:lnSpc>
+                <a:spcPct val="200000"/>
+              </a:lnSpc>
+            </a:pPr>
+            <a:r>
+              <a:rPr lang="en-US" sz="1200" dirty="0"/>
+              <a:t>Use these commands to export a </a:t>
+            </a:r>
+            <a:r>
+              <a:rPr lang="en-US" sz="1200" dirty="0" err="1"/>
+              <a:t>DataFrame</a:t>
+            </a:r>
+            <a:r>
+              <a:rPr lang="en-US" sz="1200" dirty="0"/>
+              <a:t> to CSV, .xlsx, SQL, or JSON.</a:t>
+            </a:r>
+          </a:p>
+          <a:p>
+            <a:pPr>
+              <a:lnSpc>
+                <a:spcPct val="200000"/>
+              </a:lnSpc>
+            </a:pPr>
+            <a:endParaRPr lang="en-US" sz="1200" dirty="0"/>
+          </a:p>
+          <a:p>
+            <a:pPr>
+              <a:lnSpc>
+                <a:spcPct val="200000"/>
+              </a:lnSpc>
+            </a:pPr>
+            <a:r>
+              <a:rPr lang="en-US" sz="1200" b="1" dirty="0" err="1">
+                <a:latin typeface="Consolas" panose="020B0609020204030204" pitchFamily="49" charset="0"/>
+              </a:rPr>
+              <a:t>df.</a:t>
+            </a:r>
+            <a:r>
+              <a:rPr lang="en-US" sz="1200" b="1" dirty="0" err="1">
+                <a:solidFill>
+                  <a:srgbClr val="0070C0"/>
+                </a:solidFill>
+                <a:latin typeface="Consolas" panose="020B0609020204030204" pitchFamily="49" charset="0"/>
+              </a:rPr>
+              <a:t>to_csv</a:t>
+            </a:r>
+            <a:r>
+              <a:rPr lang="en-US" sz="1200" b="1" dirty="0">
+                <a:solidFill>
+                  <a:srgbClr val="0070C0"/>
+                </a:solidFill>
+                <a:latin typeface="Consolas" panose="020B0609020204030204" pitchFamily="49" charset="0"/>
+              </a:rPr>
+              <a:t>(filename) </a:t>
+            </a:r>
+            <a:r>
+              <a:rPr lang="en-US" sz="1200" dirty="0"/>
+              <a:t>| Write to a CSV file</a:t>
+            </a:r>
+          </a:p>
+          <a:p>
+            <a:pPr>
+              <a:lnSpc>
+                <a:spcPct val="200000"/>
+              </a:lnSpc>
+            </a:pPr>
+            <a:r>
+              <a:rPr lang="en-US" sz="1200" b="1" dirty="0" err="1">
+                <a:latin typeface="Consolas" panose="020B0609020204030204" pitchFamily="49" charset="0"/>
+              </a:rPr>
+              <a:t>df.</a:t>
+            </a:r>
+            <a:r>
+              <a:rPr lang="en-US" sz="1200" b="1" dirty="0" err="1">
+                <a:solidFill>
+                  <a:srgbClr val="0070C0"/>
+                </a:solidFill>
+                <a:latin typeface="Consolas" panose="020B0609020204030204" pitchFamily="49" charset="0"/>
+              </a:rPr>
+              <a:t>to_excel</a:t>
+            </a:r>
+            <a:r>
+              <a:rPr lang="en-US" sz="1200" b="1" dirty="0">
+                <a:solidFill>
+                  <a:srgbClr val="0070C0"/>
+                </a:solidFill>
+                <a:latin typeface="Consolas" panose="020B0609020204030204" pitchFamily="49" charset="0"/>
+              </a:rPr>
+              <a:t>(filename) </a:t>
+            </a:r>
+            <a:r>
+              <a:rPr lang="en-US" sz="1200" dirty="0"/>
+              <a:t>| Write to an Excel file</a:t>
+            </a:r>
+          </a:p>
+          <a:p>
+            <a:pPr>
+              <a:lnSpc>
+                <a:spcPct val="200000"/>
+              </a:lnSpc>
+            </a:pPr>
+            <a:r>
+              <a:rPr lang="en-US" sz="1200" b="1" dirty="0" err="1">
+                <a:latin typeface="Consolas" panose="020B0609020204030204" pitchFamily="49" charset="0"/>
+              </a:rPr>
+              <a:t>df.</a:t>
+            </a:r>
+            <a:r>
+              <a:rPr lang="en-US" sz="1200" b="1" dirty="0" err="1">
+                <a:solidFill>
+                  <a:srgbClr val="0070C0"/>
+                </a:solidFill>
+                <a:latin typeface="Consolas" panose="020B0609020204030204" pitchFamily="49" charset="0"/>
+              </a:rPr>
+              <a:t>to_sql</a:t>
+            </a:r>
+            <a:r>
+              <a:rPr lang="en-US" sz="1200" b="1" dirty="0">
+                <a:solidFill>
+                  <a:srgbClr val="0070C0"/>
+                </a:solidFill>
+                <a:latin typeface="Consolas" panose="020B0609020204030204" pitchFamily="49" charset="0"/>
+              </a:rPr>
+              <a:t>(</a:t>
+            </a:r>
+            <a:r>
+              <a:rPr lang="en-US" sz="1200" b="1" dirty="0" err="1">
+                <a:solidFill>
+                  <a:srgbClr val="0070C0"/>
+                </a:solidFill>
+                <a:latin typeface="Consolas" panose="020B0609020204030204" pitchFamily="49" charset="0"/>
+              </a:rPr>
+              <a:t>table_name</a:t>
+            </a:r>
+            <a:r>
+              <a:rPr lang="en-US" sz="1200" b="1" dirty="0">
+                <a:solidFill>
+                  <a:srgbClr val="0070C0"/>
+                </a:solidFill>
+                <a:latin typeface="Consolas" panose="020B0609020204030204" pitchFamily="49" charset="0"/>
+              </a:rPr>
+              <a:t>, </a:t>
+            </a:r>
+            <a:r>
+              <a:rPr lang="en-US" sz="1200" b="1" dirty="0" err="1">
+                <a:solidFill>
+                  <a:srgbClr val="0070C0"/>
+                </a:solidFill>
+                <a:latin typeface="Consolas" panose="020B0609020204030204" pitchFamily="49" charset="0"/>
+              </a:rPr>
+              <a:t>connection_object</a:t>
+            </a:r>
+            <a:r>
+              <a:rPr lang="en-US" sz="1200" b="1" dirty="0">
+                <a:solidFill>
+                  <a:srgbClr val="0070C0"/>
+                </a:solidFill>
+                <a:latin typeface="Consolas" panose="020B0609020204030204" pitchFamily="49" charset="0"/>
+              </a:rPr>
+              <a:t>)</a:t>
+            </a:r>
+            <a:r>
+              <a:rPr lang="en-US" sz="1200" b="1" dirty="0">
+                <a:latin typeface="Consolas" panose="020B0609020204030204" pitchFamily="49" charset="0"/>
+              </a:rPr>
+              <a:t> </a:t>
+            </a:r>
+            <a:r>
+              <a:rPr lang="en-US" sz="1200" dirty="0"/>
+              <a:t>| Write to a SQL table</a:t>
+            </a:r>
+          </a:p>
+          <a:p>
+            <a:pPr>
+              <a:lnSpc>
+                <a:spcPct val="200000"/>
+              </a:lnSpc>
+            </a:pPr>
+            <a:r>
+              <a:rPr lang="en-US" sz="1200" b="1" dirty="0" err="1">
+                <a:latin typeface="Consolas" panose="020B0609020204030204" pitchFamily="49" charset="0"/>
+              </a:rPr>
+              <a:t>df.</a:t>
+            </a:r>
+            <a:r>
+              <a:rPr lang="en-US" sz="1200" b="1" dirty="0" err="1">
+                <a:solidFill>
+                  <a:srgbClr val="0070C0"/>
+                </a:solidFill>
+                <a:latin typeface="Consolas" panose="020B0609020204030204" pitchFamily="49" charset="0"/>
+              </a:rPr>
+              <a:t>to_json</a:t>
+            </a:r>
+            <a:r>
+              <a:rPr lang="en-US" sz="1200" b="1" dirty="0">
+                <a:solidFill>
+                  <a:srgbClr val="0070C0"/>
+                </a:solidFill>
+                <a:latin typeface="Consolas" panose="020B0609020204030204" pitchFamily="49" charset="0"/>
+              </a:rPr>
+              <a:t>(filename) </a:t>
+            </a:r>
+            <a:r>
+              <a:rPr lang="en-US" sz="1200" dirty="0"/>
+              <a:t>| Write to a file in JSON format</a:t>
+            </a:r>
+          </a:p>
+          <a:p>
+            <a:endParaRPr lang="en-US" sz="1200" dirty="0"/>
+          </a:p>
+        </p:txBody>
+      </p:sp>
+      <p:graphicFrame>
+        <p:nvGraphicFramePr>
+          <p:cNvPr id="95" name="Table 94">
+            <a:extLst>
+              <a:ext uri="{FF2B5EF4-FFF2-40B4-BE49-F238E27FC236}">
+                <a16:creationId xmlns:a16="http://schemas.microsoft.com/office/drawing/2014/main" id="{93605D77-9901-409F-ADFF-806A6645BA7B}"/>
+              </a:ext>
+            </a:extLst>
+          </p:cNvPr>
+          <p:cNvGraphicFramePr>
+            <a:graphicFrameLocks noGrp="1"/>
+          </p:cNvGraphicFramePr>
+          <p:nvPr>
+            <p:extLst>
+              <p:ext uri="{D42A27DB-BD31-4B8C-83A1-F6EECF244321}">
+                <p14:modId xmlns:p14="http://schemas.microsoft.com/office/powerpoint/2010/main" val="1451103247"/>
+              </p:ext>
+            </p:extLst>
+          </p:nvPr>
+        </p:nvGraphicFramePr>
+        <p:xfrm>
+          <a:off x="10073016" y="8349112"/>
+          <a:ext cx="1119705" cy="1089855"/>
+        </p:xfrm>
+        <a:graphic>
+          <a:graphicData uri="http://schemas.openxmlformats.org/drawingml/2006/table">
+            <a:tbl>
+              <a:tblPr>
+                <a:tableStyleId>{5C22544A-7EE6-4342-B048-85BDC9FD1C3A}</a:tableStyleId>
+              </a:tblPr>
+              <a:tblGrid>
+                <a:gridCol w="373235">
+                  <a:extLst>
+                    <a:ext uri="{9D8B030D-6E8A-4147-A177-3AD203B41FA5}">
+                      <a16:colId xmlns:a16="http://schemas.microsoft.com/office/drawing/2014/main" val="20000"/>
+                    </a:ext>
+                  </a:extLst>
+                </a:gridCol>
+                <a:gridCol w="373235">
+                  <a:extLst>
+                    <a:ext uri="{9D8B030D-6E8A-4147-A177-3AD203B41FA5}">
+                      <a16:colId xmlns:a16="http://schemas.microsoft.com/office/drawing/2014/main" val="20001"/>
+                    </a:ext>
+                  </a:extLst>
+                </a:gridCol>
+                <a:gridCol w="373235">
+                  <a:extLst>
+                    <a:ext uri="{9D8B030D-6E8A-4147-A177-3AD203B41FA5}">
+                      <a16:colId xmlns:a16="http://schemas.microsoft.com/office/drawing/2014/main" val="20002"/>
+                    </a:ext>
+                  </a:extLst>
+                </a:gridCol>
+              </a:tblGrid>
+              <a:tr h="217971">
+                <a:tc>
+                  <a:txBody>
+                    <a:bodyPr/>
+                    <a:lstStyle/>
+                    <a:p>
+                      <a:endParaRPr lang="en-US" sz="800" dirty="0"/>
+                    </a:p>
+                  </a:txBody>
+                  <a:tcPr marL="0" marR="0" marT="0" marB="0">
+                    <a:solidFill>
+                      <a:schemeClr val="bg2">
+                        <a:lumMod val="50000"/>
+                      </a:schemeClr>
+                    </a:solidFill>
+                  </a:tcPr>
+                </a:tc>
+                <a:tc>
+                  <a:txBody>
+                    <a:bodyPr/>
+                    <a:lstStyle/>
+                    <a:p>
+                      <a:endParaRPr lang="en-US" sz="800" dirty="0"/>
+                    </a:p>
+                  </a:txBody>
+                  <a:tcPr marL="0" marR="0" marT="0" marB="0">
+                    <a:solidFill>
+                      <a:schemeClr val="accent5"/>
+                    </a:solidFill>
+                  </a:tcPr>
+                </a:tc>
+                <a:tc>
+                  <a:txBody>
+                    <a:bodyPr/>
+                    <a:lstStyle/>
+                    <a:p>
+                      <a:endParaRPr lang="en-US" sz="800"/>
+                    </a:p>
+                  </a:txBody>
+                  <a:tcPr marL="0" marR="0" marT="0" marB="0">
+                    <a:solidFill>
+                      <a:schemeClr val="accent5"/>
+                    </a:solidFill>
+                  </a:tcPr>
+                </a:tc>
+                <a:extLst>
+                  <a:ext uri="{0D108BD9-81ED-4DB2-BD59-A6C34878D82A}">
+                    <a16:rowId xmlns:a16="http://schemas.microsoft.com/office/drawing/2014/main" val="10000"/>
+                  </a:ext>
+                </a:extLst>
+              </a:tr>
+              <a:tr h="217971">
+                <a:tc>
+                  <a:txBody>
+                    <a:bodyPr/>
+                    <a:lstStyle/>
+                    <a:p>
+                      <a:endParaRPr lang="en-US" sz="800" dirty="0"/>
+                    </a:p>
+                  </a:txBody>
+                  <a:tcPr marL="0" marR="0" marT="0" marB="0">
+                    <a:solidFill>
+                      <a:schemeClr val="bg2">
+                        <a:lumMod val="90000"/>
+                      </a:schemeClr>
+                    </a:solidFill>
+                  </a:tcPr>
+                </a:tc>
+                <a:tc>
+                  <a:txBody>
+                    <a:bodyPr/>
+                    <a:lstStyle/>
+                    <a:p>
+                      <a:endParaRPr lang="en-US" sz="800" dirty="0"/>
+                    </a:p>
+                  </a:txBody>
+                  <a:tcPr marL="0" marR="0" marT="0" marB="0">
+                    <a:solidFill>
+                      <a:schemeClr val="accent5">
+                        <a:lumMod val="60000"/>
+                        <a:lumOff val="40000"/>
+                      </a:schemeClr>
+                    </a:solidFill>
+                  </a:tcPr>
+                </a:tc>
+                <a:tc>
+                  <a:txBody>
+                    <a:bodyPr/>
+                    <a:lstStyle/>
+                    <a:p>
+                      <a:endParaRPr lang="en-US" sz="800" dirty="0"/>
+                    </a:p>
+                  </a:txBody>
+                  <a:tcPr marL="0" marR="0" marT="0" marB="0">
+                    <a:solidFill>
+                      <a:schemeClr val="accent5">
+                        <a:lumMod val="60000"/>
+                        <a:lumOff val="40000"/>
+                      </a:schemeClr>
+                    </a:solidFill>
+                  </a:tcPr>
+                </a:tc>
+                <a:extLst>
+                  <a:ext uri="{0D108BD9-81ED-4DB2-BD59-A6C34878D82A}">
+                    <a16:rowId xmlns:a16="http://schemas.microsoft.com/office/drawing/2014/main" val="10001"/>
+                  </a:ext>
+                </a:extLst>
+              </a:tr>
+              <a:tr h="217971">
+                <a:tc>
+                  <a:txBody>
+                    <a:bodyPr/>
+                    <a:lstStyle/>
+                    <a:p>
+                      <a:endParaRPr lang="en-US" sz="800" dirty="0"/>
+                    </a:p>
+                  </a:txBody>
+                  <a:tcPr marL="0" marR="0" marT="0" marB="0">
+                    <a:solidFill>
+                      <a:schemeClr val="bg2">
+                        <a:lumMod val="90000"/>
+                      </a:schemeClr>
+                    </a:solidFill>
+                  </a:tcPr>
+                </a:tc>
+                <a:tc>
+                  <a:txBody>
+                    <a:bodyPr/>
+                    <a:lstStyle/>
+                    <a:p>
+                      <a:endParaRPr lang="en-US" sz="800"/>
+                    </a:p>
+                  </a:txBody>
+                  <a:tcPr marL="0" marR="0" marT="0" marB="0">
+                    <a:solidFill>
+                      <a:schemeClr val="accent5">
+                        <a:lumMod val="60000"/>
+                        <a:lumOff val="40000"/>
+                      </a:schemeClr>
+                    </a:solidFill>
+                  </a:tcPr>
+                </a:tc>
+                <a:tc>
+                  <a:txBody>
+                    <a:bodyPr/>
+                    <a:lstStyle/>
+                    <a:p>
+                      <a:endParaRPr lang="en-US" sz="800" dirty="0"/>
+                    </a:p>
+                  </a:txBody>
+                  <a:tcPr marL="0" marR="0" marT="0" marB="0">
+                    <a:solidFill>
+                      <a:schemeClr val="accent5">
+                        <a:lumMod val="60000"/>
+                        <a:lumOff val="40000"/>
+                      </a:schemeClr>
+                    </a:solidFill>
+                  </a:tcPr>
+                </a:tc>
+                <a:extLst>
+                  <a:ext uri="{0D108BD9-81ED-4DB2-BD59-A6C34878D82A}">
+                    <a16:rowId xmlns:a16="http://schemas.microsoft.com/office/drawing/2014/main" val="10002"/>
+                  </a:ext>
+                </a:extLst>
+              </a:tr>
+              <a:tr h="217971">
+                <a:tc>
+                  <a:txBody>
+                    <a:bodyPr/>
+                    <a:lstStyle/>
+                    <a:p>
+                      <a:endParaRPr lang="en-US" sz="800"/>
+                    </a:p>
+                  </a:txBody>
+                  <a:tcPr marL="0" marR="0" marT="0" marB="0">
+                    <a:solidFill>
+                      <a:schemeClr val="bg2">
+                        <a:lumMod val="90000"/>
+                      </a:schemeClr>
+                    </a:solidFill>
+                  </a:tcPr>
+                </a:tc>
+                <a:tc>
+                  <a:txBody>
+                    <a:bodyPr/>
+                    <a:lstStyle/>
+                    <a:p>
+                      <a:endParaRPr lang="en-US" sz="800"/>
+                    </a:p>
+                  </a:txBody>
+                  <a:tcPr marL="0" marR="0" marT="0" marB="0">
+                    <a:solidFill>
+                      <a:schemeClr val="accent5">
+                        <a:lumMod val="60000"/>
+                        <a:lumOff val="40000"/>
+                      </a:schemeClr>
+                    </a:solidFill>
+                  </a:tcPr>
+                </a:tc>
+                <a:tc>
+                  <a:txBody>
+                    <a:bodyPr/>
+                    <a:lstStyle/>
+                    <a:p>
+                      <a:endParaRPr lang="en-US" sz="800"/>
+                    </a:p>
+                  </a:txBody>
+                  <a:tcPr marL="0" marR="0" marT="0" marB="0">
+                    <a:solidFill>
+                      <a:schemeClr val="accent5">
+                        <a:lumMod val="60000"/>
+                        <a:lumOff val="40000"/>
+                      </a:schemeClr>
+                    </a:solidFill>
+                  </a:tcPr>
+                </a:tc>
+                <a:extLst>
+                  <a:ext uri="{0D108BD9-81ED-4DB2-BD59-A6C34878D82A}">
+                    <a16:rowId xmlns:a16="http://schemas.microsoft.com/office/drawing/2014/main" val="10003"/>
+                  </a:ext>
+                </a:extLst>
+              </a:tr>
+              <a:tr h="217971">
+                <a:tc>
+                  <a:txBody>
+                    <a:bodyPr/>
+                    <a:lstStyle/>
+                    <a:p>
+                      <a:endParaRPr lang="en-US" sz="800" dirty="0"/>
+                    </a:p>
+                  </a:txBody>
+                  <a:tcPr marL="0" marR="0" marT="0" marB="0">
+                    <a:solidFill>
+                      <a:schemeClr val="bg2">
+                        <a:lumMod val="90000"/>
+                      </a:schemeClr>
+                    </a:solidFill>
+                  </a:tcPr>
+                </a:tc>
+                <a:tc>
+                  <a:txBody>
+                    <a:bodyPr/>
+                    <a:lstStyle/>
+                    <a:p>
+                      <a:endParaRPr lang="en-US" sz="800"/>
+                    </a:p>
+                  </a:txBody>
+                  <a:tcPr marL="0" marR="0" marT="0" marB="0">
+                    <a:solidFill>
+                      <a:schemeClr val="accent5">
+                        <a:lumMod val="60000"/>
+                        <a:lumOff val="40000"/>
+                      </a:schemeClr>
+                    </a:solidFill>
+                  </a:tcPr>
+                </a:tc>
+                <a:tc>
+                  <a:txBody>
+                    <a:bodyPr/>
+                    <a:lstStyle/>
+                    <a:p>
+                      <a:endParaRPr lang="en-US" sz="800" dirty="0"/>
+                    </a:p>
+                  </a:txBody>
+                  <a:tcPr marL="0" marR="0" marT="0" marB="0">
+                    <a:solidFill>
+                      <a:schemeClr val="accent5">
+                        <a:lumMod val="60000"/>
+                        <a:lumOff val="40000"/>
+                      </a:schemeClr>
+                    </a:solidFill>
+                  </a:tcPr>
+                </a:tc>
+                <a:extLst>
+                  <a:ext uri="{0D108BD9-81ED-4DB2-BD59-A6C34878D82A}">
+                    <a16:rowId xmlns:a16="http://schemas.microsoft.com/office/drawing/2014/main" val="10004"/>
+                  </a:ext>
+                </a:extLst>
+              </a:tr>
+            </a:tbl>
+          </a:graphicData>
+        </a:graphic>
+      </p:graphicFrame>
+      <p:sp>
+        <p:nvSpPr>
+          <p:cNvPr id="96" name="Right Arrow 21">
+            <a:extLst>
+              <a:ext uri="{FF2B5EF4-FFF2-40B4-BE49-F238E27FC236}">
+                <a16:creationId xmlns:a16="http://schemas.microsoft.com/office/drawing/2014/main" id="{ABE0E192-1656-4A45-AEF9-A0A47F4A54EE}"/>
+              </a:ext>
+            </a:extLst>
+          </p:cNvPr>
+          <p:cNvSpPr/>
+          <p:nvPr/>
+        </p:nvSpPr>
+        <p:spPr>
+          <a:xfrm>
+            <a:off x="11332194" y="8559315"/>
+            <a:ext cx="976270" cy="613458"/>
+          </a:xfrm>
+          <a:prstGeom prst="rightArrow">
+            <a:avLst/>
+          </a:prstGeom>
+          <a:gradFill flip="none" rotWithShape="1">
+            <a:gsLst>
+              <a:gs pos="0">
+                <a:schemeClr val="accent5"/>
+              </a:gs>
+              <a:gs pos="100000">
+                <a:schemeClr val="accent6">
+                  <a:lumMod val="60000"/>
+                  <a:lumOff val="40000"/>
+                </a:schemeClr>
+              </a:gs>
+            </a:gsLst>
+            <a:lin ang="0" scaled="1"/>
+            <a:tileRect/>
+          </a:gradFill>
+        </p:spPr>
+        <p:style>
+          <a:lnRef idx="2">
+            <a:schemeClr val="accent1">
+              <a:shade val="50000"/>
+            </a:schemeClr>
+          </a:lnRef>
+          <a:fillRef idx="1">
+            <a:schemeClr val="accent1"/>
+          </a:fillRef>
+          <a:effectRef idx="0">
+            <a:schemeClr val="accent1"/>
+          </a:effectRef>
+          <a:fontRef idx="minor">
+            <a:schemeClr val="lt1"/>
+          </a:fontRef>
+        </p:style>
+        <p:txBody>
+          <a:bodyPr rtlCol="0" anchor="ctr"/>
+          <a:lstStyle/>
+          <a:p>
+            <a:pPr algn="ctr"/>
+            <a:r>
+              <a:rPr lang="en-US" sz="1000" b="1" dirty="0"/>
+              <a:t>Exporting</a:t>
+            </a:r>
+          </a:p>
+          <a:p>
+            <a:pPr algn="ctr"/>
+            <a:r>
+              <a:rPr lang="en-US" sz="1000" b="1" dirty="0"/>
+              <a:t>Data</a:t>
+            </a:r>
+          </a:p>
+        </p:txBody>
+      </p:sp>
+      <p:pic>
+        <p:nvPicPr>
+          <p:cNvPr id="45" name="Picture 44" descr="A picture containing light&#10;&#10;Description automatically generated">
+            <a:extLst>
+              <a:ext uri="{FF2B5EF4-FFF2-40B4-BE49-F238E27FC236}">
+                <a16:creationId xmlns:a16="http://schemas.microsoft.com/office/drawing/2014/main" id="{1F8D7860-12F8-42D3-A045-AED99728FAF1}"/>
+              </a:ext>
+            </a:extLst>
+          </p:cNvPr>
+          <p:cNvPicPr>
+            <a:picLocks noChangeAspect="1"/>
+          </p:cNvPicPr>
+          <p:nvPr/>
+        </p:nvPicPr>
+        <p:blipFill>
+          <a:blip r:embed="rId3">
+            <a:extLst>
+              <a:ext uri="{28A0092B-C50C-407E-A947-70E740481C1C}">
+                <a14:useLocalDpi xmlns:a14="http://schemas.microsoft.com/office/drawing/2010/main" val="0"/>
+              </a:ext>
+              <a:ext uri="{837473B0-CC2E-450A-ABE3-18F120FF3D39}">
+                <a1611:picAttrSrcUrl xmlns:a1611="http://schemas.microsoft.com/office/drawing/2016/11/main" r:id="rId4"/>
+              </a:ext>
+            </a:extLst>
+          </a:blip>
+          <a:stretch>
+            <a:fillRect/>
+          </a:stretch>
+        </p:blipFill>
+        <p:spPr>
+          <a:xfrm>
+            <a:off x="12308464" y="8298364"/>
+            <a:ext cx="979910" cy="1023185"/>
+          </a:xfrm>
+          <a:prstGeom prst="rect">
+            <a:avLst/>
+          </a:prstGeom>
+        </p:spPr>
+      </p:pic>
+      <p:sp>
+        <p:nvSpPr>
+          <p:cNvPr id="69" name="TextBox 68">
+            <a:extLst>
+              <a:ext uri="{FF2B5EF4-FFF2-40B4-BE49-F238E27FC236}">
+                <a16:creationId xmlns:a16="http://schemas.microsoft.com/office/drawing/2014/main" id="{971DD9D2-6711-453C-9851-558767AB1C7F}"/>
+              </a:ext>
+            </a:extLst>
+          </p:cNvPr>
+          <p:cNvSpPr txBox="1"/>
+          <p:nvPr/>
+        </p:nvSpPr>
+        <p:spPr>
+          <a:xfrm>
+            <a:off x="11474645" y="10339641"/>
+            <a:ext cx="2355612" cy="369332"/>
+          </a:xfrm>
+          <a:prstGeom prst="rect">
+            <a:avLst/>
+          </a:prstGeom>
+          <a:noFill/>
+        </p:spPr>
+        <p:txBody>
+          <a:bodyPr wrap="square" rtlCol="0">
+            <a:spAutoFit/>
+          </a:bodyPr>
+          <a:lstStyle/>
+          <a:p>
+            <a:r>
+              <a:rPr lang="en-US" sz="900" dirty="0">
+                <a:hlinkClick r:id="rId4" tooltip="http://www.pngall.com/database-png"/>
+              </a:rPr>
+              <a:t>This Photo</a:t>
+            </a:r>
+            <a:r>
+              <a:rPr lang="en-US" sz="900" dirty="0"/>
+              <a:t> by Unknown Author is licensed under </a:t>
+            </a:r>
+            <a:r>
+              <a:rPr lang="en-US" sz="900" dirty="0">
+                <a:hlinkClick r:id="rId5" tooltip="https://creativecommons.org/licenses/by-nc/3.0/"/>
+              </a:rPr>
+              <a:t>CC BY-NC</a:t>
+            </a:r>
+            <a:endParaRPr lang="en-US" sz="900" dirty="0"/>
+          </a:p>
+        </p:txBody>
+      </p:sp>
+    </p:spTree>
+    <p:extLst>
+      <p:ext uri="{BB962C8B-B14F-4D97-AF65-F5344CB8AC3E}">
+        <p14:creationId xmlns:p14="http://schemas.microsoft.com/office/powerpoint/2010/main" val="515629992"/>
       </p:ext>
     </p:extLst>
   </p:cSld>

</xml_diff>

<commit_message>
#updated ppt and pdf with a third page
</commit_message>
<xml_diff>
--- a/doc/cheatsheet/Pandas_Cheat_Sheet.pptx
+++ b/doc/cheatsheet/Pandas_Cheat_Sheet.pptx
@@ -9695,14 +9695,14 @@
           <a:effectLst/>
           <a:extLst>
             <a:ext uri="{909E8E84-426E-40dd-AFC4-6F175D3DCCD1}">
-              <a14:hiddenFill xmlns="" xmlns:a14="http://schemas.microsoft.com/office/drawing/2010/main">
+              <a14:hiddenFill xmlns:a14="http://schemas.microsoft.com/office/drawing/2010/main" xmlns="">
                 <a:solidFill>
                   <a:schemeClr val="accent1"/>
                 </a:solidFill>
               </a14:hiddenFill>
             </a:ext>
             <a:ext uri="{91240B29-F687-4f45-9708-019B960494DF}">
-              <a14:hiddenLine xmlns="" xmlns:a14="http://schemas.microsoft.com/office/drawing/2010/main" w="9525">
+              <a14:hiddenLine xmlns:a14="http://schemas.microsoft.com/office/drawing/2010/main" xmlns="" w="9525">
                 <a:solidFill>
                   <a:schemeClr val="tx1"/>
                 </a:solidFill>
@@ -9712,7 +9712,7 @@
               </a14:hiddenLine>
             </a:ext>
             <a:ext uri="{AF507438-7753-43e0-B8FC-AC1667EBCBE1}">
-              <a14:hiddenEffects xmlns="" xmlns:a14="http://schemas.microsoft.com/office/drawing/2010/main">
+              <a14:hiddenEffects xmlns:a14="http://schemas.microsoft.com/office/drawing/2010/main" xmlns="">
                 <a:effectLst>
                   <a:outerShdw dist="35921" dir="2700000" algn="ctr" rotWithShape="0">
                     <a:schemeClr val="bg2"/>
@@ -23854,21 +23854,7 @@
                 <a:latin typeface="Consolas" panose="020B0609020204030204" pitchFamily="49" charset="0"/>
                 <a:hlinkClick r:id="rId26"/>
               </a:rPr>
-              <a:t>mer</a:t>
-            </a:r>
-            <a:r>
-              <a:rPr lang="en-US" sz="1200" b="1" dirty="0" err="1">
-                <a:latin typeface="Consolas" panose="020B0609020204030204" pitchFamily="49" charset="0"/>
-                <a:hlinkClick r:id="rId26"/>
-              </a:rPr>
-              <a:t>g</a:t>
-            </a:r>
-            <a:r>
-              <a:rPr lang="en-US" sz="1200" b="1" dirty="0" err="1">
-                <a:latin typeface="Consolas" panose="020B0609020204030204" pitchFamily="49" charset="0"/>
-                <a:hlinkClick r:id="rId26"/>
-              </a:rPr>
-              <a:t>e</a:t>
+              <a:t>merge</a:t>
             </a:r>
             <a:r>
               <a:rPr lang="en-US" sz="1200" b="1" dirty="0">
@@ -28493,22 +28479,7 @@
               <a:rPr lang="en-US" sz="1200" b="1" dirty="0">
                 <a:latin typeface="Consolas" panose="020B0609020204030204" pitchFamily="49" charset="0"/>
               </a:rPr>
-              <a:t>df</a:t>
-            </a:r>
-            <a:r>
-              <a:rPr lang="en-US" sz="1200" b="1" dirty="0">
-                <a:solidFill>
-                  <a:srgbClr val="0070C0"/>
-                </a:solidFill>
-                <a:latin typeface="Consolas" panose="020B0609020204030204" pitchFamily="49" charset="0"/>
-              </a:rPr>
-              <a:t>[col] </a:t>
-            </a:r>
-            <a:r>
-              <a:rPr lang="en-US" sz="1200" b="1" dirty="0">
-                <a:latin typeface="Consolas" panose="020B0609020204030204" pitchFamily="49" charset="0"/>
-              </a:rPr>
-              <a:t>-&gt; </a:t>
+              <a:t>df[col] -&gt; </a:t>
             </a:r>
             <a:r>
               <a:rPr lang="en-US" sz="1200" dirty="0">
@@ -28527,28 +28498,13 @@
               <a:rPr lang="en-US" sz="1200" b="1" dirty="0">
                 <a:latin typeface="Consolas" panose="020B0609020204030204" pitchFamily="49" charset="0"/>
               </a:rPr>
-              <a:t>df</a:t>
-            </a:r>
-            <a:r>
-              <a:rPr lang="en-US" sz="1200" b="1" dirty="0">
-                <a:solidFill>
-                  <a:srgbClr val="0070C0"/>
-                </a:solidFill>
-                <a:latin typeface="Consolas" panose="020B0609020204030204" pitchFamily="49" charset="0"/>
-              </a:rPr>
-              <a:t>[[col1, col2]]</a:t>
-            </a:r>
-            <a:r>
-              <a:rPr lang="en-US" sz="1200" b="1" dirty="0">
-                <a:latin typeface="Consolas" panose="020B0609020204030204" pitchFamily="49" charset="0"/>
-              </a:rPr>
-              <a:t> -&gt; </a:t>
+              <a:t>df[[col1, col2]] -&gt; </a:t>
             </a:r>
             <a:r>
               <a:rPr lang="en-US" sz="1200" dirty="0">
                 <a:latin typeface="Consolas" panose="020B0609020204030204" pitchFamily="49" charset="0"/>
               </a:rPr>
-              <a:t>Returns columns as a new 	      </a:t>
+              <a:t>Returns columns as a new </a:t>
             </a:r>
             <a:r>
               <a:rPr lang="en-US" sz="1200" dirty="0" err="1">
@@ -28583,18 +28539,9 @@
             </a:r>
             <a:r>
               <a:rPr lang="en-US" sz="1200" b="1" dirty="0">
-                <a:solidFill>
-                  <a:srgbClr val="0070C0"/>
-                </a:solidFill>
-                <a:latin typeface="Consolas" panose="020B0609020204030204" pitchFamily="49" charset="0"/>
-              </a:rPr>
-              <a:t>[0]</a:t>
-            </a:r>
-            <a:r>
-              <a:rPr lang="en-US" sz="1200" b="1" dirty="0">
-                <a:latin typeface="Consolas" panose="020B0609020204030204" pitchFamily="49" charset="0"/>
-              </a:rPr>
-              <a:t> -&gt; </a:t>
+                <a:latin typeface="Consolas" panose="020B0609020204030204" pitchFamily="49" charset="0"/>
+              </a:rPr>
+              <a:t>[0] -&gt; </a:t>
             </a:r>
             <a:r>
               <a:rPr lang="en-US" sz="1200" dirty="0">
@@ -28626,36 +28573,21 @@
             </a:r>
             <a:r>
               <a:rPr lang="en-US" sz="1200" b="1" dirty="0">
-                <a:solidFill>
-                  <a:srgbClr val="0070C0"/>
-                </a:solidFill>
                 <a:latin typeface="Consolas" panose="020B0609020204030204" pitchFamily="49" charset="0"/>
               </a:rPr>
               <a:t>['</a:t>
             </a:r>
             <a:r>
               <a:rPr lang="en-US" sz="1200" b="1" dirty="0" err="1">
-                <a:solidFill>
-                  <a:srgbClr val="0070C0"/>
-                </a:solidFill>
                 <a:latin typeface="Consolas" panose="020B0609020204030204" pitchFamily="49" charset="0"/>
               </a:rPr>
               <a:t>index_one</a:t>
             </a:r>
             <a:r>
               <a:rPr lang="en-US" sz="1200" b="1" dirty="0">
-                <a:solidFill>
-                  <a:srgbClr val="0070C0"/>
-                </a:solidFill>
-                <a:latin typeface="Consolas" panose="020B0609020204030204" pitchFamily="49" charset="0"/>
-              </a:rPr>
-              <a:t>'] </a:t>
-            </a:r>
-            <a:r>
-              <a:rPr lang="en-US" sz="1200" b="1" dirty="0">
-                <a:latin typeface="Consolas" panose="020B0609020204030204" pitchFamily="49" charset="0"/>
-              </a:rPr>
-              <a:t>-&gt; </a:t>
+                <a:latin typeface="Consolas" panose="020B0609020204030204" pitchFamily="49" charset="0"/>
+              </a:rPr>
+              <a:t>'] -&gt; </a:t>
             </a:r>
             <a:r>
               <a:rPr lang="en-US" sz="1200" dirty="0">
@@ -28687,18 +28619,9 @@
             </a:r>
             <a:r>
               <a:rPr lang="en-US" sz="1200" b="1" dirty="0">
-                <a:solidFill>
-                  <a:srgbClr val="0070C0"/>
-                </a:solidFill>
-                <a:latin typeface="Consolas" panose="020B0609020204030204" pitchFamily="49" charset="0"/>
-              </a:rPr>
-              <a:t>[0,:] </a:t>
-            </a:r>
-            <a:r>
-              <a:rPr lang="en-US" sz="1200" b="1" dirty="0">
-                <a:latin typeface="Consolas" panose="020B0609020204030204" pitchFamily="49" charset="0"/>
-              </a:rPr>
-              <a:t>-&gt; </a:t>
+                <a:latin typeface="Consolas" panose="020B0609020204030204" pitchFamily="49" charset="0"/>
+              </a:rPr>
+              <a:t>[0,:] -&gt; </a:t>
             </a:r>
             <a:r>
               <a:rPr lang="en-US" sz="1200" dirty="0">
@@ -28730,18 +28653,9 @@
             </a:r>
             <a:r>
               <a:rPr lang="en-US" sz="1200" b="1" dirty="0">
-                <a:solidFill>
-                  <a:srgbClr val="0070C0"/>
-                </a:solidFill>
-                <a:latin typeface="Consolas" panose="020B0609020204030204" pitchFamily="49" charset="0"/>
-              </a:rPr>
-              <a:t>[0,0] </a:t>
-            </a:r>
-            <a:r>
-              <a:rPr lang="en-US" sz="1200" b="1" dirty="0">
-                <a:latin typeface="Consolas" panose="020B0609020204030204" pitchFamily="49" charset="0"/>
-              </a:rPr>
-              <a:t>-&gt; </a:t>
+                <a:latin typeface="Consolas" panose="020B0609020204030204" pitchFamily="49" charset="0"/>
+              </a:rPr>
+              <a:t>[0,0] -&gt; </a:t>
             </a:r>
             <a:r>
               <a:rPr lang="en-US" sz="1200" dirty="0">

</xml_diff>

<commit_message>
DOC: update cheat sheet based on review feedback (40680)
</commit_message>
<xml_diff>
--- a/doc/cheatsheet/Pandas_Cheat_Sheet.pptx
+++ b/doc/cheatsheet/Pandas_Cheat_Sheet.pptx
@@ -262,7 +262,7 @@
           <a:p>
             <a:fld id="{79278B33-2949-49BE-B3B0-3F16CAF906FE}" type="datetimeFigureOut">
               <a:rPr lang="en-US" smtClean="0"/>
-              <a:t>4/29/2025</a:t>
+              <a:t>4/30/2025</a:t>
             </a:fld>
             <a:endParaRPr lang="en-US"/>
           </a:p>
@@ -432,7 +432,7 @@
           <a:p>
             <a:fld id="{79278B33-2949-49BE-B3B0-3F16CAF906FE}" type="datetimeFigureOut">
               <a:rPr lang="en-US" smtClean="0"/>
-              <a:t>4/29/2025</a:t>
+              <a:t>4/30/2025</a:t>
             </a:fld>
             <a:endParaRPr lang="en-US"/>
           </a:p>
@@ -612,7 +612,7 @@
           <a:p>
             <a:fld id="{79278B33-2949-49BE-B3B0-3F16CAF906FE}" type="datetimeFigureOut">
               <a:rPr lang="en-US" smtClean="0"/>
-              <a:t>4/29/2025</a:t>
+              <a:t>4/30/2025</a:t>
             </a:fld>
             <a:endParaRPr lang="en-US"/>
           </a:p>
@@ -782,7 +782,7 @@
           <a:p>
             <a:fld id="{79278B33-2949-49BE-B3B0-3F16CAF906FE}" type="datetimeFigureOut">
               <a:rPr lang="en-US" smtClean="0"/>
-              <a:t>4/29/2025</a:t>
+              <a:t>4/30/2025</a:t>
             </a:fld>
             <a:endParaRPr lang="en-US"/>
           </a:p>
@@ -1026,7 +1026,7 @@
           <a:p>
             <a:fld id="{79278B33-2949-49BE-B3B0-3F16CAF906FE}" type="datetimeFigureOut">
               <a:rPr lang="en-US" smtClean="0"/>
-              <a:t>4/29/2025</a:t>
+              <a:t>4/30/2025</a:t>
             </a:fld>
             <a:endParaRPr lang="en-US"/>
           </a:p>
@@ -1258,7 +1258,7 @@
           <a:p>
             <a:fld id="{79278B33-2949-49BE-B3B0-3F16CAF906FE}" type="datetimeFigureOut">
               <a:rPr lang="en-US" smtClean="0"/>
-              <a:t>4/29/2025</a:t>
+              <a:t>4/30/2025</a:t>
             </a:fld>
             <a:endParaRPr lang="en-US"/>
           </a:p>
@@ -1625,7 +1625,7 @@
           <a:p>
             <a:fld id="{79278B33-2949-49BE-B3B0-3F16CAF906FE}" type="datetimeFigureOut">
               <a:rPr lang="en-US" smtClean="0"/>
-              <a:t>4/29/2025</a:t>
+              <a:t>4/30/2025</a:t>
             </a:fld>
             <a:endParaRPr lang="en-US"/>
           </a:p>
@@ -1743,7 +1743,7 @@
           <a:p>
             <a:fld id="{79278B33-2949-49BE-B3B0-3F16CAF906FE}" type="datetimeFigureOut">
               <a:rPr lang="en-US" smtClean="0"/>
-              <a:t>4/29/2025</a:t>
+              <a:t>4/30/2025</a:t>
             </a:fld>
             <a:endParaRPr lang="en-US"/>
           </a:p>
@@ -1838,7 +1838,7 @@
           <a:p>
             <a:fld id="{79278B33-2949-49BE-B3B0-3F16CAF906FE}" type="datetimeFigureOut">
               <a:rPr lang="en-US" smtClean="0"/>
-              <a:t>4/29/2025</a:t>
+              <a:t>4/30/2025</a:t>
             </a:fld>
             <a:endParaRPr lang="en-US"/>
           </a:p>
@@ -2115,7 +2115,7 @@
           <a:p>
             <a:fld id="{79278B33-2949-49BE-B3B0-3F16CAF906FE}" type="datetimeFigureOut">
               <a:rPr lang="en-US" smtClean="0"/>
-              <a:t>4/29/2025</a:t>
+              <a:t>4/30/2025</a:t>
             </a:fld>
             <a:endParaRPr lang="en-US"/>
           </a:p>
@@ -2372,7 +2372,7 @@
           <a:p>
             <a:fld id="{79278B33-2949-49BE-B3B0-3F16CAF906FE}" type="datetimeFigureOut">
               <a:rPr lang="en-US" smtClean="0"/>
-              <a:t>4/29/2025</a:t>
+              <a:t>4/30/2025</a:t>
             </a:fld>
             <a:endParaRPr lang="en-US"/>
           </a:p>
@@ -2585,7 +2585,7 @@
           <a:p>
             <a:fld id="{79278B33-2949-49BE-B3B0-3F16CAF906FE}" type="datetimeFigureOut">
               <a:rPr lang="en-US" smtClean="0"/>
-              <a:t>4/29/2025</a:t>
+              <a:t>4/30/2025</a:t>
             </a:fld>
             <a:endParaRPr lang="en-US"/>
           </a:p>
@@ -6848,7 +6848,7 @@
               <a:rPr lang="en-US" sz="1200" b="1" dirty="0">
                 <a:latin typeface="Consolas" panose="020B0609020204030204" pitchFamily="49" charset="0"/>
               </a:rPr>
-              <a:t>('mpg’, ascending=False)</a:t>
+              <a:t>('mpg', ascending=False)</a:t>
             </a:r>
           </a:p>
           <a:p>
@@ -7003,7 +7003,7 @@
               <a:rPr lang="en-US" sz="1200" b="1" dirty="0">
                 <a:latin typeface="Consolas" panose="020B0609020204030204" pitchFamily="49" charset="0"/>
               </a:rPr>
-              <a:t>(columns=['Length’, 'Height'])</a:t>
+              <a:t>(columns=['Length', 'Height'])</a:t>
             </a:r>
           </a:p>
           <a:p>
@@ -9664,14 +9664,14 @@
           <a:effectLst/>
           <a:extLst>
             <a:ext uri="{909E8E84-426E-40dd-AFC4-6F175D3DCCD1}">
-              <a14:hiddenFill xmlns="" xmlns:a14="http://schemas.microsoft.com/office/drawing/2010/main">
+              <a14:hiddenFill xmlns:a14="http://schemas.microsoft.com/office/drawing/2010/main" xmlns="">
                 <a:solidFill>
                   <a:schemeClr val="accent1"/>
                 </a:solidFill>
               </a14:hiddenFill>
             </a:ext>
             <a:ext uri="{91240B29-F687-4f45-9708-019B960494DF}">
-              <a14:hiddenLine xmlns="" xmlns:a14="http://schemas.microsoft.com/office/drawing/2010/main" w="9525">
+              <a14:hiddenLine xmlns:a14="http://schemas.microsoft.com/office/drawing/2010/main" xmlns="" w="9525">
                 <a:solidFill>
                   <a:schemeClr val="tx1"/>
                 </a:solidFill>
@@ -9681,7 +9681,7 @@
               </a14:hiddenLine>
             </a:ext>
             <a:ext uri="{AF507438-7753-43e0-B8FC-AC1667EBCBE1}">
-              <a14:hiddenEffects xmlns="" xmlns:a14="http://schemas.microsoft.com/office/drawing/2010/main">
+              <a14:hiddenEffects xmlns:a14="http://schemas.microsoft.com/office/drawing/2010/main" xmlns="">
                 <a:effectLst>
                   <a:outerShdw dist="35921" dir="2700000" algn="ctr" rotWithShape="0">
                     <a:schemeClr val="bg2"/>
@@ -9831,7 +9831,7 @@
               <a:rPr lang="en-US" sz="1200" b="1" dirty="0">
                 <a:latin typeface="Consolas" panose="020B0609020204030204" pitchFamily="49" charset="0"/>
               </a:rPr>
-              <a:t>        [('d’, 1), ('d’, 2),</a:t>
+              <a:t>        [('d', 1), ('d', 2),</a:t>
             </a:r>
             <a:br>
               <a:rPr lang="en-US" sz="1200" b="1" dirty="0">
@@ -9842,7 +9842,7 @@
               <a:rPr lang="en-US" sz="1200" b="1" dirty="0">
                 <a:latin typeface="Consolas" panose="020B0609020204030204" pitchFamily="49" charset="0"/>
               </a:rPr>
-              <a:t>         ('e’, 2)], names=['n’, 'v']))</a:t>
+              <a:t>         ('e', 2)], names=['n', 'v']))</a:t>
             </a:r>
           </a:p>
           <a:p>
@@ -16410,7 +16410,7 @@
               <a:rPr lang="en-US" sz="1200" b="1" dirty="0">
                 <a:latin typeface="Consolas" panose="020B0609020204030204" pitchFamily="49" charset="0"/>
               </a:rPr>
-              <a:t>(n, 'value’)</a:t>
+              <a:t>(n, 'value')</a:t>
             </a:r>
             <a:br>
               <a:rPr lang="en-US" sz="1200" b="1" dirty="0">
@@ -16591,7 +16591,7 @@
               <a:rPr lang="en-US" sz="1200" b="1" dirty="0">
                 <a:latin typeface="Consolas" panose="020B0609020204030204" pitchFamily="49" charset="0"/>
               </a:rPr>
-              <a:t>[['width’, 'length’, 'species']]</a:t>
+              <a:t>[['width', 'length', 'species']]</a:t>
             </a:r>
           </a:p>
           <a:p>
@@ -16840,7 +16840,7 @@
               <a:rPr lang="en-US" sz="1200" b="1" dirty="0">
                 <a:latin typeface="Consolas" panose="020B0609020204030204" pitchFamily="49" charset="0"/>
               </a:rPr>
-              <a:t>['a'] &gt; 10, ['a’, 'c']]</a:t>
+              <a:t>['a'] &gt; 10, ['a', 'c']]</a:t>
             </a:r>
           </a:p>
           <a:p>
@@ -28180,114 +28180,6 @@
       </p:grpSpPr>
       <p:sp>
         <p:nvSpPr>
-          <p:cNvPr id="68" name="Rounded Rectangle 48">
-            <a:extLst>
-              <a:ext uri="{FF2B5EF4-FFF2-40B4-BE49-F238E27FC236}">
-                <a16:creationId xmlns:a16="http://schemas.microsoft.com/office/drawing/2014/main" id="{2C264735-B18D-87B6-15E3-DA28F5F967AE}"/>
-              </a:ext>
-            </a:extLst>
-          </p:cNvPr>
-          <p:cNvSpPr/>
-          <p:nvPr/>
-        </p:nvSpPr>
-        <p:spPr>
-          <a:xfrm>
-            <a:off x="5495291" y="7335915"/>
-            <a:ext cx="5305091" cy="3383345"/>
-          </a:xfrm>
-          <a:prstGeom prst="roundRect">
-            <a:avLst>
-              <a:gd name="adj" fmla="val 1508"/>
-            </a:avLst>
-          </a:prstGeom>
-          <a:solidFill>
-            <a:schemeClr val="accent1">
-              <a:lumMod val="20000"/>
-              <a:lumOff val="80000"/>
-            </a:schemeClr>
-          </a:solidFill>
-        </p:spPr>
-        <p:style>
-          <a:lnRef idx="2">
-            <a:schemeClr val="accent1">
-              <a:shade val="50000"/>
-            </a:schemeClr>
-          </a:lnRef>
-          <a:fillRef idx="1">
-            <a:schemeClr val="accent1"/>
-          </a:fillRef>
-          <a:effectRef idx="0">
-            <a:schemeClr val="accent1"/>
-          </a:effectRef>
-          <a:fontRef idx="minor">
-            <a:schemeClr val="lt1"/>
-          </a:fontRef>
-        </p:style>
-        <p:txBody>
-          <a:bodyPr rtlCol="0" anchor="ctr"/>
-          <a:lstStyle/>
-          <a:p>
-            <a:pPr algn="ctr"/>
-            <a:endParaRPr lang="en-US" sz="2683" dirty="0"/>
-          </a:p>
-        </p:txBody>
-      </p:sp>
-      <p:sp>
-        <p:nvSpPr>
-          <p:cNvPr id="54" name="Rounded Rectangle 48">
-            <a:extLst>
-              <a:ext uri="{FF2B5EF4-FFF2-40B4-BE49-F238E27FC236}">
-                <a16:creationId xmlns:a16="http://schemas.microsoft.com/office/drawing/2014/main" id="{72D85AA0-12BA-B3DC-5032-993B59C82B1B}"/>
-              </a:ext>
-            </a:extLst>
-          </p:cNvPr>
-          <p:cNvSpPr/>
-          <p:nvPr/>
-        </p:nvSpPr>
-        <p:spPr>
-          <a:xfrm>
-            <a:off x="140668" y="4606721"/>
-            <a:ext cx="5305091" cy="3521914"/>
-          </a:xfrm>
-          <a:prstGeom prst="roundRect">
-            <a:avLst>
-              <a:gd name="adj" fmla="val 1508"/>
-            </a:avLst>
-          </a:prstGeom>
-          <a:solidFill>
-            <a:schemeClr val="accent1">
-              <a:lumMod val="20000"/>
-              <a:lumOff val="80000"/>
-            </a:schemeClr>
-          </a:solidFill>
-        </p:spPr>
-        <p:style>
-          <a:lnRef idx="2">
-            <a:schemeClr val="accent1">
-              <a:shade val="50000"/>
-            </a:schemeClr>
-          </a:lnRef>
-          <a:fillRef idx="1">
-            <a:schemeClr val="accent1"/>
-          </a:fillRef>
-          <a:effectRef idx="0">
-            <a:schemeClr val="accent1"/>
-          </a:effectRef>
-          <a:fontRef idx="minor">
-            <a:schemeClr val="lt1"/>
-          </a:fontRef>
-        </p:style>
-        <p:txBody>
-          <a:bodyPr rtlCol="0" anchor="ctr"/>
-          <a:lstStyle/>
-          <a:p>
-            <a:pPr algn="ctr"/>
-            <a:endParaRPr lang="en-US" sz="2683" dirty="0"/>
-          </a:p>
-        </p:txBody>
-      </p:sp>
-      <p:sp>
-        <p:nvSpPr>
           <p:cNvPr id="39" name="Rounded Rectangle 32">
             <a:extLst>
               <a:ext uri="{FF2B5EF4-FFF2-40B4-BE49-F238E27FC236}">
@@ -28384,6 +28276,7 @@
             <a:r>
               <a:rPr lang="en-US" sz="1200" b="1" dirty="0" err="1">
                 <a:latin typeface="Consolas" panose="020B0609020204030204" pitchFamily="49" charset="0"/>
+                <a:hlinkClick r:id="rId2"/>
               </a:rPr>
               <a:t>get_option</a:t>
             </a:r>
@@ -28405,6 +28298,7 @@
             <a:r>
               <a:rPr lang="en-US" sz="1200" b="1" dirty="0" err="1">
                 <a:latin typeface="Consolas" panose="020B0609020204030204" pitchFamily="49" charset="0"/>
+                <a:hlinkClick r:id="rId3"/>
               </a:rPr>
               <a:t>set_option</a:t>
             </a:r>
@@ -28426,6 +28320,7 @@
             <a:r>
               <a:rPr lang="en-US" sz="1200" b="1" dirty="0" err="1">
                 <a:latin typeface="Consolas" panose="020B0609020204030204" pitchFamily="49" charset="0"/>
+                <a:hlinkClick r:id="rId4"/>
               </a:rPr>
               <a:t>reset_option</a:t>
             </a:r>
@@ -28447,6 +28342,7 @@
             <a:r>
               <a:rPr lang="en-US" sz="1200" b="1" dirty="0" err="1">
                 <a:latin typeface="Consolas" panose="020B0609020204030204" pitchFamily="49" charset="0"/>
+                <a:hlinkClick r:id="rId5"/>
               </a:rPr>
               <a:t>describe_option</a:t>
             </a:r>
@@ -28468,6 +28364,7 @@
             <a:r>
               <a:rPr lang="en-US" sz="1200" b="1" dirty="0" err="1">
                 <a:latin typeface="Consolas" panose="020B0609020204030204" pitchFamily="49" charset="0"/>
+                <a:hlinkClick r:id="rId6"/>
               </a:rPr>
               <a:t>option_context</a:t>
             </a:r>
@@ -28501,7 +28398,7 @@
         </p:nvSpPr>
         <p:spPr>
           <a:xfrm>
-            <a:off x="145642" y="127128"/>
+            <a:off x="145641" y="127128"/>
             <a:ext cx="10705236" cy="461665"/>
           </a:xfrm>
           <a:prstGeom prst="roundRect">
@@ -28534,7 +28431,7 @@
                 <a:solidFill>
                   <a:schemeClr val="bg1"/>
                 </a:solidFill>
-                <a:hlinkClick r:id="rId2">
+                <a:hlinkClick r:id="rId7">
                   <a:extLst>
                     <a:ext uri="{A12FA001-AC4F-418D-AE19-62706E023703}">
                       <ahyp:hlinkClr xmlns:ahyp="http://schemas.microsoft.com/office/drawing/2018/hyperlinkcolor" val="tx"/>
@@ -28567,14 +28464,14 @@
           <p:nvPr/>
         </p:nvPicPr>
         <p:blipFill>
-          <a:blip r:embed="rId3"/>
+          <a:blip r:embed="rId8"/>
           <a:stretch>
             <a:fillRect/>
           </a:stretch>
         </p:blipFill>
         <p:spPr>
           <a:xfrm>
-            <a:off x="6498830" y="1252453"/>
+            <a:off x="6498830" y="1031473"/>
             <a:ext cx="980154" cy="540000"/>
           </a:xfrm>
           <a:prstGeom prst="rect">
@@ -28597,14 +28494,14 @@
           <p:nvPr/>
         </p:nvPicPr>
         <p:blipFill>
-          <a:blip r:embed="rId4"/>
+          <a:blip r:embed="rId9"/>
           <a:stretch>
             <a:fillRect/>
           </a:stretch>
         </p:blipFill>
         <p:spPr>
           <a:xfrm>
-            <a:off x="3715783" y="1252453"/>
+            <a:off x="3715783" y="1031473"/>
             <a:ext cx="890414" cy="540000"/>
           </a:xfrm>
           <a:prstGeom prst="rect">
@@ -28626,8 +28523,8 @@
         </p:nvSpPr>
         <p:spPr>
           <a:xfrm>
-            <a:off x="145642" y="3195258"/>
-            <a:ext cx="10705236" cy="1015663"/>
+            <a:off x="145641" y="2547558"/>
+            <a:ext cx="3492000" cy="1015663"/>
           </a:xfrm>
           <a:prstGeom prst="rect">
             <a:avLst/>
@@ -28635,7 +28532,7 @@
           <a:noFill/>
         </p:spPr>
         <p:txBody>
-          <a:bodyPr wrap="square" numCol="3" rtlCol="0">
+          <a:bodyPr wrap="square" numCol="1" rtlCol="0">
             <a:spAutoFit/>
           </a:bodyPr>
           <a:lstStyle/>
@@ -28644,7 +28541,20 @@
               <a:rPr lang="en-US" sz="1200" b="1" dirty="0">
                 <a:latin typeface="Consolas" panose="020B0609020204030204" pitchFamily="49" charset="0"/>
               </a:rPr>
-              <a:t>df.plot(subplots=True)</a:t>
+              <a:t>df.</a:t>
+            </a:r>
+            <a:r>
+              <a:rPr lang="en-US" sz="1200" b="1" dirty="0">
+                <a:latin typeface="Consolas" panose="020B0609020204030204" pitchFamily="49" charset="0"/>
+                <a:hlinkClick r:id="rId10"/>
+              </a:rPr>
+              <a:t>plot</a:t>
+            </a:r>
+            <a:r>
+              <a:rPr lang="en-US" sz="1200" b="1" dirty="0">
+                <a:latin typeface="Consolas" panose="020B0609020204030204" pitchFamily="49" charset="0"/>
+              </a:rPr>
+              <a:t>(subplots=True)</a:t>
             </a:r>
           </a:p>
           <a:p>
@@ -28667,7 +28577,14 @@
               <a:rPr lang="en-US" sz="1200" b="1" dirty="0" err="1">
                 <a:latin typeface="Consolas" panose="020B0609020204030204" pitchFamily="49" charset="0"/>
               </a:rPr>
-              <a:t>df.plot</a:t>
+              <a:t>df.</a:t>
+            </a:r>
+            <a:r>
+              <a:rPr lang="en-US" sz="1200" b="1" dirty="0" err="1">
+                <a:latin typeface="Consolas" panose="020B0609020204030204" pitchFamily="49" charset="0"/>
+                <a:hlinkClick r:id="rId10"/>
+              </a:rPr>
+              <a:t>plot</a:t>
             </a:r>
             <a:r>
               <a:rPr lang="en-US" sz="1200" b="1" dirty="0">
@@ -28682,93 +28599,6 @@
               <a:rPr lang="en-US" sz="1200" dirty="0"/>
               <a:t>Sets the title of the graph.</a:t>
             </a:r>
-          </a:p>
-          <a:p>
-            <a:r>
-              <a:rPr lang="en-US" sz="1200" b="1" dirty="0" err="1">
-                <a:latin typeface="Consolas" panose="020B0609020204030204" pitchFamily="49" charset="0"/>
-              </a:rPr>
-              <a:t>df.plot</a:t>
-            </a:r>
-            <a:r>
-              <a:rPr lang="en-US" sz="1200" b="1" dirty="0">
-                <a:latin typeface="Consolas" panose="020B0609020204030204" pitchFamily="49" charset="0"/>
-              </a:rPr>
-              <a:t>(cumulative=True)</a:t>
-            </a:r>
-          </a:p>
-          <a:p>
-            <a:pPr marL="93600"/>
-            <a:r>
-              <a:rPr lang="en-US" sz="1200" dirty="0"/>
-              <a:t>Creates a cumulative plot</a:t>
-            </a:r>
-          </a:p>
-          <a:p>
-            <a:r>
-              <a:rPr lang="en-US" sz="1200" b="1" dirty="0" err="1">
-                <a:latin typeface="Consolas" panose="020B0609020204030204" pitchFamily="49" charset="0"/>
-              </a:rPr>
-              <a:t>df.plot</a:t>
-            </a:r>
-            <a:r>
-              <a:rPr lang="en-US" sz="1200" b="1" dirty="0">
-                <a:latin typeface="Consolas" panose="020B0609020204030204" pitchFamily="49" charset="0"/>
-              </a:rPr>
-              <a:t>(bins=30)</a:t>
-            </a:r>
-          </a:p>
-          <a:p>
-            <a:pPr marL="93600"/>
-            <a:r>
-              <a:rPr lang="en-US" sz="1200" dirty="0"/>
-              <a:t>Set the number of bins into which data is grouped (histograms)</a:t>
-            </a:r>
-          </a:p>
-          <a:p>
-            <a:r>
-              <a:rPr lang="en-US" sz="1200" b="1" dirty="0" err="1">
-                <a:latin typeface="Consolas" panose="020B0609020204030204" pitchFamily="49" charset="0"/>
-              </a:rPr>
-              <a:t>df.plot</a:t>
-            </a:r>
-            <a:r>
-              <a:rPr lang="en-US" sz="1200" b="1" dirty="0">
-                <a:latin typeface="Consolas" panose="020B0609020204030204" pitchFamily="49" charset="0"/>
-              </a:rPr>
-              <a:t>(stacked=True)</a:t>
-            </a:r>
-          </a:p>
-          <a:p>
-            <a:pPr marL="93600"/>
-            <a:r>
-              <a:rPr lang="en-US" sz="1200" dirty="0"/>
-              <a:t>Stacks the data for the columns on top of each other.</a:t>
-            </a:r>
-          </a:p>
-          <a:p>
-            <a:r>
-              <a:rPr lang="en-US" sz="1200" b="1" dirty="0" err="1">
-                <a:latin typeface="Consolas" panose="020B0609020204030204" pitchFamily="49" charset="0"/>
-              </a:rPr>
-              <a:t>df.plot</a:t>
-            </a:r>
-            <a:r>
-              <a:rPr lang="en-US" sz="1200" b="1" dirty="0">
-                <a:latin typeface="Consolas" panose="020B0609020204030204" pitchFamily="49" charset="0"/>
-              </a:rPr>
-              <a:t>(alpha=0.5)</a:t>
-            </a:r>
-          </a:p>
-          <a:p>
-            <a:pPr marL="93600"/>
-            <a:r>
-              <a:rPr lang="en-US" sz="1200" dirty="0"/>
-              <a:t>Sets the transparency of the plot to 50%.</a:t>
-            </a:r>
-          </a:p>
-          <a:p>
-            <a:endParaRPr lang="en-US" sz="1200" dirty="0"/>
           </a:p>
         </p:txBody>
       </p:sp>
@@ -28787,14 +28617,14 @@
           <p:nvPr/>
         </p:nvPicPr>
         <p:blipFill>
-          <a:blip r:embed="rId5"/>
+          <a:blip r:embed="rId11"/>
           <a:stretch>
             <a:fillRect/>
           </a:stretch>
         </p:blipFill>
         <p:spPr>
           <a:xfrm>
-            <a:off x="1147077" y="1253022"/>
+            <a:off x="1147077" y="1032042"/>
             <a:ext cx="745279" cy="540000"/>
           </a:xfrm>
           <a:prstGeom prst="rect">
@@ -28817,14 +28647,14 @@
           <p:nvPr/>
         </p:nvPicPr>
         <p:blipFill>
-          <a:blip r:embed="rId6"/>
+          <a:blip r:embed="rId12"/>
           <a:stretch>
             <a:fillRect/>
           </a:stretch>
         </p:blipFill>
         <p:spPr>
           <a:xfrm>
-            <a:off x="9247983" y="1252453"/>
+            <a:off x="9247983" y="1031473"/>
             <a:ext cx="613573" cy="540000"/>
           </a:xfrm>
           <a:prstGeom prst="rect">
@@ -28846,7 +28676,7 @@
         </p:nvSpPr>
         <p:spPr>
           <a:xfrm>
-            <a:off x="140669" y="741193"/>
+            <a:off x="140669" y="596413"/>
             <a:ext cx="2572052" cy="461665"/>
           </a:xfrm>
           <a:prstGeom prst="rect">
@@ -28869,13 +28699,16 @@
             <a:r>
               <a:rPr lang="en-US" sz="1200" b="1" dirty="0">
                 <a:latin typeface="Consolas" panose="020B0609020204030204" pitchFamily="49" charset="0"/>
-                <a:hlinkClick r:id="rId7"/>
-              </a:rPr>
-              <a:t>plot()</a:t>
-            </a:r>
-            <a:endParaRPr lang="en-US" sz="1200" b="1" dirty="0">
-              <a:latin typeface="Consolas" panose="020B0609020204030204" pitchFamily="49" charset="0"/>
-            </a:endParaRPr>
+                <a:hlinkClick r:id="rId10"/>
+              </a:rPr>
+              <a:t>plot</a:t>
+            </a:r>
+            <a:r>
+              <a:rPr lang="en-US" sz="1200" b="1" dirty="0">
+                <a:latin typeface="Consolas" panose="020B0609020204030204" pitchFamily="49" charset="0"/>
+              </a:rPr>
+              <a:t>()</a:t>
+            </a:r>
           </a:p>
           <a:p>
             <a:pPr marL="93600"/>
@@ -28908,7 +28741,7 @@
         </p:nvSpPr>
         <p:spPr>
           <a:xfrm>
-            <a:off x="2716310" y="741193"/>
+            <a:off x="2670737" y="596413"/>
             <a:ext cx="3146010" cy="461665"/>
           </a:xfrm>
           <a:prstGeom prst="rect">
@@ -28926,51 +28759,33 @@
               <a:rPr lang="en-US" sz="1200" b="1" dirty="0" err="1">
                 <a:latin typeface="Consolas" panose="020B0609020204030204" pitchFamily="49" charset="0"/>
               </a:rPr>
-              <a:t>df.plot</a:t>
+              <a:t>df.</a:t>
+            </a:r>
+            <a:r>
+              <a:rPr lang="en-US" sz="1200" b="1" dirty="0" err="1">
+                <a:latin typeface="Consolas" panose="020B0609020204030204" pitchFamily="49" charset="0"/>
+                <a:hlinkClick r:id="rId10"/>
+              </a:rPr>
+              <a:t>plot</a:t>
+            </a:r>
+            <a:r>
+              <a:rPr lang="en-US" sz="1200" b="1" dirty="0" err="1">
+                <a:latin typeface="Consolas" panose="020B0609020204030204" pitchFamily="49" charset="0"/>
+              </a:rPr>
+              <a:t>.</a:t>
+            </a:r>
+            <a:r>
+              <a:rPr lang="en-US" sz="1200" b="1" dirty="0" err="1">
+                <a:latin typeface="Consolas" panose="020B0609020204030204" pitchFamily="49" charset="0"/>
+                <a:hlinkClick r:id="rId13"/>
+              </a:rPr>
+              <a:t>scatter</a:t>
             </a:r>
             <a:r>
               <a:rPr lang="en-US" sz="1200" b="1" dirty="0">
                 <a:latin typeface="Consolas" panose="020B0609020204030204" pitchFamily="49" charset="0"/>
               </a:rPr>
-              <a:t>(</a:t>
-            </a:r>
-            <a:r>
-              <a:rPr lang="en-US" sz="1200" b="1" dirty="0">
-                <a:latin typeface="Consolas" panose="020B0609020204030204" pitchFamily="49" charset="0"/>
-                <a:hlinkClick r:id="rId8"/>
-              </a:rPr>
-              <a:t>kind=‘</a:t>
-            </a:r>
-            <a:r>
-              <a:rPr lang="en-US" sz="1200" b="1" dirty="0" err="1">
-                <a:latin typeface="Consolas" panose="020B0609020204030204" pitchFamily="49" charset="0"/>
-                <a:hlinkClick r:id="rId8"/>
-              </a:rPr>
-              <a:t>scatter’</a:t>
-            </a:r>
-            <a:r>
-              <a:rPr lang="en-US" sz="1200" b="1" dirty="0" err="1">
-                <a:latin typeface="Consolas" panose="020B0609020204030204" pitchFamily="49" charset="0"/>
-              </a:rPr>
-              <a:t>,x</a:t>
-            </a:r>
-            <a:r>
-              <a:rPr lang="en-US" sz="1200" b="1" dirty="0">
-                <a:latin typeface="Consolas" panose="020B0609020204030204" pitchFamily="49" charset="0"/>
-              </a:rPr>
-              <a:t>=‘</a:t>
-            </a:r>
-            <a:r>
-              <a:rPr lang="en-US" sz="1200" b="1" dirty="0" err="1">
-                <a:latin typeface="Consolas" panose="020B0609020204030204" pitchFamily="49" charset="0"/>
-              </a:rPr>
-              <a:t>w’,y</a:t>
-            </a:r>
-            <a:r>
-              <a:rPr lang="en-US" sz="1200" b="1" dirty="0">
-                <a:latin typeface="Consolas" panose="020B0609020204030204" pitchFamily="49" charset="0"/>
-              </a:rPr>
-              <a:t>=‘h’)</a:t>
+              <a:t>(x='w', y='h')</a:t>
             </a:r>
           </a:p>
           <a:p>
@@ -29004,7 +28819,7 @@
         </p:nvSpPr>
         <p:spPr>
           <a:xfrm>
-            <a:off x="5862320" y="741193"/>
+            <a:off x="5774763" y="596413"/>
             <a:ext cx="2494279" cy="461665"/>
           </a:xfrm>
           <a:prstGeom prst="rect">
@@ -29022,26 +28837,33 @@
               <a:rPr lang="en-US" sz="1200" b="1" dirty="0" err="1">
                 <a:latin typeface="Consolas" panose="020B0609020204030204" pitchFamily="49" charset="0"/>
               </a:rPr>
-              <a:t>df.plot</a:t>
+              <a:t>df.</a:t>
+            </a:r>
+            <a:r>
+              <a:rPr lang="en-US" sz="1200" b="1" dirty="0" err="1">
+                <a:latin typeface="Consolas" panose="020B0609020204030204" pitchFamily="49" charset="0"/>
+                <a:hlinkClick r:id="rId10"/>
+              </a:rPr>
+              <a:t>plot</a:t>
+            </a:r>
+            <a:r>
+              <a:rPr lang="en-US" sz="1200" b="1" dirty="0" err="1">
+                <a:latin typeface="Consolas" panose="020B0609020204030204" pitchFamily="49" charset="0"/>
+              </a:rPr>
+              <a:t>.</a:t>
+            </a:r>
+            <a:r>
+              <a:rPr lang="en-US" sz="1200" b="1" dirty="0" err="1">
+                <a:latin typeface="Consolas" panose="020B0609020204030204" pitchFamily="49" charset="0"/>
+                <a:hlinkClick r:id="rId14"/>
+              </a:rPr>
+              <a:t>hist</a:t>
             </a:r>
             <a:r>
               <a:rPr lang="en-US" sz="1200" b="1" dirty="0">
                 <a:latin typeface="Consolas" panose="020B0609020204030204" pitchFamily="49" charset="0"/>
               </a:rPr>
-              <a:t>(</a:t>
-            </a:r>
-            <a:r>
-              <a:rPr lang="en-US" sz="1200" b="1" dirty="0">
-                <a:latin typeface="Consolas" panose="020B0609020204030204" pitchFamily="49" charset="0"/>
-                <a:hlinkClick r:id="rId9"/>
-              </a:rPr>
-              <a:t>kind=‘hist’</a:t>
-            </a:r>
-            <a:r>
-              <a:rPr lang="en-US" sz="1200" b="1" dirty="0">
-                <a:latin typeface="Consolas" panose="020B0609020204030204" pitchFamily="49" charset="0"/>
-              </a:rPr>
-              <a:t>)</a:t>
+              <a:t>()</a:t>
             </a:r>
           </a:p>
           <a:p>
@@ -29075,7 +28897,7 @@
         </p:nvSpPr>
         <p:spPr>
           <a:xfrm>
-            <a:off x="8356599" y="741193"/>
+            <a:off x="8227059" y="596413"/>
             <a:ext cx="2494279" cy="461665"/>
           </a:xfrm>
           <a:prstGeom prst="rect">
@@ -29090,30 +28912,43 @@
           <a:lstStyle/>
           <a:p>
             <a:r>
+              <a:rPr lang="en-US" sz="1200" b="1" dirty="0" err="1">
+                <a:latin typeface="Consolas" panose="020B0609020204030204" pitchFamily="49" charset="0"/>
+              </a:rPr>
+              <a:t>df.</a:t>
+            </a:r>
+            <a:r>
+              <a:rPr lang="en-US" sz="1200" b="1" dirty="0" err="1">
+                <a:latin typeface="Consolas" panose="020B0609020204030204" pitchFamily="49" charset="0"/>
+                <a:hlinkClick r:id="rId10"/>
+              </a:rPr>
+              <a:t>plot</a:t>
+            </a:r>
+            <a:r>
+              <a:rPr lang="en-US" sz="1200" b="1" dirty="0" err="1">
+                <a:latin typeface="Consolas" panose="020B0609020204030204" pitchFamily="49" charset="0"/>
+              </a:rPr>
+              <a:t>.</a:t>
+            </a:r>
+            <a:r>
+              <a:rPr lang="en-US" sz="1200" b="1" dirty="0" err="1">
+                <a:latin typeface="Consolas" panose="020B0609020204030204" pitchFamily="49" charset="0"/>
+                <a:hlinkClick r:id="rId15"/>
+              </a:rPr>
+              <a:t>pie</a:t>
+            </a:r>
+            <a:r>
               <a:rPr lang="en-US" sz="1200" b="1" dirty="0">
                 <a:latin typeface="Consolas" panose="020B0609020204030204" pitchFamily="49" charset="0"/>
               </a:rPr>
-              <a:t>df.plot(</a:t>
-            </a:r>
-            <a:r>
-              <a:rPr lang="en-US" sz="1200" b="1" dirty="0">
-                <a:latin typeface="Consolas" panose="020B0609020204030204" pitchFamily="49" charset="0"/>
-                <a:hlinkClick r:id="rId10"/>
-              </a:rPr>
-              <a:t>kind=‘pie’</a:t>
-            </a:r>
-            <a:r>
-              <a:rPr lang="en-US" sz="1200" b="1" dirty="0">
-                <a:latin typeface="Consolas" panose="020B0609020204030204" pitchFamily="49" charset="0"/>
-              </a:rPr>
-              <a:t>)</a:t>
+              <a:t>()</a:t>
             </a:r>
           </a:p>
           <a:p>
             <a:pPr marL="93600"/>
             <a:r>
               <a:rPr lang="en-US" sz="1200" dirty="0"/>
-              <a:t>Plot a histogram of the </a:t>
+              <a:t>Plot a pie chart of the </a:t>
             </a:r>
             <a:r>
               <a:rPr lang="en-US" sz="1200" dirty="0" err="1"/>
@@ -29140,10 +28975,10 @@
         </p:nvGrpSpPr>
         <p:grpSpPr>
           <a:xfrm>
-            <a:off x="5525670" y="4184606"/>
-            <a:ext cx="5305091" cy="3014422"/>
+            <a:off x="5495291" y="7800649"/>
+            <a:ext cx="5305091" cy="2933142"/>
             <a:chOff x="139854" y="3045615"/>
-            <a:chExt cx="5305091" cy="3014422"/>
+            <a:chExt cx="5305091" cy="2933142"/>
           </a:xfrm>
         </p:grpSpPr>
         <p:sp>
@@ -29193,7 +29028,7 @@
                   <a:solidFill>
                     <a:schemeClr val="bg1"/>
                   </a:solidFill>
-                  <a:hlinkClick r:id="rId11">
+                  <a:hlinkClick r:id="rId16">
                     <a:extLst>
                       <a:ext uri="{A12FA001-AC4F-418D-AE19-62706E023703}">
                         <ahyp:hlinkClr xmlns:ahyp="http://schemas.microsoft.com/office/drawing/2018/hyperlinkcolor" val="tx"/>
@@ -29225,7 +29060,7 @@
           </p:nvSpPr>
           <p:spPr>
             <a:xfrm>
-              <a:off x="139854" y="4121045"/>
+              <a:off x="139854" y="4039765"/>
               <a:ext cx="2654146" cy="1938992"/>
             </a:xfrm>
             <a:prstGeom prst="rect">
@@ -29254,7 +29089,13 @@
               <a:r>
                 <a:rPr lang="en-US" sz="1200" b="1" dirty="0" err="1">
                   <a:latin typeface="Consolas" panose="020B0609020204030204" pitchFamily="49" charset="0"/>
-                  <a:hlinkClick r:id="rId12"/>
+                </a:rPr>
+                <a:t>pd.</a:t>
+              </a:r>
+              <a:r>
+                <a:rPr lang="en-US" sz="1200" b="1" dirty="0" err="1">
+                  <a:latin typeface="Consolas" panose="020B0609020204030204" pitchFamily="49" charset="0"/>
+                  <a:hlinkClick r:id="rId17"/>
                 </a:rPr>
                 <a:t>read_csv</a:t>
               </a:r>
@@ -29300,7 +29141,13 @@
               <a:r>
                 <a:rPr lang="en-US" sz="1200" b="1" dirty="0" err="1">
                   <a:latin typeface="Consolas" panose="020B0609020204030204" pitchFamily="49" charset="0"/>
-                  <a:hlinkClick r:id="rId13"/>
+                </a:rPr>
+                <a:t>pd.</a:t>
+              </a:r>
+              <a:r>
+                <a:rPr lang="en-US" sz="1200" b="1" dirty="0" err="1">
+                  <a:latin typeface="Consolas" panose="020B0609020204030204" pitchFamily="49" charset="0"/>
+                  <a:hlinkClick r:id="rId18"/>
                 </a:rPr>
                 <a:t>read_html</a:t>
               </a:r>
@@ -29346,7 +29193,13 @@
               <a:r>
                 <a:rPr lang="en-US" sz="1200" b="1" dirty="0" err="1">
                   <a:latin typeface="Consolas" panose="020B0609020204030204" pitchFamily="49" charset="0"/>
-                  <a:hlinkClick r:id="rId14"/>
+                </a:rPr>
+                <a:t>pd.</a:t>
+              </a:r>
+              <a:r>
+                <a:rPr lang="en-US" sz="1200" b="1" dirty="0" err="1">
+                  <a:latin typeface="Consolas" panose="020B0609020204030204" pitchFamily="49" charset="0"/>
+                  <a:hlinkClick r:id="rId19"/>
                 </a:rPr>
                 <a:t>read_excel</a:t>
               </a:r>
@@ -29400,7 +29253,13 @@
               <a:r>
                 <a:rPr lang="en-US" sz="1200" b="1" dirty="0" err="1">
                   <a:latin typeface="Consolas" panose="020B0609020204030204" pitchFamily="49" charset="0"/>
-                  <a:hlinkClick r:id="rId15"/>
+                </a:rPr>
+                <a:t>pd.</a:t>
+              </a:r>
+              <a:r>
+                <a:rPr lang="en-US" sz="1200" b="1" dirty="0" err="1">
+                  <a:latin typeface="Consolas" panose="020B0609020204030204" pitchFamily="49" charset="0"/>
+                  <a:hlinkClick r:id="rId20"/>
                 </a:rPr>
                 <a:t>read_sql</a:t>
               </a:r>
@@ -29439,10 +29298,32 @@
               </a:r>
             </a:p>
             <a:p>
-              <a:endParaRPr lang="en-US" sz="1200" dirty="0"/>
+              <a:r>
+                <a:rPr lang="en-US" sz="1200" b="1" dirty="0" err="1">
+                  <a:latin typeface="Consolas" panose="020B0609020204030204" pitchFamily="49" charset="0"/>
+                </a:rPr>
+                <a:t>pd.</a:t>
+              </a:r>
+              <a:r>
+                <a:rPr lang="en-US" sz="1200" b="1" dirty="0" err="1">
+                  <a:latin typeface="Consolas" panose="020B0609020204030204" pitchFamily="49" charset="0"/>
+                  <a:hlinkClick r:id="rId21"/>
+                </a:rPr>
+                <a:t>read_clipboard</a:t>
+              </a:r>
+              <a:r>
+                <a:rPr lang="en-US" sz="1200" b="1" dirty="0">
+                  <a:latin typeface="Consolas" panose="020B0609020204030204" pitchFamily="49" charset="0"/>
+                </a:rPr>
+                <a:t>()</a:t>
+              </a:r>
             </a:p>
             <a:p>
-              <a:endParaRPr lang="en-US" sz="1200" dirty="0"/>
+              <a:pPr marL="93600"/>
+              <a:r>
+                <a:rPr lang="en-US" sz="1200" dirty="0"/>
+                <a:t>Read text from clipboard</a:t>
+              </a:r>
             </a:p>
           </p:txBody>
         </p:sp>
@@ -29460,8 +29341,8 @@
           </p:nvSpPr>
           <p:spPr>
             <a:xfrm>
-              <a:off x="2790799" y="4121045"/>
-              <a:ext cx="2654146" cy="1384995"/>
+              <a:off x="2790799" y="4039765"/>
+              <a:ext cx="2654146" cy="1754326"/>
             </a:xfrm>
             <a:prstGeom prst="rect">
               <a:avLst/>
@@ -29478,18 +29359,12 @@
                 <a:rPr lang="en-US" sz="1200" b="1" dirty="0" err="1">
                   <a:latin typeface="Consolas" panose="020B0609020204030204" pitchFamily="49" charset="0"/>
                 </a:rPr>
-                <a:t>df</a:t>
-              </a:r>
-              <a:r>
-                <a:rPr lang="en-US" sz="1200" b="1" dirty="0">
-                  <a:latin typeface="Consolas" panose="020B0609020204030204" pitchFamily="49" charset="0"/>
-                </a:rPr>
-                <a:t> = </a:t>
+                <a:t>df.</a:t>
               </a:r>
               <a:r>
                 <a:rPr lang="en-US" sz="1200" b="1" dirty="0" err="1">
                   <a:latin typeface="Consolas" panose="020B0609020204030204" pitchFamily="49" charset="0"/>
-                  <a:hlinkClick r:id="rId16"/>
+                  <a:hlinkClick r:id="rId22"/>
                 </a:rPr>
                 <a:t>to_parquet</a:t>
               </a:r>
@@ -29524,18 +29399,12 @@
                 <a:rPr lang="en-US" sz="1200" b="1" dirty="0" err="1">
                   <a:latin typeface="Consolas" panose="020B0609020204030204" pitchFamily="49" charset="0"/>
                 </a:rPr>
-                <a:t>df</a:t>
-              </a:r>
-              <a:r>
-                <a:rPr lang="en-US" sz="1200" b="1" dirty="0">
-                  <a:latin typeface="Consolas" panose="020B0609020204030204" pitchFamily="49" charset="0"/>
-                </a:rPr>
-                <a:t> = </a:t>
+                <a:t>df.</a:t>
               </a:r>
               <a:r>
                 <a:rPr lang="en-US" sz="1200" b="1" dirty="0" err="1">
                   <a:latin typeface="Consolas" panose="020B0609020204030204" pitchFamily="49" charset="0"/>
-                  <a:hlinkClick r:id="rId17"/>
+                  <a:hlinkClick r:id="rId23"/>
                 </a:rPr>
                 <a:t>to_feather</a:t>
               </a:r>
@@ -29570,18 +29439,12 @@
                 <a:rPr lang="en-US" sz="1200" b="1" dirty="0" err="1">
                   <a:latin typeface="Consolas" panose="020B0609020204030204" pitchFamily="49" charset="0"/>
                 </a:rPr>
-                <a:t>df</a:t>
-              </a:r>
-              <a:r>
-                <a:rPr lang="en-US" sz="1200" b="1" dirty="0">
-                  <a:latin typeface="Consolas" panose="020B0609020204030204" pitchFamily="49" charset="0"/>
-                </a:rPr>
-                <a:t> = </a:t>
+                <a:t>df.</a:t>
               </a:r>
               <a:r>
                 <a:rPr lang="en-US" sz="1200" b="1" dirty="0" err="1">
                   <a:latin typeface="Consolas" panose="020B0609020204030204" pitchFamily="49" charset="0"/>
-                  <a:hlinkClick r:id="rId18"/>
+                  <a:hlinkClick r:id="rId24"/>
                 </a:rPr>
                 <a:t>to_hdf</a:t>
               </a:r>
@@ -29612,6 +29475,35 @@
               </a:r>
             </a:p>
             <a:p>
+              <a:r>
+                <a:rPr lang="en-US" sz="1200" b="1" dirty="0" err="1">
+                  <a:latin typeface="Consolas" panose="020B0609020204030204" pitchFamily="49" charset="0"/>
+                </a:rPr>
+                <a:t>pd.</a:t>
+              </a:r>
+              <a:r>
+                <a:rPr lang="en-US" sz="1200" b="1" dirty="0" err="1">
+                  <a:latin typeface="Consolas" panose="020B0609020204030204" pitchFamily="49" charset="0"/>
+                  <a:hlinkClick r:id="rId25"/>
+                </a:rPr>
+                <a:t>to_clipboard</a:t>
+              </a:r>
+              <a:r>
+                <a:rPr lang="en-US" sz="1200" b="1" dirty="0">
+                  <a:latin typeface="Consolas" panose="020B0609020204030204" pitchFamily="49" charset="0"/>
+                </a:rPr>
+                <a:t>()</a:t>
+              </a:r>
+            </a:p>
+            <a:p>
+              <a:pPr marL="93600"/>
+              <a:r>
+                <a:rPr lang="en-US" sz="1200" dirty="0"/>
+                <a:t>Copy object to the system clipboard</a:t>
+              </a:r>
+            </a:p>
+            <a:p>
+              <a:pPr marL="93600"/>
               <a:endParaRPr lang="en-US" sz="1200" dirty="0"/>
             </a:p>
           </p:txBody>
@@ -29630,7 +29522,7 @@
           </p:nvSpPr>
           <p:spPr>
             <a:xfrm>
-              <a:off x="139854" y="3513231"/>
+              <a:off x="139854" y="3472591"/>
               <a:ext cx="5305091" cy="646331"/>
             </a:xfrm>
             <a:prstGeom prst="rect">
@@ -29699,7 +29591,7 @@
                 <a:solidFill>
                   <a:schemeClr val="bg1"/>
                 </a:solidFill>
-                <a:hlinkClick r:id="rId19">
+                <a:hlinkClick r:id="rId26">
                   <a:extLst>
                     <a:ext uri="{A12FA001-AC4F-418D-AE19-62706E023703}">
                       <ahyp:hlinkClr xmlns:ahyp="http://schemas.microsoft.com/office/drawing/2018/hyperlinkcolor" val="tx"/>
@@ -30071,330 +29963,6 @@
           </a:p>
         </p:txBody>
       </p:sp>
-      <p:grpSp>
-        <p:nvGrpSpPr>
-          <p:cNvPr id="49" name="Group 48">
-            <a:extLst>
-              <a:ext uri="{FF2B5EF4-FFF2-40B4-BE49-F238E27FC236}">
-                <a16:creationId xmlns:a16="http://schemas.microsoft.com/office/drawing/2014/main" id="{723DD55A-6D4F-4125-C823-F3B5B3ADE67B}"/>
-              </a:ext>
-            </a:extLst>
-          </p:cNvPr>
-          <p:cNvGrpSpPr/>
-          <p:nvPr/>
-        </p:nvGrpSpPr>
-        <p:grpSpPr>
-          <a:xfrm>
-            <a:off x="140669" y="4184606"/>
-            <a:ext cx="5305091" cy="2506422"/>
-            <a:chOff x="139854" y="3045615"/>
-            <a:chExt cx="5305091" cy="2506422"/>
-          </a:xfrm>
-        </p:grpSpPr>
-        <p:sp>
-          <p:nvSpPr>
-            <p:cNvPr id="50" name="Rounded Rectangle 80">
-              <a:extLst>
-                <a:ext uri="{FF2B5EF4-FFF2-40B4-BE49-F238E27FC236}">
-                  <a16:creationId xmlns:a16="http://schemas.microsoft.com/office/drawing/2014/main" id="{A5E842E6-4526-202F-B621-BC165A1B6376}"/>
-                </a:ext>
-              </a:extLst>
-            </p:cNvPr>
-            <p:cNvSpPr/>
-            <p:nvPr/>
-          </p:nvSpPr>
-          <p:spPr>
-            <a:xfrm>
-              <a:off x="139854" y="3045615"/>
-              <a:ext cx="5305091" cy="461665"/>
-            </a:xfrm>
-            <a:prstGeom prst="roundRect">
-              <a:avLst/>
-            </a:prstGeom>
-          </p:spPr>
-          <p:style>
-            <a:lnRef idx="2">
-              <a:schemeClr val="accent1">
-                <a:shade val="50000"/>
-              </a:schemeClr>
-            </a:lnRef>
-            <a:fillRef idx="1">
-              <a:schemeClr val="accent1"/>
-            </a:fillRef>
-            <a:effectRef idx="0">
-              <a:schemeClr val="accent1"/>
-            </a:effectRef>
-            <a:fontRef idx="minor">
-              <a:schemeClr val="lt1"/>
-            </a:fontRef>
-          </p:style>
-          <p:txBody>
-            <a:bodyPr rtlCol="0" anchor="ctr"/>
-            <a:lstStyle/>
-            <a:p>
-              <a:pPr algn="ctr"/>
-              <a:r>
-                <a:rPr lang="en-US" sz="2800" b="1" dirty="0">
-                  <a:solidFill>
-                    <a:schemeClr val="bg1"/>
-                  </a:solidFill>
-                </a:rPr>
-                <a:t>Changing Type</a:t>
-              </a:r>
-            </a:p>
-          </p:txBody>
-        </p:sp>
-        <p:sp>
-          <p:nvSpPr>
-            <p:cNvPr id="51" name="TextBox 50">
-              <a:extLst>
-                <a:ext uri="{FF2B5EF4-FFF2-40B4-BE49-F238E27FC236}">
-                  <a16:creationId xmlns:a16="http://schemas.microsoft.com/office/drawing/2014/main" id="{9AA3EAA8-0C5D-C222-489A-793708C1E1B1}"/>
-                </a:ext>
-              </a:extLst>
-            </p:cNvPr>
-            <p:cNvSpPr txBox="1"/>
-            <p:nvPr/>
-          </p:nvSpPr>
-          <p:spPr>
-            <a:xfrm>
-              <a:off x="139854" y="3613045"/>
-              <a:ext cx="2654146" cy="1938992"/>
-            </a:xfrm>
-            <a:prstGeom prst="rect">
-              <a:avLst/>
-            </a:prstGeom>
-            <a:noFill/>
-          </p:spPr>
-          <p:txBody>
-            <a:bodyPr wrap="square" rtlCol="0">
-              <a:spAutoFit/>
-            </a:bodyPr>
-            <a:lstStyle/>
-            <a:p>
-              <a:r>
-                <a:rPr lang="en-US" sz="1200" b="1" dirty="0" err="1">
-                  <a:latin typeface="Consolas" panose="020B0609020204030204" pitchFamily="49" charset="0"/>
-                </a:rPr>
-                <a:t>pd.</a:t>
-              </a:r>
-              <a:r>
-                <a:rPr lang="en-US" sz="1200" b="1" dirty="0" err="1">
-                  <a:latin typeface="Consolas" panose="020B0609020204030204" pitchFamily="49" charset="0"/>
-                  <a:hlinkClick r:id="rId20"/>
-                </a:rPr>
-                <a:t>to_numeric</a:t>
-              </a:r>
-              <a:r>
-                <a:rPr lang="en-US" sz="1200" b="1" dirty="0">
-                  <a:latin typeface="Consolas" panose="020B0609020204030204" pitchFamily="49" charset="0"/>
-                </a:rPr>
-                <a:t>(data)</a:t>
-              </a:r>
-            </a:p>
-            <a:p>
-              <a:pPr marL="93600"/>
-              <a:r>
-                <a:rPr lang="en-US" sz="1200" dirty="0"/>
-                <a:t>convert non-numeric types to numeric. </a:t>
-              </a:r>
-            </a:p>
-            <a:p>
-              <a:r>
-                <a:rPr lang="en-US" sz="1200" b="1" dirty="0" err="1">
-                  <a:latin typeface="Consolas" panose="020B0609020204030204" pitchFamily="49" charset="0"/>
-                </a:rPr>
-                <a:t>pd.</a:t>
-              </a:r>
-              <a:r>
-                <a:rPr lang="en-US" sz="1200" b="1" dirty="0" err="1">
-                  <a:latin typeface="Consolas" panose="020B0609020204030204" pitchFamily="49" charset="0"/>
-                  <a:hlinkClick r:id="rId21"/>
-                </a:rPr>
-                <a:t>to_datetime</a:t>
-              </a:r>
-              <a:r>
-                <a:rPr lang="en-US" sz="1200" b="1" dirty="0">
-                  <a:latin typeface="Consolas" panose="020B0609020204030204" pitchFamily="49" charset="0"/>
-                </a:rPr>
-                <a:t>(data)</a:t>
-              </a:r>
-            </a:p>
-            <a:p>
-              <a:pPr marL="93600"/>
-              <a:r>
-                <a:rPr lang="en-US" sz="1200" dirty="0"/>
-                <a:t>convert non-datetime types to datetime type</a:t>
-              </a:r>
-            </a:p>
-            <a:p>
-              <a:r>
-                <a:rPr lang="en-US" sz="1200" b="1" dirty="0" err="1">
-                  <a:latin typeface="Consolas" panose="020B0609020204030204" pitchFamily="49" charset="0"/>
-                </a:rPr>
-                <a:t>pd.</a:t>
-              </a:r>
-              <a:r>
-                <a:rPr lang="en-US" sz="1200" b="1" dirty="0" err="1">
-                  <a:latin typeface="Consolas" panose="020B0609020204030204" pitchFamily="49" charset="0"/>
-                  <a:hlinkClick r:id="rId22"/>
-                </a:rPr>
-                <a:t>to_timedelta</a:t>
-              </a:r>
-              <a:r>
-                <a:rPr lang="en-US" sz="1200" b="1" dirty="0">
-                  <a:latin typeface="Consolas" panose="020B0609020204030204" pitchFamily="49" charset="0"/>
-                </a:rPr>
-                <a:t>(data)</a:t>
-              </a:r>
-            </a:p>
-            <a:p>
-              <a:pPr marL="93600"/>
-              <a:r>
-                <a:rPr lang="en-US" sz="1200" dirty="0"/>
-                <a:t>convert non- </a:t>
-              </a:r>
-              <a:r>
-                <a:rPr lang="en-US" sz="1200" dirty="0" err="1"/>
-                <a:t>timedelta</a:t>
-              </a:r>
-              <a:r>
-                <a:rPr lang="en-US" sz="1200" dirty="0"/>
-                <a:t> types to </a:t>
-              </a:r>
-              <a:r>
-                <a:rPr lang="en-US" sz="1200" dirty="0" err="1"/>
-                <a:t>timedelta</a:t>
-              </a:r>
-              <a:endParaRPr lang="en-US" sz="1200" dirty="0"/>
-            </a:p>
-            <a:p>
-              <a:endParaRPr lang="en-US" sz="1200" dirty="0"/>
-            </a:p>
-          </p:txBody>
-        </p:sp>
-        <p:sp>
-          <p:nvSpPr>
-            <p:cNvPr id="52" name="TextBox 51">
-              <a:extLst>
-                <a:ext uri="{FF2B5EF4-FFF2-40B4-BE49-F238E27FC236}">
-                  <a16:creationId xmlns:a16="http://schemas.microsoft.com/office/drawing/2014/main" id="{76761F18-E4DC-228A-20CB-87FAE256A0E2}"/>
-                </a:ext>
-              </a:extLst>
-            </p:cNvPr>
-            <p:cNvSpPr txBox="1"/>
-            <p:nvPr/>
-          </p:nvSpPr>
-          <p:spPr>
-            <a:xfrm>
-              <a:off x="2790799" y="3613045"/>
-              <a:ext cx="2654146" cy="1938992"/>
-            </a:xfrm>
-            <a:prstGeom prst="rect">
-              <a:avLst/>
-            </a:prstGeom>
-            <a:noFill/>
-          </p:spPr>
-          <p:txBody>
-            <a:bodyPr wrap="square" rtlCol="0">
-              <a:spAutoFit/>
-            </a:bodyPr>
-            <a:lstStyle/>
-            <a:p>
-              <a:r>
-                <a:rPr lang="en-US" sz="1200" b="1" dirty="0" err="1">
-                  <a:latin typeface="Consolas" panose="020B0609020204030204" pitchFamily="49" charset="0"/>
-                </a:rPr>
-                <a:t>df.</a:t>
-              </a:r>
-              <a:r>
-                <a:rPr lang="en-US" sz="1200" b="1" dirty="0" err="1">
-                  <a:latin typeface="Consolas" panose="020B0609020204030204" pitchFamily="49" charset="0"/>
-                  <a:hlinkClick r:id="rId23"/>
-                </a:rPr>
-                <a:t>as_type</a:t>
-              </a:r>
-              <a:r>
-                <a:rPr lang="en-US" sz="1200" b="1" dirty="0">
-                  <a:latin typeface="Consolas" panose="020B0609020204030204" pitchFamily="49" charset="0"/>
-                </a:rPr>
-                <a:t>(type)</a:t>
-              </a:r>
-            </a:p>
-            <a:p>
-              <a:pPr marL="93600"/>
-              <a:r>
-                <a:rPr lang="en-US" sz="1200" dirty="0"/>
-                <a:t>convert data to (almost) any given type including categorical</a:t>
-              </a:r>
-            </a:p>
-            <a:p>
-              <a:r>
-                <a:rPr lang="en-US" sz="1200" b="1" dirty="0" err="1">
-                  <a:latin typeface="Consolas" panose="020B0609020204030204" pitchFamily="49" charset="0"/>
-                </a:rPr>
-                <a:t>df.</a:t>
-              </a:r>
-              <a:r>
-                <a:rPr lang="en-US" sz="1200" b="1" dirty="0" err="1">
-                  <a:latin typeface="Consolas" panose="020B0609020204030204" pitchFamily="49" charset="0"/>
-                  <a:hlinkClick r:id="rId24"/>
-                </a:rPr>
-                <a:t>infer_objects</a:t>
-              </a:r>
-              <a:r>
-                <a:rPr lang="en-US" sz="1200" b="1" dirty="0">
-                  <a:latin typeface="Consolas" panose="020B0609020204030204" pitchFamily="49" charset="0"/>
-                </a:rPr>
-                <a:t>()</a:t>
-              </a:r>
-            </a:p>
-            <a:p>
-              <a:pPr marL="93600"/>
-              <a:r>
-                <a:rPr lang="en-US" sz="1200" dirty="0"/>
-                <a:t>attempts to infer a better type for object type data.</a:t>
-              </a:r>
-            </a:p>
-            <a:p>
-              <a:r>
-                <a:rPr lang="en-US" sz="1200" b="1" dirty="0" err="1">
-                  <a:latin typeface="Consolas" panose="020B0609020204030204" pitchFamily="49" charset="0"/>
-                </a:rPr>
-                <a:t>df.</a:t>
-              </a:r>
-              <a:r>
-                <a:rPr lang="en-US" sz="1200" b="1" dirty="0" err="1">
-                  <a:latin typeface="Consolas" panose="020B0609020204030204" pitchFamily="49" charset="0"/>
-                  <a:hlinkClick r:id="rId25"/>
-                </a:rPr>
-                <a:t>convert_dtypes</a:t>
-              </a:r>
-              <a:r>
-                <a:rPr lang="en-US" sz="1200" b="1" dirty="0">
-                  <a:latin typeface="Consolas" panose="020B0609020204030204" pitchFamily="49" charset="0"/>
-                </a:rPr>
-                <a:t>()</a:t>
-              </a:r>
-            </a:p>
-            <a:p>
-              <a:pPr marL="93600"/>
-              <a:r>
-                <a:rPr lang="en-US" sz="1200" dirty="0"/>
-                <a:t>convert columns to best possible </a:t>
-              </a:r>
-              <a:r>
-                <a:rPr lang="en-US" sz="1200" dirty="0" err="1"/>
-                <a:t>dtypes</a:t>
-              </a:r>
-              <a:endParaRPr lang="en-US" sz="1200" dirty="0"/>
-            </a:p>
-            <a:p>
-              <a:endParaRPr lang="en-US" sz="1200" dirty="0"/>
-            </a:p>
-          </p:txBody>
-        </p:sp>
-      </p:grpSp>
       <p:sp>
         <p:nvSpPr>
           <p:cNvPr id="8" name="TextBox 7">
@@ -30409,7 +29977,7 @@
         </p:nvSpPr>
         <p:spPr>
           <a:xfrm>
-            <a:off x="140669" y="1910808"/>
+            <a:off x="140669" y="1537428"/>
             <a:ext cx="2572052" cy="461665"/>
           </a:xfrm>
           <a:prstGeom prst="rect">
@@ -30427,26 +29995,33 @@
               <a:rPr lang="en-US" sz="1200" b="1" dirty="0" err="1">
                 <a:latin typeface="Consolas" panose="020B0609020204030204" pitchFamily="49" charset="0"/>
               </a:rPr>
-              <a:t>df.plot</a:t>
+              <a:t>df.</a:t>
+            </a:r>
+            <a:r>
+              <a:rPr lang="en-US" sz="1200" b="1" dirty="0" err="1">
+                <a:latin typeface="Consolas" panose="020B0609020204030204" pitchFamily="49" charset="0"/>
+                <a:hlinkClick r:id="rId10"/>
+              </a:rPr>
+              <a:t>plot</a:t>
+            </a:r>
+            <a:r>
+              <a:rPr lang="en-US" sz="1200" b="1" dirty="0" err="1">
+                <a:latin typeface="Consolas" panose="020B0609020204030204" pitchFamily="49" charset="0"/>
+              </a:rPr>
+              <a:t>.</a:t>
+            </a:r>
+            <a:r>
+              <a:rPr lang="en-US" sz="1200" b="1" dirty="0" err="1">
+                <a:latin typeface="Consolas" panose="020B0609020204030204" pitchFamily="49" charset="0"/>
+                <a:hlinkClick r:id="rId27"/>
+              </a:rPr>
+              <a:t>bar</a:t>
             </a:r>
             <a:r>
               <a:rPr lang="en-US" sz="1200" b="1" dirty="0">
                 <a:latin typeface="Consolas" panose="020B0609020204030204" pitchFamily="49" charset="0"/>
               </a:rPr>
-              <a:t>(</a:t>
-            </a:r>
-            <a:r>
-              <a:rPr lang="en-US" sz="1200" b="1" dirty="0">
-                <a:latin typeface="Consolas" panose="020B0609020204030204" pitchFamily="49" charset="0"/>
-                <a:hlinkClick r:id="rId26"/>
-              </a:rPr>
-              <a:t>kind=‘bar’</a:t>
-            </a:r>
-            <a:r>
-              <a:rPr lang="en-US" sz="1200" b="1" dirty="0">
-                <a:latin typeface="Consolas" panose="020B0609020204030204" pitchFamily="49" charset="0"/>
-              </a:rPr>
-              <a:t>)</a:t>
+              <a:t>()</a:t>
             </a:r>
           </a:p>
           <a:p>
@@ -30480,8 +30055,8 @@
         </p:nvSpPr>
         <p:spPr>
           <a:xfrm>
-            <a:off x="2716310" y="1910808"/>
-            <a:ext cx="3146010" cy="461665"/>
+            <a:off x="7358878" y="2547558"/>
+            <a:ext cx="3492000" cy="1015663"/>
           </a:xfrm>
           <a:prstGeom prst="rect">
             <a:avLst/>
@@ -30498,41 +30073,63 @@
               <a:rPr lang="en-US" sz="1200" b="1" dirty="0" err="1">
                 <a:latin typeface="Consolas" panose="020B0609020204030204" pitchFamily="49" charset="0"/>
               </a:rPr>
-              <a:t>df.plot</a:t>
+              <a:t>df.</a:t>
+            </a:r>
+            <a:r>
+              <a:rPr lang="en-US" sz="1200" b="1" dirty="0" err="1">
+                <a:latin typeface="Consolas" panose="020B0609020204030204" pitchFamily="49" charset="0"/>
+                <a:hlinkClick r:id="rId10"/>
+              </a:rPr>
+              <a:t>plot</a:t>
             </a:r>
             <a:r>
               <a:rPr lang="en-US" sz="1200" b="1" dirty="0">
                 <a:latin typeface="Consolas" panose="020B0609020204030204" pitchFamily="49" charset="0"/>
               </a:rPr>
-              <a:t>(</a:t>
+              <a:t>(stacked=True)</a:t>
+            </a:r>
+          </a:p>
+          <a:p>
+            <a:pPr marL="93600"/>
+            <a:r>
+              <a:rPr lang="en-US" sz="1200" dirty="0"/>
+              <a:t>Stacks the data for the columns on top of each other. (bar, </a:t>
+            </a:r>
+            <a:r>
+              <a:rPr lang="en-US" sz="1200" dirty="0" err="1"/>
+              <a:t>barh</a:t>
+            </a:r>
+            <a:r>
+              <a:rPr lang="en-US" sz="1200" dirty="0"/>
+              <a:t> and area only)</a:t>
+            </a:r>
+          </a:p>
+          <a:p>
+            <a:r>
+              <a:rPr lang="en-US" sz="1200" b="1" dirty="0" err="1">
+                <a:latin typeface="Consolas" panose="020B0609020204030204" pitchFamily="49" charset="0"/>
+              </a:rPr>
+              <a:t>df.</a:t>
+            </a:r>
+            <a:r>
+              <a:rPr lang="en-US" sz="1200" b="1" dirty="0" err="1">
+                <a:latin typeface="Consolas" panose="020B0609020204030204" pitchFamily="49" charset="0"/>
+                <a:hlinkClick r:id="rId10"/>
+              </a:rPr>
+              <a:t>plot</a:t>
             </a:r>
             <a:r>
               <a:rPr lang="en-US" sz="1200" b="1" dirty="0">
                 <a:latin typeface="Consolas" panose="020B0609020204030204" pitchFamily="49" charset="0"/>
-                <a:hlinkClick r:id="rId27"/>
-              </a:rPr>
-              <a:t>kind=‘boxplot’</a:t>
-            </a:r>
-            <a:r>
-              <a:rPr lang="en-US" sz="1200" b="1" dirty="0">
-                <a:latin typeface="Consolas" panose="020B0609020204030204" pitchFamily="49" charset="0"/>
-              </a:rPr>
-              <a:t>)</a:t>
+              </a:rPr>
+              <a:t>(alpha=0.5)</a:t>
             </a:r>
           </a:p>
           <a:p>
             <a:pPr marL="93600"/>
             <a:r>
               <a:rPr lang="en-US" sz="1200" dirty="0"/>
-              <a:t>Plot a scatter graph of the </a:t>
-            </a:r>
-            <a:r>
-              <a:rPr lang="en-US" sz="1200" dirty="0" err="1"/>
-              <a:t>DataFrame</a:t>
-            </a:r>
-            <a:r>
-              <a:rPr lang="en-US" sz="1200" dirty="0"/>
-              <a:t>.</a:t>
+              <a:t>Sets the transparency of the plot to 50%.</a:t>
             </a:r>
           </a:p>
         </p:txBody>
@@ -30551,7 +30148,7 @@
         </p:nvSpPr>
         <p:spPr>
           <a:xfrm>
-            <a:off x="5862320" y="1910808"/>
+            <a:off x="5774763" y="1537428"/>
             <a:ext cx="2494279" cy="461665"/>
           </a:xfrm>
           <a:prstGeom prst="rect">
@@ -30569,33 +30166,40 @@
               <a:rPr lang="en-US" sz="1200" b="1" dirty="0" err="1">
                 <a:latin typeface="Consolas" panose="020B0609020204030204" pitchFamily="49" charset="0"/>
               </a:rPr>
-              <a:t>df.plot</a:t>
+              <a:t>df.</a:t>
+            </a:r>
+            <a:r>
+              <a:rPr lang="en-US" sz="1200" b="1" dirty="0" err="1">
+                <a:latin typeface="Consolas" panose="020B0609020204030204" pitchFamily="49" charset="0"/>
+                <a:hlinkClick r:id="rId10"/>
+              </a:rPr>
+              <a:t>plot</a:t>
+            </a:r>
+            <a:r>
+              <a:rPr lang="en-US" sz="1200" b="1" dirty="0" err="1">
+                <a:latin typeface="Consolas" panose="020B0609020204030204" pitchFamily="49" charset="0"/>
+              </a:rPr>
+              <a:t>.</a:t>
+            </a:r>
+            <a:r>
+              <a:rPr lang="en-US" sz="1200" b="1" dirty="0" err="1">
+                <a:latin typeface="Consolas" panose="020B0609020204030204" pitchFamily="49" charset="0"/>
+                <a:hlinkClick r:id="rId28"/>
+              </a:rPr>
+              <a:t>area</a:t>
             </a:r>
             <a:r>
               <a:rPr lang="en-US" sz="1200" b="1" dirty="0">
                 <a:latin typeface="Consolas" panose="020B0609020204030204" pitchFamily="49" charset="0"/>
               </a:rPr>
-              <a:t>(</a:t>
-            </a:r>
-            <a:r>
-              <a:rPr lang="en-US" sz="1200" b="1" dirty="0">
-                <a:latin typeface="Consolas" panose="020B0609020204030204" pitchFamily="49" charset="0"/>
-                <a:hlinkClick r:id="rId28"/>
-              </a:rPr>
-              <a:t>kind=‘area’</a:t>
-            </a:r>
-            <a:r>
-              <a:rPr lang="en-US" sz="1200" b="1" dirty="0">
-                <a:latin typeface="Consolas" panose="020B0609020204030204" pitchFamily="49" charset="0"/>
-              </a:rPr>
-              <a:t>)</a:t>
+              <a:t>()</a:t>
             </a:r>
           </a:p>
           <a:p>
             <a:pPr marL="93600"/>
             <a:r>
               <a:rPr lang="en-US" sz="1200" dirty="0"/>
-              <a:t>Plot a histogram of the </a:t>
+              <a:t>Plot a area graph of the </a:t>
             </a:r>
             <a:r>
               <a:rPr lang="en-US" sz="1200" dirty="0" err="1"/>
@@ -30622,8 +30226,8 @@
         </p:nvSpPr>
         <p:spPr>
           <a:xfrm>
-            <a:off x="8356599" y="1910808"/>
-            <a:ext cx="2494279" cy="461665"/>
+            <a:off x="8227059" y="1537428"/>
+            <a:ext cx="2647234" cy="461665"/>
           </a:xfrm>
           <a:prstGeom prst="rect">
             <a:avLst/>
@@ -30637,44 +30241,51 @@
           <a:lstStyle/>
           <a:p>
             <a:r>
+              <a:rPr lang="en-US" sz="1200" b="1" dirty="0" err="1">
+                <a:latin typeface="Consolas" panose="020B0609020204030204" pitchFamily="49" charset="0"/>
+              </a:rPr>
+              <a:t>df.</a:t>
+            </a:r>
+            <a:r>
+              <a:rPr lang="en-US" sz="1200" b="1" dirty="0" err="1">
+                <a:latin typeface="Consolas" panose="020B0609020204030204" pitchFamily="49" charset="0"/>
+                <a:hlinkClick r:id="rId10"/>
+              </a:rPr>
+              <a:t>plot</a:t>
+            </a:r>
+            <a:r>
+              <a:rPr lang="en-US" sz="1200" b="1" dirty="0" err="1">
+                <a:latin typeface="Consolas" panose="020B0609020204030204" pitchFamily="49" charset="0"/>
+              </a:rPr>
+              <a:t>.</a:t>
+            </a:r>
+            <a:r>
+              <a:rPr lang="en-US" sz="1200" b="1" dirty="0" err="1">
+                <a:latin typeface="Consolas" panose="020B0609020204030204" pitchFamily="49" charset="0"/>
+                <a:hlinkClick r:id="rId15"/>
+              </a:rPr>
+              <a:t>hexbin</a:t>
+            </a:r>
+            <a:r>
               <a:rPr lang="en-US" sz="1200" b="1" dirty="0">
                 <a:latin typeface="Consolas" panose="020B0609020204030204" pitchFamily="49" charset="0"/>
               </a:rPr>
-              <a:t>df.plot(</a:t>
-            </a:r>
-            <a:r>
-              <a:rPr lang="en-US" sz="1200" b="1" dirty="0">
-                <a:latin typeface="Consolas" panose="020B0609020204030204" pitchFamily="49" charset="0"/>
-                <a:hlinkClick r:id="rId10"/>
-              </a:rPr>
-              <a:t>kind=‘</a:t>
-            </a:r>
-            <a:r>
-              <a:rPr lang="en-US" sz="1200" b="1" dirty="0" err="1">
-                <a:latin typeface="Consolas" panose="020B0609020204030204" pitchFamily="49" charset="0"/>
-                <a:hlinkClick r:id="rId10"/>
-              </a:rPr>
+              <a:t>()</a:t>
+            </a:r>
+          </a:p>
+          <a:p>
+            <a:pPr marL="93600"/>
+            <a:r>
+              <a:rPr lang="en-US" sz="1200" dirty="0"/>
+              <a:t>Plot a </a:t>
+            </a:r>
+            <a:r>
+              <a:rPr lang="en-US" sz="1200" dirty="0" err="1"/>
               <a:t>hexbin</a:t>
             </a:r>
             <a:r>
-              <a:rPr lang="en-US" sz="1200" b="1" dirty="0">
-                <a:latin typeface="Consolas" panose="020B0609020204030204" pitchFamily="49" charset="0"/>
-                <a:hlinkClick r:id="rId10"/>
-              </a:rPr>
-              <a:t>’</a:t>
-            </a:r>
-            <a:r>
-              <a:rPr lang="en-US" sz="1200" b="1" dirty="0">
-                <a:latin typeface="Consolas" panose="020B0609020204030204" pitchFamily="49" charset="0"/>
-              </a:rPr>
-              <a:t>)</a:t>
-            </a:r>
-          </a:p>
-          <a:p>
-            <a:pPr marL="93600"/>
-            <a:r>
               <a:rPr lang="en-US" sz="1200" dirty="0"/>
-              <a:t>Plot a histogram of the </a:t>
+              <a:t> graph of the </a:t>
             </a:r>
             <a:r>
               <a:rPr lang="en-US" sz="1200" dirty="0" err="1"/>
@@ -30709,7 +30320,7 @@
         </p:blipFill>
         <p:spPr>
           <a:xfrm>
-            <a:off x="1170612" y="2422637"/>
+            <a:off x="1170612" y="1980677"/>
             <a:ext cx="698208" cy="540000"/>
           </a:xfrm>
           <a:prstGeom prst="rect">
@@ -30739,7 +30350,7 @@
         </p:blipFill>
         <p:spPr>
           <a:xfrm>
-            <a:off x="6616268" y="2422637"/>
+            <a:off x="6616268" y="1980677"/>
             <a:ext cx="745278" cy="540000"/>
           </a:xfrm>
           <a:prstGeom prst="rect">
@@ -30776,7 +30387,7 @@
         </p:blipFill>
         <p:spPr bwMode="auto">
           <a:xfrm>
-            <a:off x="9194769" y="2422637"/>
+            <a:off x="9194769" y="1980677"/>
             <a:ext cx="720000" cy="540000"/>
           </a:xfrm>
           <a:prstGeom prst="rect">
@@ -30823,7 +30434,7 @@
         </p:blipFill>
         <p:spPr bwMode="auto">
           <a:xfrm>
-            <a:off x="3800990" y="2422637"/>
+            <a:off x="3800990" y="1980677"/>
             <a:ext cx="720000" cy="540000"/>
           </a:xfrm>
           <a:prstGeom prst="rect">
@@ -30843,627 +30454,6 @@
       </p:pic>
       <p:grpSp>
         <p:nvGrpSpPr>
-          <p:cNvPr id="27" name="Group 26">
-            <a:extLst>
-              <a:ext uri="{FF2B5EF4-FFF2-40B4-BE49-F238E27FC236}">
-                <a16:creationId xmlns:a16="http://schemas.microsoft.com/office/drawing/2014/main" id="{D94A7B71-4B8F-939F-C30F-C25E7205BF93}"/>
-              </a:ext>
-            </a:extLst>
-          </p:cNvPr>
-          <p:cNvGrpSpPr/>
-          <p:nvPr/>
-        </p:nvGrpSpPr>
-        <p:grpSpPr>
-          <a:xfrm>
-            <a:off x="5495291" y="6954229"/>
-            <a:ext cx="5305091" cy="3765032"/>
-            <a:chOff x="139854" y="3045615"/>
-            <a:chExt cx="5305091" cy="3765032"/>
-          </a:xfrm>
-        </p:grpSpPr>
-        <p:sp>
-          <p:nvSpPr>
-            <p:cNvPr id="28" name="Rounded Rectangle 80">
-              <a:extLst>
-                <a:ext uri="{FF2B5EF4-FFF2-40B4-BE49-F238E27FC236}">
-                  <a16:creationId xmlns:a16="http://schemas.microsoft.com/office/drawing/2014/main" id="{5E9102C2-FD55-79ED-6A28-BF90775207CE}"/>
-                </a:ext>
-              </a:extLst>
-            </p:cNvPr>
-            <p:cNvSpPr/>
-            <p:nvPr/>
-          </p:nvSpPr>
-          <p:spPr>
-            <a:xfrm>
-              <a:off x="139854" y="3045615"/>
-              <a:ext cx="5305091" cy="461665"/>
-            </a:xfrm>
-            <a:prstGeom prst="roundRect">
-              <a:avLst/>
-            </a:prstGeom>
-          </p:spPr>
-          <p:style>
-            <a:lnRef idx="2">
-              <a:schemeClr val="accent1">
-                <a:shade val="50000"/>
-              </a:schemeClr>
-            </a:lnRef>
-            <a:fillRef idx="1">
-              <a:schemeClr val="accent1"/>
-            </a:fillRef>
-            <a:effectRef idx="0">
-              <a:schemeClr val="accent1"/>
-            </a:effectRef>
-            <a:fontRef idx="minor">
-              <a:schemeClr val="lt1"/>
-            </a:fontRef>
-          </p:style>
-          <p:txBody>
-            <a:bodyPr rtlCol="0" anchor="ctr"/>
-            <a:lstStyle/>
-            <a:p>
-              <a:pPr algn="ctr"/>
-              <a:r>
-                <a:rPr lang="en-US" sz="2800" b="1" dirty="0">
-                  <a:solidFill>
-                    <a:schemeClr val="bg1"/>
-                  </a:solidFill>
-                </a:rPr>
-                <a:t>Series String Operations</a:t>
-              </a:r>
-            </a:p>
-          </p:txBody>
-        </p:sp>
-        <p:sp>
-          <p:nvSpPr>
-            <p:cNvPr id="29" name="TextBox 28">
-              <a:extLst>
-                <a:ext uri="{FF2B5EF4-FFF2-40B4-BE49-F238E27FC236}">
-                  <a16:creationId xmlns:a16="http://schemas.microsoft.com/office/drawing/2014/main" id="{6A9DDEB4-B962-5750-C1FB-5D0E489B11C6}"/>
-                </a:ext>
-              </a:extLst>
-            </p:cNvPr>
-            <p:cNvSpPr txBox="1"/>
-            <p:nvPr/>
-          </p:nvSpPr>
-          <p:spPr>
-            <a:xfrm>
-              <a:off x="139854" y="3948325"/>
-              <a:ext cx="2654146" cy="2862322"/>
-            </a:xfrm>
-            <a:prstGeom prst="rect">
-              <a:avLst/>
-            </a:prstGeom>
-            <a:noFill/>
-          </p:spPr>
-          <p:txBody>
-            <a:bodyPr wrap="square" rtlCol="0">
-              <a:spAutoFit/>
-            </a:bodyPr>
-            <a:lstStyle/>
-            <a:p>
-              <a:r>
-                <a:rPr lang="en-US" sz="1200" b="1" dirty="0" err="1">
-                  <a:latin typeface="Consolas" panose="020B0609020204030204" pitchFamily="49" charset="0"/>
-                </a:rPr>
-                <a:t>s.str.</a:t>
-              </a:r>
-              <a:r>
-                <a:rPr lang="en-US" sz="1200" b="1" dirty="0" err="1">
-                  <a:latin typeface="Consolas" panose="020B0609020204030204" pitchFamily="49" charset="0"/>
-                  <a:hlinkClick r:id="rId33"/>
-                </a:rPr>
-                <a:t>count</a:t>
-              </a:r>
-              <a:r>
-                <a:rPr lang="en-US" sz="1200" b="1" dirty="0">
-                  <a:latin typeface="Consolas" panose="020B0609020204030204" pitchFamily="49" charset="0"/>
-                </a:rPr>
-                <a:t>(pattern)</a:t>
-              </a:r>
-            </a:p>
-            <a:p>
-              <a:pPr marL="93600"/>
-              <a:r>
-                <a:rPr lang="en-US" sz="1200" dirty="0"/>
-                <a:t>Returns a series with the integer counts in each element.</a:t>
-              </a:r>
-            </a:p>
-            <a:p>
-              <a:r>
-                <a:rPr lang="en-US" sz="1200" b="1" dirty="0" err="1">
-                  <a:latin typeface="Consolas" panose="020B0609020204030204" pitchFamily="49" charset="0"/>
-                </a:rPr>
-                <a:t>s.str.</a:t>
-              </a:r>
-              <a:r>
-                <a:rPr lang="en-US" sz="1200" b="1" dirty="0" err="1">
-                  <a:latin typeface="Consolas" panose="020B0609020204030204" pitchFamily="49" charset="0"/>
-                  <a:hlinkClick r:id="rId34"/>
-                </a:rPr>
-                <a:t>get</a:t>
-              </a:r>
-              <a:r>
-                <a:rPr lang="en-US" sz="1200" b="1" dirty="0">
-                  <a:latin typeface="Consolas" panose="020B0609020204030204" pitchFamily="49" charset="0"/>
-                </a:rPr>
-                <a:t>(index)</a:t>
-              </a:r>
-            </a:p>
-            <a:p>
-              <a:pPr marL="93600"/>
-              <a:r>
-                <a:rPr lang="en-US" sz="1200" dirty="0"/>
-                <a:t>Returns a series with the data at the given index for each element.</a:t>
-              </a:r>
-            </a:p>
-            <a:p>
-              <a:r>
-                <a:rPr lang="en-US" sz="1200" b="1" dirty="0" err="1">
-                  <a:latin typeface="Consolas" panose="020B0609020204030204" pitchFamily="49" charset="0"/>
-                </a:rPr>
-                <a:t>s.str.</a:t>
-              </a:r>
-              <a:r>
-                <a:rPr lang="en-US" sz="1200" b="1" dirty="0" err="1">
-                  <a:latin typeface="Consolas" panose="020B0609020204030204" pitchFamily="49" charset="0"/>
-                  <a:hlinkClick r:id="rId35"/>
-                </a:rPr>
-                <a:t>join</a:t>
-              </a:r>
-              <a:r>
-                <a:rPr lang="en-US" sz="1200" b="1" dirty="0">
-                  <a:latin typeface="Consolas" panose="020B0609020204030204" pitchFamily="49" charset="0"/>
-                </a:rPr>
-                <a:t>(</a:t>
-              </a:r>
-              <a:r>
-                <a:rPr lang="en-US" sz="1200" b="1" dirty="0" err="1">
-                  <a:latin typeface="Consolas" panose="020B0609020204030204" pitchFamily="49" charset="0"/>
-                </a:rPr>
-                <a:t>sep</a:t>
-              </a:r>
-              <a:r>
-                <a:rPr lang="en-US" sz="1200" b="1" dirty="0">
-                  <a:latin typeface="Consolas" panose="020B0609020204030204" pitchFamily="49" charset="0"/>
-                </a:rPr>
-                <a:t>)</a:t>
-              </a:r>
-            </a:p>
-            <a:p>
-              <a:pPr marL="93600"/>
-              <a:r>
-                <a:rPr lang="en-US" sz="1200" dirty="0"/>
-                <a:t>Returns a series where each element has been concatenated.</a:t>
-              </a:r>
-            </a:p>
-            <a:p>
-              <a:r>
-                <a:rPr lang="en-US" sz="1200" b="1" dirty="0" err="1">
-                  <a:latin typeface="Consolas" panose="020B0609020204030204" pitchFamily="49" charset="0"/>
-                </a:rPr>
-                <a:t>s.str.</a:t>
-              </a:r>
-              <a:r>
-                <a:rPr lang="en-US" sz="1200" b="1" dirty="0" err="1">
-                  <a:latin typeface="Consolas" panose="020B0609020204030204" pitchFamily="49" charset="0"/>
-                  <a:hlinkClick r:id="rId36"/>
-                </a:rPr>
-                <a:t>title</a:t>
-              </a:r>
-              <a:r>
-                <a:rPr lang="en-US" sz="1200" b="1" dirty="0">
-                  <a:latin typeface="Consolas" panose="020B0609020204030204" pitchFamily="49" charset="0"/>
-                </a:rPr>
-                <a:t>()</a:t>
-              </a:r>
-            </a:p>
-            <a:p>
-              <a:pPr marL="93600"/>
-              <a:r>
-                <a:rPr lang="en-US" sz="1200" dirty="0"/>
-                <a:t>Converts the first character of each word to be a capital.</a:t>
-              </a:r>
-            </a:p>
-            <a:p>
-              <a:r>
-                <a:rPr lang="en-US" sz="1200" b="1" dirty="0" err="1">
-                  <a:latin typeface="Consolas" panose="020B0609020204030204" pitchFamily="49" charset="0"/>
-                </a:rPr>
-                <a:t>s.str.</a:t>
-              </a:r>
-              <a:r>
-                <a:rPr lang="en-US" sz="1200" b="1" dirty="0" err="1">
-                  <a:latin typeface="Consolas" panose="020B0609020204030204" pitchFamily="49" charset="0"/>
-                  <a:hlinkClick r:id="rId37"/>
-                </a:rPr>
-                <a:t>len</a:t>
-              </a:r>
-              <a:r>
-                <a:rPr lang="en-US" sz="1200" b="1" dirty="0">
-                  <a:latin typeface="Consolas" panose="020B0609020204030204" pitchFamily="49" charset="0"/>
-                </a:rPr>
-                <a:t>()</a:t>
-              </a:r>
-            </a:p>
-            <a:p>
-              <a:pPr marL="93600"/>
-              <a:r>
-                <a:rPr lang="en-US" sz="1200" dirty="0"/>
-                <a:t>Returns a series with the lengths of each element.</a:t>
-              </a:r>
-            </a:p>
-          </p:txBody>
-        </p:sp>
-        <p:sp>
-          <p:nvSpPr>
-            <p:cNvPr id="32" name="TextBox 31">
-              <a:extLst>
-                <a:ext uri="{FF2B5EF4-FFF2-40B4-BE49-F238E27FC236}">
-                  <a16:creationId xmlns:a16="http://schemas.microsoft.com/office/drawing/2014/main" id="{BC3DADEE-9235-CBEA-B132-376B17AC7870}"/>
-                </a:ext>
-              </a:extLst>
-            </p:cNvPr>
-            <p:cNvSpPr txBox="1"/>
-            <p:nvPr/>
-          </p:nvSpPr>
-          <p:spPr>
-            <a:xfrm>
-              <a:off x="2790799" y="3948325"/>
-              <a:ext cx="2654146" cy="2862322"/>
-            </a:xfrm>
-            <a:prstGeom prst="rect">
-              <a:avLst/>
-            </a:prstGeom>
-            <a:noFill/>
-          </p:spPr>
-          <p:txBody>
-            <a:bodyPr wrap="square" rtlCol="0">
-              <a:spAutoFit/>
-            </a:bodyPr>
-            <a:lstStyle/>
-            <a:p>
-              <a:r>
-                <a:rPr lang="en-US" sz="1200" b="1" dirty="0">
-                  <a:latin typeface="Consolas" panose="020B0609020204030204" pitchFamily="49" charset="0"/>
-                </a:rPr>
-                <a:t>s.str.</a:t>
-              </a:r>
-              <a:r>
-                <a:rPr lang="en-US" sz="1200" b="1" dirty="0">
-                  <a:latin typeface="Consolas" panose="020B0609020204030204" pitchFamily="49" charset="0"/>
-                  <a:hlinkClick r:id="rId38"/>
-                </a:rPr>
-                <a:t>cat</a:t>
-              </a:r>
-              <a:r>
-                <a:rPr lang="en-US" sz="1200" b="1" dirty="0">
-                  <a:latin typeface="Consolas" panose="020B0609020204030204" pitchFamily="49" charset="0"/>
-                </a:rPr>
-                <a:t>()</a:t>
-              </a:r>
-            </a:p>
-            <a:p>
-              <a:pPr marL="93600"/>
-              <a:r>
-                <a:rPr lang="en-US" sz="1200" dirty="0"/>
-                <a:t>Concatenate elements into a single string</a:t>
-              </a:r>
-            </a:p>
-            <a:p>
-              <a:r>
-                <a:rPr lang="en-US" sz="1200" b="1" dirty="0" err="1">
-                  <a:latin typeface="Consolas" panose="020B0609020204030204" pitchFamily="49" charset="0"/>
-                </a:rPr>
-                <a:t>s.str.</a:t>
-              </a:r>
-              <a:r>
-                <a:rPr lang="en-US" sz="1200" b="1" dirty="0" err="1">
-                  <a:latin typeface="Consolas" panose="020B0609020204030204" pitchFamily="49" charset="0"/>
-                  <a:hlinkClick r:id="rId39"/>
-                </a:rPr>
-                <a:t>partition</a:t>
-              </a:r>
-              <a:r>
-                <a:rPr lang="en-US" sz="1200" b="1" dirty="0">
-                  <a:latin typeface="Consolas" panose="020B0609020204030204" pitchFamily="49" charset="0"/>
-                </a:rPr>
-                <a:t>(</a:t>
-              </a:r>
-              <a:r>
-                <a:rPr lang="en-US" sz="1200" b="1" dirty="0" err="1">
-                  <a:latin typeface="Consolas" panose="020B0609020204030204" pitchFamily="49" charset="0"/>
-                </a:rPr>
-                <a:t>sep</a:t>
-              </a:r>
-              <a:r>
-                <a:rPr lang="en-US" sz="1200" b="1" dirty="0">
-                  <a:latin typeface="Consolas" panose="020B0609020204030204" pitchFamily="49" charset="0"/>
-                </a:rPr>
-                <a:t>)</a:t>
-              </a:r>
-            </a:p>
-            <a:p>
-              <a:pPr marL="93600"/>
-              <a:r>
-                <a:rPr lang="en-US" sz="1200" dirty="0"/>
-                <a:t>Splits the string on the first instance of the separator</a:t>
-              </a:r>
-            </a:p>
-            <a:p>
-              <a:r>
-                <a:rPr lang="en-US" sz="1200" b="1" dirty="0" err="1">
-                  <a:latin typeface="Consolas" panose="020B0609020204030204" pitchFamily="49" charset="0"/>
-                </a:rPr>
-                <a:t>s.str.</a:t>
-              </a:r>
-              <a:r>
-                <a:rPr lang="en-US" sz="1200" b="1" dirty="0" err="1">
-                  <a:latin typeface="Consolas" panose="020B0609020204030204" pitchFamily="49" charset="0"/>
-                  <a:hlinkClick r:id="rId40"/>
-                </a:rPr>
-                <a:t>slice</a:t>
-              </a:r>
-              <a:r>
-                <a:rPr lang="en-US" sz="1200" b="1" dirty="0">
-                  <a:latin typeface="Consolas" panose="020B0609020204030204" pitchFamily="49" charset="0"/>
-                </a:rPr>
-                <a:t>(start, stop, step)</a:t>
-              </a:r>
-            </a:p>
-            <a:p>
-              <a:pPr marL="93600"/>
-              <a:r>
-                <a:rPr lang="en-US" sz="1200" dirty="0"/>
-                <a:t>Slices each string</a:t>
-              </a:r>
-            </a:p>
-            <a:p>
-              <a:r>
-                <a:rPr lang="en-US" sz="1200" b="1" dirty="0" err="1">
-                  <a:latin typeface="Consolas" panose="020B0609020204030204" pitchFamily="49" charset="0"/>
-                </a:rPr>
-                <a:t>s.str.</a:t>
-              </a:r>
-              <a:r>
-                <a:rPr lang="en-US" sz="1200" b="1" dirty="0" err="1">
-                  <a:latin typeface="Consolas" panose="020B0609020204030204" pitchFamily="49" charset="0"/>
-                  <a:hlinkClick r:id="rId41"/>
-                </a:rPr>
-                <a:t>replace</a:t>
-              </a:r>
-              <a:r>
-                <a:rPr lang="en-US" sz="1200" b="1" dirty="0">
-                  <a:latin typeface="Consolas" panose="020B0609020204030204" pitchFamily="49" charset="0"/>
-                </a:rPr>
-                <a:t>(pat, rep)</a:t>
-              </a:r>
-            </a:p>
-            <a:p>
-              <a:pPr marL="93600"/>
-              <a:r>
-                <a:rPr lang="en-US" sz="1200" dirty="0"/>
-                <a:t>Use regex to replace patterns in each string.</a:t>
-              </a:r>
-            </a:p>
-            <a:p>
-              <a:r>
-                <a:rPr lang="en-US" sz="1200" b="1" dirty="0" err="1">
-                  <a:latin typeface="Consolas" panose="020B0609020204030204" pitchFamily="49" charset="0"/>
-                </a:rPr>
-                <a:t>s.str.</a:t>
-              </a:r>
-              <a:r>
-                <a:rPr lang="en-US" sz="1200" b="1" dirty="0" err="1">
-                  <a:latin typeface="Consolas" panose="020B0609020204030204" pitchFamily="49" charset="0"/>
-                  <a:hlinkClick r:id="rId42"/>
-                </a:rPr>
-                <a:t>isalnum</a:t>
-              </a:r>
-              <a:r>
-                <a:rPr lang="en-US" sz="1200" b="1" dirty="0">
-                  <a:latin typeface="Consolas" panose="020B0609020204030204" pitchFamily="49" charset="0"/>
-                </a:rPr>
-                <a:t>()</a:t>
-              </a:r>
-            </a:p>
-            <a:p>
-              <a:pPr marL="93600"/>
-              <a:r>
-                <a:rPr lang="en-US" sz="1200" dirty="0"/>
-                <a:t>Checks whether each element is alpha-numeric</a:t>
-              </a:r>
-            </a:p>
-          </p:txBody>
-        </p:sp>
-        <p:sp>
-          <p:nvSpPr>
-            <p:cNvPr id="33" name="TextBox 32">
-              <a:extLst>
-                <a:ext uri="{FF2B5EF4-FFF2-40B4-BE49-F238E27FC236}">
-                  <a16:creationId xmlns:a16="http://schemas.microsoft.com/office/drawing/2014/main" id="{C8214C2B-AA1C-2323-1176-3D074557CAA1}"/>
-                </a:ext>
-              </a:extLst>
-            </p:cNvPr>
-            <p:cNvSpPr txBox="1"/>
-            <p:nvPr/>
-          </p:nvSpPr>
-          <p:spPr>
-            <a:xfrm>
-              <a:off x="139854" y="3513231"/>
-              <a:ext cx="5305091" cy="461665"/>
-            </a:xfrm>
-            <a:prstGeom prst="rect">
-              <a:avLst/>
-            </a:prstGeom>
-            <a:noFill/>
-          </p:spPr>
-          <p:txBody>
-            <a:bodyPr wrap="square" rtlCol="0">
-              <a:spAutoFit/>
-            </a:bodyPr>
-            <a:lstStyle/>
-            <a:p>
-              <a:r>
-                <a:rPr lang="en-US" sz="1200" dirty="0"/>
-                <a:t>Similar to python string operations, except these are vectorized to apply to the entire Series efficiently.</a:t>
-              </a:r>
-            </a:p>
-          </p:txBody>
-        </p:sp>
-      </p:grpSp>
-      <p:grpSp>
-        <p:nvGrpSpPr>
-          <p:cNvPr id="37" name="Group 36">
-            <a:extLst>
-              <a:ext uri="{FF2B5EF4-FFF2-40B4-BE49-F238E27FC236}">
-                <a16:creationId xmlns:a16="http://schemas.microsoft.com/office/drawing/2014/main" id="{5865B909-DD40-3ECF-F607-5A19656F6B05}"/>
-              </a:ext>
-            </a:extLst>
-          </p:cNvPr>
-          <p:cNvGrpSpPr/>
-          <p:nvPr/>
-        </p:nvGrpSpPr>
-        <p:grpSpPr>
-          <a:xfrm>
-            <a:off x="10830762" y="9447091"/>
-            <a:ext cx="3140826" cy="1304371"/>
-            <a:chOff x="39680" y="3045615"/>
-            <a:chExt cx="5640005" cy="1304371"/>
-          </a:xfrm>
-        </p:grpSpPr>
-        <p:sp>
-          <p:nvSpPr>
-            <p:cNvPr id="41" name="Rounded Rectangle 80">
-              <a:extLst>
-                <a:ext uri="{FF2B5EF4-FFF2-40B4-BE49-F238E27FC236}">
-                  <a16:creationId xmlns:a16="http://schemas.microsoft.com/office/drawing/2014/main" id="{8690D32F-8CB5-C44D-CD48-86FC1782DB50}"/>
-                </a:ext>
-              </a:extLst>
-            </p:cNvPr>
-            <p:cNvSpPr/>
-            <p:nvPr/>
-          </p:nvSpPr>
-          <p:spPr>
-            <a:xfrm>
-              <a:off x="139854" y="3045615"/>
-              <a:ext cx="5305091" cy="461665"/>
-            </a:xfrm>
-            <a:prstGeom prst="roundRect">
-              <a:avLst/>
-            </a:prstGeom>
-          </p:spPr>
-          <p:style>
-            <a:lnRef idx="2">
-              <a:schemeClr val="accent1">
-                <a:shade val="50000"/>
-              </a:schemeClr>
-            </a:lnRef>
-            <a:fillRef idx="1">
-              <a:schemeClr val="accent1"/>
-            </a:fillRef>
-            <a:effectRef idx="0">
-              <a:schemeClr val="accent1"/>
-            </a:effectRef>
-            <a:fontRef idx="minor">
-              <a:schemeClr val="lt1"/>
-            </a:fontRef>
-          </p:style>
-          <p:txBody>
-            <a:bodyPr rtlCol="0" anchor="ctr"/>
-            <a:lstStyle/>
-            <a:p>
-              <a:pPr algn="ctr"/>
-              <a:r>
-                <a:rPr lang="en-US" sz="2800" b="1" dirty="0">
-                  <a:solidFill>
-                    <a:schemeClr val="bg1"/>
-                  </a:solidFill>
-                </a:rPr>
-                <a:t>Clipboard</a:t>
-              </a:r>
-            </a:p>
-          </p:txBody>
-        </p:sp>
-        <p:sp>
-          <p:nvSpPr>
-            <p:cNvPr id="44" name="TextBox 43">
-              <a:extLst>
-                <a:ext uri="{FF2B5EF4-FFF2-40B4-BE49-F238E27FC236}">
-                  <a16:creationId xmlns:a16="http://schemas.microsoft.com/office/drawing/2014/main" id="{7FF5F6B5-C5F0-E554-0319-E901E1182FB1}"/>
-                </a:ext>
-              </a:extLst>
-            </p:cNvPr>
-            <p:cNvSpPr txBox="1"/>
-            <p:nvPr/>
-          </p:nvSpPr>
-          <p:spPr>
-            <a:xfrm>
-              <a:off x="39680" y="3518989"/>
-              <a:ext cx="5640005" cy="830997"/>
-            </a:xfrm>
-            <a:prstGeom prst="rect">
-              <a:avLst/>
-            </a:prstGeom>
-            <a:noFill/>
-          </p:spPr>
-          <p:txBody>
-            <a:bodyPr wrap="square" rtlCol="0">
-              <a:spAutoFit/>
-            </a:bodyPr>
-            <a:lstStyle/>
-            <a:p>
-              <a:r>
-                <a:rPr lang="en-US" sz="1200" b="1" dirty="0" err="1">
-                  <a:latin typeface="Consolas" panose="020B0609020204030204" pitchFamily="49" charset="0"/>
-                </a:rPr>
-                <a:t>df.to_clipboard</a:t>
-              </a:r>
-              <a:r>
-                <a:rPr lang="en-US" sz="1200" b="1" dirty="0">
-                  <a:latin typeface="Consolas" panose="020B0609020204030204" pitchFamily="49" charset="0"/>
-                </a:rPr>
-                <a:t>()</a:t>
-              </a:r>
-            </a:p>
-            <a:p>
-              <a:pPr marL="93600"/>
-              <a:r>
-                <a:rPr lang="en-US" sz="1200" dirty="0"/>
-                <a:t>Copy object to the system clipboard</a:t>
-              </a:r>
-            </a:p>
-            <a:p>
-              <a:r>
-                <a:rPr lang="en-US" sz="1200" b="1" dirty="0" err="1">
-                  <a:latin typeface="Consolas" panose="020B0609020204030204" pitchFamily="49" charset="0"/>
-                </a:rPr>
-                <a:t>df.read_clipboard</a:t>
-              </a:r>
-              <a:r>
-                <a:rPr lang="en-US" sz="1200" b="1" dirty="0">
-                  <a:latin typeface="Consolas" panose="020B0609020204030204" pitchFamily="49" charset="0"/>
-                </a:rPr>
-                <a:t>()</a:t>
-              </a:r>
-            </a:p>
-            <a:p>
-              <a:pPr marL="93600"/>
-              <a:r>
-                <a:rPr lang="en-US" sz="1200" dirty="0"/>
-                <a:t>Read text from clipboard and pass to </a:t>
-              </a:r>
-              <a:r>
-                <a:rPr lang="en-US" sz="1200" dirty="0" err="1"/>
-                <a:t>read_csv</a:t>
-              </a:r>
-              <a:endParaRPr lang="en-US" sz="1200" dirty="0"/>
-            </a:p>
-          </p:txBody>
-        </p:sp>
-      </p:grpSp>
-      <p:grpSp>
-        <p:nvGrpSpPr>
           <p:cNvPr id="59" name="Group 58">
             <a:extLst>
               <a:ext uri="{FF2B5EF4-FFF2-40B4-BE49-F238E27FC236}">
@@ -31476,10 +30466,10 @@
         </p:nvGrpSpPr>
         <p:grpSpPr>
           <a:xfrm>
-            <a:off x="140668" y="8237055"/>
-            <a:ext cx="2571361" cy="2768796"/>
-            <a:chOff x="139854" y="3045615"/>
-            <a:chExt cx="5305091" cy="2768796"/>
+            <a:off x="125428" y="8732355"/>
+            <a:ext cx="5208572" cy="1885353"/>
+            <a:chOff x="139854" y="3190395"/>
+            <a:chExt cx="5305091" cy="1885353"/>
           </a:xfrm>
         </p:grpSpPr>
         <p:sp>
@@ -31496,7 +30486,7 @@
           </p:nvSpPr>
           <p:spPr>
             <a:xfrm>
-              <a:off x="139854" y="3045615"/>
+              <a:off x="139854" y="3190395"/>
               <a:ext cx="5305091" cy="461665"/>
             </a:xfrm>
             <a:prstGeom prst="roundRect">
@@ -31550,7 +30540,7 @@
           <p:spPr>
             <a:xfrm>
               <a:off x="139854" y="4060085"/>
-              <a:ext cx="5305091" cy="1754326"/>
+              <a:ext cx="5305091" cy="1015663"/>
             </a:xfrm>
             <a:prstGeom prst="rect">
               <a:avLst/>
@@ -31567,12 +30557,12 @@
                 <a:rPr lang="en-US" sz="1200" b="1" dirty="0" err="1">
                   <a:latin typeface="Consolas" panose="020B0609020204030204" pitchFamily="49" charset="0"/>
                 </a:rPr>
-                <a:t>df.</a:t>
+                <a:t>s.</a:t>
               </a:r>
               <a:r>
                 <a:rPr lang="en-US" sz="1200" b="1" dirty="0" err="1">
                   <a:latin typeface="Consolas" panose="020B0609020204030204" pitchFamily="49" charset="0"/>
-                  <a:hlinkClick r:id="rId43"/>
+                  <a:hlinkClick r:id="rId33"/>
                 </a:rPr>
                 <a:t>map</a:t>
               </a:r>
@@ -31580,19 +30570,35 @@
                 <a:rPr lang="en-US" sz="1200" b="1" dirty="0">
                   <a:latin typeface="Consolas" panose="020B0609020204030204" pitchFamily="49" charset="0"/>
                 </a:rPr>
-                <a:t>(</a:t>
+                <a:t>(lambda x: 2*x)</a:t>
+              </a:r>
+            </a:p>
+            <a:p>
+              <a:pPr marL="93600"/>
+              <a:r>
+                <a:rPr lang="en-US" sz="1200" dirty="0"/>
+                <a:t>Returns a copy of the series where every entry is doubled</a:t>
+              </a:r>
+            </a:p>
+            <a:p>
+              <a:r>
+                <a:rPr lang="en-US" sz="1200" b="1" dirty="0" err="1">
+                  <a:latin typeface="Consolas" panose="020B0609020204030204" pitchFamily="49" charset="0"/>
+                </a:rPr>
+                <a:t>s.</a:t>
               </a:r>
               <a:r>
                 <a:rPr lang="en-US" sz="1200" b="1" dirty="0" err="1">
                   <a:latin typeface="Consolas" panose="020B0609020204030204" pitchFamily="49" charset="0"/>
+                  <a:hlinkClick r:id="rId34"/>
                 </a:rPr>
-                <a:t>func</a:t>
+                <a:t>apply</a:t>
               </a:r>
               <a:r>
                 <a:rPr lang="en-US" sz="1200" b="1" dirty="0">
                   <a:latin typeface="Consolas" panose="020B0609020204030204" pitchFamily="49" charset="0"/>
                 </a:rPr>
-                <a:t>)</a:t>
+                <a:t>(lambda x: [1, 2], axis=1)</a:t>
               </a:r>
             </a:p>
             <a:p>
@@ -31607,60 +30613,8 @@
               </a:r>
               <a:r>
                 <a:rPr lang="en-US" sz="1200" dirty="0"/>
-                <a:t> with the mapping applies</a:t>
+                <a:t> with each element replaced with [1, 2], used when the logic is more complex per element.</a:t>
               </a:r>
-            </a:p>
-            <a:p>
-              <a:r>
-                <a:rPr lang="en-US" sz="1200" b="1" dirty="0" err="1">
-                  <a:latin typeface="Consolas" panose="020B0609020204030204" pitchFamily="49" charset="0"/>
-                </a:rPr>
-                <a:t>df.</a:t>
-              </a:r>
-              <a:r>
-                <a:rPr lang="en-US" sz="1200" b="1" dirty="0" err="1">
-                  <a:latin typeface="Consolas" panose="020B0609020204030204" pitchFamily="49" charset="0"/>
-                  <a:hlinkClick r:id="rId44"/>
-                </a:rPr>
-                <a:t>apply</a:t>
-              </a:r>
-              <a:r>
-                <a:rPr lang="en-US" sz="1200" b="1" dirty="0">
-                  <a:latin typeface="Consolas" panose="020B0609020204030204" pitchFamily="49" charset="0"/>
-                </a:rPr>
-                <a:t>(</a:t>
-              </a:r>
-              <a:r>
-                <a:rPr lang="en-US" sz="1200" b="1" dirty="0" err="1">
-                  <a:latin typeface="Consolas" panose="020B0609020204030204" pitchFamily="49" charset="0"/>
-                </a:rPr>
-                <a:t>func</a:t>
-              </a:r>
-              <a:r>
-                <a:rPr lang="en-US" sz="1200" b="1" dirty="0">
-                  <a:latin typeface="Consolas" panose="020B0609020204030204" pitchFamily="49" charset="0"/>
-                </a:rPr>
-                <a:t>)</a:t>
-              </a:r>
-            </a:p>
-            <a:p>
-              <a:pPr marL="93600"/>
-              <a:r>
-                <a:rPr lang="en-US" sz="1200" dirty="0"/>
-                <a:t>Returns a copy of the </a:t>
-              </a:r>
-              <a:r>
-                <a:rPr lang="en-US" sz="1200" dirty="0" err="1"/>
-                <a:t>dataframe</a:t>
-              </a:r>
-              <a:r>
-                <a:rPr lang="en-US" sz="1200" dirty="0"/>
-                <a:t> with the function applies, used when the logic is more complex per element</a:t>
-              </a:r>
-            </a:p>
-            <a:p>
-              <a:pPr marL="93600"/>
-              <a:endParaRPr lang="en-US" sz="1200" dirty="0"/>
             </a:p>
           </p:txBody>
         </p:sp>
@@ -31678,7 +30632,7 @@
           </p:nvSpPr>
           <p:spPr>
             <a:xfrm>
-              <a:off x="139854" y="3482751"/>
+              <a:off x="139854" y="3650391"/>
               <a:ext cx="5305091" cy="461665"/>
             </a:xfrm>
             <a:prstGeom prst="rect">
@@ -31702,56 +30656,18 @@
               </a:r>
               <a:r>
                 <a:rPr lang="en-US" sz="1200" dirty="0"/>
-                <a:t>, useful for recategorizing or transforming data</a:t>
+                <a:t>, useful for recategorizing or transforming data.</a:t>
               </a:r>
             </a:p>
           </p:txBody>
         </p:sp>
       </p:grpSp>
-      <p:cxnSp>
-        <p:nvCxnSpPr>
-          <p:cNvPr id="69" name="Straight Connector 68">
+      <p:sp>
+        <p:nvSpPr>
+          <p:cNvPr id="5" name="TextBox 4">
             <a:extLst>
               <a:ext uri="{FF2B5EF4-FFF2-40B4-BE49-F238E27FC236}">
-                <a16:creationId xmlns:a16="http://schemas.microsoft.com/office/drawing/2014/main" id="{6C34E450-5A07-700F-8ED1-096B9C1CB878}"/>
-              </a:ext>
-            </a:extLst>
-          </p:cNvPr>
-          <p:cNvCxnSpPr>
-            <a:cxnSpLocks/>
-          </p:cNvCxnSpPr>
-          <p:nvPr/>
-        </p:nvCxnSpPr>
-        <p:spPr>
-          <a:xfrm>
-            <a:off x="135695" y="6628529"/>
-            <a:ext cx="5310064" cy="0"/>
-          </a:xfrm>
-          <a:prstGeom prst="line">
-            <a:avLst/>
-          </a:prstGeom>
-        </p:spPr>
-        <p:style>
-          <a:lnRef idx="1">
-            <a:schemeClr val="accent1"/>
-          </a:lnRef>
-          <a:fillRef idx="0">
-            <a:schemeClr val="accent1"/>
-          </a:fillRef>
-          <a:effectRef idx="0">
-            <a:schemeClr val="accent1"/>
-          </a:effectRef>
-          <a:fontRef idx="minor">
-            <a:schemeClr val="tx1"/>
-          </a:fontRef>
-        </p:style>
-      </p:cxnSp>
-      <p:sp>
-        <p:nvSpPr>
-          <p:cNvPr id="71" name="TextBox 70">
-            <a:extLst>
-              <a:ext uri="{FF2B5EF4-FFF2-40B4-BE49-F238E27FC236}">
-                <a16:creationId xmlns:a16="http://schemas.microsoft.com/office/drawing/2014/main" id="{13845956-2C47-A783-1FBC-4E7C4D54C2C6}"/>
+                <a16:creationId xmlns:a16="http://schemas.microsoft.com/office/drawing/2014/main" id="{31BD94D3-03F1-6642-4E43-5500C31DE006}"/>
               </a:ext>
             </a:extLst>
           </p:cNvPr>
@@ -31760,8 +30676,8 @@
         </p:nvSpPr>
         <p:spPr>
           <a:xfrm>
-            <a:off x="142571" y="6419773"/>
-            <a:ext cx="2649041" cy="1754326"/>
+            <a:off x="2670737" y="1537428"/>
+            <a:ext cx="3146010" cy="461665"/>
           </a:xfrm>
           <a:prstGeom prst="rect">
             <a:avLst/>
@@ -31775,94 +30691,61 @@
           <a:lstStyle/>
           <a:p>
             <a:r>
-              <a:rPr lang="en-US" sz="1200" dirty="0">
-                <a:solidFill>
-                  <a:schemeClr val="accent5"/>
-                </a:solidFill>
-              </a:rPr>
-              <a:t>More on datetime</a:t>
-            </a:r>
-          </a:p>
-          <a:p>
-            <a:r>
               <a:rPr lang="en-US" sz="1200" b="1" dirty="0" err="1">
                 <a:latin typeface="Consolas" panose="020B0609020204030204" pitchFamily="49" charset="0"/>
               </a:rPr>
-              <a:t>s.dt.year</a:t>
-            </a:r>
-            <a:endParaRPr lang="en-US" sz="1200" b="1" dirty="0">
-              <a:latin typeface="Consolas" panose="020B0609020204030204" pitchFamily="49" charset="0"/>
-            </a:endParaRPr>
+              <a:t>df.</a:t>
+            </a:r>
+            <a:r>
+              <a:rPr lang="en-US" sz="1200" b="1" dirty="0" err="1">
+                <a:latin typeface="Consolas" panose="020B0609020204030204" pitchFamily="49" charset="0"/>
+                <a:hlinkClick r:id="rId10"/>
+              </a:rPr>
+              <a:t>plot</a:t>
+            </a:r>
+            <a:r>
+              <a:rPr lang="en-US" sz="1200" b="1" dirty="0" err="1">
+                <a:latin typeface="Consolas" panose="020B0609020204030204" pitchFamily="49" charset="0"/>
+              </a:rPr>
+              <a:t>.</a:t>
+            </a:r>
+            <a:r>
+              <a:rPr lang="en-US" sz="1200" b="1" dirty="0" err="1">
+                <a:latin typeface="Consolas" panose="020B0609020204030204" pitchFamily="49" charset="0"/>
+                <a:hlinkClick r:id="rId35"/>
+              </a:rPr>
+              <a:t>boxplot</a:t>
+            </a:r>
+            <a:r>
+              <a:rPr lang="en-US" sz="1200" b="1" dirty="0">
+                <a:latin typeface="Consolas" panose="020B0609020204030204" pitchFamily="49" charset="0"/>
+              </a:rPr>
+              <a:t>()</a:t>
+            </a:r>
           </a:p>
           <a:p>
             <a:pPr marL="93600"/>
             <a:r>
               <a:rPr lang="en-US" sz="1200" dirty="0"/>
-              <a:t>Extract the year.</a:t>
-            </a:r>
-          </a:p>
-          <a:p>
-            <a:r>
-              <a:rPr lang="en-US" sz="1200" b="1" dirty="0" err="1">
-                <a:latin typeface="Consolas" panose="020B0609020204030204" pitchFamily="49" charset="0"/>
-              </a:rPr>
-              <a:t>s.dt.month</a:t>
-            </a:r>
-            <a:endParaRPr lang="en-US" sz="1200" b="1" dirty="0">
-              <a:latin typeface="Consolas" panose="020B0609020204030204" pitchFamily="49" charset="0"/>
-            </a:endParaRPr>
-          </a:p>
-          <a:p>
-            <a:pPr marL="93600"/>
+              <a:t>Plot a scatter graph of the </a:t>
+            </a:r>
+            <a:r>
+              <a:rPr lang="en-US" sz="1200" dirty="0" err="1"/>
+              <a:t>DataFrame</a:t>
+            </a:r>
             <a:r>
               <a:rPr lang="en-US" sz="1200" dirty="0"/>
-              <a:t>Extract the month as an integer.</a:t>
-            </a:r>
-          </a:p>
-          <a:p>
-            <a:r>
-              <a:rPr lang="en-US" sz="1200" b="1" dirty="0" err="1">
-                <a:latin typeface="Consolas" panose="020B0609020204030204" pitchFamily="49" charset="0"/>
-              </a:rPr>
-              <a:t>s.dt.day</a:t>
-            </a:r>
-            <a:endParaRPr lang="en-US" sz="1200" b="1" dirty="0">
-              <a:latin typeface="Consolas" panose="020B0609020204030204" pitchFamily="49" charset="0"/>
-            </a:endParaRPr>
-          </a:p>
-          <a:p>
-            <a:pPr marL="93600"/>
-            <a:r>
-              <a:rPr lang="en-US" sz="1200" dirty="0"/>
-              <a:t>Extract the day (int) from the date.</a:t>
-            </a:r>
-          </a:p>
-          <a:p>
-            <a:r>
-              <a:rPr lang="en-US" sz="1200" b="1" dirty="0" err="1">
-                <a:latin typeface="Consolas" panose="020B0609020204030204" pitchFamily="49" charset="0"/>
-              </a:rPr>
-              <a:t>s.dt.dayofweek</a:t>
-            </a:r>
-            <a:endParaRPr lang="en-US" sz="1200" b="1" dirty="0">
-              <a:latin typeface="Consolas" panose="020B0609020204030204" pitchFamily="49" charset="0"/>
-            </a:endParaRPr>
-          </a:p>
-          <a:p>
-            <a:pPr marL="93600"/>
-            <a:r>
-              <a:rPr lang="en-US" sz="1200" dirty="0"/>
-              <a:t>Extract the day, 0=Mon, 6=Sun</a:t>
+              <a:t>.</a:t>
             </a:r>
           </a:p>
         </p:txBody>
       </p:sp>
       <p:sp>
         <p:nvSpPr>
-          <p:cNvPr id="72" name="TextBox 71">
+          <p:cNvPr id="12" name="TextBox 11">
             <a:extLst>
               <a:ext uri="{FF2B5EF4-FFF2-40B4-BE49-F238E27FC236}">
-                <a16:creationId xmlns:a16="http://schemas.microsoft.com/office/drawing/2014/main" id="{9CA54CB9-315A-2308-D88A-21C2BFBE73C9}"/>
+                <a16:creationId xmlns:a16="http://schemas.microsoft.com/office/drawing/2014/main" id="{6D24F30B-4D6D-16B5-565F-B1CC9B8F20CD}"/>
               </a:ext>
             </a:extLst>
           </p:cNvPr>
@@ -31871,8 +30754,8 @@
         </p:nvSpPr>
         <p:spPr>
           <a:xfrm>
-            <a:off x="2836469" y="6419773"/>
-            <a:ext cx="2649041" cy="1754326"/>
+            <a:off x="3752260" y="2547558"/>
+            <a:ext cx="3492000" cy="1015663"/>
           </a:xfrm>
           <a:prstGeom prst="rect">
             <a:avLst/>
@@ -31885,28 +30768,31 @@
           </a:bodyPr>
           <a:lstStyle/>
           <a:p>
-            <a:endParaRPr lang="en-US" sz="1200" dirty="0">
-              <a:solidFill>
-                <a:schemeClr val="accent5"/>
-              </a:solidFill>
-            </a:endParaRPr>
-          </a:p>
-          <a:p>
             <a:r>
               <a:rPr lang="en-US" sz="1200" b="1" dirty="0" err="1">
                 <a:latin typeface="Consolas" panose="020B0609020204030204" pitchFamily="49" charset="0"/>
               </a:rPr>
-              <a:t>s.dt.hour</a:t>
-            </a:r>
-            <a:endParaRPr lang="en-US" sz="1200" b="1" dirty="0">
-              <a:latin typeface="Consolas" panose="020B0609020204030204" pitchFamily="49" charset="0"/>
-            </a:endParaRPr>
+              <a:t>df.</a:t>
+            </a:r>
+            <a:r>
+              <a:rPr lang="en-US" sz="1200" b="1" dirty="0" err="1">
+                <a:latin typeface="Consolas" panose="020B0609020204030204" pitchFamily="49" charset="0"/>
+                <a:hlinkClick r:id="rId10"/>
+              </a:rPr>
+              <a:t>plot</a:t>
+            </a:r>
+            <a:r>
+              <a:rPr lang="en-US" sz="1200" b="1" dirty="0">
+                <a:latin typeface="Consolas" panose="020B0609020204030204" pitchFamily="49" charset="0"/>
+              </a:rPr>
+              <a:t>(cumulative=True)</a:t>
+            </a:r>
           </a:p>
           <a:p>
             <a:pPr marL="93600"/>
             <a:r>
               <a:rPr lang="en-US" sz="1200" dirty="0"/>
-              <a:t>Extract the hour.</a:t>
+              <a:t>Creates a cumulative plot</a:t>
             </a:r>
           </a:p>
           <a:p>
@@ -31914,63 +30800,102 @@
               <a:rPr lang="en-US" sz="1200" b="1" dirty="0" err="1">
                 <a:latin typeface="Consolas" panose="020B0609020204030204" pitchFamily="49" charset="0"/>
               </a:rPr>
-              <a:t>s.dt.minute</a:t>
-            </a:r>
-            <a:endParaRPr lang="en-US" sz="1200" b="1" dirty="0">
-              <a:latin typeface="Consolas" panose="020B0609020204030204" pitchFamily="49" charset="0"/>
-            </a:endParaRPr>
+              <a:t>df.</a:t>
+            </a:r>
+            <a:r>
+              <a:rPr lang="en-US" sz="1200" b="1" dirty="0" err="1">
+                <a:latin typeface="Consolas" panose="020B0609020204030204" pitchFamily="49" charset="0"/>
+                <a:hlinkClick r:id="rId10"/>
+              </a:rPr>
+              <a:t>plot</a:t>
+            </a:r>
+            <a:r>
+              <a:rPr lang="en-US" sz="1200" b="1" dirty="0">
+                <a:latin typeface="Consolas" panose="020B0609020204030204" pitchFamily="49" charset="0"/>
+              </a:rPr>
+              <a:t>(bins=30)</a:t>
+            </a:r>
           </a:p>
           <a:p>
             <a:pPr marL="93600"/>
             <a:r>
               <a:rPr lang="en-US" sz="1200" dirty="0"/>
-              <a:t>Extract the minute.</a:t>
-            </a:r>
-          </a:p>
+              <a:t>Set the number of bins into which data is grouped (histograms)</a:t>
+            </a:r>
+          </a:p>
+        </p:txBody>
+      </p:sp>
+      <p:sp>
+        <p:nvSpPr>
+          <p:cNvPr id="14" name="TextBox 13">
+            <a:extLst>
+              <a:ext uri="{FF2B5EF4-FFF2-40B4-BE49-F238E27FC236}">
+                <a16:creationId xmlns:a16="http://schemas.microsoft.com/office/drawing/2014/main" id="{7D5B0F56-AF72-8A94-52CC-FD1210556B4B}"/>
+              </a:ext>
+            </a:extLst>
+          </p:cNvPr>
+          <p:cNvSpPr txBox="1"/>
+          <p:nvPr/>
+        </p:nvSpPr>
+        <p:spPr>
+          <a:xfrm>
+            <a:off x="140667" y="3528756"/>
+            <a:ext cx="10659715" cy="646331"/>
+          </a:xfrm>
+          <a:prstGeom prst="rect">
+            <a:avLst/>
+          </a:prstGeom>
+          <a:noFill/>
+        </p:spPr>
+        <p:txBody>
+          <a:bodyPr wrap="square" rtlCol="0">
+            <a:spAutoFit/>
+          </a:bodyPr>
+          <a:lstStyle/>
           <a:p>
             <a:r>
               <a:rPr lang="en-US" sz="1200" b="1" dirty="0" err="1">
                 <a:latin typeface="Consolas" panose="020B0609020204030204" pitchFamily="49" charset="0"/>
               </a:rPr>
-              <a:t>s.dt.second</a:t>
-            </a:r>
-            <a:endParaRPr lang="en-US" sz="1200" b="1" dirty="0">
-              <a:latin typeface="Consolas" panose="020B0609020204030204" pitchFamily="49" charset="0"/>
-            </a:endParaRPr>
+              <a:t>df.</a:t>
+            </a:r>
+            <a:r>
+              <a:rPr lang="en-US" sz="1200" b="1" dirty="0" err="1">
+                <a:latin typeface="Consolas" panose="020B0609020204030204" pitchFamily="49" charset="0"/>
+                <a:hlinkClick r:id="rId10"/>
+              </a:rPr>
+              <a:t>plot</a:t>
+            </a:r>
+            <a:r>
+              <a:rPr lang="en-US" sz="1200" b="1" dirty="0">
+                <a:latin typeface="Consolas" panose="020B0609020204030204" pitchFamily="49" charset="0"/>
+              </a:rPr>
+              <a:t>(subplots=True, title=['col1', 'col2', 'col3'])</a:t>
+            </a:r>
           </a:p>
           <a:p>
             <a:pPr marL="93600"/>
             <a:r>
               <a:rPr lang="en-US" sz="1200" dirty="0"/>
-              <a:t>Extract the second.</a:t>
-            </a:r>
-          </a:p>
-          <a:p>
-            <a:r>
-              <a:rPr lang="en-US" sz="1200" b="1" dirty="0" err="1">
-                <a:latin typeface="Consolas" panose="020B0609020204030204" pitchFamily="49" charset="0"/>
-              </a:rPr>
-              <a:t>s.dt.quarter</a:t>
-            </a:r>
-            <a:endParaRPr lang="en-US" sz="1200" b="1" dirty="0">
-              <a:latin typeface="Consolas" panose="020B0609020204030204" pitchFamily="49" charset="0"/>
-            </a:endParaRPr>
-          </a:p>
-          <a:p>
-            <a:pPr marL="93600"/>
+              <a:t>Arguments can be combined for more flexibility when graphing, this would plot a separate line graph for of column of a 3-columned </a:t>
+            </a:r>
+            <a:r>
+              <a:rPr lang="en-US" sz="1200" dirty="0" err="1"/>
+              <a:t>DataFrame</a:t>
+            </a:r>
             <a:r>
               <a:rPr lang="en-US" sz="1200" dirty="0"/>
-              <a:t>Extract the quarter of the date</a:t>
+              <a:t>. The first string in the list of titles applies to the graph of the left-most column.</a:t>
             </a:r>
           </a:p>
         </p:txBody>
       </p:sp>
       <p:grpSp>
         <p:nvGrpSpPr>
-          <p:cNvPr id="74" name="Group 73">
+          <p:cNvPr id="78" name="Group 77">
             <a:extLst>
               <a:ext uri="{FF2B5EF4-FFF2-40B4-BE49-F238E27FC236}">
-                <a16:creationId xmlns:a16="http://schemas.microsoft.com/office/drawing/2014/main" id="{5C0D5FA8-39AC-BAB3-0E91-BD173B529193}"/>
+                <a16:creationId xmlns:a16="http://schemas.microsoft.com/office/drawing/2014/main" id="{E88DFEEA-0FA5-E656-FB6C-43B7878D04D3}"/>
               </a:ext>
             </a:extLst>
           </p:cNvPr>
@@ -31979,18 +30904,564 @@
         </p:nvGrpSpPr>
         <p:grpSpPr>
           <a:xfrm>
-            <a:off x="2836225" y="8237055"/>
-            <a:ext cx="2611011" cy="1865578"/>
-            <a:chOff x="123304" y="3045615"/>
-            <a:chExt cx="5321641" cy="1865578"/>
+            <a:off x="5495291" y="4187881"/>
+            <a:ext cx="5305091" cy="3632952"/>
+            <a:chOff x="5495291" y="4187881"/>
+            <a:chExt cx="5305091" cy="3632952"/>
           </a:xfrm>
         </p:grpSpPr>
         <p:sp>
           <p:nvSpPr>
-            <p:cNvPr id="75" name="Rounded Rectangle 80">
+            <p:cNvPr id="77" name="Rounded Rectangle 48">
               <a:extLst>
                 <a:ext uri="{FF2B5EF4-FFF2-40B4-BE49-F238E27FC236}">
-                  <a16:creationId xmlns:a16="http://schemas.microsoft.com/office/drawing/2014/main" id="{3C6C94C1-8EDA-62FF-08C2-803262CDC124}"/>
+                  <a16:creationId xmlns:a16="http://schemas.microsoft.com/office/drawing/2014/main" id="{2C264735-B18D-87B6-15E3-DA28F5F967AE}"/>
+                </a:ext>
+              </a:extLst>
+            </p:cNvPr>
+            <p:cNvSpPr/>
+            <p:nvPr/>
+          </p:nvSpPr>
+          <p:spPr>
+            <a:xfrm>
+              <a:off x="5495291" y="4618646"/>
+              <a:ext cx="5305091" cy="3132000"/>
+            </a:xfrm>
+            <a:prstGeom prst="roundRect">
+              <a:avLst>
+                <a:gd name="adj" fmla="val 1508"/>
+              </a:avLst>
+            </a:prstGeom>
+            <a:solidFill>
+              <a:schemeClr val="accent1">
+                <a:lumMod val="20000"/>
+                <a:lumOff val="80000"/>
+              </a:schemeClr>
+            </a:solidFill>
+          </p:spPr>
+          <p:style>
+            <a:lnRef idx="2">
+              <a:schemeClr val="accent1">
+                <a:shade val="50000"/>
+              </a:schemeClr>
+            </a:lnRef>
+            <a:fillRef idx="1">
+              <a:schemeClr val="accent1"/>
+            </a:fillRef>
+            <a:effectRef idx="0">
+              <a:schemeClr val="accent1"/>
+            </a:effectRef>
+            <a:fontRef idx="minor">
+              <a:schemeClr val="lt1"/>
+            </a:fontRef>
+          </p:style>
+          <p:txBody>
+            <a:bodyPr rtlCol="0" anchor="ctr"/>
+            <a:lstStyle/>
+            <a:p>
+              <a:pPr algn="ctr"/>
+              <a:endParaRPr lang="en-US" sz="2683" dirty="0"/>
+            </a:p>
+          </p:txBody>
+        </p:sp>
+        <p:grpSp>
+          <p:nvGrpSpPr>
+            <p:cNvPr id="56" name="Group 55">
+              <a:extLst>
+                <a:ext uri="{FF2B5EF4-FFF2-40B4-BE49-F238E27FC236}">
+                  <a16:creationId xmlns:a16="http://schemas.microsoft.com/office/drawing/2014/main" id="{B6A38DE3-05EC-CA9A-84BD-274AB0CC0B86}"/>
+                </a:ext>
+              </a:extLst>
+            </p:cNvPr>
+            <p:cNvGrpSpPr/>
+            <p:nvPr/>
+          </p:nvGrpSpPr>
+          <p:grpSpPr>
+            <a:xfrm>
+              <a:off x="5495291" y="4187881"/>
+              <a:ext cx="5305091" cy="3632952"/>
+              <a:chOff x="139854" y="3045615"/>
+              <a:chExt cx="5305091" cy="3632952"/>
+            </a:xfrm>
+          </p:grpSpPr>
+          <p:sp>
+            <p:nvSpPr>
+              <p:cNvPr id="57" name="Rounded Rectangle 80">
+                <a:extLst>
+                  <a:ext uri="{FF2B5EF4-FFF2-40B4-BE49-F238E27FC236}">
+                    <a16:creationId xmlns:a16="http://schemas.microsoft.com/office/drawing/2014/main" id="{22974F59-49A2-AE72-7FBA-5884B871D2C6}"/>
+                  </a:ext>
+                </a:extLst>
+              </p:cNvPr>
+              <p:cNvSpPr/>
+              <p:nvPr/>
+            </p:nvSpPr>
+            <p:spPr>
+              <a:xfrm>
+                <a:off x="139854" y="3045615"/>
+                <a:ext cx="5305091" cy="461665"/>
+              </a:xfrm>
+              <a:prstGeom prst="roundRect">
+                <a:avLst/>
+              </a:prstGeom>
+            </p:spPr>
+            <p:style>
+              <a:lnRef idx="2">
+                <a:schemeClr val="accent1">
+                  <a:shade val="50000"/>
+                </a:schemeClr>
+              </a:lnRef>
+              <a:fillRef idx="1">
+                <a:schemeClr val="accent1"/>
+              </a:fillRef>
+              <a:effectRef idx="0">
+                <a:schemeClr val="accent1"/>
+              </a:effectRef>
+              <a:fontRef idx="minor">
+                <a:schemeClr val="lt1"/>
+              </a:fontRef>
+            </p:style>
+            <p:txBody>
+              <a:bodyPr rtlCol="0" anchor="ctr"/>
+              <a:lstStyle/>
+              <a:p>
+                <a:pPr algn="ctr"/>
+                <a:r>
+                  <a:rPr lang="en-US" sz="2800" b="1" dirty="0">
+                    <a:solidFill>
+                      <a:schemeClr val="bg1"/>
+                    </a:solidFill>
+                  </a:rPr>
+                  <a:t>Series String Operations</a:t>
+                </a:r>
+              </a:p>
+            </p:txBody>
+          </p:sp>
+          <p:sp>
+            <p:nvSpPr>
+              <p:cNvPr id="58" name="TextBox 57">
+                <a:extLst>
+                  <a:ext uri="{FF2B5EF4-FFF2-40B4-BE49-F238E27FC236}">
+                    <a16:creationId xmlns:a16="http://schemas.microsoft.com/office/drawing/2014/main" id="{EE72E99E-B519-1022-DB85-C048621814A3}"/>
+                  </a:ext>
+                </a:extLst>
+              </p:cNvPr>
+              <p:cNvSpPr txBox="1"/>
+              <p:nvPr/>
+            </p:nvSpPr>
+            <p:spPr>
+              <a:xfrm>
+                <a:off x="139854" y="3816245"/>
+                <a:ext cx="2654146" cy="2862322"/>
+              </a:xfrm>
+              <a:prstGeom prst="rect">
+                <a:avLst/>
+              </a:prstGeom>
+              <a:noFill/>
+            </p:spPr>
+            <p:txBody>
+              <a:bodyPr wrap="square" rtlCol="0">
+                <a:spAutoFit/>
+              </a:bodyPr>
+              <a:lstStyle/>
+              <a:p>
+                <a:r>
+                  <a:rPr lang="en-US" sz="1200" b="1" dirty="0" err="1">
+                    <a:latin typeface="Consolas" panose="020B0609020204030204" pitchFamily="49" charset="0"/>
+                  </a:rPr>
+                  <a:t>s.str.</a:t>
+                </a:r>
+                <a:r>
+                  <a:rPr lang="en-US" sz="1200" b="1" dirty="0" err="1">
+                    <a:latin typeface="Consolas" panose="020B0609020204030204" pitchFamily="49" charset="0"/>
+                    <a:hlinkClick r:id="rId36"/>
+                  </a:rPr>
+                  <a:t>count</a:t>
+                </a:r>
+                <a:r>
+                  <a:rPr lang="en-US" sz="1200" b="1" dirty="0">
+                    <a:latin typeface="Consolas" panose="020B0609020204030204" pitchFamily="49" charset="0"/>
+                  </a:rPr>
+                  <a:t>(pattern)</a:t>
+                </a:r>
+              </a:p>
+              <a:p>
+                <a:pPr marL="93600"/>
+                <a:r>
+                  <a:rPr lang="en-US" sz="1200" dirty="0"/>
+                  <a:t>Returns a series with the integer counts in each element.</a:t>
+                </a:r>
+              </a:p>
+              <a:p>
+                <a:r>
+                  <a:rPr lang="en-US" sz="1200" b="1" dirty="0" err="1">
+                    <a:latin typeface="Consolas" panose="020B0609020204030204" pitchFamily="49" charset="0"/>
+                  </a:rPr>
+                  <a:t>s.str.</a:t>
+                </a:r>
+                <a:r>
+                  <a:rPr lang="en-US" sz="1200" b="1" dirty="0" err="1">
+                    <a:latin typeface="Consolas" panose="020B0609020204030204" pitchFamily="49" charset="0"/>
+                    <a:hlinkClick r:id="rId37"/>
+                  </a:rPr>
+                  <a:t>get</a:t>
+                </a:r>
+                <a:r>
+                  <a:rPr lang="en-US" sz="1200" b="1" dirty="0">
+                    <a:latin typeface="Consolas" panose="020B0609020204030204" pitchFamily="49" charset="0"/>
+                  </a:rPr>
+                  <a:t>(index)</a:t>
+                </a:r>
+              </a:p>
+              <a:p>
+                <a:pPr marL="93600"/>
+                <a:r>
+                  <a:rPr lang="en-US" sz="1200" dirty="0"/>
+                  <a:t>Returns a series with the data at the given index for each element.</a:t>
+                </a:r>
+              </a:p>
+              <a:p>
+                <a:r>
+                  <a:rPr lang="en-US" sz="1200" b="1" dirty="0" err="1">
+                    <a:latin typeface="Consolas" panose="020B0609020204030204" pitchFamily="49" charset="0"/>
+                  </a:rPr>
+                  <a:t>s.str.</a:t>
+                </a:r>
+                <a:r>
+                  <a:rPr lang="en-US" sz="1200" b="1" dirty="0" err="1">
+                    <a:latin typeface="Consolas" panose="020B0609020204030204" pitchFamily="49" charset="0"/>
+                    <a:hlinkClick r:id="rId38"/>
+                  </a:rPr>
+                  <a:t>join</a:t>
+                </a:r>
+                <a:r>
+                  <a:rPr lang="en-US" sz="1200" b="1" dirty="0">
+                    <a:latin typeface="Consolas" panose="020B0609020204030204" pitchFamily="49" charset="0"/>
+                  </a:rPr>
+                  <a:t>(</a:t>
+                </a:r>
+                <a:r>
+                  <a:rPr lang="en-US" sz="1200" b="1" dirty="0" err="1">
+                    <a:latin typeface="Consolas" panose="020B0609020204030204" pitchFamily="49" charset="0"/>
+                  </a:rPr>
+                  <a:t>sep</a:t>
+                </a:r>
+                <a:r>
+                  <a:rPr lang="en-US" sz="1200" b="1" dirty="0">
+                    <a:latin typeface="Consolas" panose="020B0609020204030204" pitchFamily="49" charset="0"/>
+                  </a:rPr>
+                  <a:t>)</a:t>
+                </a:r>
+              </a:p>
+              <a:p>
+                <a:pPr marL="93600"/>
+                <a:r>
+                  <a:rPr lang="en-US" sz="1200" dirty="0"/>
+                  <a:t>Returns a series where each element has been concatenated.</a:t>
+                </a:r>
+              </a:p>
+              <a:p>
+                <a:r>
+                  <a:rPr lang="en-US" sz="1200" b="1" dirty="0" err="1">
+                    <a:latin typeface="Consolas" panose="020B0609020204030204" pitchFamily="49" charset="0"/>
+                  </a:rPr>
+                  <a:t>s.str.</a:t>
+                </a:r>
+                <a:r>
+                  <a:rPr lang="en-US" sz="1200" b="1" dirty="0" err="1">
+                    <a:latin typeface="Consolas" panose="020B0609020204030204" pitchFamily="49" charset="0"/>
+                    <a:hlinkClick r:id="rId39"/>
+                  </a:rPr>
+                  <a:t>title</a:t>
+                </a:r>
+                <a:r>
+                  <a:rPr lang="en-US" sz="1200" b="1" dirty="0">
+                    <a:latin typeface="Consolas" panose="020B0609020204030204" pitchFamily="49" charset="0"/>
+                  </a:rPr>
+                  <a:t>()</a:t>
+                </a:r>
+              </a:p>
+              <a:p>
+                <a:pPr marL="93600"/>
+                <a:r>
+                  <a:rPr lang="en-US" sz="1200" dirty="0"/>
+                  <a:t>Converts the first character of each word to be a capital.</a:t>
+                </a:r>
+              </a:p>
+              <a:p>
+                <a:r>
+                  <a:rPr lang="en-US" sz="1200" b="1" dirty="0" err="1">
+                    <a:latin typeface="Consolas" panose="020B0609020204030204" pitchFamily="49" charset="0"/>
+                  </a:rPr>
+                  <a:t>s.str.</a:t>
+                </a:r>
+                <a:r>
+                  <a:rPr lang="en-US" sz="1200" b="1" dirty="0" err="1">
+                    <a:latin typeface="Consolas" panose="020B0609020204030204" pitchFamily="49" charset="0"/>
+                    <a:hlinkClick r:id="rId40"/>
+                  </a:rPr>
+                  <a:t>len</a:t>
+                </a:r>
+                <a:r>
+                  <a:rPr lang="en-US" sz="1200" b="1" dirty="0">
+                    <a:latin typeface="Consolas" panose="020B0609020204030204" pitchFamily="49" charset="0"/>
+                  </a:rPr>
+                  <a:t>()</a:t>
+                </a:r>
+              </a:p>
+              <a:p>
+                <a:pPr marL="93600"/>
+                <a:r>
+                  <a:rPr lang="en-US" sz="1200" dirty="0"/>
+                  <a:t>Returns a series with the lengths of each element.</a:t>
+                </a:r>
+              </a:p>
+            </p:txBody>
+          </p:sp>
+          <p:sp>
+            <p:nvSpPr>
+              <p:cNvPr id="62" name="TextBox 61">
+                <a:extLst>
+                  <a:ext uri="{FF2B5EF4-FFF2-40B4-BE49-F238E27FC236}">
+                    <a16:creationId xmlns:a16="http://schemas.microsoft.com/office/drawing/2014/main" id="{140AE2C8-F53F-EBA5-8F37-CE9FBA2F47EB}"/>
+                  </a:ext>
+                </a:extLst>
+              </p:cNvPr>
+              <p:cNvSpPr txBox="1"/>
+              <p:nvPr/>
+            </p:nvSpPr>
+            <p:spPr>
+              <a:xfrm>
+                <a:off x="2790799" y="3816245"/>
+                <a:ext cx="2654146" cy="2862322"/>
+              </a:xfrm>
+              <a:prstGeom prst="rect">
+                <a:avLst/>
+              </a:prstGeom>
+              <a:noFill/>
+            </p:spPr>
+            <p:txBody>
+              <a:bodyPr wrap="square" rtlCol="0">
+                <a:spAutoFit/>
+              </a:bodyPr>
+              <a:lstStyle/>
+              <a:p>
+                <a:r>
+                  <a:rPr lang="en-US" sz="1200" b="1" dirty="0">
+                    <a:latin typeface="Consolas" panose="020B0609020204030204" pitchFamily="49" charset="0"/>
+                  </a:rPr>
+                  <a:t>s.str.</a:t>
+                </a:r>
+                <a:r>
+                  <a:rPr lang="en-US" sz="1200" b="1" dirty="0">
+                    <a:latin typeface="Consolas" panose="020B0609020204030204" pitchFamily="49" charset="0"/>
+                    <a:hlinkClick r:id="rId41"/>
+                  </a:rPr>
+                  <a:t>cat</a:t>
+                </a:r>
+                <a:r>
+                  <a:rPr lang="en-US" sz="1200" b="1" dirty="0">
+                    <a:latin typeface="Consolas" panose="020B0609020204030204" pitchFamily="49" charset="0"/>
+                  </a:rPr>
+                  <a:t>()</a:t>
+                </a:r>
+              </a:p>
+              <a:p>
+                <a:pPr marL="93600"/>
+                <a:r>
+                  <a:rPr lang="en-US" sz="1200" dirty="0"/>
+                  <a:t>Concatenate elements into a single string</a:t>
+                </a:r>
+              </a:p>
+              <a:p>
+                <a:r>
+                  <a:rPr lang="en-US" sz="1200" b="1" dirty="0" err="1">
+                    <a:latin typeface="Consolas" panose="020B0609020204030204" pitchFamily="49" charset="0"/>
+                  </a:rPr>
+                  <a:t>s.str.</a:t>
+                </a:r>
+                <a:r>
+                  <a:rPr lang="en-US" sz="1200" b="1" dirty="0" err="1">
+                    <a:latin typeface="Consolas" panose="020B0609020204030204" pitchFamily="49" charset="0"/>
+                    <a:hlinkClick r:id="rId42"/>
+                  </a:rPr>
+                  <a:t>partition</a:t>
+                </a:r>
+                <a:r>
+                  <a:rPr lang="en-US" sz="1200" b="1" dirty="0">
+                    <a:latin typeface="Consolas" panose="020B0609020204030204" pitchFamily="49" charset="0"/>
+                  </a:rPr>
+                  <a:t>(</a:t>
+                </a:r>
+                <a:r>
+                  <a:rPr lang="en-US" sz="1200" b="1" dirty="0" err="1">
+                    <a:latin typeface="Consolas" panose="020B0609020204030204" pitchFamily="49" charset="0"/>
+                  </a:rPr>
+                  <a:t>sep</a:t>
+                </a:r>
+                <a:r>
+                  <a:rPr lang="en-US" sz="1200" b="1" dirty="0">
+                    <a:latin typeface="Consolas" panose="020B0609020204030204" pitchFamily="49" charset="0"/>
+                  </a:rPr>
+                  <a:t>)</a:t>
+                </a:r>
+              </a:p>
+              <a:p>
+                <a:pPr marL="93600"/>
+                <a:r>
+                  <a:rPr lang="en-US" sz="1200" dirty="0"/>
+                  <a:t>Splits the string on the first instance of the separator</a:t>
+                </a:r>
+              </a:p>
+              <a:p>
+                <a:r>
+                  <a:rPr lang="en-US" sz="1200" b="1" dirty="0" err="1">
+                    <a:latin typeface="Consolas" panose="020B0609020204030204" pitchFamily="49" charset="0"/>
+                  </a:rPr>
+                  <a:t>s.str.</a:t>
+                </a:r>
+                <a:r>
+                  <a:rPr lang="en-US" sz="1200" b="1" dirty="0" err="1">
+                    <a:latin typeface="Consolas" panose="020B0609020204030204" pitchFamily="49" charset="0"/>
+                    <a:hlinkClick r:id="rId43"/>
+                  </a:rPr>
+                  <a:t>slice</a:t>
+                </a:r>
+                <a:r>
+                  <a:rPr lang="en-US" sz="1200" b="1" dirty="0">
+                    <a:latin typeface="Consolas" panose="020B0609020204030204" pitchFamily="49" charset="0"/>
+                  </a:rPr>
+                  <a:t>(start, stop, step)</a:t>
+                </a:r>
+              </a:p>
+              <a:p>
+                <a:pPr marL="93600"/>
+                <a:r>
+                  <a:rPr lang="en-US" sz="1200" dirty="0"/>
+                  <a:t>Slices each string</a:t>
+                </a:r>
+              </a:p>
+              <a:p>
+                <a:r>
+                  <a:rPr lang="en-US" sz="1200" b="1" dirty="0" err="1">
+                    <a:latin typeface="Consolas" panose="020B0609020204030204" pitchFamily="49" charset="0"/>
+                  </a:rPr>
+                  <a:t>s.str.</a:t>
+                </a:r>
+                <a:r>
+                  <a:rPr lang="en-US" sz="1200" b="1" dirty="0" err="1">
+                    <a:latin typeface="Consolas" panose="020B0609020204030204" pitchFamily="49" charset="0"/>
+                    <a:hlinkClick r:id="rId44"/>
+                  </a:rPr>
+                  <a:t>replace</a:t>
+                </a:r>
+                <a:r>
+                  <a:rPr lang="en-US" sz="1200" b="1" dirty="0">
+                    <a:latin typeface="Consolas" panose="020B0609020204030204" pitchFamily="49" charset="0"/>
+                  </a:rPr>
+                  <a:t>(pat, rep)</a:t>
+                </a:r>
+              </a:p>
+              <a:p>
+                <a:pPr marL="93600"/>
+                <a:r>
+                  <a:rPr lang="en-US" sz="1200" dirty="0"/>
+                  <a:t>Use regex to replace patterns in each string.</a:t>
+                </a:r>
+              </a:p>
+              <a:p>
+                <a:r>
+                  <a:rPr lang="en-US" sz="1200" b="1" dirty="0" err="1">
+                    <a:latin typeface="Consolas" panose="020B0609020204030204" pitchFamily="49" charset="0"/>
+                  </a:rPr>
+                  <a:t>s.str.</a:t>
+                </a:r>
+                <a:r>
+                  <a:rPr lang="en-US" sz="1200" b="1" dirty="0" err="1">
+                    <a:latin typeface="Consolas" panose="020B0609020204030204" pitchFamily="49" charset="0"/>
+                    <a:hlinkClick r:id="rId45"/>
+                  </a:rPr>
+                  <a:t>isalnum</a:t>
+                </a:r>
+                <a:r>
+                  <a:rPr lang="en-US" sz="1200" b="1" dirty="0">
+                    <a:latin typeface="Consolas" panose="020B0609020204030204" pitchFamily="49" charset="0"/>
+                  </a:rPr>
+                  <a:t>()</a:t>
+                </a:r>
+              </a:p>
+              <a:p>
+                <a:pPr marL="93600"/>
+                <a:r>
+                  <a:rPr lang="en-US" sz="1200" dirty="0"/>
+                  <a:t>Checks whether each element is alpha-numeric</a:t>
+                </a:r>
+              </a:p>
+            </p:txBody>
+          </p:sp>
+          <p:sp>
+            <p:nvSpPr>
+              <p:cNvPr id="64" name="TextBox 63">
+                <a:extLst>
+                  <a:ext uri="{FF2B5EF4-FFF2-40B4-BE49-F238E27FC236}">
+                    <a16:creationId xmlns:a16="http://schemas.microsoft.com/office/drawing/2014/main" id="{3E73FD19-8460-E272-6181-C2631BDBE3AD}"/>
+                  </a:ext>
+                </a:extLst>
+              </p:cNvPr>
+              <p:cNvSpPr txBox="1"/>
+              <p:nvPr/>
+            </p:nvSpPr>
+            <p:spPr>
+              <a:xfrm>
+                <a:off x="139854" y="3513231"/>
+                <a:ext cx="5305091" cy="461665"/>
+              </a:xfrm>
+              <a:prstGeom prst="rect">
+                <a:avLst/>
+              </a:prstGeom>
+              <a:noFill/>
+            </p:spPr>
+            <p:txBody>
+              <a:bodyPr wrap="square" rtlCol="0">
+                <a:spAutoFit/>
+              </a:bodyPr>
+              <a:lstStyle/>
+              <a:p>
+                <a:r>
+                  <a:rPr lang="en-US" sz="1200" dirty="0"/>
+                  <a:t>Similar to python string operations, except these are vectorized to apply to the entire Series efficiently.</a:t>
+                </a:r>
+              </a:p>
+            </p:txBody>
+          </p:sp>
+        </p:grpSp>
+      </p:grpSp>
+      <p:grpSp>
+        <p:nvGrpSpPr>
+          <p:cNvPr id="66" name="Group 65">
+            <a:extLst>
+              <a:ext uri="{FF2B5EF4-FFF2-40B4-BE49-F238E27FC236}">
+                <a16:creationId xmlns:a16="http://schemas.microsoft.com/office/drawing/2014/main" id="{723DD55A-6D4F-4125-C823-F3B5B3ADE67B}"/>
+              </a:ext>
+            </a:extLst>
+          </p:cNvPr>
+          <p:cNvGrpSpPr/>
+          <p:nvPr/>
+        </p:nvGrpSpPr>
+        <p:grpSpPr>
+          <a:xfrm>
+            <a:off x="140669" y="4184606"/>
+            <a:ext cx="5305091" cy="2321756"/>
+            <a:chOff x="139854" y="3045615"/>
+            <a:chExt cx="5305091" cy="2321756"/>
+          </a:xfrm>
+        </p:grpSpPr>
+        <p:sp>
+          <p:nvSpPr>
+            <p:cNvPr id="67" name="Rounded Rectangle 80">
+              <a:extLst>
+                <a:ext uri="{FF2B5EF4-FFF2-40B4-BE49-F238E27FC236}">
+                  <a16:creationId xmlns:a16="http://schemas.microsoft.com/office/drawing/2014/main" id="{A5E842E6-4526-202F-B621-BC165A1B6376}"/>
                 </a:ext>
               </a:extLst>
             </p:cNvPr>
@@ -32032,30 +31503,18 @@
                   <a:solidFill>
                     <a:schemeClr val="bg1"/>
                   </a:solidFill>
-                  <a:hlinkClick r:id="rId45">
-                    <a:extLst>
-                      <a:ext uri="{A12FA001-AC4F-418D-AE19-62706E023703}">
-                        <ahyp:hlinkClr xmlns:ahyp="http://schemas.microsoft.com/office/drawing/2018/hyperlinkcolor" val="tx"/>
-                      </a:ext>
-                    </a:extLst>
-                  </a:hlinkClick>
                 </a:rPr>
-                <a:t>Pivot Tables</a:t>
+                <a:t>Changing Type</a:t>
               </a:r>
-              <a:endParaRPr lang="en-US" sz="2800" b="1" dirty="0">
-                <a:solidFill>
-                  <a:schemeClr val="bg1"/>
-                </a:solidFill>
-              </a:endParaRPr>
             </a:p>
           </p:txBody>
         </p:sp>
         <p:sp>
           <p:nvSpPr>
-            <p:cNvPr id="76" name="TextBox 75">
+            <p:cNvPr id="70" name="TextBox 69">
               <a:extLst>
                 <a:ext uri="{FF2B5EF4-FFF2-40B4-BE49-F238E27FC236}">
-                  <a16:creationId xmlns:a16="http://schemas.microsoft.com/office/drawing/2014/main" id="{56CACD81-CA04-5925-4C01-B6D62B9B228C}"/>
+                  <a16:creationId xmlns:a16="http://schemas.microsoft.com/office/drawing/2014/main" id="{9AA3EAA8-0C5D-C222-489A-793708C1E1B1}"/>
                 </a:ext>
               </a:extLst>
             </p:cNvPr>
@@ -32064,8 +31523,8 @@
           </p:nvSpPr>
           <p:spPr>
             <a:xfrm>
-              <a:off x="123304" y="4080196"/>
-              <a:ext cx="5305089" cy="830997"/>
+              <a:off x="139854" y="3613045"/>
+              <a:ext cx="2654146" cy="1754326"/>
             </a:xfrm>
             <a:prstGeom prst="rect">
               <a:avLst/>
@@ -32089,689 +31548,584 @@
                   <a:latin typeface="Consolas" panose="020B0609020204030204" pitchFamily="49" charset="0"/>
                   <a:hlinkClick r:id="rId46"/>
                 </a:rPr>
-                <a:t>pivot_table</a:t>
+                <a:t>to_numeric</a:t>
               </a:r>
               <a:r>
                 <a:rPr lang="en-US" sz="1200" b="1" dirty="0">
                   <a:latin typeface="Consolas" panose="020B0609020204030204" pitchFamily="49" charset="0"/>
                 </a:rPr>
-                <a:t>(</a:t>
-              </a:r>
-              <a:r>
-                <a:rPr lang="en-US" sz="1200" b="1" dirty="0" err="1">
-                  <a:latin typeface="Consolas" panose="020B0609020204030204" pitchFamily="49" charset="0"/>
-                </a:rPr>
-                <a:t>df</a:t>
-              </a:r>
-              <a:r>
-                <a:rPr lang="en-US" sz="1200" b="1" dirty="0">
-                  <a:latin typeface="Consolas" panose="020B0609020204030204" pitchFamily="49" charset="0"/>
-                </a:rPr>
-                <a:t>, values, index, columns, </a:t>
-              </a:r>
-              <a:r>
-                <a:rPr lang="en-US" sz="1200" b="1" dirty="0" err="1">
-                  <a:latin typeface="Consolas" panose="020B0609020204030204" pitchFamily="49" charset="0"/>
-                </a:rPr>
-                <a:t>aggfunc</a:t>
-              </a:r>
-              <a:r>
-                <a:rPr lang="en-US" sz="1200" b="1" dirty="0">
-                  <a:latin typeface="Consolas" panose="020B0609020204030204" pitchFamily="49" charset="0"/>
-                </a:rPr>
-                <a:t>)</a:t>
+                <a:t>(data)</a:t>
               </a:r>
             </a:p>
             <a:p>
               <a:pPr marL="93600"/>
               <a:r>
                 <a:rPr lang="en-US" sz="1200" dirty="0"/>
-                <a:t>Creates a pivot table from the given </a:t>
+                <a:t>convert non-numeric types to numeric. </a:t>
+              </a:r>
+            </a:p>
+            <a:p>
+              <a:r>
+                <a:rPr lang="en-US" sz="1200" b="1" dirty="0" err="1">
+                  <a:latin typeface="Consolas" panose="020B0609020204030204" pitchFamily="49" charset="0"/>
+                </a:rPr>
+                <a:t>pd.</a:t>
+              </a:r>
+              <a:r>
+                <a:rPr lang="en-US" sz="1200" b="1" dirty="0" err="1">
+                  <a:latin typeface="Consolas" panose="020B0609020204030204" pitchFamily="49" charset="0"/>
+                  <a:hlinkClick r:id="rId47"/>
+                </a:rPr>
+                <a:t>to_datetime</a:t>
+              </a:r>
+              <a:r>
+                <a:rPr lang="en-US" sz="1200" b="1" dirty="0">
+                  <a:latin typeface="Consolas" panose="020B0609020204030204" pitchFamily="49" charset="0"/>
+                </a:rPr>
+                <a:t>(data)</a:t>
+              </a:r>
+            </a:p>
+            <a:p>
+              <a:pPr marL="93600"/>
+              <a:r>
+                <a:rPr lang="en-US" sz="1200" dirty="0"/>
+                <a:t>convert non-datetime types to datetime type</a:t>
+              </a:r>
+            </a:p>
+            <a:p>
+              <a:r>
+                <a:rPr lang="en-US" sz="1200" b="1" dirty="0" err="1">
+                  <a:latin typeface="Consolas" panose="020B0609020204030204" pitchFamily="49" charset="0"/>
+                </a:rPr>
+                <a:t>pd.</a:t>
+              </a:r>
+              <a:r>
+                <a:rPr lang="en-US" sz="1200" b="1" dirty="0" err="1">
+                  <a:latin typeface="Consolas" panose="020B0609020204030204" pitchFamily="49" charset="0"/>
+                  <a:hlinkClick r:id="rId48"/>
+                </a:rPr>
+                <a:t>to_timedelta</a:t>
+              </a:r>
+              <a:r>
+                <a:rPr lang="en-US" sz="1200" b="1" dirty="0">
+                  <a:latin typeface="Consolas" panose="020B0609020204030204" pitchFamily="49" charset="0"/>
+                </a:rPr>
+                <a:t>(data)</a:t>
+              </a:r>
+            </a:p>
+            <a:p>
+              <a:pPr marL="93600"/>
+              <a:r>
+                <a:rPr lang="en-US" sz="1200" dirty="0"/>
+                <a:t>convert non- </a:t>
               </a:r>
               <a:r>
                 <a:rPr lang="en-US" sz="1200" dirty="0" err="1"/>
-                <a:t>dataframe</a:t>
+                <a:t>timedelta</a:t>
               </a:r>
               <a:r>
                 <a:rPr lang="en-US" sz="1200" dirty="0"/>
-                <a:t>.</a:t>
+                <a:t> types to </a:t>
               </a:r>
+              <a:r>
+                <a:rPr lang="en-US" sz="1200" dirty="0" err="1"/>
+                <a:t>timedelta</a:t>
+              </a:r>
+              <a:endParaRPr lang="en-US" sz="1200" dirty="0"/>
+            </a:p>
+          </p:txBody>
+        </p:sp>
+        <p:sp>
+          <p:nvSpPr>
+            <p:cNvPr id="73" name="TextBox 72">
+              <a:extLst>
+                <a:ext uri="{FF2B5EF4-FFF2-40B4-BE49-F238E27FC236}">
+                  <a16:creationId xmlns:a16="http://schemas.microsoft.com/office/drawing/2014/main" id="{76761F18-E4DC-228A-20CB-87FAE256A0E2}"/>
+                </a:ext>
+              </a:extLst>
+            </p:cNvPr>
+            <p:cNvSpPr txBox="1"/>
+            <p:nvPr/>
+          </p:nvSpPr>
+          <p:spPr>
+            <a:xfrm>
+              <a:off x="2790799" y="3613045"/>
+              <a:ext cx="2654146" cy="1754326"/>
+            </a:xfrm>
+            <a:prstGeom prst="rect">
+              <a:avLst/>
+            </a:prstGeom>
+            <a:noFill/>
+          </p:spPr>
+          <p:txBody>
+            <a:bodyPr wrap="square" rtlCol="0">
+              <a:spAutoFit/>
+            </a:bodyPr>
+            <a:lstStyle/>
+            <a:p>
+              <a:r>
+                <a:rPr lang="en-US" sz="1200" b="1" dirty="0" err="1">
+                  <a:latin typeface="Consolas" panose="020B0609020204030204" pitchFamily="49" charset="0"/>
+                </a:rPr>
+                <a:t>df.</a:t>
+              </a:r>
+              <a:r>
+                <a:rPr lang="en-US" sz="1200" b="1" dirty="0" err="1">
+                  <a:latin typeface="Consolas" panose="020B0609020204030204" pitchFamily="49" charset="0"/>
+                  <a:hlinkClick r:id="rId49"/>
+                </a:rPr>
+                <a:t>as_type</a:t>
+              </a:r>
+              <a:r>
+                <a:rPr lang="en-US" sz="1200" b="1" dirty="0">
+                  <a:latin typeface="Consolas" panose="020B0609020204030204" pitchFamily="49" charset="0"/>
+                </a:rPr>
+                <a:t>(type)</a:t>
+              </a:r>
+            </a:p>
+            <a:p>
+              <a:pPr marL="93600"/>
+              <a:r>
+                <a:rPr lang="en-US" sz="1200" dirty="0"/>
+                <a:t>convert data to (almost) any given type including categorical</a:t>
+              </a:r>
+            </a:p>
+            <a:p>
+              <a:r>
+                <a:rPr lang="en-US" sz="1200" b="1" dirty="0" err="1">
+                  <a:latin typeface="Consolas" panose="020B0609020204030204" pitchFamily="49" charset="0"/>
+                </a:rPr>
+                <a:t>df.</a:t>
+              </a:r>
+              <a:r>
+                <a:rPr lang="en-US" sz="1200" b="1" dirty="0" err="1">
+                  <a:latin typeface="Consolas" panose="020B0609020204030204" pitchFamily="49" charset="0"/>
+                  <a:hlinkClick r:id="rId50"/>
+                </a:rPr>
+                <a:t>infer_objects</a:t>
+              </a:r>
+              <a:r>
+                <a:rPr lang="en-US" sz="1200" b="1" dirty="0">
+                  <a:latin typeface="Consolas" panose="020B0609020204030204" pitchFamily="49" charset="0"/>
+                </a:rPr>
+                <a:t>()</a:t>
+              </a:r>
+            </a:p>
+            <a:p>
+              <a:pPr marL="93600"/>
+              <a:r>
+                <a:rPr lang="en-US" sz="1200" dirty="0"/>
+                <a:t>attempts to infer a better type for object type data.</a:t>
+              </a:r>
+            </a:p>
+            <a:p>
+              <a:r>
+                <a:rPr lang="en-US" sz="1200" b="1" dirty="0" err="1">
+                  <a:latin typeface="Consolas" panose="020B0609020204030204" pitchFamily="49" charset="0"/>
+                </a:rPr>
+                <a:t>df.</a:t>
+              </a:r>
+              <a:r>
+                <a:rPr lang="en-US" sz="1200" b="1" dirty="0" err="1">
+                  <a:latin typeface="Consolas" panose="020B0609020204030204" pitchFamily="49" charset="0"/>
+                  <a:hlinkClick r:id="rId51"/>
+                </a:rPr>
+                <a:t>convert_dtypes</a:t>
+              </a:r>
+              <a:r>
+                <a:rPr lang="en-US" sz="1200" b="1" dirty="0">
+                  <a:latin typeface="Consolas" panose="020B0609020204030204" pitchFamily="49" charset="0"/>
+                </a:rPr>
+                <a:t>()</a:t>
+              </a:r>
+            </a:p>
+            <a:p>
+              <a:pPr marL="93600"/>
+              <a:r>
+                <a:rPr lang="en-US" sz="1200" dirty="0"/>
+                <a:t>convert columns to best possible </a:t>
+              </a:r>
+              <a:r>
+                <a:rPr lang="en-US" sz="1200" dirty="0" err="1"/>
+                <a:t>dtypes</a:t>
+              </a:r>
+              <a:endParaRPr lang="en-US" sz="1200" dirty="0"/>
             </a:p>
           </p:txBody>
         </p:sp>
       </p:grpSp>
-      <p:graphicFrame>
-        <p:nvGraphicFramePr>
-          <p:cNvPr id="79" name="Table 78">
+      <p:grpSp>
+        <p:nvGrpSpPr>
+          <p:cNvPr id="91" name="Group 90">
             <a:extLst>
               <a:ext uri="{FF2B5EF4-FFF2-40B4-BE49-F238E27FC236}">
-                <a16:creationId xmlns:a16="http://schemas.microsoft.com/office/drawing/2014/main" id="{8379014E-BE82-EA0A-02D2-A4EA1A936C4D}"/>
+                <a16:creationId xmlns:a16="http://schemas.microsoft.com/office/drawing/2014/main" id="{A017D6B9-847C-822B-100E-D42389B3E182}"/>
               </a:ext>
             </a:extLst>
           </p:cNvPr>
-          <p:cNvGraphicFramePr>
-            <a:graphicFrameLocks noGrp="1"/>
-          </p:cNvGraphicFramePr>
-          <p:nvPr>
-            <p:extLst>
-              <p:ext uri="{D42A27DB-BD31-4B8C-83A1-F6EECF244321}">
-                <p14:modId xmlns:p14="http://schemas.microsoft.com/office/powerpoint/2010/main" val="965934937"/>
-              </p:ext>
-            </p:extLst>
-          </p:nvPr>
-        </p:nvGraphicFramePr>
-        <p:xfrm>
-          <a:off x="2984263" y="10120672"/>
-          <a:ext cx="822960" cy="548640"/>
-        </p:xfrm>
-        <a:graphic>
-          <a:graphicData uri="http://schemas.openxmlformats.org/drawingml/2006/table">
-            <a:tbl>
-              <a:tblPr bandRow="1">
-                <a:tableStyleId>{5C22544A-7EE6-4342-B048-85BDC9FD1C3A}</a:tableStyleId>
-              </a:tblPr>
-              <a:tblGrid>
-                <a:gridCol w="274320">
-                  <a:extLst>
-                    <a:ext uri="{9D8B030D-6E8A-4147-A177-3AD203B41FA5}">
-                      <a16:colId xmlns:a16="http://schemas.microsoft.com/office/drawing/2014/main" val="20000"/>
-                    </a:ext>
-                  </a:extLst>
-                </a:gridCol>
-                <a:gridCol w="274320">
-                  <a:extLst>
-                    <a:ext uri="{9D8B030D-6E8A-4147-A177-3AD203B41FA5}">
-                      <a16:colId xmlns:a16="http://schemas.microsoft.com/office/drawing/2014/main" val="20001"/>
-                    </a:ext>
-                  </a:extLst>
-                </a:gridCol>
-                <a:gridCol w="274320">
-                  <a:extLst>
-                    <a:ext uri="{9D8B030D-6E8A-4147-A177-3AD203B41FA5}">
-                      <a16:colId xmlns:a16="http://schemas.microsoft.com/office/drawing/2014/main" val="20002"/>
-                    </a:ext>
-                  </a:extLst>
-                </a:gridCol>
-              </a:tblGrid>
-              <a:tr h="137160">
-                <a:tc>
-                  <a:txBody>
-                    <a:bodyPr/>
-                    <a:lstStyle/>
-                    <a:p>
-                      <a:endParaRPr lang="en-US" sz="500" dirty="0"/>
-                    </a:p>
-                  </a:txBody>
-                  <a:tcPr marL="0" marR="0" marT="0" marB="0">
-                    <a:solidFill>
-                      <a:schemeClr val="bg2">
-                        <a:lumMod val="75000"/>
-                      </a:schemeClr>
-                    </a:solidFill>
-                  </a:tcPr>
-                </a:tc>
-                <a:tc>
-                  <a:txBody>
-                    <a:bodyPr/>
-                    <a:lstStyle/>
-                    <a:p>
-                      <a:endParaRPr lang="en-US" sz="500" dirty="0"/>
-                    </a:p>
-                  </a:txBody>
-                  <a:tcPr marL="0" marR="0" marT="0" marB="0">
-                    <a:solidFill>
-                      <a:schemeClr val="accent6"/>
-                    </a:solidFill>
-                  </a:tcPr>
-                </a:tc>
-                <a:tc>
-                  <a:txBody>
-                    <a:bodyPr/>
-                    <a:lstStyle/>
-                    <a:p>
-                      <a:endParaRPr lang="en-US" sz="500" dirty="0"/>
-                    </a:p>
-                  </a:txBody>
-                  <a:tcPr marL="0" marR="0" marT="0" marB="0">
-                    <a:solidFill>
-                      <a:schemeClr val="accent2"/>
-                    </a:solidFill>
-                  </a:tcPr>
-                </a:tc>
+          <p:cNvGrpSpPr/>
+          <p:nvPr/>
+        </p:nvGrpSpPr>
+        <p:grpSpPr>
+          <a:xfrm>
+            <a:off x="68156" y="6564645"/>
+            <a:ext cx="5357283" cy="2244372"/>
+            <a:chOff x="68156" y="6564645"/>
+            <a:chExt cx="5357283" cy="2244372"/>
+          </a:xfrm>
+        </p:grpSpPr>
+        <p:sp>
+          <p:nvSpPr>
+            <p:cNvPr id="54" name="Rounded Rectangle 48">
+              <a:extLst>
+                <a:ext uri="{FF2B5EF4-FFF2-40B4-BE49-F238E27FC236}">
+                  <a16:creationId xmlns:a16="http://schemas.microsoft.com/office/drawing/2014/main" id="{72D85AA0-12BA-B3DC-5032-993B59C82B1B}"/>
+                </a:ext>
+              </a:extLst>
+            </p:cNvPr>
+            <p:cNvSpPr/>
+            <p:nvPr/>
+          </p:nvSpPr>
+          <p:spPr>
+            <a:xfrm>
+              <a:off x="120348" y="6689521"/>
+              <a:ext cx="5305091" cy="1896463"/>
+            </a:xfrm>
+            <a:prstGeom prst="roundRect">
+              <a:avLst>
+                <a:gd name="adj" fmla="val 1508"/>
+              </a:avLst>
+            </a:prstGeom>
+            <a:solidFill>
+              <a:schemeClr val="accent1">
+                <a:lumMod val="20000"/>
+                <a:lumOff val="80000"/>
+              </a:schemeClr>
+            </a:solidFill>
+          </p:spPr>
+          <p:style>
+            <a:lnRef idx="2">
+              <a:schemeClr val="accent1">
+                <a:shade val="50000"/>
+              </a:schemeClr>
+            </a:lnRef>
+            <a:fillRef idx="1">
+              <a:schemeClr val="accent1"/>
+            </a:fillRef>
+            <a:effectRef idx="0">
+              <a:schemeClr val="accent1"/>
+            </a:effectRef>
+            <a:fontRef idx="minor">
+              <a:schemeClr val="lt1"/>
+            </a:fontRef>
+          </p:style>
+          <p:txBody>
+            <a:bodyPr rtlCol="0" anchor="ctr"/>
+            <a:lstStyle/>
+            <a:p>
+              <a:pPr algn="ctr"/>
+              <a:endParaRPr lang="en-US" sz="2683" dirty="0"/>
+            </a:p>
+          </p:txBody>
+        </p:sp>
+        <p:grpSp>
+          <p:nvGrpSpPr>
+            <p:cNvPr id="84" name="Group 83">
+              <a:extLst>
+                <a:ext uri="{FF2B5EF4-FFF2-40B4-BE49-F238E27FC236}">
+                  <a16:creationId xmlns:a16="http://schemas.microsoft.com/office/drawing/2014/main" id="{17DD23A4-2B73-D0DF-E7BD-EB6F79315B5F}"/>
+                </a:ext>
+              </a:extLst>
+            </p:cNvPr>
+            <p:cNvGrpSpPr/>
+            <p:nvPr/>
+          </p:nvGrpSpPr>
+          <p:grpSpPr>
+            <a:xfrm>
+              <a:off x="68156" y="6564645"/>
+              <a:ext cx="5338768" cy="2244372"/>
+              <a:chOff x="68156" y="6534165"/>
+              <a:chExt cx="5338768" cy="2244372"/>
+            </a:xfrm>
+          </p:grpSpPr>
+          <p:sp>
+            <p:nvSpPr>
+              <p:cNvPr id="85" name="TextBox 84">
                 <a:extLst>
-                  <a:ext uri="{0D108BD9-81ED-4DB2-BD59-A6C34878D82A}">
-                    <a16:rowId xmlns:a16="http://schemas.microsoft.com/office/drawing/2014/main" val="10000"/>
+                  <a:ext uri="{FF2B5EF4-FFF2-40B4-BE49-F238E27FC236}">
+                    <a16:creationId xmlns:a16="http://schemas.microsoft.com/office/drawing/2014/main" id="{13845956-2C47-A783-1FBC-4E7C4D54C2C6}"/>
                   </a:ext>
                 </a:extLst>
-              </a:tr>
-              <a:tr h="137160">
-                <a:tc>
-                  <a:txBody>
-                    <a:bodyPr/>
-                    <a:lstStyle/>
-                    <a:p>
-                      <a:endParaRPr lang="en-US" sz="500" dirty="0"/>
-                    </a:p>
-                  </a:txBody>
-                  <a:tcPr marL="0" marR="0" marT="0" marB="0">
-                    <a:solidFill>
-                      <a:schemeClr val="bg2"/>
-                    </a:solidFill>
-                  </a:tcPr>
-                </a:tc>
-                <a:tc>
-                  <a:txBody>
-                    <a:bodyPr/>
-                    <a:lstStyle/>
-                    <a:p>
-                      <a:endParaRPr lang="en-US" sz="500" dirty="0"/>
-                    </a:p>
-                  </a:txBody>
-                  <a:tcPr marL="0" marR="0" marT="0" marB="0">
-                    <a:solidFill>
-                      <a:schemeClr val="accent6">
-                        <a:lumMod val="40000"/>
-                        <a:lumOff val="60000"/>
-                      </a:schemeClr>
-                    </a:solidFill>
-                  </a:tcPr>
-                </a:tc>
-                <a:tc>
-                  <a:txBody>
-                    <a:bodyPr/>
-                    <a:lstStyle/>
-                    <a:p>
-                      <a:endParaRPr lang="en-US" sz="500" dirty="0"/>
-                    </a:p>
-                  </a:txBody>
-                  <a:tcPr marL="0" marR="0" marT="0" marB="0">
-                    <a:solidFill>
-                      <a:schemeClr val="accent2">
-                        <a:lumMod val="40000"/>
-                        <a:lumOff val="60000"/>
-                      </a:schemeClr>
-                    </a:solidFill>
-                  </a:tcPr>
-                </a:tc>
+              </p:cNvPr>
+              <p:cNvSpPr txBox="1"/>
+              <p:nvPr/>
+            </p:nvSpPr>
+            <p:spPr>
+              <a:xfrm>
+                <a:off x="2757883" y="6654879"/>
+                <a:ext cx="2649041" cy="2123658"/>
+              </a:xfrm>
+              <a:prstGeom prst="rect">
+                <a:avLst/>
+              </a:prstGeom>
+              <a:noFill/>
+            </p:spPr>
+            <p:txBody>
+              <a:bodyPr wrap="square" rtlCol="0">
+                <a:spAutoFit/>
+              </a:bodyPr>
+              <a:lstStyle/>
+              <a:p>
+                <a:r>
+                  <a:rPr lang="en-US" sz="1200" b="1" dirty="0" err="1">
+                    <a:latin typeface="Consolas" panose="020B0609020204030204" pitchFamily="49" charset="0"/>
+                  </a:rPr>
+                  <a:t>s.dt.day</a:t>
+                </a:r>
+                <a:endParaRPr lang="en-US" sz="1200" b="1" dirty="0">
+                  <a:latin typeface="Consolas" panose="020B0609020204030204" pitchFamily="49" charset="0"/>
+                </a:endParaRPr>
+              </a:p>
+              <a:p>
+                <a:pPr marL="93600"/>
+                <a:r>
+                  <a:rPr lang="en-US" sz="1200" dirty="0"/>
+                  <a:t>Extract the day (int) from the date.</a:t>
+                </a:r>
+              </a:p>
+              <a:p>
+                <a:r>
+                  <a:rPr lang="en-US" sz="1200" b="1" dirty="0" err="1">
+                    <a:latin typeface="Consolas" panose="020B0609020204030204" pitchFamily="49" charset="0"/>
+                  </a:rPr>
+                  <a:t>s.dt.quarter</a:t>
+                </a:r>
+                <a:endParaRPr lang="en-US" sz="1200" b="1" dirty="0">
+                  <a:latin typeface="Consolas" panose="020B0609020204030204" pitchFamily="49" charset="0"/>
+                </a:endParaRPr>
+              </a:p>
+              <a:p>
+                <a:pPr marL="93600"/>
+                <a:r>
+                  <a:rPr lang="en-US" sz="1200" dirty="0"/>
+                  <a:t>Find which quarter the date lies in.</a:t>
+                </a:r>
+              </a:p>
+              <a:p>
+                <a:r>
+                  <a:rPr lang="en-US" sz="1200" b="1" dirty="0" err="1">
+                    <a:latin typeface="Consolas" panose="020B0609020204030204" pitchFamily="49" charset="0"/>
+                  </a:rPr>
+                  <a:t>s.dt.hour</a:t>
+                </a:r>
+                <a:endParaRPr lang="en-US" sz="1200" b="1" dirty="0">
+                  <a:latin typeface="Consolas" panose="020B0609020204030204" pitchFamily="49" charset="0"/>
+                </a:endParaRPr>
+              </a:p>
+              <a:p>
+                <a:pPr marL="93600"/>
+                <a:r>
+                  <a:rPr lang="en-US" sz="1200" dirty="0"/>
+                  <a:t>Extract the hour.</a:t>
+                </a:r>
+              </a:p>
+              <a:p>
+                <a:r>
+                  <a:rPr lang="en-US" sz="1200" b="1" dirty="0" err="1">
+                    <a:latin typeface="Consolas" panose="020B0609020204030204" pitchFamily="49" charset="0"/>
+                  </a:rPr>
+                  <a:t>s.dt.minute</a:t>
+                </a:r>
+                <a:endParaRPr lang="en-US" sz="1200" b="1" dirty="0">
+                  <a:latin typeface="Consolas" panose="020B0609020204030204" pitchFamily="49" charset="0"/>
+                </a:endParaRPr>
+              </a:p>
+              <a:p>
+                <a:pPr marL="93600"/>
+                <a:r>
+                  <a:rPr lang="en-US" sz="1200" dirty="0"/>
+                  <a:t>Extract the minute.</a:t>
+                </a:r>
+              </a:p>
+              <a:p>
+                <a:r>
+                  <a:rPr lang="en-US" sz="1200" b="1" dirty="0" err="1">
+                    <a:latin typeface="Consolas" panose="020B0609020204030204" pitchFamily="49" charset="0"/>
+                  </a:rPr>
+                  <a:t>s.dt.second</a:t>
+                </a:r>
+                <a:endParaRPr lang="en-US" sz="1200" b="1" dirty="0">
+                  <a:latin typeface="Consolas" panose="020B0609020204030204" pitchFamily="49" charset="0"/>
+                </a:endParaRPr>
+              </a:p>
+              <a:p>
+                <a:pPr marL="93600"/>
+                <a:r>
+                  <a:rPr lang="en-US" sz="1200" dirty="0"/>
+                  <a:t>Extract the second.</a:t>
+                </a:r>
+              </a:p>
+              <a:p>
+                <a:pPr marL="93600"/>
+                <a:endParaRPr lang="en-US" sz="1200" dirty="0"/>
+              </a:p>
+            </p:txBody>
+          </p:sp>
+          <p:sp>
+            <p:nvSpPr>
+              <p:cNvPr id="87" name="Rounded Rectangle 80">
                 <a:extLst>
-                  <a:ext uri="{0D108BD9-81ED-4DB2-BD59-A6C34878D82A}">
-                    <a16:rowId xmlns:a16="http://schemas.microsoft.com/office/drawing/2014/main" val="10001"/>
+                  <a:ext uri="{FF2B5EF4-FFF2-40B4-BE49-F238E27FC236}">
+                    <a16:creationId xmlns:a16="http://schemas.microsoft.com/office/drawing/2014/main" id="{00349599-F429-0A79-04A0-F9594DC4E15C}"/>
                   </a:ext>
                 </a:extLst>
-              </a:tr>
-              <a:tr h="137160">
-                <a:tc>
-                  <a:txBody>
-                    <a:bodyPr/>
-                    <a:lstStyle/>
-                    <a:p>
-                      <a:endParaRPr lang="en-US" sz="500" dirty="0"/>
-                    </a:p>
-                  </a:txBody>
-                  <a:tcPr marL="0" marR="0" marT="0" marB="0">
-                    <a:solidFill>
-                      <a:schemeClr val="bg2"/>
-                    </a:solidFill>
-                  </a:tcPr>
-                </a:tc>
-                <a:tc>
-                  <a:txBody>
-                    <a:bodyPr/>
-                    <a:lstStyle/>
-                    <a:p>
-                      <a:endParaRPr lang="en-US" sz="500" dirty="0"/>
-                    </a:p>
-                  </a:txBody>
-                  <a:tcPr marL="0" marR="0" marT="0" marB="0">
-                    <a:solidFill>
-                      <a:schemeClr val="accent6">
-                        <a:lumMod val="40000"/>
-                        <a:lumOff val="60000"/>
-                      </a:schemeClr>
-                    </a:solidFill>
-                  </a:tcPr>
-                </a:tc>
-                <a:tc>
-                  <a:txBody>
-                    <a:bodyPr/>
-                    <a:lstStyle/>
-                    <a:p>
-                      <a:endParaRPr lang="en-US" sz="500" dirty="0"/>
-                    </a:p>
-                  </a:txBody>
-                  <a:tcPr marL="0" marR="0" marT="0" marB="0">
-                    <a:solidFill>
-                      <a:schemeClr val="accent2">
-                        <a:lumMod val="40000"/>
-                        <a:lumOff val="60000"/>
-                      </a:schemeClr>
-                    </a:solidFill>
-                  </a:tcPr>
-                </a:tc>
+              </p:cNvPr>
+              <p:cNvSpPr/>
+              <p:nvPr/>
+            </p:nvSpPr>
+            <p:spPr>
+              <a:xfrm>
+                <a:off x="120349" y="6534165"/>
+                <a:ext cx="2571361" cy="461665"/>
+              </a:xfrm>
+              <a:prstGeom prst="roundRect">
+                <a:avLst/>
+              </a:prstGeom>
+            </p:spPr>
+            <p:style>
+              <a:lnRef idx="2">
+                <a:schemeClr val="accent1">
+                  <a:shade val="50000"/>
+                </a:schemeClr>
+              </a:lnRef>
+              <a:fillRef idx="1">
+                <a:schemeClr val="accent1"/>
+              </a:fillRef>
+              <a:effectRef idx="0">
+                <a:schemeClr val="accent1"/>
+              </a:effectRef>
+              <a:fontRef idx="minor">
+                <a:schemeClr val="lt1"/>
+              </a:fontRef>
+            </p:style>
+            <p:txBody>
+              <a:bodyPr rtlCol="0" anchor="ctr"/>
+              <a:lstStyle/>
+              <a:p>
+                <a:pPr algn="ctr"/>
+                <a:r>
+                  <a:rPr lang="en-US" sz="2800" b="1" dirty="0">
+                    <a:solidFill>
+                      <a:schemeClr val="bg1"/>
+                    </a:solidFill>
+                  </a:rPr>
+                  <a:t>Datetime</a:t>
+                </a:r>
+              </a:p>
+            </p:txBody>
+          </p:sp>
+          <p:sp>
+            <p:nvSpPr>
+              <p:cNvPr id="89" name="TextBox 88">
                 <a:extLst>
-                  <a:ext uri="{0D108BD9-81ED-4DB2-BD59-A6C34878D82A}">
-                    <a16:rowId xmlns:a16="http://schemas.microsoft.com/office/drawing/2014/main" val="10002"/>
+                  <a:ext uri="{FF2B5EF4-FFF2-40B4-BE49-F238E27FC236}">
+                    <a16:creationId xmlns:a16="http://schemas.microsoft.com/office/drawing/2014/main" id="{495B4978-804C-4BB9-C37A-49A482F54933}"/>
                   </a:ext>
                 </a:extLst>
-              </a:tr>
-              <a:tr h="137160">
-                <a:tc>
-                  <a:txBody>
-                    <a:bodyPr/>
-                    <a:lstStyle/>
-                    <a:p>
-                      <a:endParaRPr lang="en-US" sz="500" dirty="0"/>
-                    </a:p>
-                  </a:txBody>
-                  <a:tcPr marL="0" marR="0" marT="0" marB="0">
-                    <a:solidFill>
-                      <a:schemeClr val="bg2"/>
-                    </a:solidFill>
-                  </a:tcPr>
-                </a:tc>
-                <a:tc>
-                  <a:txBody>
-                    <a:bodyPr/>
-                    <a:lstStyle/>
-                    <a:p>
-                      <a:endParaRPr lang="en-US" sz="500" dirty="0"/>
-                    </a:p>
-                  </a:txBody>
-                  <a:tcPr marL="0" marR="0" marT="0" marB="0">
-                    <a:solidFill>
-                      <a:schemeClr val="accent6">
-                        <a:lumMod val="40000"/>
-                        <a:lumOff val="60000"/>
-                      </a:schemeClr>
-                    </a:solidFill>
-                  </a:tcPr>
-                </a:tc>
-                <a:tc>
-                  <a:txBody>
-                    <a:bodyPr/>
-                    <a:lstStyle/>
-                    <a:p>
-                      <a:endParaRPr lang="en-US" sz="500" dirty="0"/>
-                    </a:p>
-                  </a:txBody>
-                  <a:tcPr marL="0" marR="0" marT="0" marB="0">
-                    <a:solidFill>
-                      <a:schemeClr val="accent2">
-                        <a:lumMod val="40000"/>
-                        <a:lumOff val="60000"/>
-                      </a:schemeClr>
-                    </a:solidFill>
-                  </a:tcPr>
-                </a:tc>
+              </p:cNvPr>
+              <p:cNvSpPr txBox="1"/>
+              <p:nvPr/>
+            </p:nvSpPr>
+            <p:spPr>
+              <a:xfrm>
+                <a:off x="69627" y="6989169"/>
+                <a:ext cx="2649041" cy="830997"/>
+              </a:xfrm>
+              <a:prstGeom prst="rect">
+                <a:avLst/>
+              </a:prstGeom>
+              <a:noFill/>
+            </p:spPr>
+            <p:txBody>
+              <a:bodyPr wrap="square" rtlCol="0">
+                <a:spAutoFit/>
+              </a:bodyPr>
+              <a:lstStyle/>
+              <a:p>
+                <a:r>
+                  <a:rPr lang="en-US" sz="1200" dirty="0"/>
+                  <a:t>If you have a Series, s, containing data of type datetime, use can use the dt accessor to get various sections of the value:</a:t>
+                </a:r>
+              </a:p>
+            </p:txBody>
+          </p:sp>
+          <p:sp>
+            <p:nvSpPr>
+              <p:cNvPr id="90" name="TextBox 89">
                 <a:extLst>
-                  <a:ext uri="{0D108BD9-81ED-4DB2-BD59-A6C34878D82A}">
-                    <a16:rowId xmlns:a16="http://schemas.microsoft.com/office/drawing/2014/main" val="10003"/>
+                  <a:ext uri="{FF2B5EF4-FFF2-40B4-BE49-F238E27FC236}">
+                    <a16:creationId xmlns:a16="http://schemas.microsoft.com/office/drawing/2014/main" id="{CC3F058E-4EB6-74C2-323F-625A013FAAA1}"/>
                   </a:ext>
                 </a:extLst>
-              </a:tr>
-            </a:tbl>
-          </a:graphicData>
-        </a:graphic>
-      </p:graphicFrame>
-      <p:cxnSp>
-        <p:nvCxnSpPr>
-          <p:cNvPr id="80" name="Straight Arrow Connector 79">
-            <a:extLst>
-              <a:ext uri="{FF2B5EF4-FFF2-40B4-BE49-F238E27FC236}">
-                <a16:creationId xmlns:a16="http://schemas.microsoft.com/office/drawing/2014/main" id="{8D3258D4-D0AF-E1DC-7E80-B738D8B320FB}"/>
-              </a:ext>
-            </a:extLst>
-          </p:cNvPr>
-          <p:cNvCxnSpPr/>
-          <p:nvPr/>
-        </p:nvCxnSpPr>
-        <p:spPr>
-          <a:xfrm>
-            <a:off x="3909194" y="10395530"/>
-            <a:ext cx="363152" cy="0"/>
-          </a:xfrm>
-          <a:prstGeom prst="straightConnector1">
-            <a:avLst/>
-          </a:prstGeom>
-          <a:ln w="63500">
-            <a:solidFill>
-              <a:schemeClr val="tx1"/>
-            </a:solidFill>
-            <a:tailEnd type="stealth"/>
-          </a:ln>
-        </p:spPr>
-        <p:style>
-          <a:lnRef idx="1">
-            <a:schemeClr val="accent1"/>
-          </a:lnRef>
-          <a:fillRef idx="0">
-            <a:schemeClr val="accent1"/>
-          </a:fillRef>
-          <a:effectRef idx="0">
-            <a:schemeClr val="accent1"/>
-          </a:effectRef>
-          <a:fontRef idx="minor">
-            <a:schemeClr val="tx1"/>
-          </a:fontRef>
-        </p:style>
-      </p:cxnSp>
-      <p:graphicFrame>
-        <p:nvGraphicFramePr>
-          <p:cNvPr id="81" name="Table 80">
-            <a:extLst>
-              <a:ext uri="{FF2B5EF4-FFF2-40B4-BE49-F238E27FC236}">
-                <a16:creationId xmlns:a16="http://schemas.microsoft.com/office/drawing/2014/main" id="{83CA82DE-28C8-069C-D448-1152CDE5E8D4}"/>
-              </a:ext>
-            </a:extLst>
-          </p:cNvPr>
-          <p:cNvGraphicFramePr>
-            <a:graphicFrameLocks noGrp="1"/>
-          </p:cNvGraphicFramePr>
-          <p:nvPr>
-            <p:extLst>
-              <p:ext uri="{D42A27DB-BD31-4B8C-83A1-F6EECF244321}">
-                <p14:modId xmlns:p14="http://schemas.microsoft.com/office/powerpoint/2010/main" val="1637696863"/>
-              </p:ext>
-            </p:extLst>
-          </p:nvPr>
-        </p:nvGraphicFramePr>
-        <p:xfrm>
-          <a:off x="4374317" y="10120672"/>
-          <a:ext cx="822960" cy="548640"/>
-        </p:xfrm>
-        <a:graphic>
-          <a:graphicData uri="http://schemas.openxmlformats.org/drawingml/2006/table">
-            <a:tbl>
-              <a:tblPr bandRow="1">
-                <a:tableStyleId>{5C22544A-7EE6-4342-B048-85BDC9FD1C3A}</a:tableStyleId>
-              </a:tblPr>
-              <a:tblGrid>
-                <a:gridCol w="274320">
-                  <a:extLst>
-                    <a:ext uri="{9D8B030D-6E8A-4147-A177-3AD203B41FA5}">
-                      <a16:colId xmlns:a16="http://schemas.microsoft.com/office/drawing/2014/main" val="20000"/>
-                    </a:ext>
-                  </a:extLst>
-                </a:gridCol>
-                <a:gridCol w="274320">
-                  <a:extLst>
-                    <a:ext uri="{9D8B030D-6E8A-4147-A177-3AD203B41FA5}">
-                      <a16:colId xmlns:a16="http://schemas.microsoft.com/office/drawing/2014/main" val="20001"/>
-                    </a:ext>
-                  </a:extLst>
-                </a:gridCol>
-                <a:gridCol w="274320">
-                  <a:extLst>
-                    <a:ext uri="{9D8B030D-6E8A-4147-A177-3AD203B41FA5}">
-                      <a16:colId xmlns:a16="http://schemas.microsoft.com/office/drawing/2014/main" val="20002"/>
-                    </a:ext>
-                  </a:extLst>
-                </a:gridCol>
-              </a:tblGrid>
-              <a:tr h="137160">
-                <a:tc>
-                  <a:txBody>
-                    <a:bodyPr/>
-                    <a:lstStyle/>
-                    <a:p>
-                      <a:endParaRPr lang="en-US" sz="500" dirty="0"/>
-                    </a:p>
-                  </a:txBody>
-                  <a:tcPr marL="0" marR="0" marT="0" marB="0">
-                    <a:solidFill>
-                      <a:schemeClr val="bg2">
-                        <a:lumMod val="75000"/>
-                      </a:schemeClr>
-                    </a:solidFill>
-                  </a:tcPr>
-                </a:tc>
-                <a:tc>
-                  <a:txBody>
-                    <a:bodyPr/>
-                    <a:lstStyle/>
-                    <a:p>
-                      <a:endParaRPr lang="en-US" sz="500" dirty="0"/>
-                    </a:p>
-                  </a:txBody>
-                  <a:tcPr marL="0" marR="0" marT="0" marB="0">
-                    <a:solidFill>
-                      <a:schemeClr val="bg2"/>
-                    </a:solidFill>
-                  </a:tcPr>
-                </a:tc>
-                <a:tc>
-                  <a:txBody>
-                    <a:bodyPr/>
-                    <a:lstStyle/>
-                    <a:p>
-                      <a:endParaRPr lang="en-US" sz="500" dirty="0"/>
-                    </a:p>
-                  </a:txBody>
-                  <a:tcPr marL="0" marR="0" marT="0" marB="0">
-                    <a:solidFill>
-                      <a:schemeClr val="bg2"/>
-                    </a:solidFill>
-                  </a:tcPr>
-                </a:tc>
-                <a:extLst>
-                  <a:ext uri="{0D108BD9-81ED-4DB2-BD59-A6C34878D82A}">
-                    <a16:rowId xmlns:a16="http://schemas.microsoft.com/office/drawing/2014/main" val="10000"/>
-                  </a:ext>
-                </a:extLst>
-              </a:tr>
-              <a:tr h="137160">
-                <a:tc>
-                  <a:txBody>
-                    <a:bodyPr/>
-                    <a:lstStyle/>
-                    <a:p>
-                      <a:endParaRPr lang="en-US" sz="500" dirty="0"/>
-                    </a:p>
-                  </a:txBody>
-                  <a:tcPr marL="0" marR="0" marT="0" marB="0">
-                    <a:solidFill>
-                      <a:schemeClr val="accent6">
-                        <a:lumMod val="40000"/>
-                        <a:lumOff val="60000"/>
-                      </a:schemeClr>
-                    </a:solidFill>
-                  </a:tcPr>
-                </a:tc>
-                <a:tc>
-                  <a:txBody>
-                    <a:bodyPr/>
-                    <a:lstStyle/>
-                    <a:p>
-                      <a:endParaRPr lang="en-US" sz="500" dirty="0"/>
-                    </a:p>
-                  </a:txBody>
-                  <a:tcPr marL="0" marR="0" marT="0" marB="0">
-                    <a:solidFill>
-                      <a:schemeClr val="accent2">
-                        <a:lumMod val="40000"/>
-                        <a:lumOff val="60000"/>
-                      </a:schemeClr>
-                    </a:solidFill>
-                  </a:tcPr>
-                </a:tc>
-                <a:tc>
-                  <a:txBody>
-                    <a:bodyPr/>
-                    <a:lstStyle/>
-                    <a:p>
-                      <a:endParaRPr lang="en-US" sz="500" dirty="0"/>
-                    </a:p>
-                  </a:txBody>
-                  <a:tcPr marL="0" marR="0" marT="0" marB="0">
-                    <a:solidFill>
-                      <a:schemeClr val="accent2">
-                        <a:lumMod val="40000"/>
-                        <a:lumOff val="60000"/>
-                      </a:schemeClr>
-                    </a:solidFill>
-                  </a:tcPr>
-                </a:tc>
-                <a:extLst>
-                  <a:ext uri="{0D108BD9-81ED-4DB2-BD59-A6C34878D82A}">
-                    <a16:rowId xmlns:a16="http://schemas.microsoft.com/office/drawing/2014/main" val="10001"/>
-                  </a:ext>
-                </a:extLst>
-              </a:tr>
-              <a:tr h="137160">
-                <a:tc>
-                  <a:txBody>
-                    <a:bodyPr/>
-                    <a:lstStyle/>
-                    <a:p>
-                      <a:endParaRPr lang="en-US" sz="500" dirty="0"/>
-                    </a:p>
-                  </a:txBody>
-                  <a:tcPr marL="0" marR="0" marT="0" marB="0">
-                    <a:solidFill>
-                      <a:schemeClr val="accent6">
-                        <a:lumMod val="40000"/>
-                        <a:lumOff val="60000"/>
-                      </a:schemeClr>
-                    </a:solidFill>
-                  </a:tcPr>
-                </a:tc>
-                <a:tc>
-                  <a:txBody>
-                    <a:bodyPr/>
-                    <a:lstStyle/>
-                    <a:p>
-                      <a:endParaRPr lang="en-US" sz="500" dirty="0"/>
-                    </a:p>
-                  </a:txBody>
-                  <a:tcPr marL="0" marR="0" marT="0" marB="0">
-                    <a:solidFill>
-                      <a:schemeClr val="accent2">
-                        <a:lumMod val="40000"/>
-                        <a:lumOff val="60000"/>
-                      </a:schemeClr>
-                    </a:solidFill>
-                  </a:tcPr>
-                </a:tc>
-                <a:tc>
-                  <a:txBody>
-                    <a:bodyPr/>
-                    <a:lstStyle/>
-                    <a:p>
-                      <a:endParaRPr lang="en-US" sz="500" dirty="0"/>
-                    </a:p>
-                  </a:txBody>
-                  <a:tcPr marL="0" marR="0" marT="0" marB="0">
-                    <a:solidFill>
-                      <a:schemeClr val="accent2">
-                        <a:lumMod val="40000"/>
-                        <a:lumOff val="60000"/>
-                      </a:schemeClr>
-                    </a:solidFill>
-                  </a:tcPr>
-                </a:tc>
-                <a:extLst>
-                  <a:ext uri="{0D108BD9-81ED-4DB2-BD59-A6C34878D82A}">
-                    <a16:rowId xmlns:a16="http://schemas.microsoft.com/office/drawing/2014/main" val="10002"/>
-                  </a:ext>
-                </a:extLst>
-              </a:tr>
-              <a:tr h="137160">
-                <a:tc>
-                  <a:txBody>
-                    <a:bodyPr/>
-                    <a:lstStyle/>
-                    <a:p>
-                      <a:endParaRPr lang="en-US" sz="500" dirty="0"/>
-                    </a:p>
-                  </a:txBody>
-                  <a:tcPr marL="0" marR="0" marT="0" marB="0">
-                    <a:solidFill>
-                      <a:schemeClr val="accent6">
-                        <a:lumMod val="40000"/>
-                        <a:lumOff val="60000"/>
-                      </a:schemeClr>
-                    </a:solidFill>
-                  </a:tcPr>
-                </a:tc>
-                <a:tc>
-                  <a:txBody>
-                    <a:bodyPr/>
-                    <a:lstStyle/>
-                    <a:p>
-                      <a:endParaRPr lang="en-US" sz="500" dirty="0"/>
-                    </a:p>
-                  </a:txBody>
-                  <a:tcPr marL="0" marR="0" marT="0" marB="0">
-                    <a:solidFill>
-                      <a:schemeClr val="accent2">
-                        <a:lumMod val="40000"/>
-                        <a:lumOff val="60000"/>
-                      </a:schemeClr>
-                    </a:solidFill>
-                  </a:tcPr>
-                </a:tc>
-                <a:tc>
-                  <a:txBody>
-                    <a:bodyPr/>
-                    <a:lstStyle/>
-                    <a:p>
-                      <a:endParaRPr lang="en-US" sz="500" dirty="0"/>
-                    </a:p>
-                  </a:txBody>
-                  <a:tcPr marL="0" marR="0" marT="0" marB="0">
-                    <a:solidFill>
-                      <a:schemeClr val="accent2">
-                        <a:lumMod val="40000"/>
-                        <a:lumOff val="60000"/>
-                      </a:schemeClr>
-                    </a:solidFill>
-                  </a:tcPr>
-                </a:tc>
-                <a:extLst>
-                  <a:ext uri="{0D108BD9-81ED-4DB2-BD59-A6C34878D82A}">
-                    <a16:rowId xmlns:a16="http://schemas.microsoft.com/office/drawing/2014/main" val="10003"/>
-                  </a:ext>
-                </a:extLst>
-              </a:tr>
-            </a:tbl>
-          </a:graphicData>
-        </a:graphic>
-      </p:graphicFrame>
-      <p:sp>
-        <p:nvSpPr>
-          <p:cNvPr id="83" name="TextBox 82">
-            <a:extLst>
-              <a:ext uri="{FF2B5EF4-FFF2-40B4-BE49-F238E27FC236}">
-                <a16:creationId xmlns:a16="http://schemas.microsoft.com/office/drawing/2014/main" id="{9A2EB994-D8A7-48A9-2872-C37A1227E120}"/>
-              </a:ext>
-            </a:extLst>
-          </p:cNvPr>
-          <p:cNvSpPr txBox="1"/>
-          <p:nvPr/>
-        </p:nvSpPr>
-        <p:spPr>
-          <a:xfrm>
-            <a:off x="2853759" y="8693319"/>
-            <a:ext cx="2571361" cy="646331"/>
-          </a:xfrm>
-          <a:prstGeom prst="rect">
-            <a:avLst/>
-          </a:prstGeom>
-          <a:noFill/>
-        </p:spPr>
-        <p:txBody>
-          <a:bodyPr wrap="square" rtlCol="0">
-            <a:spAutoFit/>
-          </a:bodyPr>
-          <a:lstStyle/>
-          <a:p>
-            <a:r>
-              <a:rPr lang="en-US" sz="1200" dirty="0"/>
-              <a:t>Rearranges the layout of the table to make it easier to read the data a different way.</a:t>
-            </a:r>
-          </a:p>
-        </p:txBody>
-      </p:sp>
+              </p:cNvPr>
+              <p:cNvSpPr txBox="1"/>
+              <p:nvPr/>
+            </p:nvSpPr>
+            <p:spPr>
+              <a:xfrm>
+                <a:off x="68156" y="7762874"/>
+                <a:ext cx="2649041" cy="830997"/>
+              </a:xfrm>
+              <a:prstGeom prst="rect">
+                <a:avLst/>
+              </a:prstGeom>
+              <a:noFill/>
+            </p:spPr>
+            <p:txBody>
+              <a:bodyPr wrap="square" rtlCol="0">
+                <a:spAutoFit/>
+              </a:bodyPr>
+              <a:lstStyle/>
+              <a:p>
+                <a:r>
+                  <a:rPr lang="en-US" sz="1200" b="1" dirty="0" err="1">
+                    <a:latin typeface="Consolas" panose="020B0609020204030204" pitchFamily="49" charset="0"/>
+                  </a:rPr>
+                  <a:t>s.dt.year</a:t>
+                </a:r>
+                <a:endParaRPr lang="en-US" sz="1200" b="1" dirty="0">
+                  <a:latin typeface="Consolas" panose="020B0609020204030204" pitchFamily="49" charset="0"/>
+                </a:endParaRPr>
+              </a:p>
+              <a:p>
+                <a:pPr marL="93600"/>
+                <a:r>
+                  <a:rPr lang="en-US" sz="1200" dirty="0"/>
+                  <a:t>Extract the year</a:t>
+                </a:r>
+              </a:p>
+              <a:p>
+                <a:r>
+                  <a:rPr lang="en-US" sz="1200" b="1" dirty="0" err="1">
+                    <a:latin typeface="Consolas" panose="020B0609020204030204" pitchFamily="49" charset="0"/>
+                  </a:rPr>
+                  <a:t>s.dt.month</a:t>
+                </a:r>
+                <a:endParaRPr lang="en-US" sz="1200" b="1" dirty="0">
+                  <a:latin typeface="Consolas" panose="020B0609020204030204" pitchFamily="49" charset="0"/>
+                </a:endParaRPr>
+              </a:p>
+              <a:p>
+                <a:pPr marL="93600"/>
+                <a:r>
+                  <a:rPr lang="en-US" sz="1200" dirty="0"/>
+                  <a:t>Extract the month as an integer.</a:t>
+                </a:r>
+              </a:p>
+            </p:txBody>
+          </p:sp>
+        </p:grpSp>
+      </p:grpSp>
     </p:spTree>
     <p:extLst>
       <p:ext uri="{BB962C8B-B14F-4D97-AF65-F5344CB8AC3E}">

</xml_diff>

<commit_message>
DOC: 3rd draft: update cheat sheet (40680)
</commit_message>
<xml_diff>
--- a/doc/cheatsheet/Pandas_Cheat_Sheet.pptx
+++ b/doc/cheatsheet/Pandas_Cheat_Sheet.pptx
@@ -9664,14 +9664,14 @@
           <a:effectLst/>
           <a:extLst>
             <a:ext uri="{909E8E84-426E-40dd-AFC4-6F175D3DCCD1}">
-              <a14:hiddenFill xmlns:a14="http://schemas.microsoft.com/office/drawing/2010/main" xmlns="">
+              <a14:hiddenFill xmlns="" xmlns:a14="http://schemas.microsoft.com/office/drawing/2010/main">
                 <a:solidFill>
                   <a:schemeClr val="accent1"/>
                 </a:solidFill>
               </a14:hiddenFill>
             </a:ext>
             <a:ext uri="{91240B29-F687-4f45-9708-019B960494DF}">
-              <a14:hiddenLine xmlns:a14="http://schemas.microsoft.com/office/drawing/2010/main" xmlns="" w="9525">
+              <a14:hiddenLine xmlns="" xmlns:a14="http://schemas.microsoft.com/office/drawing/2010/main" w="9525">
                 <a:solidFill>
                   <a:schemeClr val="tx1"/>
                 </a:solidFill>
@@ -9681,7 +9681,7 @@
               </a14:hiddenLine>
             </a:ext>
             <a:ext uri="{AF507438-7753-43e0-B8FC-AC1667EBCBE1}">
-              <a14:hiddenEffects xmlns:a14="http://schemas.microsoft.com/office/drawing/2010/main" xmlns="">
+              <a14:hiddenEffects xmlns="" xmlns:a14="http://schemas.microsoft.com/office/drawing/2010/main">
                 <a:effectLst>
                   <a:outerShdw dist="35921" dir="2700000" algn="ctr" rotWithShape="0">
                     <a:schemeClr val="bg2"/>
@@ -28192,8 +28192,8 @@
         </p:nvSpPr>
         <p:spPr>
           <a:xfrm>
-            <a:off x="10891520" y="940630"/>
-            <a:ext cx="2934426" cy="8376568"/>
+            <a:off x="10891520" y="940629"/>
+            <a:ext cx="2934426" cy="9399711"/>
           </a:xfrm>
           <a:prstGeom prst="roundRect">
             <a:avLst>
@@ -28249,7 +28249,7 @@
         </p:nvSpPr>
         <p:spPr>
           <a:xfrm>
-            <a:off x="10886547" y="1482565"/>
+            <a:off x="10886547" y="2522089"/>
             <a:ext cx="2944372" cy="2677656"/>
           </a:xfrm>
           <a:prstGeom prst="rect">
@@ -28291,7 +28291,7 @@
             <a:pPr marL="93600"/>
             <a:r>
               <a:rPr lang="en-US" sz="1200" dirty="0"/>
-              <a:t>fetch the value of the given option.</a:t>
+              <a:t>Fetch the value of the given option.</a:t>
             </a:r>
           </a:p>
           <a:p>
@@ -28313,7 +28313,7 @@
             <a:pPr marL="93600"/>
             <a:r>
               <a:rPr lang="en-US" sz="1200" dirty="0"/>
-              <a:t>set the value of the given option.</a:t>
+              <a:t>Set the value of the given option.</a:t>
             </a:r>
           </a:p>
           <a:p>
@@ -28357,7 +28357,7 @@
             <a:pPr marL="93600"/>
             <a:r>
               <a:rPr lang="en-US" sz="1200" dirty="0"/>
-              <a:t>print descriptions of given options.</a:t>
+              <a:t>Print descriptions of given options.</a:t>
             </a:r>
           </a:p>
           <a:p>
@@ -28379,7 +28379,7 @@
             <a:pPr marL="93600"/>
             <a:r>
               <a:rPr lang="en-US" sz="1200" dirty="0"/>
-              <a:t>execute code with temporary option settings that revert to prior settings after execution.</a:t>
+              <a:t>Execute code with temporary option settings that revert to prior settings after execution.</a:t>
             </a:r>
           </a:p>
         </p:txBody>
@@ -28714,7 +28714,7 @@
             <a:pPr marL="93600"/>
             <a:r>
               <a:rPr lang="en-US" sz="1200" dirty="0"/>
-              <a:t>plot a line graph for the </a:t>
+              <a:t>Plot a line graph for the </a:t>
             </a:r>
             <a:r>
               <a:rPr lang="en-US" sz="1200" dirty="0" err="1"/>
@@ -29122,7 +29122,7 @@
               <a:pPr marL="93600"/>
               <a:r>
                 <a:rPr lang="en-US" sz="1200" dirty="0"/>
-                <a:t>read data from csv file</a:t>
+                <a:t>Read data from csv file</a:t>
               </a:r>
             </a:p>
             <a:p>
@@ -29174,7 +29174,7 @@
               <a:pPr marL="93600"/>
               <a:r>
                 <a:rPr lang="en-US" sz="1200" dirty="0"/>
-                <a:t>read data from html file</a:t>
+                <a:t>Read data from html file</a:t>
               </a:r>
             </a:p>
             <a:p>
@@ -29226,7 +29226,7 @@
               <a:pPr marL="93600"/>
               <a:r>
                 <a:rPr lang="en-US" sz="1200" dirty="0"/>
-                <a:t>read data from </a:t>
+                <a:t>Read data from </a:t>
               </a:r>
               <a:r>
                 <a:rPr lang="en-US" sz="1200" dirty="0" err="1"/>
@@ -29286,7 +29286,7 @@
               <a:pPr marL="93600"/>
               <a:r>
                 <a:rPr lang="en-US" sz="1200" dirty="0"/>
-                <a:t>read data from </a:t>
+                <a:t>Read data from </a:t>
               </a:r>
               <a:r>
                 <a:rPr lang="en-US" sz="1200" dirty="0" err="1"/>
@@ -29391,7 +29391,7 @@
               <a:pPr marL="93600"/>
               <a:r>
                 <a:rPr lang="en-US" sz="1200" dirty="0"/>
-                <a:t>write data to parquet file</a:t>
+                <a:t>Write data to parquet file</a:t>
               </a:r>
             </a:p>
             <a:p>
@@ -29431,7 +29431,7 @@
               <a:pPr marL="93600"/>
               <a:r>
                 <a:rPr lang="en-US" sz="1200" dirty="0"/>
-                <a:t>write data to feather file</a:t>
+                <a:t>Write data to feather file</a:t>
               </a:r>
             </a:p>
             <a:p>
@@ -29471,7 +29471,7 @@
               <a:pPr marL="93600"/>
               <a:r>
                 <a:rPr lang="en-US" sz="1200" dirty="0"/>
-                <a:t>write data to HDF file</a:t>
+                <a:t>Write data to HDF file</a:t>
               </a:r>
             </a:p>
             <a:p>
@@ -29479,7 +29479,7 @@
                 <a:rPr lang="en-US" sz="1200" b="1" dirty="0" err="1">
                   <a:latin typeface="Consolas" panose="020B0609020204030204" pitchFamily="49" charset="0"/>
                 </a:rPr>
-                <a:t>pd.</a:t>
+                <a:t>df.</a:t>
               </a:r>
               <a:r>
                 <a:rPr lang="en-US" sz="1200" b="1" dirty="0" err="1">
@@ -29624,7 +29624,7 @@
         <p:spPr>
           <a:xfrm>
             <a:off x="10886548" y="938596"/>
-            <a:ext cx="2934426" cy="646331"/>
+            <a:ext cx="2934426" cy="1938992"/>
           </a:xfrm>
           <a:prstGeom prst="rect">
             <a:avLst/>
@@ -29639,16 +29639,79 @@
           <a:p>
             <a:r>
               <a:rPr lang="en-US" sz="1200" dirty="0"/>
-              <a:t>Pandas offers some ‘options’ to globally control how </a:t>
+              <a:t>Pandas offers some ‘options’ to globally control how Pandas behaves, display etc.</a:t>
+            </a:r>
+          </a:p>
+          <a:p>
+            <a:r>
+              <a:rPr lang="en-US" sz="1200" dirty="0"/>
+              <a:t>Options can be queried and set via: </a:t>
+            </a:r>
+            <a:r>
+              <a:rPr lang="en-US" sz="1200" b="1" dirty="0">
+                <a:latin typeface="Consolas" panose="020B0609020204030204" pitchFamily="49" charset="0"/>
+              </a:rPr>
+              <a:t>pd.options._</a:t>
+            </a:r>
+            <a:r>
+              <a:rPr lang="en-US" sz="1200" b="1" dirty="0" err="1">
+                <a:latin typeface="Consolas" panose="020B0609020204030204" pitchFamily="49" charset="0"/>
+              </a:rPr>
+              <a:t>option_name</a:t>
+            </a:r>
+            <a:r>
+              <a:rPr lang="en-US" sz="1200" b="1" dirty="0">
+                <a:latin typeface="Consolas" panose="020B0609020204030204" pitchFamily="49" charset="0"/>
+              </a:rPr>
+              <a:t>_</a:t>
+            </a:r>
+            <a:r>
+              <a:rPr lang="en-US" sz="1200" dirty="0"/>
+              <a:t> (where _</a:t>
             </a:r>
             <a:r>
               <a:rPr lang="en-US" sz="1200" dirty="0" err="1"/>
-              <a:t>DataFrames</a:t>
+              <a:t>option_name</a:t>
             </a:r>
             <a:r>
               <a:rPr lang="en-US" sz="1200" dirty="0"/>
-              <a:t> behave, display etc.</a:t>
-            </a:r>
+              <a:t>_ is the name of an option). For example:</a:t>
+            </a:r>
+          </a:p>
+          <a:p>
+            <a:r>
+              <a:rPr lang="en-US" sz="1200" b="1" dirty="0" err="1">
+                <a:latin typeface="Consolas" panose="020B0609020204030204" pitchFamily="49" charset="0"/>
+              </a:rPr>
+              <a:t>Pd.options.display.max_rows</a:t>
+            </a:r>
+            <a:r>
+              <a:rPr lang="en-US" sz="1200" b="1" dirty="0">
+                <a:latin typeface="Consolas" panose="020B0609020204030204" pitchFamily="49" charset="0"/>
+              </a:rPr>
+              <a:t> = 20</a:t>
+            </a:r>
+          </a:p>
+          <a:p>
+            <a:pPr marL="93600"/>
+            <a:r>
+              <a:rPr lang="en-US" sz="1200" dirty="0"/>
+              <a:t>‘</a:t>
+            </a:r>
+            <a:r>
+              <a:rPr lang="en-US" sz="1200" dirty="0" err="1"/>
+              <a:t>max_rows</a:t>
+            </a:r>
+            <a:r>
+              <a:rPr lang="en-US" sz="1200" dirty="0"/>
+              <a:t>’ option is currently set to 20</a:t>
+            </a:r>
+          </a:p>
+          <a:p>
+            <a:endParaRPr lang="en-US" sz="1200" dirty="0"/>
+          </a:p>
+          <a:p>
+            <a:endParaRPr lang="en-US" sz="1200" dirty="0"/>
           </a:p>
         </p:txBody>
       </p:sp>
@@ -29668,7 +29731,7 @@
         </p:nvCxnSpPr>
         <p:spPr>
           <a:xfrm flipV="1">
-            <a:off x="10891520" y="1688836"/>
+            <a:off x="10891520" y="2728360"/>
             <a:ext cx="2927815" cy="7703"/>
           </a:xfrm>
           <a:prstGeom prst="line">
@@ -29706,7 +29769,7 @@
         </p:nvCxnSpPr>
         <p:spPr>
           <a:xfrm flipV="1">
-            <a:off x="10889853" y="4259116"/>
+            <a:off x="10889853" y="5314687"/>
             <a:ext cx="2927815" cy="7703"/>
           </a:xfrm>
           <a:prstGeom prst="line">
@@ -29742,7 +29805,7 @@
         </p:nvSpPr>
         <p:spPr>
           <a:xfrm>
-            <a:off x="10896493" y="4051233"/>
+            <a:off x="10896493" y="5106804"/>
             <a:ext cx="2944372" cy="5447645"/>
           </a:xfrm>
           <a:prstGeom prst="rect">
@@ -29780,7 +29843,7 @@
             <a:pPr marL="93600"/>
             <a:r>
               <a:rPr lang="en-US" sz="1200" dirty="0"/>
-              <a:t>the maximum number of rows displayed in pretty-print.</a:t>
+              <a:t>The maximum number of rows displayed in pretty-print.</a:t>
             </a:r>
           </a:p>
           <a:p>
@@ -29798,7 +29861,7 @@
             <a:pPr marL="93600"/>
             <a:r>
               <a:rPr lang="en-US" sz="1200" dirty="0"/>
-              <a:t> the maximum number of columns displayed in pretty-print.</a:t>
+              <a:t> The maximum number of columns displayed in pretty-print.</a:t>
             </a:r>
           </a:p>
           <a:p>
@@ -29816,7 +29879,7 @@
             <a:pPr marL="93600"/>
             <a:r>
               <a:rPr lang="en-US" sz="1200" dirty="0"/>
-              <a:t>controls whether the </a:t>
+              <a:t>Controls whether the </a:t>
             </a:r>
             <a:r>
               <a:rPr lang="en-US" sz="1200" dirty="0" err="1"/>
@@ -29842,7 +29905,7 @@
             <a:pPr marL="93600"/>
             <a:r>
               <a:rPr lang="en-US" sz="1200" dirty="0"/>
-              <a:t>controls whether a </a:t>
+              <a:t>Controls whether a </a:t>
             </a:r>
             <a:r>
               <a:rPr lang="en-US" sz="1200" dirty="0" err="1"/>
@@ -29868,7 +29931,7 @@
             <a:pPr marL="93600"/>
             <a:r>
               <a:rPr lang="en-US" sz="1200" dirty="0"/>
-              <a:t>the output display precision in decimal places.</a:t>
+              <a:t>The output display precision in decimal places.</a:t>
             </a:r>
           </a:p>
           <a:p>
@@ -29886,7 +29949,7 @@
             <a:pPr marL="93600"/>
             <a:r>
               <a:rPr lang="en-US" sz="1200" dirty="0"/>
-              <a:t>the maximum width of columns, longer cells will be truncated.</a:t>
+              <a:t>The maximum width of columns, longer cells will be truncated.</a:t>
             </a:r>
           </a:p>
           <a:p>
@@ -29904,7 +29967,7 @@
             <a:pPr marL="93600"/>
             <a:r>
               <a:rPr lang="en-US" sz="1200" dirty="0"/>
-              <a:t>the maximum number of columns displayed after calling </a:t>
+              <a:t>The maximum number of columns displayed after calling </a:t>
             </a:r>
             <a:r>
               <a:rPr lang="en-US" sz="1200" b="1" dirty="0">
@@ -29932,7 +29995,7 @@
             <a:pPr marL="93600"/>
             <a:r>
               <a:rPr lang="en-US" sz="1200" dirty="0"/>
-              <a:t>sets the rounding threshold to zero when displaying a Series/</a:t>
+              <a:t>Sets the rounding threshold to zero when displaying a Series/</a:t>
             </a:r>
             <a:r>
               <a:rPr lang="en-US" sz="1200" dirty="0" err="1"/>
@@ -29958,7 +30021,7 @@
             <a:pPr marL="93600"/>
             <a:r>
               <a:rPr lang="en-US" sz="1200" dirty="0"/>
-              <a:t>controls how column headers are justified</a:t>
+              <a:t>Controls how column headers are justified.</a:t>
             </a:r>
           </a:p>
         </p:txBody>
@@ -30028,7 +30091,7 @@
             <a:pPr marL="93600"/>
             <a:r>
               <a:rPr lang="en-US" sz="1200" dirty="0"/>
-              <a:t>plot a line graph for the </a:t>
+              <a:t>Plot a line graph for the </a:t>
             </a:r>
             <a:r>
               <a:rPr lang="en-US" sz="1200" dirty="0" err="1"/>
@@ -30149,7 +30212,7 @@
         <p:spPr>
           <a:xfrm>
             <a:off x="5774763" y="1537428"/>
-            <a:ext cx="2494279" cy="461665"/>
+            <a:ext cx="2647234" cy="461665"/>
           </a:xfrm>
           <a:prstGeom prst="rect">
             <a:avLst/>
@@ -30199,7 +30262,7 @@
             <a:pPr marL="93600"/>
             <a:r>
               <a:rPr lang="en-US" sz="1200" dirty="0"/>
-              <a:t>Plot a area graph of the </a:t>
+              <a:t>Plot an area graph of the </a:t>
             </a:r>
             <a:r>
               <a:rPr lang="en-US" sz="1200" dirty="0" err="1"/>
@@ -30585,7 +30648,7 @@
                 <a:rPr lang="en-US" sz="1200" b="1" dirty="0" err="1">
                   <a:latin typeface="Consolas" panose="020B0609020204030204" pitchFamily="49" charset="0"/>
                 </a:rPr>
-                <a:t>s.</a:t>
+                <a:t>df.</a:t>
               </a:r>
               <a:r>
                 <a:rPr lang="en-US" sz="1200" b="1" dirty="0" err="1">
@@ -30598,23 +30661,56 @@
                 <a:rPr lang="en-US" sz="1200" b="1" dirty="0">
                   <a:latin typeface="Consolas" panose="020B0609020204030204" pitchFamily="49" charset="0"/>
                 </a:rPr>
-                <a:t>(lambda x: [1, 2], axis=1)</a:t>
+                <a:t>(</a:t>
+              </a:r>
+              <a:r>
+                <a:rPr lang="en-GB" sz="1200" b="1" dirty="0">
+                  <a:latin typeface="Consolas" panose="020B0609020204030204" pitchFamily="49" charset="0"/>
+                </a:rPr>
+                <a:t>lambda s: </a:t>
+              </a:r>
+              <a:r>
+                <a:rPr lang="en-GB" sz="1200" b="1" dirty="0" err="1">
+                  <a:latin typeface="Consolas" panose="020B0609020204030204" pitchFamily="49" charset="0"/>
+                </a:rPr>
+                <a:t>s.max</a:t>
+              </a:r>
+              <a:r>
+                <a:rPr lang="en-GB" sz="1200" b="1" dirty="0">
+                  <a:latin typeface="Consolas" panose="020B0609020204030204" pitchFamily="49" charset="0"/>
+                </a:rPr>
+                <a:t>() - </a:t>
+              </a:r>
+              <a:r>
+                <a:rPr lang="en-GB" sz="1200" b="1" dirty="0" err="1">
+                  <a:latin typeface="Consolas" panose="020B0609020204030204" pitchFamily="49" charset="0"/>
+                </a:rPr>
+                <a:t>s.min</a:t>
+              </a:r>
+              <a:r>
+                <a:rPr lang="en-GB" sz="1200" b="1" dirty="0">
+                  <a:latin typeface="Consolas" panose="020B0609020204030204" pitchFamily="49" charset="0"/>
+                </a:rPr>
+                <a:t>(), axis=1</a:t>
+              </a:r>
+              <a:r>
+                <a:rPr lang="en-US" sz="1200" b="1" dirty="0">
+                  <a:latin typeface="Consolas" panose="020B0609020204030204" pitchFamily="49" charset="0"/>
+                </a:rPr>
+                <a:t>)</a:t>
               </a:r>
             </a:p>
             <a:p>
               <a:pPr marL="93600"/>
               <a:r>
                 <a:rPr lang="en-US" sz="1200" dirty="0"/>
-                <a:t>Returns a copy of the </a:t>
+                <a:t>Returns a Series with the difference of the maximum and minimum values of each row of the </a:t>
               </a:r>
               <a:r>
                 <a:rPr lang="en-US" sz="1200" dirty="0" err="1"/>
-                <a:t>dataframe</a:t>
+                <a:t>DataFrame</a:t>
               </a:r>
-              <a:r>
-                <a:rPr lang="en-US" sz="1200" dirty="0"/>
-                <a:t> with each element replaced with [1, 2], used when the logic is more complex per element.</a:t>
-              </a:r>
+              <a:endParaRPr lang="en-US" sz="1200" dirty="0"/>
             </a:p>
           </p:txBody>
         </p:sp>
@@ -30656,7 +30752,7 @@
               </a:r>
               <a:r>
                 <a:rPr lang="en-US" sz="1200" dirty="0"/>
-                <a:t>, useful for recategorizing or transforming data.</a:t>
+                <a:t> or Series, useful for recategorizing or transforming data.</a:t>
               </a:r>
             </a:p>
           </p:txBody>
@@ -31561,7 +31657,7 @@
               <a:pPr marL="93600"/>
               <a:r>
                 <a:rPr lang="en-US" sz="1200" dirty="0"/>
-                <a:t>convert non-numeric types to numeric. </a:t>
+                <a:t>Convert non-numeric types to numeric. </a:t>
               </a:r>
             </a:p>
             <a:p>
@@ -31589,7 +31685,7 @@
               <a:pPr marL="93600"/>
               <a:r>
                 <a:rPr lang="en-US" sz="1200" dirty="0"/>
-                <a:t>convert non-datetime types to datetime type</a:t>
+                <a:t>Convert non-datetime types to datetime type</a:t>
               </a:r>
             </a:p>
             <a:p>
@@ -31617,7 +31713,7 @@
               <a:pPr marL="93600"/>
               <a:r>
                 <a:rPr lang="en-US" sz="1200" dirty="0"/>
-                <a:t>convert non- </a:t>
+                <a:t>Convert non- </a:t>
               </a:r>
               <a:r>
                 <a:rPr lang="en-US" sz="1200" dirty="0" err="1"/>
@@ -31687,7 +31783,7 @@
               <a:pPr marL="93600"/>
               <a:r>
                 <a:rPr lang="en-US" sz="1200" dirty="0"/>
-                <a:t>convert data to (almost) any given type including categorical</a:t>
+                <a:t>Convert data to (almost) any given type including categorical</a:t>
               </a:r>
             </a:p>
             <a:p>
@@ -31715,7 +31811,7 @@
               <a:pPr marL="93600"/>
               <a:r>
                 <a:rPr lang="en-US" sz="1200" dirty="0"/>
-                <a:t>attempts to infer a better type for object type data.</a:t>
+                <a:t>Attempts to infer a better type for object type data.</a:t>
               </a:r>
             </a:p>
             <a:p>
@@ -31743,7 +31839,7 @@
               <a:pPr marL="93600"/>
               <a:r>
                 <a:rPr lang="en-US" sz="1200" dirty="0"/>
-                <a:t>convert columns to best possible </a:t>
+                <a:t>Convert columns to best possible </a:t>
               </a:r>
               <a:r>
                 <a:rPr lang="en-US" sz="1200" dirty="0" err="1"/>
@@ -32038,8 +32134,8 @@
             </p:nvSpPr>
             <p:spPr>
               <a:xfrm>
-                <a:off x="69627" y="6989169"/>
-                <a:ext cx="2649041" cy="830997"/>
+                <a:off x="133795" y="6989169"/>
+                <a:ext cx="2320647" cy="738664"/>
               </a:xfrm>
               <a:prstGeom prst="rect">
                 <a:avLst/>
@@ -32053,9 +32149,16 @@
               <a:lstStyle/>
               <a:p>
                 <a:r>
-                  <a:rPr lang="en-US" sz="1200" dirty="0"/>
-                  <a:t>If you have a Series, s, containing data of type datetime, use can use the dt accessor to get various sections of the value:</a:t>
+                  <a:rPr lang="en-US" sz="1050" b="0" i="0" dirty="0">
+                    <a:solidFill>
+                      <a:srgbClr val="1F2328"/>
+                    </a:solidFill>
+                    <a:effectLst/>
+                    <a:latin typeface="-apple-system"/>
+                  </a:rPr>
+                  <a:t>With a Series containing data of type datetime, the dt accessor is used to get various components of the datetime values:</a:t>
                 </a:r>
+                <a:endParaRPr lang="en-US" sz="1200" dirty="0"/>
               </a:p>
             </p:txBody>
           </p:sp>
@@ -32073,7 +32176,7 @@
             </p:nvSpPr>
             <p:spPr>
               <a:xfrm>
-                <a:off x="68156" y="7762874"/>
+                <a:off x="68156" y="7682664"/>
                 <a:ext cx="2649041" cy="830997"/>
               </a:xfrm>
               <a:prstGeom prst="rect">

</xml_diff>

<commit_message>
Italicised 'option_name' and fixed the max_rows example
</commit_message>
<xml_diff>
--- a/doc/cheatsheet/Pandas_Cheat_Sheet.pptx
+++ b/doc/cheatsheet/Pandas_Cheat_Sheet.pptx
@@ -262,7 +262,7 @@
           <a:p>
             <a:fld id="{79278B33-2949-49BE-B3B0-3F16CAF906FE}" type="datetimeFigureOut">
               <a:rPr lang="en-US" smtClean="0"/>
-              <a:t>4/30/2025</a:t>
+              <a:t>5/10/2025</a:t>
             </a:fld>
             <a:endParaRPr lang="en-US"/>
           </a:p>
@@ -432,7 +432,7 @@
           <a:p>
             <a:fld id="{79278B33-2949-49BE-B3B0-3F16CAF906FE}" type="datetimeFigureOut">
               <a:rPr lang="en-US" smtClean="0"/>
-              <a:t>4/30/2025</a:t>
+              <a:t>5/10/2025</a:t>
             </a:fld>
             <a:endParaRPr lang="en-US"/>
           </a:p>
@@ -612,7 +612,7 @@
           <a:p>
             <a:fld id="{79278B33-2949-49BE-B3B0-3F16CAF906FE}" type="datetimeFigureOut">
               <a:rPr lang="en-US" smtClean="0"/>
-              <a:t>4/30/2025</a:t>
+              <a:t>5/10/2025</a:t>
             </a:fld>
             <a:endParaRPr lang="en-US"/>
           </a:p>
@@ -782,7 +782,7 @@
           <a:p>
             <a:fld id="{79278B33-2949-49BE-B3B0-3F16CAF906FE}" type="datetimeFigureOut">
               <a:rPr lang="en-US" smtClean="0"/>
-              <a:t>4/30/2025</a:t>
+              <a:t>5/10/2025</a:t>
             </a:fld>
             <a:endParaRPr lang="en-US"/>
           </a:p>
@@ -1026,7 +1026,7 @@
           <a:p>
             <a:fld id="{79278B33-2949-49BE-B3B0-3F16CAF906FE}" type="datetimeFigureOut">
               <a:rPr lang="en-US" smtClean="0"/>
-              <a:t>4/30/2025</a:t>
+              <a:t>5/10/2025</a:t>
             </a:fld>
             <a:endParaRPr lang="en-US"/>
           </a:p>
@@ -1258,7 +1258,7 @@
           <a:p>
             <a:fld id="{79278B33-2949-49BE-B3B0-3F16CAF906FE}" type="datetimeFigureOut">
               <a:rPr lang="en-US" smtClean="0"/>
-              <a:t>4/30/2025</a:t>
+              <a:t>5/10/2025</a:t>
             </a:fld>
             <a:endParaRPr lang="en-US"/>
           </a:p>
@@ -1625,7 +1625,7 @@
           <a:p>
             <a:fld id="{79278B33-2949-49BE-B3B0-3F16CAF906FE}" type="datetimeFigureOut">
               <a:rPr lang="en-US" smtClean="0"/>
-              <a:t>4/30/2025</a:t>
+              <a:t>5/10/2025</a:t>
             </a:fld>
             <a:endParaRPr lang="en-US"/>
           </a:p>
@@ -1743,7 +1743,7 @@
           <a:p>
             <a:fld id="{79278B33-2949-49BE-B3B0-3F16CAF906FE}" type="datetimeFigureOut">
               <a:rPr lang="en-US" smtClean="0"/>
-              <a:t>4/30/2025</a:t>
+              <a:t>5/10/2025</a:t>
             </a:fld>
             <a:endParaRPr lang="en-US"/>
           </a:p>
@@ -1838,7 +1838,7 @@
           <a:p>
             <a:fld id="{79278B33-2949-49BE-B3B0-3F16CAF906FE}" type="datetimeFigureOut">
               <a:rPr lang="en-US" smtClean="0"/>
-              <a:t>4/30/2025</a:t>
+              <a:t>5/10/2025</a:t>
             </a:fld>
             <a:endParaRPr lang="en-US"/>
           </a:p>
@@ -2115,7 +2115,7 @@
           <a:p>
             <a:fld id="{79278B33-2949-49BE-B3B0-3F16CAF906FE}" type="datetimeFigureOut">
               <a:rPr lang="en-US" smtClean="0"/>
-              <a:t>4/30/2025</a:t>
+              <a:t>5/10/2025</a:t>
             </a:fld>
             <a:endParaRPr lang="en-US"/>
           </a:p>
@@ -2372,7 +2372,7 @@
           <a:p>
             <a:fld id="{79278B33-2949-49BE-B3B0-3F16CAF906FE}" type="datetimeFigureOut">
               <a:rPr lang="en-US" smtClean="0"/>
-              <a:t>4/30/2025</a:t>
+              <a:t>5/10/2025</a:t>
             </a:fld>
             <a:endParaRPr lang="en-US"/>
           </a:p>
@@ -2585,7 +2585,7 @@
           <a:p>
             <a:fld id="{79278B33-2949-49BE-B3B0-3F16CAF906FE}" type="datetimeFigureOut">
               <a:rPr lang="en-US" smtClean="0"/>
-              <a:t>4/30/2025</a:t>
+              <a:t>5/10/2025</a:t>
             </a:fld>
             <a:endParaRPr lang="en-US"/>
           </a:p>
@@ -9664,14 +9664,14 @@
           <a:effectLst/>
           <a:extLst>
             <a:ext uri="{909E8E84-426E-40dd-AFC4-6F175D3DCCD1}">
-              <a14:hiddenFill xmlns="" xmlns:a14="http://schemas.microsoft.com/office/drawing/2010/main">
+              <a14:hiddenFill xmlns:a14="http://schemas.microsoft.com/office/drawing/2010/main" xmlns="">
                 <a:solidFill>
                   <a:schemeClr val="accent1"/>
                 </a:solidFill>
               </a14:hiddenFill>
             </a:ext>
             <a:ext uri="{91240B29-F687-4f45-9708-019B960494DF}">
-              <a14:hiddenLine xmlns="" xmlns:a14="http://schemas.microsoft.com/office/drawing/2010/main" w="9525">
+              <a14:hiddenLine xmlns:a14="http://schemas.microsoft.com/office/drawing/2010/main" xmlns="" w="9525">
                 <a:solidFill>
                   <a:schemeClr val="tx1"/>
                 </a:solidFill>
@@ -9681,7 +9681,7 @@
               </a14:hiddenLine>
             </a:ext>
             <a:ext uri="{AF507438-7753-43e0-B8FC-AC1667EBCBE1}">
-              <a14:hiddenEffects xmlns="" xmlns:a14="http://schemas.microsoft.com/office/drawing/2010/main">
+              <a14:hiddenEffects xmlns:a14="http://schemas.microsoft.com/office/drawing/2010/main" xmlns="">
                 <a:effectLst>
                   <a:outerShdw dist="35921" dir="2700000" algn="ctr" rotWithShape="0">
                     <a:schemeClr val="bg2"/>
@@ -29648,64 +29648,65 @@
               <a:t>Options can be queried and set via: </a:t>
             </a:r>
             <a:r>
+              <a:rPr lang="en-US" sz="1200" b="1" dirty="0" err="1">
+                <a:latin typeface="Consolas" panose="020B0609020204030204" pitchFamily="49" charset="0"/>
+              </a:rPr>
+              <a:t>pd.options.</a:t>
+            </a:r>
+            <a:r>
+              <a:rPr lang="en-US" sz="1200" b="1" i="1" dirty="0" err="1">
+                <a:latin typeface="Consolas" panose="020B0609020204030204" pitchFamily="49" charset="0"/>
+              </a:rPr>
+              <a:t>option_name</a:t>
+            </a:r>
+            <a:r>
+              <a:rPr lang="en-US" sz="1200" dirty="0"/>
+              <a:t> (where </a:t>
+            </a:r>
+            <a:r>
+              <a:rPr lang="en-US" sz="1200" i="1" dirty="0" err="1"/>
+              <a:t>option_name</a:t>
+            </a:r>
+            <a:r>
+              <a:rPr lang="en-US" sz="1200" dirty="0"/>
+              <a:t> is the name of an option). For example:</a:t>
+            </a:r>
+          </a:p>
+          <a:p>
+            <a:r>
+              <a:rPr lang="en-US" sz="1200" b="1" dirty="0" err="1">
+                <a:latin typeface="Consolas" panose="020B0609020204030204" pitchFamily="49" charset="0"/>
+              </a:rPr>
+              <a:t>pd.options.display.max_rows</a:t>
+            </a:r>
+            <a:r>
               <a:rPr lang="en-US" sz="1200" b="1" dirty="0">
                 <a:latin typeface="Consolas" panose="020B0609020204030204" pitchFamily="49" charset="0"/>
               </a:rPr>
-              <a:t>pd.options._</a:t>
+              <a:t> = 20</a:t>
+            </a:r>
+          </a:p>
+          <a:p>
+            <a:pPr marL="93600"/>
+            <a:r>
+              <a:rPr lang="en-US" sz="1200" dirty="0"/>
+              <a:t>Set the </a:t>
             </a:r>
             <a:r>
               <a:rPr lang="en-US" sz="1200" b="1" dirty="0" err="1">
                 <a:latin typeface="Consolas" panose="020B0609020204030204" pitchFamily="49" charset="0"/>
               </a:rPr>
-              <a:t>option_name</a:t>
-            </a:r>
-            <a:r>
-              <a:rPr lang="en-US" sz="1200" b="1" dirty="0">
-                <a:latin typeface="Consolas" panose="020B0609020204030204" pitchFamily="49" charset="0"/>
-              </a:rPr>
-              <a:t>_</a:t>
+              <a:t>display.max_rows</a:t>
             </a:r>
             <a:r>
               <a:rPr lang="en-US" sz="1200" dirty="0"/>
-              <a:t> (where _</a:t>
-            </a:r>
-            <a:r>
-              <a:rPr lang="en-US" sz="1200" dirty="0" err="1"/>
-              <a:t>option_name</a:t>
-            </a:r>
-            <a:r>
-              <a:rPr lang="en-US" sz="1200" dirty="0"/>
-              <a:t>_ is the name of an option). For example:</a:t>
-            </a:r>
-          </a:p>
-          <a:p>
-            <a:r>
-              <a:rPr lang="en-US" sz="1200" b="1" dirty="0" err="1">
-                <a:latin typeface="Consolas" panose="020B0609020204030204" pitchFamily="49" charset="0"/>
-              </a:rPr>
-              <a:t>Pd.options.display.max_rows</a:t>
-            </a:r>
-            <a:r>
-              <a:rPr lang="en-US" sz="1200" b="1" dirty="0">
-                <a:latin typeface="Consolas" panose="020B0609020204030204" pitchFamily="49" charset="0"/>
-              </a:rPr>
-              <a:t> = 20</a:t>
-            </a:r>
-          </a:p>
-          <a:p>
-            <a:pPr marL="93600"/>
-            <a:r>
-              <a:rPr lang="en-US" sz="1200" dirty="0"/>
-              <a:t>‘</a:t>
-            </a:r>
-            <a:r>
-              <a:rPr lang="en-US" sz="1200" dirty="0" err="1"/>
-              <a:t>max_rows</a:t>
-            </a:r>
-            <a:r>
-              <a:rPr lang="en-US" sz="1200" dirty="0"/>
-              <a:t>’ option is currently set to 20</a:t>
-            </a:r>
+              <a:t> option </a:t>
+            </a:r>
+            <a:r>
+              <a:rPr lang="en-US" sz="1200"/>
+              <a:t>to 20.</a:t>
+            </a:r>
+            <a:endParaRPr lang="en-US" sz="1200" dirty="0"/>
           </a:p>
           <a:p>
             <a:endParaRPr lang="en-US" sz="1200" dirty="0"/>

</xml_diff>

<commit_message>
Typo fix for .astype() in cheatsheet
</commit_message>
<xml_diff>
--- a/doc/cheatsheet/Pandas_Cheat_Sheet.pptx
+++ b/doc/cheatsheet/Pandas_Cheat_Sheet.pptx
@@ -262,7 +262,7 @@
           <a:p>
             <a:fld id="{79278B33-2949-49BE-B3B0-3F16CAF906FE}" type="datetimeFigureOut">
               <a:rPr lang="en-US" smtClean="0"/>
-              <a:t>5/10/2025</a:t>
+              <a:t>5/30/25</a:t>
             </a:fld>
             <a:endParaRPr lang="en-US"/>
           </a:p>
@@ -432,7 +432,7 @@
           <a:p>
             <a:fld id="{79278B33-2949-49BE-B3B0-3F16CAF906FE}" type="datetimeFigureOut">
               <a:rPr lang="en-US" smtClean="0"/>
-              <a:t>5/10/2025</a:t>
+              <a:t>5/30/25</a:t>
             </a:fld>
             <a:endParaRPr lang="en-US"/>
           </a:p>
@@ -612,7 +612,7 @@
           <a:p>
             <a:fld id="{79278B33-2949-49BE-B3B0-3F16CAF906FE}" type="datetimeFigureOut">
               <a:rPr lang="en-US" smtClean="0"/>
-              <a:t>5/10/2025</a:t>
+              <a:t>5/30/25</a:t>
             </a:fld>
             <a:endParaRPr lang="en-US"/>
           </a:p>
@@ -782,7 +782,7 @@
           <a:p>
             <a:fld id="{79278B33-2949-49BE-B3B0-3F16CAF906FE}" type="datetimeFigureOut">
               <a:rPr lang="en-US" smtClean="0"/>
-              <a:t>5/10/2025</a:t>
+              <a:t>5/30/25</a:t>
             </a:fld>
             <a:endParaRPr lang="en-US"/>
           </a:p>
@@ -1026,7 +1026,7 @@
           <a:p>
             <a:fld id="{79278B33-2949-49BE-B3B0-3F16CAF906FE}" type="datetimeFigureOut">
               <a:rPr lang="en-US" smtClean="0"/>
-              <a:t>5/10/2025</a:t>
+              <a:t>5/30/25</a:t>
             </a:fld>
             <a:endParaRPr lang="en-US"/>
           </a:p>
@@ -1258,7 +1258,7 @@
           <a:p>
             <a:fld id="{79278B33-2949-49BE-B3B0-3F16CAF906FE}" type="datetimeFigureOut">
               <a:rPr lang="en-US" smtClean="0"/>
-              <a:t>5/10/2025</a:t>
+              <a:t>5/30/25</a:t>
             </a:fld>
             <a:endParaRPr lang="en-US"/>
           </a:p>
@@ -1625,7 +1625,7 @@
           <a:p>
             <a:fld id="{79278B33-2949-49BE-B3B0-3F16CAF906FE}" type="datetimeFigureOut">
               <a:rPr lang="en-US" smtClean="0"/>
-              <a:t>5/10/2025</a:t>
+              <a:t>5/30/25</a:t>
             </a:fld>
             <a:endParaRPr lang="en-US"/>
           </a:p>
@@ -1743,7 +1743,7 @@
           <a:p>
             <a:fld id="{79278B33-2949-49BE-B3B0-3F16CAF906FE}" type="datetimeFigureOut">
               <a:rPr lang="en-US" smtClean="0"/>
-              <a:t>5/10/2025</a:t>
+              <a:t>5/30/25</a:t>
             </a:fld>
             <a:endParaRPr lang="en-US"/>
           </a:p>
@@ -1838,7 +1838,7 @@
           <a:p>
             <a:fld id="{79278B33-2949-49BE-B3B0-3F16CAF906FE}" type="datetimeFigureOut">
               <a:rPr lang="en-US" smtClean="0"/>
-              <a:t>5/10/2025</a:t>
+              <a:t>5/30/25</a:t>
             </a:fld>
             <a:endParaRPr lang="en-US"/>
           </a:p>
@@ -2115,7 +2115,7 @@
           <a:p>
             <a:fld id="{79278B33-2949-49BE-B3B0-3F16CAF906FE}" type="datetimeFigureOut">
               <a:rPr lang="en-US" smtClean="0"/>
-              <a:t>5/10/2025</a:t>
+              <a:t>5/30/25</a:t>
             </a:fld>
             <a:endParaRPr lang="en-US"/>
           </a:p>
@@ -2372,7 +2372,7 @@
           <a:p>
             <a:fld id="{79278B33-2949-49BE-B3B0-3F16CAF906FE}" type="datetimeFigureOut">
               <a:rPr lang="en-US" smtClean="0"/>
-              <a:t>5/10/2025</a:t>
+              <a:t>5/30/25</a:t>
             </a:fld>
             <a:endParaRPr lang="en-US"/>
           </a:p>
@@ -2585,7 +2585,7 @@
           <a:p>
             <a:fld id="{79278B33-2949-49BE-B3B0-3F16CAF906FE}" type="datetimeFigureOut">
               <a:rPr lang="en-US" smtClean="0"/>
-              <a:t>5/10/2025</a:t>
+              <a:t>5/30/25</a:t>
             </a:fld>
             <a:endParaRPr lang="en-US"/>
           </a:p>
@@ -9664,14 +9664,14 @@
           <a:effectLst/>
           <a:extLst>
             <a:ext uri="{909E8E84-426E-40dd-AFC4-6F175D3DCCD1}">
-              <a14:hiddenFill xmlns:a14="http://schemas.microsoft.com/office/drawing/2010/main" xmlns="">
+              <a14:hiddenFill xmlns="" xmlns:a14="http://schemas.microsoft.com/office/drawing/2010/main">
                 <a:solidFill>
                   <a:schemeClr val="accent1"/>
                 </a:solidFill>
               </a14:hiddenFill>
             </a:ext>
             <a:ext uri="{91240B29-F687-4f45-9708-019B960494DF}">
-              <a14:hiddenLine xmlns:a14="http://schemas.microsoft.com/office/drawing/2010/main" xmlns="" w="9525">
+              <a14:hiddenLine xmlns="" xmlns:a14="http://schemas.microsoft.com/office/drawing/2010/main" w="9525">
                 <a:solidFill>
                   <a:schemeClr val="tx1"/>
                 </a:solidFill>
@@ -9681,7 +9681,7 @@
               </a14:hiddenLine>
             </a:ext>
             <a:ext uri="{AF507438-7753-43e0-B8FC-AC1667EBCBE1}">
-              <a14:hiddenEffects xmlns:a14="http://schemas.microsoft.com/office/drawing/2010/main" xmlns="">
+              <a14:hiddenEffects xmlns="" xmlns:a14="http://schemas.microsoft.com/office/drawing/2010/main">
                 <a:effectLst>
                   <a:outerShdw dist="35921" dir="2700000" algn="ctr" rotWithShape="0">
                     <a:schemeClr val="bg2"/>
@@ -31764,14 +31764,20 @@
                 <a:rPr lang="en-US" sz="1200" b="1" dirty="0" err="1">
                   <a:latin typeface="Consolas" panose="020B0609020204030204" pitchFamily="49" charset="0"/>
                 </a:rPr>
-                <a:t>df.</a:t>
+                <a:t>df</a:t>
               </a:r>
               <a:r>
-                <a:rPr lang="en-US" sz="1200" b="1" dirty="0" err="1">
+                <a:rPr lang="en-US" sz="1200" b="1" err="1">
+                  <a:latin typeface="Consolas" panose="020B0609020204030204" pitchFamily="49" charset="0"/>
+                </a:rPr>
+                <a:t>.</a:t>
+              </a:r>
+              <a:r>
+                <a:rPr lang="en-US" sz="1200" b="1">
                   <a:latin typeface="Consolas" panose="020B0609020204030204" pitchFamily="49" charset="0"/>
                   <a:hlinkClick r:id="rId49"/>
                 </a:rPr>
-                <a:t>as_type</a:t>
+                <a:t>astype</a:t>
               </a:r>
               <a:r>
                 <a:rPr lang="en-US" sz="1200" b="1" dirty="0">

</xml_diff>

<commit_message>
DOC: Typo fix for .astype() in cheatsheet (#61528)
Typo fix for .astype() in cheatsheet
</commit_message>
<xml_diff>
--- a/doc/cheatsheet/Pandas_Cheat_Sheet.pptx
+++ b/doc/cheatsheet/Pandas_Cheat_Sheet.pptx
@@ -262,7 +262,7 @@
           <a:p>
             <a:fld id="{79278B33-2949-49BE-B3B0-3F16CAF906FE}" type="datetimeFigureOut">
               <a:rPr lang="en-US" smtClean="0"/>
-              <a:t>5/10/2025</a:t>
+              <a:t>5/30/25</a:t>
             </a:fld>
             <a:endParaRPr lang="en-US"/>
           </a:p>
@@ -432,7 +432,7 @@
           <a:p>
             <a:fld id="{79278B33-2949-49BE-B3B0-3F16CAF906FE}" type="datetimeFigureOut">
               <a:rPr lang="en-US" smtClean="0"/>
-              <a:t>5/10/2025</a:t>
+              <a:t>5/30/25</a:t>
             </a:fld>
             <a:endParaRPr lang="en-US"/>
           </a:p>
@@ -612,7 +612,7 @@
           <a:p>
             <a:fld id="{79278B33-2949-49BE-B3B0-3F16CAF906FE}" type="datetimeFigureOut">
               <a:rPr lang="en-US" smtClean="0"/>
-              <a:t>5/10/2025</a:t>
+              <a:t>5/30/25</a:t>
             </a:fld>
             <a:endParaRPr lang="en-US"/>
           </a:p>
@@ -782,7 +782,7 @@
           <a:p>
             <a:fld id="{79278B33-2949-49BE-B3B0-3F16CAF906FE}" type="datetimeFigureOut">
               <a:rPr lang="en-US" smtClean="0"/>
-              <a:t>5/10/2025</a:t>
+              <a:t>5/30/25</a:t>
             </a:fld>
             <a:endParaRPr lang="en-US"/>
           </a:p>
@@ -1026,7 +1026,7 @@
           <a:p>
             <a:fld id="{79278B33-2949-49BE-B3B0-3F16CAF906FE}" type="datetimeFigureOut">
               <a:rPr lang="en-US" smtClean="0"/>
-              <a:t>5/10/2025</a:t>
+              <a:t>5/30/25</a:t>
             </a:fld>
             <a:endParaRPr lang="en-US"/>
           </a:p>
@@ -1258,7 +1258,7 @@
           <a:p>
             <a:fld id="{79278B33-2949-49BE-B3B0-3F16CAF906FE}" type="datetimeFigureOut">
               <a:rPr lang="en-US" smtClean="0"/>
-              <a:t>5/10/2025</a:t>
+              <a:t>5/30/25</a:t>
             </a:fld>
             <a:endParaRPr lang="en-US"/>
           </a:p>
@@ -1625,7 +1625,7 @@
           <a:p>
             <a:fld id="{79278B33-2949-49BE-B3B0-3F16CAF906FE}" type="datetimeFigureOut">
               <a:rPr lang="en-US" smtClean="0"/>
-              <a:t>5/10/2025</a:t>
+              <a:t>5/30/25</a:t>
             </a:fld>
             <a:endParaRPr lang="en-US"/>
           </a:p>
@@ -1743,7 +1743,7 @@
           <a:p>
             <a:fld id="{79278B33-2949-49BE-B3B0-3F16CAF906FE}" type="datetimeFigureOut">
               <a:rPr lang="en-US" smtClean="0"/>
-              <a:t>5/10/2025</a:t>
+              <a:t>5/30/25</a:t>
             </a:fld>
             <a:endParaRPr lang="en-US"/>
           </a:p>
@@ -1838,7 +1838,7 @@
           <a:p>
             <a:fld id="{79278B33-2949-49BE-B3B0-3F16CAF906FE}" type="datetimeFigureOut">
               <a:rPr lang="en-US" smtClean="0"/>
-              <a:t>5/10/2025</a:t>
+              <a:t>5/30/25</a:t>
             </a:fld>
             <a:endParaRPr lang="en-US"/>
           </a:p>
@@ -2115,7 +2115,7 @@
           <a:p>
             <a:fld id="{79278B33-2949-49BE-B3B0-3F16CAF906FE}" type="datetimeFigureOut">
               <a:rPr lang="en-US" smtClean="0"/>
-              <a:t>5/10/2025</a:t>
+              <a:t>5/30/25</a:t>
             </a:fld>
             <a:endParaRPr lang="en-US"/>
           </a:p>
@@ -2372,7 +2372,7 @@
           <a:p>
             <a:fld id="{79278B33-2949-49BE-B3B0-3F16CAF906FE}" type="datetimeFigureOut">
               <a:rPr lang="en-US" smtClean="0"/>
-              <a:t>5/10/2025</a:t>
+              <a:t>5/30/25</a:t>
             </a:fld>
             <a:endParaRPr lang="en-US"/>
           </a:p>
@@ -2585,7 +2585,7 @@
           <a:p>
             <a:fld id="{79278B33-2949-49BE-B3B0-3F16CAF906FE}" type="datetimeFigureOut">
               <a:rPr lang="en-US" smtClean="0"/>
-              <a:t>5/10/2025</a:t>
+              <a:t>5/30/25</a:t>
             </a:fld>
             <a:endParaRPr lang="en-US"/>
           </a:p>
@@ -9664,14 +9664,14 @@
           <a:effectLst/>
           <a:extLst>
             <a:ext uri="{909E8E84-426E-40dd-AFC4-6F175D3DCCD1}">
-              <a14:hiddenFill xmlns:a14="http://schemas.microsoft.com/office/drawing/2010/main" xmlns="">
+              <a14:hiddenFill xmlns="" xmlns:a14="http://schemas.microsoft.com/office/drawing/2010/main">
                 <a:solidFill>
                   <a:schemeClr val="accent1"/>
                 </a:solidFill>
               </a14:hiddenFill>
             </a:ext>
             <a:ext uri="{91240B29-F687-4f45-9708-019B960494DF}">
-              <a14:hiddenLine xmlns:a14="http://schemas.microsoft.com/office/drawing/2010/main" xmlns="" w="9525">
+              <a14:hiddenLine xmlns="" xmlns:a14="http://schemas.microsoft.com/office/drawing/2010/main" w="9525">
                 <a:solidFill>
                   <a:schemeClr val="tx1"/>
                 </a:solidFill>
@@ -9681,7 +9681,7 @@
               </a14:hiddenLine>
             </a:ext>
             <a:ext uri="{AF507438-7753-43e0-B8FC-AC1667EBCBE1}">
-              <a14:hiddenEffects xmlns:a14="http://schemas.microsoft.com/office/drawing/2010/main" xmlns="">
+              <a14:hiddenEffects xmlns="" xmlns:a14="http://schemas.microsoft.com/office/drawing/2010/main">
                 <a:effectLst>
                   <a:outerShdw dist="35921" dir="2700000" algn="ctr" rotWithShape="0">
                     <a:schemeClr val="bg2"/>
@@ -31764,14 +31764,20 @@
                 <a:rPr lang="en-US" sz="1200" b="1" dirty="0" err="1">
                   <a:latin typeface="Consolas" panose="020B0609020204030204" pitchFamily="49" charset="0"/>
                 </a:rPr>
-                <a:t>df.</a:t>
+                <a:t>df</a:t>
               </a:r>
               <a:r>
-                <a:rPr lang="en-US" sz="1200" b="1" dirty="0" err="1">
+                <a:rPr lang="en-US" sz="1200" b="1" err="1">
+                  <a:latin typeface="Consolas" panose="020B0609020204030204" pitchFamily="49" charset="0"/>
+                </a:rPr>
+                <a:t>.</a:t>
+              </a:r>
+              <a:r>
+                <a:rPr lang="en-US" sz="1200" b="1">
                   <a:latin typeface="Consolas" panose="020B0609020204030204" pitchFamily="49" charset="0"/>
                   <a:hlinkClick r:id="rId49"/>
                 </a:rPr>
-                <a:t>as_type</a:t>
+                <a:t>astype</a:t>
               </a:r>
               <a:r>
                 <a:rPr lang="en-US" sz="1200" b="1" dirty="0">

</xml_diff>